<commit_message>
atualizacao do artefato 15
</commit_message>
<xml_diff>
--- a/Artefatos/15-ArquiteturaDeNegocioParaCadaCenario.pptx
+++ b/Artefatos/15-ArquiteturaDeNegocioParaCadaCenario.pptx
@@ -1,22 +1,116 @@
 
 <file path=ppt/presentation.xml><?xml version="1.0" encoding="utf-8"?>
-<p:presentation xmlns:a="http://schemas.openxmlformats.org/drawingml/2006/main" xmlns:p="http://schemas.openxmlformats.org/presentationml/2006/main" xmlns:r="http://schemas.openxmlformats.org/officeDocument/2006/relationships" xmlns:p14="http://schemas.microsoft.com/office/powerpoint/2010/main" xmlns:p15="http://schemas.microsoft.com/office/powerpoint/2012/main" xmlns:mc="http://schemas.openxmlformats.org/markup-compatibility/2006">
+<p:presentation xmlns:a="http://schemas.openxmlformats.org/drawingml/2006/main" xmlns:r="http://schemas.openxmlformats.org/officeDocument/2006/relationships" xmlns:p="http://schemas.openxmlformats.org/presentationml/2006/main">
   <p:sldMasterIdLst>
-    <p:sldMasterId id="2147483648" r:id="rId2"/>
+    <p:sldMasterId id="2147483648" r:id="rId1"/>
   </p:sldMasterIdLst>
   <p:sldIdLst>
-    <p:sldId id="256" r:id="rId3"/>
+    <p:sldId id="256" r:id="rId2"/>
+    <p:sldId id="258" r:id="rId3"/>
     <p:sldId id="257" r:id="rId4"/>
-    <p:sldId id="258" r:id="rId5"/>
-    <p:sldId id="259" r:id="rId6"/>
   </p:sldIdLst>
   <p:sldSz cx="10080625" cy="5670550"/>
-  <p:notesSz cx="7559675" cy="10691812"/>
+  <p:notesSz cx="7559675" cy="10691813"/>
+  <p:defaultTextStyle>
+    <a:defPPr>
+      <a:defRPr lang="pt-BR"/>
+    </a:defPPr>
+    <a:lvl1pPr marL="0" algn="l" defTabSz="914400" rtl="0" eaLnBrk="1" latinLnBrk="0" hangingPunct="1">
+      <a:defRPr sz="1800" kern="1200">
+        <a:solidFill>
+          <a:schemeClr val="tx1"/>
+        </a:solidFill>
+        <a:latin typeface="+mn-lt"/>
+        <a:ea typeface="+mn-ea"/>
+        <a:cs typeface="+mn-cs"/>
+      </a:defRPr>
+    </a:lvl1pPr>
+    <a:lvl2pPr marL="457200" algn="l" defTabSz="914400" rtl="0" eaLnBrk="1" latinLnBrk="0" hangingPunct="1">
+      <a:defRPr sz="1800" kern="1200">
+        <a:solidFill>
+          <a:schemeClr val="tx1"/>
+        </a:solidFill>
+        <a:latin typeface="+mn-lt"/>
+        <a:ea typeface="+mn-ea"/>
+        <a:cs typeface="+mn-cs"/>
+      </a:defRPr>
+    </a:lvl2pPr>
+    <a:lvl3pPr marL="914400" algn="l" defTabSz="914400" rtl="0" eaLnBrk="1" latinLnBrk="0" hangingPunct="1">
+      <a:defRPr sz="1800" kern="1200">
+        <a:solidFill>
+          <a:schemeClr val="tx1"/>
+        </a:solidFill>
+        <a:latin typeface="+mn-lt"/>
+        <a:ea typeface="+mn-ea"/>
+        <a:cs typeface="+mn-cs"/>
+      </a:defRPr>
+    </a:lvl3pPr>
+    <a:lvl4pPr marL="1371600" algn="l" defTabSz="914400" rtl="0" eaLnBrk="1" latinLnBrk="0" hangingPunct="1">
+      <a:defRPr sz="1800" kern="1200">
+        <a:solidFill>
+          <a:schemeClr val="tx1"/>
+        </a:solidFill>
+        <a:latin typeface="+mn-lt"/>
+        <a:ea typeface="+mn-ea"/>
+        <a:cs typeface="+mn-cs"/>
+      </a:defRPr>
+    </a:lvl4pPr>
+    <a:lvl5pPr marL="1828800" algn="l" defTabSz="914400" rtl="0" eaLnBrk="1" latinLnBrk="0" hangingPunct="1">
+      <a:defRPr sz="1800" kern="1200">
+        <a:solidFill>
+          <a:schemeClr val="tx1"/>
+        </a:solidFill>
+        <a:latin typeface="+mn-lt"/>
+        <a:ea typeface="+mn-ea"/>
+        <a:cs typeface="+mn-cs"/>
+      </a:defRPr>
+    </a:lvl5pPr>
+    <a:lvl6pPr marL="2286000" algn="l" defTabSz="914400" rtl="0" eaLnBrk="1" latinLnBrk="0" hangingPunct="1">
+      <a:defRPr sz="1800" kern="1200">
+        <a:solidFill>
+          <a:schemeClr val="tx1"/>
+        </a:solidFill>
+        <a:latin typeface="+mn-lt"/>
+        <a:ea typeface="+mn-ea"/>
+        <a:cs typeface="+mn-cs"/>
+      </a:defRPr>
+    </a:lvl6pPr>
+    <a:lvl7pPr marL="2743200" algn="l" defTabSz="914400" rtl="0" eaLnBrk="1" latinLnBrk="0" hangingPunct="1">
+      <a:defRPr sz="1800" kern="1200">
+        <a:solidFill>
+          <a:schemeClr val="tx1"/>
+        </a:solidFill>
+        <a:latin typeface="+mn-lt"/>
+        <a:ea typeface="+mn-ea"/>
+        <a:cs typeface="+mn-cs"/>
+      </a:defRPr>
+    </a:lvl7pPr>
+    <a:lvl8pPr marL="3200400" algn="l" defTabSz="914400" rtl="0" eaLnBrk="1" latinLnBrk="0" hangingPunct="1">
+      <a:defRPr sz="1800" kern="1200">
+        <a:solidFill>
+          <a:schemeClr val="tx1"/>
+        </a:solidFill>
+        <a:latin typeface="+mn-lt"/>
+        <a:ea typeface="+mn-ea"/>
+        <a:cs typeface="+mn-cs"/>
+      </a:defRPr>
+    </a:lvl8pPr>
+    <a:lvl9pPr marL="3657600" algn="l" defTabSz="914400" rtl="0" eaLnBrk="1" latinLnBrk="0" hangingPunct="1">
+      <a:defRPr sz="1800" kern="1200">
+        <a:solidFill>
+          <a:schemeClr val="tx1"/>
+        </a:solidFill>
+        <a:latin typeface="+mn-lt"/>
+        <a:ea typeface="+mn-ea"/>
+        <a:cs typeface="+mn-cs"/>
+      </a:defRPr>
+    </a:lvl9pPr>
+  </p:defaultTextStyle>
 </p:presentation>
 </file>
 
 <file path=ppt/slideLayouts/slideLayout1.xml><?xml version="1.0" encoding="utf-8"?>
-<p:sldLayout xmlns:a="http://schemas.openxmlformats.org/drawingml/2006/main" xmlns:p="http://schemas.openxmlformats.org/presentationml/2006/main" xmlns:r="http://schemas.openxmlformats.org/officeDocument/2006/relationships" xmlns:p14="http://schemas.microsoft.com/office/powerpoint/2010/main" xmlns:p15="http://schemas.microsoft.com/office/powerpoint/2012/main" xmlns:mc="http://schemas.openxmlformats.org/markup-compatibility/2006" type="blank" preserve="1">
+<p:sldLayout xmlns:a="http://schemas.openxmlformats.org/drawingml/2006/main" xmlns:r="http://schemas.openxmlformats.org/officeDocument/2006/relationships" xmlns:p="http://schemas.openxmlformats.org/presentationml/2006/main" type="blank" preserve="1">
   <p:cSld name="Blank Slide">
     <p:spTree>
       <p:nvGrpSpPr>
@@ -34,11 +128,14 @@
       </p:grpSpPr>
     </p:spTree>
   </p:cSld>
+  <p:clrMapOvr>
+    <a:masterClrMapping/>
+  </p:clrMapOvr>
 </p:sldLayout>
 </file>
 
 <file path=ppt/slideLayouts/slideLayout10.xml><?xml version="1.0" encoding="utf-8"?>
-<p:sldLayout xmlns:a="http://schemas.openxmlformats.org/drawingml/2006/main" xmlns:p="http://schemas.openxmlformats.org/presentationml/2006/main" xmlns:r="http://schemas.openxmlformats.org/officeDocument/2006/relationships" xmlns:p14="http://schemas.microsoft.com/office/powerpoint/2010/main" xmlns:p15="http://schemas.microsoft.com/office/powerpoint/2012/main" xmlns:mc="http://schemas.openxmlformats.org/markup-compatibility/2006" type="objOverTx" preserve="1">
+<p:sldLayout xmlns:a="http://schemas.openxmlformats.org/drawingml/2006/main" xmlns:r="http://schemas.openxmlformats.org/officeDocument/2006/relationships" xmlns:p="http://schemas.openxmlformats.org/presentationml/2006/main" type="objOverTx" preserve="1">
   <p:cSld name="Title, Content over Content">
     <p:spTree>
       <p:nvGrpSpPr>
@@ -74,12 +171,13 @@
           </a:prstGeom>
         </p:spPr>
         <p:txBody>
-          <a:bodyPr lIns="0" rIns="0" tIns="0" bIns="0" anchor="ctr">
+          <a:bodyPr lIns="0" tIns="0" rIns="0" bIns="0" anchor="ctr">
             <a:spAutoFit/>
           </a:bodyPr>
+          <a:lstStyle/>
           <a:p>
             <a:pPr algn="ctr"/>
-            <a:endParaRPr b="0" lang="pt-BR" sz="4400" spc="-1" strike="noStrike">
+            <a:endParaRPr lang="pt-BR" sz="4400" b="0" strike="noStrike" spc="-1">
               <a:latin typeface="Arial"/>
             </a:endParaRPr>
           </a:p>
@@ -105,11 +203,12 @@
           </a:prstGeom>
         </p:spPr>
         <p:txBody>
-          <a:bodyPr lIns="0" rIns="0" tIns="0" bIns="0">
+          <a:bodyPr lIns="0" tIns="0" rIns="0" bIns="0">
             <a:normAutofit/>
           </a:bodyPr>
-          <a:p>
-            <a:endParaRPr b="0" lang="pt-BR" sz="3200" spc="-1" strike="noStrike">
+          <a:lstStyle/>
+          <a:p>
+            <a:endParaRPr lang="pt-BR" sz="3200" b="0" strike="noStrike" spc="-1">
               <a:latin typeface="Arial"/>
             </a:endParaRPr>
           </a:p>
@@ -135,11 +234,12 @@
           </a:prstGeom>
         </p:spPr>
         <p:txBody>
-          <a:bodyPr lIns="0" rIns="0" tIns="0" bIns="0">
+          <a:bodyPr lIns="0" tIns="0" rIns="0" bIns="0">
             <a:normAutofit/>
           </a:bodyPr>
-          <a:p>
-            <a:endParaRPr b="0" lang="pt-BR" sz="3200" spc="-1" strike="noStrike">
+          <a:lstStyle/>
+          <a:p>
+            <a:endParaRPr lang="pt-BR" sz="3200" b="0" strike="noStrike" spc="-1">
               <a:latin typeface="Arial"/>
             </a:endParaRPr>
           </a:p>
@@ -147,11 +247,14 @@
       </p:sp>
     </p:spTree>
   </p:cSld>
+  <p:clrMapOvr>
+    <a:masterClrMapping/>
+  </p:clrMapOvr>
 </p:sldLayout>
 </file>
 
 <file path=ppt/slideLayouts/slideLayout11.xml><?xml version="1.0" encoding="utf-8"?>
-<p:sldLayout xmlns:a="http://schemas.openxmlformats.org/drawingml/2006/main" xmlns:p="http://schemas.openxmlformats.org/presentationml/2006/main" xmlns:r="http://schemas.openxmlformats.org/officeDocument/2006/relationships" xmlns:p14="http://schemas.microsoft.com/office/powerpoint/2010/main" xmlns:p15="http://schemas.microsoft.com/office/powerpoint/2012/main" xmlns:mc="http://schemas.openxmlformats.org/markup-compatibility/2006" type="fourObj" preserve="1">
+<p:sldLayout xmlns:a="http://schemas.openxmlformats.org/drawingml/2006/main" xmlns:r="http://schemas.openxmlformats.org/officeDocument/2006/relationships" xmlns:p="http://schemas.openxmlformats.org/presentationml/2006/main" type="fourObj" preserve="1">
   <p:cSld name="Title, 4 Content">
     <p:spTree>
       <p:nvGrpSpPr>
@@ -187,12 +290,13 @@
           </a:prstGeom>
         </p:spPr>
         <p:txBody>
-          <a:bodyPr lIns="0" rIns="0" tIns="0" bIns="0" anchor="ctr">
+          <a:bodyPr lIns="0" tIns="0" rIns="0" bIns="0" anchor="ctr">
             <a:spAutoFit/>
           </a:bodyPr>
+          <a:lstStyle/>
           <a:p>
             <a:pPr algn="ctr"/>
-            <a:endParaRPr b="0" lang="pt-BR" sz="4400" spc="-1" strike="noStrike">
+            <a:endParaRPr lang="pt-BR" sz="4400" b="0" strike="noStrike" spc="-1">
               <a:latin typeface="Arial"/>
             </a:endParaRPr>
           </a:p>
@@ -218,11 +322,12 @@
           </a:prstGeom>
         </p:spPr>
         <p:txBody>
-          <a:bodyPr lIns="0" rIns="0" tIns="0" bIns="0">
+          <a:bodyPr lIns="0" tIns="0" rIns="0" bIns="0">
             <a:normAutofit/>
           </a:bodyPr>
-          <a:p>
-            <a:endParaRPr b="0" lang="pt-BR" sz="3200" spc="-1" strike="noStrike">
+          <a:lstStyle/>
+          <a:p>
+            <a:endParaRPr lang="pt-BR" sz="3200" b="0" strike="noStrike" spc="-1">
               <a:latin typeface="Arial"/>
             </a:endParaRPr>
           </a:p>
@@ -248,11 +353,12 @@
           </a:prstGeom>
         </p:spPr>
         <p:txBody>
-          <a:bodyPr lIns="0" rIns="0" tIns="0" bIns="0">
+          <a:bodyPr lIns="0" tIns="0" rIns="0" bIns="0">
             <a:normAutofit/>
           </a:bodyPr>
-          <a:p>
-            <a:endParaRPr b="0" lang="pt-BR" sz="3200" spc="-1" strike="noStrike">
+          <a:lstStyle/>
+          <a:p>
+            <a:endParaRPr lang="pt-BR" sz="3200" b="0" strike="noStrike" spc="-1">
               <a:latin typeface="Arial"/>
             </a:endParaRPr>
           </a:p>
@@ -278,11 +384,12 @@
           </a:prstGeom>
         </p:spPr>
         <p:txBody>
-          <a:bodyPr lIns="0" rIns="0" tIns="0" bIns="0">
+          <a:bodyPr lIns="0" tIns="0" rIns="0" bIns="0">
             <a:normAutofit/>
           </a:bodyPr>
-          <a:p>
-            <a:endParaRPr b="0" lang="pt-BR" sz="3200" spc="-1" strike="noStrike">
+          <a:lstStyle/>
+          <a:p>
+            <a:endParaRPr lang="pt-BR" sz="3200" b="0" strike="noStrike" spc="-1">
               <a:latin typeface="Arial"/>
             </a:endParaRPr>
           </a:p>
@@ -308,11 +415,12 @@
           </a:prstGeom>
         </p:spPr>
         <p:txBody>
-          <a:bodyPr lIns="0" rIns="0" tIns="0" bIns="0">
+          <a:bodyPr lIns="0" tIns="0" rIns="0" bIns="0">
             <a:normAutofit/>
           </a:bodyPr>
-          <a:p>
-            <a:endParaRPr b="0" lang="pt-BR" sz="3200" spc="-1" strike="noStrike">
+          <a:lstStyle/>
+          <a:p>
+            <a:endParaRPr lang="pt-BR" sz="3200" b="0" strike="noStrike" spc="-1">
               <a:latin typeface="Arial"/>
             </a:endParaRPr>
           </a:p>
@@ -320,11 +428,14 @@
       </p:sp>
     </p:spTree>
   </p:cSld>
+  <p:clrMapOvr>
+    <a:masterClrMapping/>
+  </p:clrMapOvr>
 </p:sldLayout>
 </file>
 
 <file path=ppt/slideLayouts/slideLayout12.xml><?xml version="1.0" encoding="utf-8"?>
-<p:sldLayout xmlns:a="http://schemas.openxmlformats.org/drawingml/2006/main" xmlns:p="http://schemas.openxmlformats.org/presentationml/2006/main" xmlns:r="http://schemas.openxmlformats.org/officeDocument/2006/relationships" xmlns:p14="http://schemas.microsoft.com/office/powerpoint/2010/main" xmlns:p15="http://schemas.microsoft.com/office/powerpoint/2012/main" xmlns:mc="http://schemas.openxmlformats.org/markup-compatibility/2006" type="blank" preserve="1">
+<p:sldLayout xmlns:a="http://schemas.openxmlformats.org/drawingml/2006/main" xmlns:r="http://schemas.openxmlformats.org/officeDocument/2006/relationships" xmlns:p="http://schemas.openxmlformats.org/presentationml/2006/main" type="blank" preserve="1">
   <p:cSld name="Title, 6 Content">
     <p:spTree>
       <p:nvGrpSpPr>
@@ -360,12 +471,13 @@
           </a:prstGeom>
         </p:spPr>
         <p:txBody>
-          <a:bodyPr lIns="0" rIns="0" tIns="0" bIns="0" anchor="ctr">
+          <a:bodyPr lIns="0" tIns="0" rIns="0" bIns="0" anchor="ctr">
             <a:spAutoFit/>
           </a:bodyPr>
+          <a:lstStyle/>
           <a:p>
             <a:pPr algn="ctr"/>
-            <a:endParaRPr b="0" lang="pt-BR" sz="4400" spc="-1" strike="noStrike">
+            <a:endParaRPr lang="pt-BR" sz="4400" b="0" strike="noStrike" spc="-1">
               <a:latin typeface="Arial"/>
             </a:endParaRPr>
           </a:p>
@@ -391,11 +503,12 @@
           </a:prstGeom>
         </p:spPr>
         <p:txBody>
-          <a:bodyPr lIns="0" rIns="0" tIns="0" bIns="0">
+          <a:bodyPr lIns="0" tIns="0" rIns="0" bIns="0">
             <a:normAutofit/>
           </a:bodyPr>
-          <a:p>
-            <a:endParaRPr b="0" lang="pt-BR" sz="3200" spc="-1" strike="noStrike">
+          <a:lstStyle/>
+          <a:p>
+            <a:endParaRPr lang="pt-BR" sz="3200" b="0" strike="noStrike" spc="-1">
               <a:latin typeface="Arial"/>
             </a:endParaRPr>
           </a:p>
@@ -421,11 +534,12 @@
           </a:prstGeom>
         </p:spPr>
         <p:txBody>
-          <a:bodyPr lIns="0" rIns="0" tIns="0" bIns="0">
+          <a:bodyPr lIns="0" tIns="0" rIns="0" bIns="0">
             <a:normAutofit/>
           </a:bodyPr>
-          <a:p>
-            <a:endParaRPr b="0" lang="pt-BR" sz="3200" spc="-1" strike="noStrike">
+          <a:lstStyle/>
+          <a:p>
+            <a:endParaRPr lang="pt-BR" sz="3200" b="0" strike="noStrike" spc="-1">
               <a:latin typeface="Arial"/>
             </a:endParaRPr>
           </a:p>
@@ -451,11 +565,12 @@
           </a:prstGeom>
         </p:spPr>
         <p:txBody>
-          <a:bodyPr lIns="0" rIns="0" tIns="0" bIns="0">
+          <a:bodyPr lIns="0" tIns="0" rIns="0" bIns="0">
             <a:normAutofit/>
           </a:bodyPr>
-          <a:p>
-            <a:endParaRPr b="0" lang="pt-BR" sz="3200" spc="-1" strike="noStrike">
+          <a:lstStyle/>
+          <a:p>
+            <a:endParaRPr lang="pt-BR" sz="3200" b="0" strike="noStrike" spc="-1">
               <a:latin typeface="Arial"/>
             </a:endParaRPr>
           </a:p>
@@ -481,11 +596,12 @@
           </a:prstGeom>
         </p:spPr>
         <p:txBody>
-          <a:bodyPr lIns="0" rIns="0" tIns="0" bIns="0">
+          <a:bodyPr lIns="0" tIns="0" rIns="0" bIns="0">
             <a:normAutofit/>
           </a:bodyPr>
-          <a:p>
-            <a:endParaRPr b="0" lang="pt-BR" sz="3200" spc="-1" strike="noStrike">
+          <a:lstStyle/>
+          <a:p>
+            <a:endParaRPr lang="pt-BR" sz="3200" b="0" strike="noStrike" spc="-1">
               <a:latin typeface="Arial"/>
             </a:endParaRPr>
           </a:p>
@@ -511,11 +627,12 @@
           </a:prstGeom>
         </p:spPr>
         <p:txBody>
-          <a:bodyPr lIns="0" rIns="0" tIns="0" bIns="0">
+          <a:bodyPr lIns="0" tIns="0" rIns="0" bIns="0">
             <a:normAutofit/>
           </a:bodyPr>
-          <a:p>
-            <a:endParaRPr b="0" lang="pt-BR" sz="3200" spc="-1" strike="noStrike">
+          <a:lstStyle/>
+          <a:p>
+            <a:endParaRPr lang="pt-BR" sz="3200" b="0" strike="noStrike" spc="-1">
               <a:latin typeface="Arial"/>
             </a:endParaRPr>
           </a:p>
@@ -541,11 +658,12 @@
           </a:prstGeom>
         </p:spPr>
         <p:txBody>
-          <a:bodyPr lIns="0" rIns="0" tIns="0" bIns="0">
+          <a:bodyPr lIns="0" tIns="0" rIns="0" bIns="0">
             <a:normAutofit/>
           </a:bodyPr>
-          <a:p>
-            <a:endParaRPr b="0" lang="pt-BR" sz="3200" spc="-1" strike="noStrike">
+          <a:lstStyle/>
+          <a:p>
+            <a:endParaRPr lang="pt-BR" sz="3200" b="0" strike="noStrike" spc="-1">
               <a:latin typeface="Arial"/>
             </a:endParaRPr>
           </a:p>
@@ -553,11 +671,14 @@
       </p:sp>
     </p:spTree>
   </p:cSld>
+  <p:clrMapOvr>
+    <a:masterClrMapping/>
+  </p:clrMapOvr>
 </p:sldLayout>
 </file>
 
 <file path=ppt/slideLayouts/slideLayout2.xml><?xml version="1.0" encoding="utf-8"?>
-<p:sldLayout xmlns:a="http://schemas.openxmlformats.org/drawingml/2006/main" xmlns:p="http://schemas.openxmlformats.org/presentationml/2006/main" xmlns:r="http://schemas.openxmlformats.org/officeDocument/2006/relationships" xmlns:p14="http://schemas.microsoft.com/office/powerpoint/2010/main" xmlns:p15="http://schemas.microsoft.com/office/powerpoint/2012/main" xmlns:mc="http://schemas.openxmlformats.org/markup-compatibility/2006" type="tx" preserve="1">
+<p:sldLayout xmlns:a="http://schemas.openxmlformats.org/drawingml/2006/main" xmlns:r="http://schemas.openxmlformats.org/officeDocument/2006/relationships" xmlns:p="http://schemas.openxmlformats.org/presentationml/2006/main" type="tx" preserve="1">
   <p:cSld name="Title Slide">
     <p:spTree>
       <p:nvGrpSpPr>
@@ -593,12 +714,13 @@
           </a:prstGeom>
         </p:spPr>
         <p:txBody>
-          <a:bodyPr lIns="0" rIns="0" tIns="0" bIns="0" anchor="ctr">
+          <a:bodyPr lIns="0" tIns="0" rIns="0" bIns="0" anchor="ctr">
             <a:spAutoFit/>
           </a:bodyPr>
+          <a:lstStyle/>
           <a:p>
             <a:pPr algn="ctr"/>
-            <a:endParaRPr b="0" lang="pt-BR" sz="4400" spc="-1" strike="noStrike">
+            <a:endParaRPr lang="pt-BR" sz="4400" b="0" strike="noStrike" spc="-1">
               <a:latin typeface="Arial"/>
             </a:endParaRPr>
           </a:p>
@@ -624,12 +746,13 @@
           </a:prstGeom>
         </p:spPr>
         <p:txBody>
-          <a:bodyPr lIns="0" rIns="0" tIns="0" bIns="0" anchor="ctr">
+          <a:bodyPr lIns="0" tIns="0" rIns="0" bIns="0" anchor="ctr">
             <a:spAutoFit/>
           </a:bodyPr>
+          <a:lstStyle/>
           <a:p>
             <a:pPr algn="ctr"/>
-            <a:endParaRPr b="0" lang="pt-BR" sz="3200" spc="-1" strike="noStrike">
+            <a:endParaRPr lang="pt-BR" sz="3200" b="0" strike="noStrike" spc="-1">
               <a:latin typeface="Arial"/>
             </a:endParaRPr>
           </a:p>
@@ -637,11 +760,14 @@
       </p:sp>
     </p:spTree>
   </p:cSld>
+  <p:clrMapOvr>
+    <a:masterClrMapping/>
+  </p:clrMapOvr>
 </p:sldLayout>
 </file>
 
 <file path=ppt/slideLayouts/slideLayout3.xml><?xml version="1.0" encoding="utf-8"?>
-<p:sldLayout xmlns:a="http://schemas.openxmlformats.org/drawingml/2006/main" xmlns:p="http://schemas.openxmlformats.org/presentationml/2006/main" xmlns:r="http://schemas.openxmlformats.org/officeDocument/2006/relationships" xmlns:p14="http://schemas.microsoft.com/office/powerpoint/2010/main" xmlns:p15="http://schemas.microsoft.com/office/powerpoint/2012/main" xmlns:mc="http://schemas.openxmlformats.org/markup-compatibility/2006" type="obj" preserve="1">
+<p:sldLayout xmlns:a="http://schemas.openxmlformats.org/drawingml/2006/main" xmlns:r="http://schemas.openxmlformats.org/officeDocument/2006/relationships" xmlns:p="http://schemas.openxmlformats.org/presentationml/2006/main" type="obj" preserve="1">
   <p:cSld name="Title, Content">
     <p:spTree>
       <p:nvGrpSpPr>
@@ -677,12 +803,13 @@
           </a:prstGeom>
         </p:spPr>
         <p:txBody>
-          <a:bodyPr lIns="0" rIns="0" tIns="0" bIns="0" anchor="ctr">
+          <a:bodyPr lIns="0" tIns="0" rIns="0" bIns="0" anchor="ctr">
             <a:spAutoFit/>
           </a:bodyPr>
+          <a:lstStyle/>
           <a:p>
             <a:pPr algn="ctr"/>
-            <a:endParaRPr b="0" lang="pt-BR" sz="4400" spc="-1" strike="noStrike">
+            <a:endParaRPr lang="pt-BR" sz="4400" b="0" strike="noStrike" spc="-1">
               <a:latin typeface="Arial"/>
             </a:endParaRPr>
           </a:p>
@@ -708,11 +835,12 @@
           </a:prstGeom>
         </p:spPr>
         <p:txBody>
-          <a:bodyPr lIns="0" rIns="0" tIns="0" bIns="0">
+          <a:bodyPr lIns="0" tIns="0" rIns="0" bIns="0">
             <a:normAutofit/>
           </a:bodyPr>
-          <a:p>
-            <a:endParaRPr b="0" lang="pt-BR" sz="3200" spc="-1" strike="noStrike">
+          <a:lstStyle/>
+          <a:p>
+            <a:endParaRPr lang="pt-BR" sz="3200" b="0" strike="noStrike" spc="-1">
               <a:latin typeface="Arial"/>
             </a:endParaRPr>
           </a:p>
@@ -720,11 +848,14 @@
       </p:sp>
     </p:spTree>
   </p:cSld>
+  <p:clrMapOvr>
+    <a:masterClrMapping/>
+  </p:clrMapOvr>
 </p:sldLayout>
 </file>
 
 <file path=ppt/slideLayouts/slideLayout4.xml><?xml version="1.0" encoding="utf-8"?>
-<p:sldLayout xmlns:a="http://schemas.openxmlformats.org/drawingml/2006/main" xmlns:p="http://schemas.openxmlformats.org/presentationml/2006/main" xmlns:r="http://schemas.openxmlformats.org/officeDocument/2006/relationships" xmlns:p14="http://schemas.microsoft.com/office/powerpoint/2010/main" xmlns:p15="http://schemas.microsoft.com/office/powerpoint/2012/main" xmlns:mc="http://schemas.openxmlformats.org/markup-compatibility/2006" type="twoObj" preserve="1">
+<p:sldLayout xmlns:a="http://schemas.openxmlformats.org/drawingml/2006/main" xmlns:r="http://schemas.openxmlformats.org/officeDocument/2006/relationships" xmlns:p="http://schemas.openxmlformats.org/presentationml/2006/main" type="twoObj" preserve="1">
   <p:cSld name="Title, 2 Content">
     <p:spTree>
       <p:nvGrpSpPr>
@@ -760,12 +891,13 @@
           </a:prstGeom>
         </p:spPr>
         <p:txBody>
-          <a:bodyPr lIns="0" rIns="0" tIns="0" bIns="0" anchor="ctr">
+          <a:bodyPr lIns="0" tIns="0" rIns="0" bIns="0" anchor="ctr">
             <a:spAutoFit/>
           </a:bodyPr>
+          <a:lstStyle/>
           <a:p>
             <a:pPr algn="ctr"/>
-            <a:endParaRPr b="0" lang="pt-BR" sz="4400" spc="-1" strike="noStrike">
+            <a:endParaRPr lang="pt-BR" sz="4400" b="0" strike="noStrike" spc="-1">
               <a:latin typeface="Arial"/>
             </a:endParaRPr>
           </a:p>
@@ -791,11 +923,12 @@
           </a:prstGeom>
         </p:spPr>
         <p:txBody>
-          <a:bodyPr lIns="0" rIns="0" tIns="0" bIns="0">
+          <a:bodyPr lIns="0" tIns="0" rIns="0" bIns="0">
             <a:normAutofit/>
           </a:bodyPr>
-          <a:p>
-            <a:endParaRPr b="0" lang="pt-BR" sz="3200" spc="-1" strike="noStrike">
+          <a:lstStyle/>
+          <a:p>
+            <a:endParaRPr lang="pt-BR" sz="3200" b="0" strike="noStrike" spc="-1">
               <a:latin typeface="Arial"/>
             </a:endParaRPr>
           </a:p>
@@ -821,11 +954,12 @@
           </a:prstGeom>
         </p:spPr>
         <p:txBody>
-          <a:bodyPr lIns="0" rIns="0" tIns="0" bIns="0">
+          <a:bodyPr lIns="0" tIns="0" rIns="0" bIns="0">
             <a:normAutofit/>
           </a:bodyPr>
-          <a:p>
-            <a:endParaRPr b="0" lang="pt-BR" sz="3200" spc="-1" strike="noStrike">
+          <a:lstStyle/>
+          <a:p>
+            <a:endParaRPr lang="pt-BR" sz="3200" b="0" strike="noStrike" spc="-1">
               <a:latin typeface="Arial"/>
             </a:endParaRPr>
           </a:p>
@@ -833,11 +967,14 @@
       </p:sp>
     </p:spTree>
   </p:cSld>
+  <p:clrMapOvr>
+    <a:masterClrMapping/>
+  </p:clrMapOvr>
 </p:sldLayout>
 </file>
 
 <file path=ppt/slideLayouts/slideLayout5.xml><?xml version="1.0" encoding="utf-8"?>
-<p:sldLayout xmlns:a="http://schemas.openxmlformats.org/drawingml/2006/main" xmlns:p="http://schemas.openxmlformats.org/presentationml/2006/main" xmlns:r="http://schemas.openxmlformats.org/officeDocument/2006/relationships" xmlns:p14="http://schemas.microsoft.com/office/powerpoint/2010/main" xmlns:p15="http://schemas.microsoft.com/office/powerpoint/2012/main" xmlns:mc="http://schemas.openxmlformats.org/markup-compatibility/2006" type="titleOnly" preserve="1">
+<p:sldLayout xmlns:a="http://schemas.openxmlformats.org/drawingml/2006/main" xmlns:r="http://schemas.openxmlformats.org/officeDocument/2006/relationships" xmlns:p="http://schemas.openxmlformats.org/presentationml/2006/main" type="titleOnly" preserve="1">
   <p:cSld name="Title Only">
     <p:spTree>
       <p:nvGrpSpPr>
@@ -873,12 +1010,13 @@
           </a:prstGeom>
         </p:spPr>
         <p:txBody>
-          <a:bodyPr lIns="0" rIns="0" tIns="0" bIns="0" anchor="ctr">
+          <a:bodyPr lIns="0" tIns="0" rIns="0" bIns="0" anchor="ctr">
             <a:spAutoFit/>
           </a:bodyPr>
+          <a:lstStyle/>
           <a:p>
             <a:pPr algn="ctr"/>
-            <a:endParaRPr b="0" lang="pt-BR" sz="4400" spc="-1" strike="noStrike">
+            <a:endParaRPr lang="pt-BR" sz="4400" b="0" strike="noStrike" spc="-1">
               <a:latin typeface="Arial"/>
             </a:endParaRPr>
           </a:p>
@@ -886,11 +1024,14 @@
       </p:sp>
     </p:spTree>
   </p:cSld>
+  <p:clrMapOvr>
+    <a:masterClrMapping/>
+  </p:clrMapOvr>
 </p:sldLayout>
 </file>
 
 <file path=ppt/slideLayouts/slideLayout6.xml><?xml version="1.0" encoding="utf-8"?>
-<p:sldLayout xmlns:a="http://schemas.openxmlformats.org/drawingml/2006/main" xmlns:p="http://schemas.openxmlformats.org/presentationml/2006/main" xmlns:r="http://schemas.openxmlformats.org/officeDocument/2006/relationships" xmlns:p14="http://schemas.microsoft.com/office/powerpoint/2010/main" xmlns:p15="http://schemas.microsoft.com/office/powerpoint/2012/main" xmlns:mc="http://schemas.openxmlformats.org/markup-compatibility/2006" type="objOnly" preserve="1">
+<p:sldLayout xmlns:a="http://schemas.openxmlformats.org/drawingml/2006/main" xmlns:r="http://schemas.openxmlformats.org/officeDocument/2006/relationships" xmlns:p="http://schemas.openxmlformats.org/presentationml/2006/main" type="objOnly" preserve="1">
   <p:cSld name="Centered Text">
     <p:spTree>
       <p:nvGrpSpPr>
@@ -926,12 +1067,13 @@
           </a:prstGeom>
         </p:spPr>
         <p:txBody>
-          <a:bodyPr lIns="0" rIns="0" tIns="0" bIns="0" anchor="ctr">
+          <a:bodyPr lIns="0" tIns="0" rIns="0" bIns="0" anchor="ctr">
             <a:spAutoFit/>
           </a:bodyPr>
+          <a:lstStyle/>
           <a:p>
             <a:pPr algn="ctr"/>
-            <a:endParaRPr b="0" lang="pt-BR" sz="3200" spc="-1" strike="noStrike">
+            <a:endParaRPr lang="pt-BR" sz="3200" b="0" strike="noStrike" spc="-1">
               <a:latin typeface="Arial"/>
             </a:endParaRPr>
           </a:p>
@@ -939,11 +1081,14 @@
       </p:sp>
     </p:spTree>
   </p:cSld>
+  <p:clrMapOvr>
+    <a:masterClrMapping/>
+  </p:clrMapOvr>
 </p:sldLayout>
 </file>
 
 <file path=ppt/slideLayouts/slideLayout7.xml><?xml version="1.0" encoding="utf-8"?>
-<p:sldLayout xmlns:a="http://schemas.openxmlformats.org/drawingml/2006/main" xmlns:p="http://schemas.openxmlformats.org/presentationml/2006/main" xmlns:r="http://schemas.openxmlformats.org/officeDocument/2006/relationships" xmlns:p14="http://schemas.microsoft.com/office/powerpoint/2010/main" xmlns:p15="http://schemas.microsoft.com/office/powerpoint/2012/main" xmlns:mc="http://schemas.openxmlformats.org/markup-compatibility/2006" type="twoObjAndObj" preserve="1">
+<p:sldLayout xmlns:a="http://schemas.openxmlformats.org/drawingml/2006/main" xmlns:r="http://schemas.openxmlformats.org/officeDocument/2006/relationships" xmlns:p="http://schemas.openxmlformats.org/presentationml/2006/main" type="twoObjAndObj" preserve="1">
   <p:cSld name="Title, 2 Content and Content">
     <p:spTree>
       <p:nvGrpSpPr>
@@ -979,12 +1124,13 @@
           </a:prstGeom>
         </p:spPr>
         <p:txBody>
-          <a:bodyPr lIns="0" rIns="0" tIns="0" bIns="0" anchor="ctr">
+          <a:bodyPr lIns="0" tIns="0" rIns="0" bIns="0" anchor="ctr">
             <a:spAutoFit/>
           </a:bodyPr>
+          <a:lstStyle/>
           <a:p>
             <a:pPr algn="ctr"/>
-            <a:endParaRPr b="0" lang="pt-BR" sz="4400" spc="-1" strike="noStrike">
+            <a:endParaRPr lang="pt-BR" sz="4400" b="0" strike="noStrike" spc="-1">
               <a:latin typeface="Arial"/>
             </a:endParaRPr>
           </a:p>
@@ -1010,11 +1156,12 @@
           </a:prstGeom>
         </p:spPr>
         <p:txBody>
-          <a:bodyPr lIns="0" rIns="0" tIns="0" bIns="0">
+          <a:bodyPr lIns="0" tIns="0" rIns="0" bIns="0">
             <a:normAutofit/>
           </a:bodyPr>
-          <a:p>
-            <a:endParaRPr b="0" lang="pt-BR" sz="3200" spc="-1" strike="noStrike">
+          <a:lstStyle/>
+          <a:p>
+            <a:endParaRPr lang="pt-BR" sz="3200" b="0" strike="noStrike" spc="-1">
               <a:latin typeface="Arial"/>
             </a:endParaRPr>
           </a:p>
@@ -1040,11 +1187,12 @@
           </a:prstGeom>
         </p:spPr>
         <p:txBody>
-          <a:bodyPr lIns="0" rIns="0" tIns="0" bIns="0">
+          <a:bodyPr lIns="0" tIns="0" rIns="0" bIns="0">
             <a:normAutofit/>
           </a:bodyPr>
-          <a:p>
-            <a:endParaRPr b="0" lang="pt-BR" sz="3200" spc="-1" strike="noStrike">
+          <a:lstStyle/>
+          <a:p>
+            <a:endParaRPr lang="pt-BR" sz="3200" b="0" strike="noStrike" spc="-1">
               <a:latin typeface="Arial"/>
             </a:endParaRPr>
           </a:p>
@@ -1070,11 +1218,12 @@
           </a:prstGeom>
         </p:spPr>
         <p:txBody>
-          <a:bodyPr lIns="0" rIns="0" tIns="0" bIns="0">
+          <a:bodyPr lIns="0" tIns="0" rIns="0" bIns="0">
             <a:normAutofit/>
           </a:bodyPr>
-          <a:p>
-            <a:endParaRPr b="0" lang="pt-BR" sz="3200" spc="-1" strike="noStrike">
+          <a:lstStyle/>
+          <a:p>
+            <a:endParaRPr lang="pt-BR" sz="3200" b="0" strike="noStrike" spc="-1">
               <a:latin typeface="Arial"/>
             </a:endParaRPr>
           </a:p>
@@ -1082,11 +1231,14 @@
       </p:sp>
     </p:spTree>
   </p:cSld>
+  <p:clrMapOvr>
+    <a:masterClrMapping/>
+  </p:clrMapOvr>
 </p:sldLayout>
 </file>
 
 <file path=ppt/slideLayouts/slideLayout8.xml><?xml version="1.0" encoding="utf-8"?>
-<p:sldLayout xmlns:a="http://schemas.openxmlformats.org/drawingml/2006/main" xmlns:p="http://schemas.openxmlformats.org/presentationml/2006/main" xmlns:r="http://schemas.openxmlformats.org/officeDocument/2006/relationships" xmlns:p14="http://schemas.microsoft.com/office/powerpoint/2010/main" xmlns:p15="http://schemas.microsoft.com/office/powerpoint/2012/main" xmlns:mc="http://schemas.openxmlformats.org/markup-compatibility/2006" type="objAndTwoObj" preserve="1">
+<p:sldLayout xmlns:a="http://schemas.openxmlformats.org/drawingml/2006/main" xmlns:r="http://schemas.openxmlformats.org/officeDocument/2006/relationships" xmlns:p="http://schemas.openxmlformats.org/presentationml/2006/main" type="objAndTwoObj" preserve="1">
   <p:cSld name="Title Content and 2 Content">
     <p:spTree>
       <p:nvGrpSpPr>
@@ -1122,12 +1274,13 @@
           </a:prstGeom>
         </p:spPr>
         <p:txBody>
-          <a:bodyPr lIns="0" rIns="0" tIns="0" bIns="0" anchor="ctr">
+          <a:bodyPr lIns="0" tIns="0" rIns="0" bIns="0" anchor="ctr">
             <a:spAutoFit/>
           </a:bodyPr>
+          <a:lstStyle/>
           <a:p>
             <a:pPr algn="ctr"/>
-            <a:endParaRPr b="0" lang="pt-BR" sz="4400" spc="-1" strike="noStrike">
+            <a:endParaRPr lang="pt-BR" sz="4400" b="0" strike="noStrike" spc="-1">
               <a:latin typeface="Arial"/>
             </a:endParaRPr>
           </a:p>
@@ -1153,11 +1306,12 @@
           </a:prstGeom>
         </p:spPr>
         <p:txBody>
-          <a:bodyPr lIns="0" rIns="0" tIns="0" bIns="0">
+          <a:bodyPr lIns="0" tIns="0" rIns="0" bIns="0">
             <a:normAutofit/>
           </a:bodyPr>
-          <a:p>
-            <a:endParaRPr b="0" lang="pt-BR" sz="3200" spc="-1" strike="noStrike">
+          <a:lstStyle/>
+          <a:p>
+            <a:endParaRPr lang="pt-BR" sz="3200" b="0" strike="noStrike" spc="-1">
               <a:latin typeface="Arial"/>
             </a:endParaRPr>
           </a:p>
@@ -1183,11 +1337,12 @@
           </a:prstGeom>
         </p:spPr>
         <p:txBody>
-          <a:bodyPr lIns="0" rIns="0" tIns="0" bIns="0">
+          <a:bodyPr lIns="0" tIns="0" rIns="0" bIns="0">
             <a:normAutofit/>
           </a:bodyPr>
-          <a:p>
-            <a:endParaRPr b="0" lang="pt-BR" sz="3200" spc="-1" strike="noStrike">
+          <a:lstStyle/>
+          <a:p>
+            <a:endParaRPr lang="pt-BR" sz="3200" b="0" strike="noStrike" spc="-1">
               <a:latin typeface="Arial"/>
             </a:endParaRPr>
           </a:p>
@@ -1213,11 +1368,12 @@
           </a:prstGeom>
         </p:spPr>
         <p:txBody>
-          <a:bodyPr lIns="0" rIns="0" tIns="0" bIns="0">
+          <a:bodyPr lIns="0" tIns="0" rIns="0" bIns="0">
             <a:normAutofit/>
           </a:bodyPr>
-          <a:p>
-            <a:endParaRPr b="0" lang="pt-BR" sz="3200" spc="-1" strike="noStrike">
+          <a:lstStyle/>
+          <a:p>
+            <a:endParaRPr lang="pt-BR" sz="3200" b="0" strike="noStrike" spc="-1">
               <a:latin typeface="Arial"/>
             </a:endParaRPr>
           </a:p>
@@ -1225,11 +1381,14 @@
       </p:sp>
     </p:spTree>
   </p:cSld>
+  <p:clrMapOvr>
+    <a:masterClrMapping/>
+  </p:clrMapOvr>
 </p:sldLayout>
 </file>
 
 <file path=ppt/slideLayouts/slideLayout9.xml><?xml version="1.0" encoding="utf-8"?>
-<p:sldLayout xmlns:a="http://schemas.openxmlformats.org/drawingml/2006/main" xmlns:p="http://schemas.openxmlformats.org/presentationml/2006/main" xmlns:r="http://schemas.openxmlformats.org/officeDocument/2006/relationships" xmlns:p14="http://schemas.microsoft.com/office/powerpoint/2010/main" xmlns:p15="http://schemas.microsoft.com/office/powerpoint/2012/main" xmlns:mc="http://schemas.openxmlformats.org/markup-compatibility/2006" type="twoObjOverTx" preserve="1">
+<p:sldLayout xmlns:a="http://schemas.openxmlformats.org/drawingml/2006/main" xmlns:r="http://schemas.openxmlformats.org/officeDocument/2006/relationships" xmlns:p="http://schemas.openxmlformats.org/presentationml/2006/main" type="twoObjOverTx" preserve="1">
   <p:cSld name="Title, 2 Content over Content">
     <p:spTree>
       <p:nvGrpSpPr>
@@ -1265,12 +1424,13 @@
           </a:prstGeom>
         </p:spPr>
         <p:txBody>
-          <a:bodyPr lIns="0" rIns="0" tIns="0" bIns="0" anchor="ctr">
+          <a:bodyPr lIns="0" tIns="0" rIns="0" bIns="0" anchor="ctr">
             <a:spAutoFit/>
           </a:bodyPr>
+          <a:lstStyle/>
           <a:p>
             <a:pPr algn="ctr"/>
-            <a:endParaRPr b="0" lang="pt-BR" sz="4400" spc="-1" strike="noStrike">
+            <a:endParaRPr lang="pt-BR" sz="4400" b="0" strike="noStrike" spc="-1">
               <a:latin typeface="Arial"/>
             </a:endParaRPr>
           </a:p>
@@ -1296,11 +1456,12 @@
           </a:prstGeom>
         </p:spPr>
         <p:txBody>
-          <a:bodyPr lIns="0" rIns="0" tIns="0" bIns="0">
+          <a:bodyPr lIns="0" tIns="0" rIns="0" bIns="0">
             <a:normAutofit/>
           </a:bodyPr>
-          <a:p>
-            <a:endParaRPr b="0" lang="pt-BR" sz="3200" spc="-1" strike="noStrike">
+          <a:lstStyle/>
+          <a:p>
+            <a:endParaRPr lang="pt-BR" sz="3200" b="0" strike="noStrike" spc="-1">
               <a:latin typeface="Arial"/>
             </a:endParaRPr>
           </a:p>
@@ -1326,11 +1487,12 @@
           </a:prstGeom>
         </p:spPr>
         <p:txBody>
-          <a:bodyPr lIns="0" rIns="0" tIns="0" bIns="0">
+          <a:bodyPr lIns="0" tIns="0" rIns="0" bIns="0">
             <a:normAutofit/>
           </a:bodyPr>
-          <a:p>
-            <a:endParaRPr b="0" lang="pt-BR" sz="3200" spc="-1" strike="noStrike">
+          <a:lstStyle/>
+          <a:p>
+            <a:endParaRPr lang="pt-BR" sz="3200" b="0" strike="noStrike" spc="-1">
               <a:latin typeface="Arial"/>
             </a:endParaRPr>
           </a:p>
@@ -1356,11 +1518,12 @@
           </a:prstGeom>
         </p:spPr>
         <p:txBody>
-          <a:bodyPr lIns="0" rIns="0" tIns="0" bIns="0">
+          <a:bodyPr lIns="0" tIns="0" rIns="0" bIns="0">
             <a:normAutofit/>
           </a:bodyPr>
-          <a:p>
-            <a:endParaRPr b="0" lang="pt-BR" sz="3200" spc="-1" strike="noStrike">
+          <a:lstStyle/>
+          <a:p>
+            <a:endParaRPr lang="pt-BR" sz="3200" b="0" strike="noStrike" spc="-1">
               <a:latin typeface="Arial"/>
             </a:endParaRPr>
           </a:p>
@@ -1368,17 +1531,21 @@
       </p:sp>
     </p:spTree>
   </p:cSld>
+  <p:clrMapOvr>
+    <a:masterClrMapping/>
+  </p:clrMapOvr>
 </p:sldLayout>
 </file>
 
 <file path=ppt/slideMasters/slideMaster1.xml><?xml version="1.0" encoding="utf-8"?>
-<p:sldMaster xmlns:a="http://schemas.openxmlformats.org/drawingml/2006/main" xmlns:p="http://schemas.openxmlformats.org/presentationml/2006/main" xmlns:r="http://schemas.openxmlformats.org/officeDocument/2006/relationships" xmlns:p14="http://schemas.microsoft.com/office/powerpoint/2010/main" xmlns:p15="http://schemas.microsoft.com/office/powerpoint/2012/main" xmlns:mc="http://schemas.openxmlformats.org/markup-compatibility/2006">
+<p:sldMaster xmlns:a="http://schemas.openxmlformats.org/drawingml/2006/main" xmlns:r="http://schemas.openxmlformats.org/officeDocument/2006/relationships" xmlns:p="http://schemas.openxmlformats.org/presentationml/2006/main">
   <p:cSld>
     <p:bg>
       <p:bgPr>
         <a:solidFill>
-          <a:srgbClr val="ffffff"/>
+          <a:srgbClr val="FFFFFF"/>
         </a:solidFill>
+        <a:effectLst/>
       </p:bgPr>
     </p:bg>
     <p:spTree>
@@ -1397,7 +1564,7 @@
       </p:grpSpPr>
       <p:sp>
         <p:nvSpPr>
-          <p:cNvPr id="0" name="PlaceHolder 1"/>
+          <p:cNvPr id="2" name="PlaceHolder 1"/>
           <p:cNvSpPr>
             <a:spLocks noGrp="1"/>
           </p:cNvSpPr>
@@ -1415,25 +1582,23 @@
           </a:prstGeom>
         </p:spPr>
         <p:txBody>
-          <a:bodyPr lIns="0" rIns="0" tIns="0" bIns="0" anchor="ctr">
+          <a:bodyPr lIns="0" tIns="0" rIns="0" bIns="0" anchor="ctr">
             <a:spAutoFit/>
           </a:bodyPr>
+          <a:lstStyle/>
           <a:p>
             <a:r>
-              <a:rPr b="0" lang="pt-BR" sz="1800" spc="-1" strike="noStrike">
+              <a:rPr lang="pt-BR" sz="1800" b="0" strike="noStrike" spc="-1">
                 <a:latin typeface="Arial"/>
               </a:rPr>
               <a:t>Clique para editar o formato do texto do título</a:t>
             </a:r>
-            <a:endParaRPr b="0" lang="pt-BR" sz="1800" spc="-1" strike="noStrike">
-              <a:latin typeface="Arial"/>
-            </a:endParaRPr>
-          </a:p>
-        </p:txBody>
-      </p:sp>
-      <p:sp>
-        <p:nvSpPr>
-          <p:cNvPr id="1" name="PlaceHolder 2"/>
+          </a:p>
+        </p:txBody>
+      </p:sp>
+      <p:sp>
+        <p:nvSpPr>
+          <p:cNvPr id="3" name="PlaceHolder 2"/>
           <p:cNvSpPr>
             <a:spLocks noGrp="1"/>
           </p:cNvSpPr>
@@ -1451,9 +1616,10 @@
           </a:prstGeom>
         </p:spPr>
         <p:txBody>
-          <a:bodyPr lIns="0" rIns="0" tIns="0" bIns="0">
+          <a:bodyPr lIns="0" tIns="0" rIns="0" bIns="0">
             <a:normAutofit fontScale="94000"/>
           </a:bodyPr>
+          <a:lstStyle/>
           <a:p>
             <a:pPr marL="432000" indent="-324000">
               <a:spcBef>
@@ -1467,17 +1633,14 @@
               <a:buChar char=""/>
             </a:pPr>
             <a:r>
-              <a:rPr b="0" lang="pt-BR" sz="3200" spc="-1" strike="noStrike">
+              <a:rPr lang="pt-BR" sz="3200" b="0" strike="noStrike" spc="-1">
                 <a:latin typeface="Arial"/>
               </a:rPr>
               <a:t>Clique para editar o formato do texto da estrutura de tópicos</a:t>
             </a:r>
-            <a:endParaRPr b="0" lang="pt-BR" sz="3200" spc="-1" strike="noStrike">
-              <a:latin typeface="Arial"/>
-            </a:endParaRPr>
-          </a:p>
-          <a:p>
-            <a:pPr lvl="1" marL="864000" indent="-324000">
+          </a:p>
+          <a:p>
+            <a:pPr marL="864000" lvl="1" indent="-324000">
               <a:spcBef>
                 <a:spcPts val="1134"/>
               </a:spcBef>
@@ -1489,17 +1652,14 @@
               <a:buChar char=""/>
             </a:pPr>
             <a:r>
-              <a:rPr b="0" lang="pt-BR" sz="2800" spc="-1" strike="noStrike">
+              <a:rPr lang="pt-BR" sz="2800" b="0" strike="noStrike" spc="-1">
                 <a:latin typeface="Arial"/>
               </a:rPr>
               <a:t>2.º nível da estrutura de tópicos</a:t>
             </a:r>
-            <a:endParaRPr b="0" lang="pt-BR" sz="2800" spc="-1" strike="noStrike">
-              <a:latin typeface="Arial"/>
-            </a:endParaRPr>
-          </a:p>
-          <a:p>
-            <a:pPr lvl="2" marL="1296000" indent="-288000">
+          </a:p>
+          <a:p>
+            <a:pPr marL="1296000" lvl="2" indent="-288000">
               <a:spcBef>
                 <a:spcPts val="850"/>
               </a:spcBef>
@@ -1511,17 +1671,14 @@
               <a:buChar char=""/>
             </a:pPr>
             <a:r>
-              <a:rPr b="0" lang="pt-BR" sz="2400" spc="-1" strike="noStrike">
+              <a:rPr lang="pt-BR" sz="2400" b="0" strike="noStrike" spc="-1">
                 <a:latin typeface="Arial"/>
               </a:rPr>
               <a:t>3.º nível da estrutura de tópicos</a:t>
             </a:r>
-            <a:endParaRPr b="0" lang="pt-BR" sz="2400" spc="-1" strike="noStrike">
-              <a:latin typeface="Arial"/>
-            </a:endParaRPr>
-          </a:p>
-          <a:p>
-            <a:pPr lvl="3" marL="1728000" indent="-216000">
+          </a:p>
+          <a:p>
+            <a:pPr marL="1728000" lvl="3" indent="-216000">
               <a:spcBef>
                 <a:spcPts val="567"/>
               </a:spcBef>
@@ -1533,17 +1690,14 @@
               <a:buChar char=""/>
             </a:pPr>
             <a:r>
-              <a:rPr b="0" lang="pt-BR" sz="2000" spc="-1" strike="noStrike">
+              <a:rPr lang="pt-BR" sz="2000" b="0" strike="noStrike" spc="-1">
                 <a:latin typeface="Arial"/>
               </a:rPr>
               <a:t>4.º nível da estrutura de tópicos</a:t>
             </a:r>
-            <a:endParaRPr b="0" lang="pt-BR" sz="2000" spc="-1" strike="noStrike">
-              <a:latin typeface="Arial"/>
-            </a:endParaRPr>
-          </a:p>
-          <a:p>
-            <a:pPr lvl="4" marL="2160000" indent="-216000">
+          </a:p>
+          <a:p>
+            <a:pPr marL="2160000" lvl="4" indent="-216000">
               <a:spcBef>
                 <a:spcPts val="283"/>
               </a:spcBef>
@@ -1555,17 +1709,14 @@
               <a:buChar char=""/>
             </a:pPr>
             <a:r>
-              <a:rPr b="0" lang="pt-BR" sz="2000" spc="-1" strike="noStrike">
+              <a:rPr lang="pt-BR" sz="2000" b="0" strike="noStrike" spc="-1">
                 <a:latin typeface="Arial"/>
               </a:rPr>
               <a:t>5.º nível da estrutura de tópicos</a:t>
             </a:r>
-            <a:endParaRPr b="0" lang="pt-BR" sz="2000" spc="-1" strike="noStrike">
-              <a:latin typeface="Arial"/>
-            </a:endParaRPr>
-          </a:p>
-          <a:p>
-            <a:pPr lvl="5" marL="2592000" indent="-216000">
+          </a:p>
+          <a:p>
+            <a:pPr marL="2592000" lvl="5" indent="-216000">
               <a:spcBef>
                 <a:spcPts val="283"/>
               </a:spcBef>
@@ -1577,17 +1728,14 @@
               <a:buChar char=""/>
             </a:pPr>
             <a:r>
-              <a:rPr b="0" lang="pt-BR" sz="2000" spc="-1" strike="noStrike">
+              <a:rPr lang="pt-BR" sz="2000" b="0" strike="noStrike" spc="-1">
                 <a:latin typeface="Arial"/>
               </a:rPr>
               <a:t>6.º nível da estrutura de tópicos</a:t>
             </a:r>
-            <a:endParaRPr b="0" lang="pt-BR" sz="2000" spc="-1" strike="noStrike">
-              <a:latin typeface="Arial"/>
-            </a:endParaRPr>
-          </a:p>
-          <a:p>
-            <a:pPr lvl="6" marL="3024000" indent="-216000">
+          </a:p>
+          <a:p>
+            <a:pPr marL="3024000" lvl="6" indent="-216000">
               <a:spcBef>
                 <a:spcPts val="283"/>
               </a:spcBef>
@@ -1599,39 +1747,316 @@
               <a:buChar char=""/>
             </a:pPr>
             <a:r>
-              <a:rPr b="0" lang="pt-BR" sz="2000" spc="-1" strike="noStrike">
+              <a:rPr lang="pt-BR" sz="2000" b="0" strike="noStrike" spc="-1">
                 <a:latin typeface="Arial"/>
               </a:rPr>
               <a:t>7.º nível da estrutura de tópicos</a:t>
             </a:r>
-            <a:endParaRPr b="0" lang="pt-BR" sz="2000" spc="-1" strike="noStrike">
-              <a:latin typeface="Arial"/>
-            </a:endParaRPr>
           </a:p>
         </p:txBody>
       </p:sp>
     </p:spTree>
   </p:cSld>
-  <p:clrMap bg1="lt1" bg2="lt2" tx1="dk1" tx2="dk2" accent1="accent1" accent2="accent2" accent3="accent3" accent4="accent4" accent5="accent5" accent6="accent6" hlink="hlink" folHlink="folHlink"/>
+  <p:clrMap bg1="lt1" tx1="dk1" bg2="lt2" tx2="dk2" accent1="accent1" accent2="accent2" accent3="accent3" accent4="accent4" accent5="accent5" accent6="accent6" hlink="hlink" folHlink="folHlink"/>
   <p:sldLayoutIdLst>
-    <p:sldLayoutId id="2147483649" r:id="rId2"/>
-    <p:sldLayoutId id="2147483650" r:id="rId3"/>
-    <p:sldLayoutId id="2147483651" r:id="rId4"/>
-    <p:sldLayoutId id="2147483652" r:id="rId5"/>
-    <p:sldLayoutId id="2147483653" r:id="rId6"/>
-    <p:sldLayoutId id="2147483654" r:id="rId7"/>
-    <p:sldLayoutId id="2147483655" r:id="rId8"/>
-    <p:sldLayoutId id="2147483656" r:id="rId9"/>
-    <p:sldLayoutId id="2147483657" r:id="rId10"/>
-    <p:sldLayoutId id="2147483658" r:id="rId11"/>
-    <p:sldLayoutId id="2147483659" r:id="rId12"/>
-    <p:sldLayoutId id="2147483660" r:id="rId13"/>
+    <p:sldLayoutId id="2147483649" r:id="rId1"/>
+    <p:sldLayoutId id="2147483650" r:id="rId2"/>
+    <p:sldLayoutId id="2147483651" r:id="rId3"/>
+    <p:sldLayoutId id="2147483652" r:id="rId4"/>
+    <p:sldLayoutId id="2147483653" r:id="rId5"/>
+    <p:sldLayoutId id="2147483654" r:id="rId6"/>
+    <p:sldLayoutId id="2147483655" r:id="rId7"/>
+    <p:sldLayoutId id="2147483656" r:id="rId8"/>
+    <p:sldLayoutId id="2147483657" r:id="rId9"/>
+    <p:sldLayoutId id="2147483658" r:id="rId10"/>
+    <p:sldLayoutId id="2147483659" r:id="rId11"/>
+    <p:sldLayoutId id="2147483660" r:id="rId12"/>
   </p:sldLayoutIdLst>
+  <p:txStyles>
+    <p:titleStyle>
+      <a:lvl1pPr algn="l" defTabSz="914400" rtl="0" eaLnBrk="1" latinLnBrk="0" hangingPunct="1">
+        <a:lnSpc>
+          <a:spcPct val="90000"/>
+        </a:lnSpc>
+        <a:spcBef>
+          <a:spcPct val="0"/>
+        </a:spcBef>
+        <a:buNone/>
+        <a:defRPr sz="4400" kern="1200">
+          <a:solidFill>
+            <a:schemeClr val="tx1"/>
+          </a:solidFill>
+          <a:latin typeface="+mj-lt"/>
+          <a:ea typeface="+mj-ea"/>
+          <a:cs typeface="+mj-cs"/>
+        </a:defRPr>
+      </a:lvl1pPr>
+    </p:titleStyle>
+    <p:bodyStyle>
+      <a:lvl1pPr marL="228600" indent="-228600" algn="l" defTabSz="914400" rtl="0" eaLnBrk="1" latinLnBrk="0" hangingPunct="1">
+        <a:lnSpc>
+          <a:spcPct val="90000"/>
+        </a:lnSpc>
+        <a:spcBef>
+          <a:spcPts val="1000"/>
+        </a:spcBef>
+        <a:buFont typeface="Arial" panose="020B0604020202020204" pitchFamily="34" charset="0"/>
+        <a:buChar char="•"/>
+        <a:defRPr sz="2800" kern="1200">
+          <a:solidFill>
+            <a:schemeClr val="tx1"/>
+          </a:solidFill>
+          <a:latin typeface="+mn-lt"/>
+          <a:ea typeface="+mn-ea"/>
+          <a:cs typeface="+mn-cs"/>
+        </a:defRPr>
+      </a:lvl1pPr>
+      <a:lvl2pPr marL="685800" indent="-228600" algn="l" defTabSz="914400" rtl="0" eaLnBrk="1" latinLnBrk="0" hangingPunct="1">
+        <a:lnSpc>
+          <a:spcPct val="90000"/>
+        </a:lnSpc>
+        <a:spcBef>
+          <a:spcPts val="500"/>
+        </a:spcBef>
+        <a:buFont typeface="Arial" panose="020B0604020202020204" pitchFamily="34" charset="0"/>
+        <a:buChar char="•"/>
+        <a:defRPr sz="2400" kern="1200">
+          <a:solidFill>
+            <a:schemeClr val="tx1"/>
+          </a:solidFill>
+          <a:latin typeface="+mn-lt"/>
+          <a:ea typeface="+mn-ea"/>
+          <a:cs typeface="+mn-cs"/>
+        </a:defRPr>
+      </a:lvl2pPr>
+      <a:lvl3pPr marL="1143000" indent="-228600" algn="l" defTabSz="914400" rtl="0" eaLnBrk="1" latinLnBrk="0" hangingPunct="1">
+        <a:lnSpc>
+          <a:spcPct val="90000"/>
+        </a:lnSpc>
+        <a:spcBef>
+          <a:spcPts val="500"/>
+        </a:spcBef>
+        <a:buFont typeface="Arial" panose="020B0604020202020204" pitchFamily="34" charset="0"/>
+        <a:buChar char="•"/>
+        <a:defRPr sz="2000" kern="1200">
+          <a:solidFill>
+            <a:schemeClr val="tx1"/>
+          </a:solidFill>
+          <a:latin typeface="+mn-lt"/>
+          <a:ea typeface="+mn-ea"/>
+          <a:cs typeface="+mn-cs"/>
+        </a:defRPr>
+      </a:lvl3pPr>
+      <a:lvl4pPr marL="1600200" indent="-228600" algn="l" defTabSz="914400" rtl="0" eaLnBrk="1" latinLnBrk="0" hangingPunct="1">
+        <a:lnSpc>
+          <a:spcPct val="90000"/>
+        </a:lnSpc>
+        <a:spcBef>
+          <a:spcPts val="500"/>
+        </a:spcBef>
+        <a:buFont typeface="Arial" panose="020B0604020202020204" pitchFamily="34" charset="0"/>
+        <a:buChar char="•"/>
+        <a:defRPr sz="1800" kern="1200">
+          <a:solidFill>
+            <a:schemeClr val="tx1"/>
+          </a:solidFill>
+          <a:latin typeface="+mn-lt"/>
+          <a:ea typeface="+mn-ea"/>
+          <a:cs typeface="+mn-cs"/>
+        </a:defRPr>
+      </a:lvl4pPr>
+      <a:lvl5pPr marL="2057400" indent="-228600" algn="l" defTabSz="914400" rtl="0" eaLnBrk="1" latinLnBrk="0" hangingPunct="1">
+        <a:lnSpc>
+          <a:spcPct val="90000"/>
+        </a:lnSpc>
+        <a:spcBef>
+          <a:spcPts val="500"/>
+        </a:spcBef>
+        <a:buFont typeface="Arial" panose="020B0604020202020204" pitchFamily="34" charset="0"/>
+        <a:buChar char="•"/>
+        <a:defRPr sz="1800" kern="1200">
+          <a:solidFill>
+            <a:schemeClr val="tx1"/>
+          </a:solidFill>
+          <a:latin typeface="+mn-lt"/>
+          <a:ea typeface="+mn-ea"/>
+          <a:cs typeface="+mn-cs"/>
+        </a:defRPr>
+      </a:lvl5pPr>
+      <a:lvl6pPr marL="2514600" indent="-228600" algn="l" defTabSz="914400" rtl="0" eaLnBrk="1" latinLnBrk="0" hangingPunct="1">
+        <a:lnSpc>
+          <a:spcPct val="90000"/>
+        </a:lnSpc>
+        <a:spcBef>
+          <a:spcPts val="500"/>
+        </a:spcBef>
+        <a:buFont typeface="Arial" panose="020B0604020202020204" pitchFamily="34" charset="0"/>
+        <a:buChar char="•"/>
+        <a:defRPr sz="1800" kern="1200">
+          <a:solidFill>
+            <a:schemeClr val="tx1"/>
+          </a:solidFill>
+          <a:latin typeface="+mn-lt"/>
+          <a:ea typeface="+mn-ea"/>
+          <a:cs typeface="+mn-cs"/>
+        </a:defRPr>
+      </a:lvl6pPr>
+      <a:lvl7pPr marL="2971800" indent="-228600" algn="l" defTabSz="914400" rtl="0" eaLnBrk="1" latinLnBrk="0" hangingPunct="1">
+        <a:lnSpc>
+          <a:spcPct val="90000"/>
+        </a:lnSpc>
+        <a:spcBef>
+          <a:spcPts val="500"/>
+        </a:spcBef>
+        <a:buFont typeface="Arial" panose="020B0604020202020204" pitchFamily="34" charset="0"/>
+        <a:buChar char="•"/>
+        <a:defRPr sz="1800" kern="1200">
+          <a:solidFill>
+            <a:schemeClr val="tx1"/>
+          </a:solidFill>
+          <a:latin typeface="+mn-lt"/>
+          <a:ea typeface="+mn-ea"/>
+          <a:cs typeface="+mn-cs"/>
+        </a:defRPr>
+      </a:lvl7pPr>
+      <a:lvl8pPr marL="3429000" indent="-228600" algn="l" defTabSz="914400" rtl="0" eaLnBrk="1" latinLnBrk="0" hangingPunct="1">
+        <a:lnSpc>
+          <a:spcPct val="90000"/>
+        </a:lnSpc>
+        <a:spcBef>
+          <a:spcPts val="500"/>
+        </a:spcBef>
+        <a:buFont typeface="Arial" panose="020B0604020202020204" pitchFamily="34" charset="0"/>
+        <a:buChar char="•"/>
+        <a:defRPr sz="1800" kern="1200">
+          <a:solidFill>
+            <a:schemeClr val="tx1"/>
+          </a:solidFill>
+          <a:latin typeface="+mn-lt"/>
+          <a:ea typeface="+mn-ea"/>
+          <a:cs typeface="+mn-cs"/>
+        </a:defRPr>
+      </a:lvl8pPr>
+      <a:lvl9pPr marL="3886200" indent="-228600" algn="l" defTabSz="914400" rtl="0" eaLnBrk="1" latinLnBrk="0" hangingPunct="1">
+        <a:lnSpc>
+          <a:spcPct val="90000"/>
+        </a:lnSpc>
+        <a:spcBef>
+          <a:spcPts val="500"/>
+        </a:spcBef>
+        <a:buFont typeface="Arial" panose="020B0604020202020204" pitchFamily="34" charset="0"/>
+        <a:buChar char="•"/>
+        <a:defRPr sz="1800" kern="1200">
+          <a:solidFill>
+            <a:schemeClr val="tx1"/>
+          </a:solidFill>
+          <a:latin typeface="+mn-lt"/>
+          <a:ea typeface="+mn-ea"/>
+          <a:cs typeface="+mn-cs"/>
+        </a:defRPr>
+      </a:lvl9pPr>
+    </p:bodyStyle>
+    <p:otherStyle>
+      <a:defPPr>
+        <a:defRPr lang="pt-BR"/>
+      </a:defPPr>
+      <a:lvl1pPr marL="0" algn="l" defTabSz="914400" rtl="0" eaLnBrk="1" latinLnBrk="0" hangingPunct="1">
+        <a:defRPr sz="1800" kern="1200">
+          <a:solidFill>
+            <a:schemeClr val="tx1"/>
+          </a:solidFill>
+          <a:latin typeface="+mn-lt"/>
+          <a:ea typeface="+mn-ea"/>
+          <a:cs typeface="+mn-cs"/>
+        </a:defRPr>
+      </a:lvl1pPr>
+      <a:lvl2pPr marL="457200" algn="l" defTabSz="914400" rtl="0" eaLnBrk="1" latinLnBrk="0" hangingPunct="1">
+        <a:defRPr sz="1800" kern="1200">
+          <a:solidFill>
+            <a:schemeClr val="tx1"/>
+          </a:solidFill>
+          <a:latin typeface="+mn-lt"/>
+          <a:ea typeface="+mn-ea"/>
+          <a:cs typeface="+mn-cs"/>
+        </a:defRPr>
+      </a:lvl2pPr>
+      <a:lvl3pPr marL="914400" algn="l" defTabSz="914400" rtl="0" eaLnBrk="1" latinLnBrk="0" hangingPunct="1">
+        <a:defRPr sz="1800" kern="1200">
+          <a:solidFill>
+            <a:schemeClr val="tx1"/>
+          </a:solidFill>
+          <a:latin typeface="+mn-lt"/>
+          <a:ea typeface="+mn-ea"/>
+          <a:cs typeface="+mn-cs"/>
+        </a:defRPr>
+      </a:lvl3pPr>
+      <a:lvl4pPr marL="1371600" algn="l" defTabSz="914400" rtl="0" eaLnBrk="1" latinLnBrk="0" hangingPunct="1">
+        <a:defRPr sz="1800" kern="1200">
+          <a:solidFill>
+            <a:schemeClr val="tx1"/>
+          </a:solidFill>
+          <a:latin typeface="+mn-lt"/>
+          <a:ea typeface="+mn-ea"/>
+          <a:cs typeface="+mn-cs"/>
+        </a:defRPr>
+      </a:lvl4pPr>
+      <a:lvl5pPr marL="1828800" algn="l" defTabSz="914400" rtl="0" eaLnBrk="1" latinLnBrk="0" hangingPunct="1">
+        <a:defRPr sz="1800" kern="1200">
+          <a:solidFill>
+            <a:schemeClr val="tx1"/>
+          </a:solidFill>
+          <a:latin typeface="+mn-lt"/>
+          <a:ea typeface="+mn-ea"/>
+          <a:cs typeface="+mn-cs"/>
+        </a:defRPr>
+      </a:lvl5pPr>
+      <a:lvl6pPr marL="2286000" algn="l" defTabSz="914400" rtl="0" eaLnBrk="1" latinLnBrk="0" hangingPunct="1">
+        <a:defRPr sz="1800" kern="1200">
+          <a:solidFill>
+            <a:schemeClr val="tx1"/>
+          </a:solidFill>
+          <a:latin typeface="+mn-lt"/>
+          <a:ea typeface="+mn-ea"/>
+          <a:cs typeface="+mn-cs"/>
+        </a:defRPr>
+      </a:lvl6pPr>
+      <a:lvl7pPr marL="2743200" algn="l" defTabSz="914400" rtl="0" eaLnBrk="1" latinLnBrk="0" hangingPunct="1">
+        <a:defRPr sz="1800" kern="1200">
+          <a:solidFill>
+            <a:schemeClr val="tx1"/>
+          </a:solidFill>
+          <a:latin typeface="+mn-lt"/>
+          <a:ea typeface="+mn-ea"/>
+          <a:cs typeface="+mn-cs"/>
+        </a:defRPr>
+      </a:lvl7pPr>
+      <a:lvl8pPr marL="3200400" algn="l" defTabSz="914400" rtl="0" eaLnBrk="1" latinLnBrk="0" hangingPunct="1">
+        <a:defRPr sz="1800" kern="1200">
+          <a:solidFill>
+            <a:schemeClr val="tx1"/>
+          </a:solidFill>
+          <a:latin typeface="+mn-lt"/>
+          <a:ea typeface="+mn-ea"/>
+          <a:cs typeface="+mn-cs"/>
+        </a:defRPr>
+      </a:lvl8pPr>
+      <a:lvl9pPr marL="3657600" algn="l" defTabSz="914400" rtl="0" eaLnBrk="1" latinLnBrk="0" hangingPunct="1">
+        <a:defRPr sz="1800" kern="1200">
+          <a:solidFill>
+            <a:schemeClr val="tx1"/>
+          </a:solidFill>
+          <a:latin typeface="+mn-lt"/>
+          <a:ea typeface="+mn-ea"/>
+          <a:cs typeface="+mn-cs"/>
+        </a:defRPr>
+      </a:lvl9pPr>
+    </p:otherStyle>
+  </p:txStyles>
 </p:sldMaster>
 </file>
 
 <file path=ppt/slides/slide1.xml><?xml version="1.0" encoding="utf-8"?>
-<p:sld xmlns:a="http://schemas.openxmlformats.org/drawingml/2006/main" xmlns:p="http://schemas.openxmlformats.org/presentationml/2006/main" xmlns:r="http://schemas.openxmlformats.org/officeDocument/2006/relationships" xmlns:p14="http://schemas.microsoft.com/office/powerpoint/2010/main" xmlns:p15="http://schemas.microsoft.com/office/powerpoint/2012/main" xmlns:mc="http://schemas.openxmlformats.org/markup-compatibility/2006">
+<p:sld xmlns:a="http://schemas.openxmlformats.org/drawingml/2006/main" xmlns:r="http://schemas.openxmlformats.org/officeDocument/2006/relationships" xmlns:p="http://schemas.openxmlformats.org/presentationml/2006/main">
   <p:cSld>
     <p:spTree>
       <p:nvGrpSpPr>
@@ -1667,15 +2092,22 @@
           </a:ln>
         </p:spPr>
         <p:style>
-          <a:lnRef idx="0"/>
-          <a:fillRef idx="0"/>
-          <a:effectRef idx="0"/>
+          <a:lnRef idx="0">
+            <a:scrgbClr r="0" g="0" b="0"/>
+          </a:lnRef>
+          <a:fillRef idx="0">
+            <a:scrgbClr r="0" g="0" b="0"/>
+          </a:fillRef>
+          <a:effectRef idx="0">
+            <a:scrgbClr r="0" g="0" b="0"/>
+          </a:effectRef>
           <a:fontRef idx="minor"/>
         </p:style>
         <p:txBody>
-          <a:bodyPr lIns="90000" rIns="90000" tIns="45000" bIns="45000" anchor="ctr">
+          <a:bodyPr lIns="90000" tIns="45000" rIns="90000" bIns="45000" anchor="ctr">
             <a:noAutofit/>
           </a:bodyPr>
+          <a:lstStyle/>
           <a:p>
             <a:pPr>
               <a:lnSpc>
@@ -1683,7 +2115,7 @@
               </a:lnSpc>
             </a:pPr>
             <a:r>
-              <a:rPr b="0" lang="pt-BR" sz="4400" spc="-1" strike="noStrike">
+              <a:rPr lang="pt-BR" sz="4400" b="0" strike="noStrike" spc="-1">
                 <a:solidFill>
                   <a:srgbClr val="000000"/>
                 </a:solidFill>
@@ -1691,7 +2123,7 @@
               </a:rPr>
               <a:t>Contexto de Negócio</a:t>
             </a:r>
-            <a:endParaRPr b="0" lang="pt-BR" sz="4400" spc="-1" strike="noStrike">
+            <a:endParaRPr lang="pt-BR" sz="4400" b="0" strike="noStrike" spc="-1">
               <a:latin typeface="Arial"/>
             </a:endParaRPr>
           </a:p>
@@ -1712,7 +2144,7 @@
             <a:avLst/>
           </a:prstGeom>
           <a:solidFill>
-            <a:srgbClr val="4472c4"/>
+            <a:srgbClr val="4472C4"/>
           </a:solidFill>
           <a:ln w="12600">
             <a:solidFill>
@@ -1722,15 +2154,22 @@
           </a:ln>
         </p:spPr>
         <p:style>
-          <a:lnRef idx="0"/>
-          <a:fillRef idx="0"/>
-          <a:effectRef idx="0"/>
+          <a:lnRef idx="0">
+            <a:scrgbClr r="0" g="0" b="0"/>
+          </a:lnRef>
+          <a:fillRef idx="0">
+            <a:scrgbClr r="0" g="0" b="0"/>
+          </a:fillRef>
+          <a:effectRef idx="0">
+            <a:scrgbClr r="0" g="0" b="0"/>
+          </a:effectRef>
           <a:fontRef idx="minor"/>
         </p:style>
         <p:txBody>
-          <a:bodyPr lIns="90000" rIns="90000" tIns="45000" bIns="45000" anchor="ctr">
+          <a:bodyPr lIns="90000" tIns="45000" rIns="90000" bIns="45000" anchor="ctr">
             <a:noAutofit/>
           </a:bodyPr>
+          <a:lstStyle/>
           <a:p>
             <a:pPr algn="ctr">
               <a:lnSpc>
@@ -1738,16 +2177,16 @@
               </a:lnSpc>
             </a:pPr>
             <a:r>
-              <a:rPr b="0" lang="pt-BR" sz="1800" spc="-1" strike="noStrike">
+              <a:rPr lang="pt-BR" sz="1800" b="0" strike="noStrike" spc="-1">
                 <a:solidFill>
-                  <a:srgbClr val="ffffff"/>
+                  <a:srgbClr val="FFFFFF"/>
                 </a:solidFill>
                 <a:latin typeface="Calibri"/>
                 <a:ea typeface="DejaVu Sans"/>
               </a:rPr>
               <a:t>Cliente</a:t>
             </a:r>
-            <a:endParaRPr b="0" lang="pt-BR" sz="1800" spc="-1" strike="noStrike">
+            <a:endParaRPr lang="pt-BR" sz="1800" b="0" strike="noStrike" spc="-1">
               <a:latin typeface="Arial"/>
             </a:endParaRPr>
           </a:p>
@@ -1772,15 +2211,21 @@
           <a:noFill/>
           <a:ln w="6480">
             <a:solidFill>
-              <a:srgbClr val="4472c4"/>
+              <a:srgbClr val="4472C4"/>
             </a:solidFill>
             <a:miter/>
           </a:ln>
         </p:spPr>
         <p:style>
-          <a:lnRef idx="0"/>
-          <a:fillRef idx="0"/>
-          <a:effectRef idx="0"/>
+          <a:lnRef idx="0">
+            <a:scrgbClr r="0" g="0" b="0"/>
+          </a:lnRef>
+          <a:fillRef idx="0">
+            <a:scrgbClr r="0" g="0" b="0"/>
+          </a:fillRef>
+          <a:effectRef idx="0">
+            <a:scrgbClr r="0" g="0" b="0"/>
+          </a:effectRef>
           <a:fontRef idx="minor"/>
         </p:style>
       </p:sp>
@@ -1793,7 +2238,7 @@
         <p:spPr>
           <a:xfrm>
             <a:off x="2741040" y="1935000"/>
-            <a:ext cx="1648800" cy="303480"/>
+            <a:ext cx="2137230" cy="521766"/>
           </a:xfrm>
           <a:prstGeom prst="rect">
             <a:avLst/>
@@ -1804,15 +2249,22 @@
           </a:ln>
         </p:spPr>
         <p:style>
-          <a:lnRef idx="0"/>
-          <a:fillRef idx="0"/>
-          <a:effectRef idx="0"/>
+          <a:lnRef idx="0">
+            <a:scrgbClr r="0" g="0" b="0"/>
+          </a:lnRef>
+          <a:fillRef idx="0">
+            <a:scrgbClr r="0" g="0" b="0"/>
+          </a:fillRef>
+          <a:effectRef idx="0">
+            <a:scrgbClr r="0" g="0" b="0"/>
+          </a:effectRef>
           <a:fontRef idx="minor"/>
         </p:style>
         <p:txBody>
-          <a:bodyPr wrap="none" lIns="90000" rIns="90000" tIns="45000" bIns="45000">
+          <a:bodyPr wrap="none" lIns="90000" tIns="45000" rIns="90000" bIns="45000">
             <a:spAutoFit/>
           </a:bodyPr>
+          <a:lstStyle/>
           <a:p>
             <a:pPr marL="343080" indent="-342360">
               <a:lnSpc>
@@ -1825,16 +2277,45 @@
               <a:buAutoNum type="arabicPeriod"/>
             </a:pPr>
             <a:r>
-              <a:rPr b="0" lang="pt-BR" sz="1400" spc="-1" strike="noStrike">
+              <a:rPr lang="pt-BR" sz="1400" b="0" strike="noStrike" spc="-1" dirty="0">
                 <a:solidFill>
                   <a:srgbClr val="000000"/>
                 </a:solidFill>
                 <a:latin typeface="Calibri"/>
-                <a:ea typeface="DejaVu Sans"/>
               </a:rPr>
-              <a:t>Atender Cliente</a:t>
+              <a:t>Solicitar orçamento</a:t>
             </a:r>
-            <a:endParaRPr b="0" lang="pt-BR" sz="1400" spc="-1" strike="noStrike">
+            <a:endParaRPr lang="pt-BR" sz="1400" spc="-1" dirty="0">
+              <a:solidFill>
+                <a:srgbClr val="000000"/>
+              </a:solidFill>
+              <a:latin typeface="Calibri"/>
+            </a:endParaRPr>
+          </a:p>
+          <a:p>
+            <a:pPr marL="343080" indent="-342360">
+              <a:lnSpc>
+                <a:spcPct val="100000"/>
+              </a:lnSpc>
+              <a:buClr>
+                <a:srgbClr val="000000"/>
+              </a:buClr>
+              <a:buFont typeface="StarSymbol"/>
+              <a:buAutoNum type="arabicPeriod"/>
+            </a:pPr>
+            <a:r>
+              <a:rPr lang="pt-BR" sz="1400" spc="-1" dirty="0">
+                <a:solidFill>
+                  <a:srgbClr val="000000"/>
+                </a:solidFill>
+                <a:latin typeface="Calibri"/>
+              </a:rPr>
+              <a:t>Fazer pedido de peças</a:t>
+            </a:r>
+            <a:endParaRPr lang="pt-BR" sz="1400" spc="-1" dirty="0">
+              <a:solidFill>
+                <a:srgbClr val="000000"/>
+              </a:solidFill>
               <a:latin typeface="Arial"/>
             </a:endParaRPr>
           </a:p>
@@ -1865,15 +2346,22 @@
           </a:ln>
         </p:spPr>
         <p:style>
-          <a:lnRef idx="0"/>
-          <a:fillRef idx="0"/>
-          <a:effectRef idx="0"/>
+          <a:lnRef idx="0">
+            <a:scrgbClr r="0" g="0" b="0"/>
+          </a:lnRef>
+          <a:fillRef idx="0">
+            <a:scrgbClr r="0" g="0" b="0"/>
+          </a:fillRef>
+          <a:effectRef idx="0">
+            <a:scrgbClr r="0" g="0" b="0"/>
+          </a:effectRef>
           <a:fontRef idx="minor"/>
         </p:style>
         <p:txBody>
-          <a:bodyPr lIns="90000" rIns="90000" tIns="45000" bIns="45000">
+          <a:bodyPr lIns="90000" tIns="45000" rIns="90000" bIns="45000">
             <a:noAutofit/>
           </a:bodyPr>
+          <a:lstStyle/>
           <a:p>
             <a:pPr algn="ctr">
               <a:lnSpc>
@@ -1881,7 +2369,7 @@
               </a:lnSpc>
             </a:pPr>
             <a:r>
-              <a:rPr b="0" lang="pt-BR" sz="1800" spc="-1" strike="noStrike">
+              <a:rPr lang="pt-BR" sz="1800" b="0" strike="noStrike" spc="-1">
                 <a:solidFill>
                   <a:srgbClr val="000000"/>
                 </a:solidFill>
@@ -1890,7 +2378,7 @@
               </a:rPr>
               <a:t>Loja De Computador</a:t>
             </a:r>
-            <a:endParaRPr b="0" lang="pt-BR" sz="1800" spc="-1" strike="noStrike">
+            <a:endParaRPr lang="pt-BR" sz="1800" b="0" strike="noStrike" spc="-1">
               <a:latin typeface="Arial"/>
             </a:endParaRPr>
           </a:p>
@@ -1898,19 +2386,14 @@
       </p:sp>
     </p:spTree>
   </p:cSld>
-  <mc:AlternateContent>
-    <mc:Choice Requires="p14">
-      <p:transition spd="slow" p14:dur="2000"/>
-    </mc:Choice>
-    <mc:Fallback>
-      <p:transition spd="slow"/>
-    </mc:Fallback>
-  </mc:AlternateContent>
+  <p:clrMapOvr>
+    <a:masterClrMapping/>
+  </p:clrMapOvr>
 </p:sld>
 </file>
 
 <file path=ppt/slides/slide2.xml><?xml version="1.0" encoding="utf-8"?>
-<p:sld xmlns:a="http://schemas.openxmlformats.org/drawingml/2006/main" xmlns:p="http://schemas.openxmlformats.org/presentationml/2006/main" xmlns:r="http://schemas.openxmlformats.org/officeDocument/2006/relationships" xmlns:p14="http://schemas.microsoft.com/office/powerpoint/2010/main" xmlns:p15="http://schemas.microsoft.com/office/powerpoint/2012/main" xmlns:mc="http://schemas.openxmlformats.org/markup-compatibility/2006">
+<p:sld xmlns:a="http://schemas.openxmlformats.org/drawingml/2006/main" xmlns:r="http://schemas.openxmlformats.org/officeDocument/2006/relationships" xmlns:p="http://schemas.openxmlformats.org/presentationml/2006/main">
   <p:cSld>
     <p:spTree>
       <p:nvGrpSpPr>
@@ -1928,7 +2411,7 @@
       </p:grpSpPr>
       <p:sp>
         <p:nvSpPr>
-          <p:cNvPr id="43" name="CustomShape 1"/>
+          <p:cNvPr id="50" name="CustomShape 1"/>
           <p:cNvSpPr/>
           <p:nvPr/>
         </p:nvSpPr>
@@ -1946,15 +2429,22 @@
           </a:ln>
         </p:spPr>
         <p:style>
-          <a:lnRef idx="0"/>
-          <a:fillRef idx="0"/>
-          <a:effectRef idx="0"/>
+          <a:lnRef idx="0">
+            <a:scrgbClr r="0" g="0" b="0"/>
+          </a:lnRef>
+          <a:fillRef idx="0">
+            <a:scrgbClr r="0" g="0" b="0"/>
+          </a:fillRef>
+          <a:effectRef idx="0">
+            <a:scrgbClr r="0" g="0" b="0"/>
+          </a:effectRef>
           <a:fontRef idx="minor"/>
         </p:style>
         <p:txBody>
-          <a:bodyPr lIns="90000" rIns="90000" tIns="45000" bIns="45000" anchor="ctr">
+          <a:bodyPr lIns="90000" tIns="45000" rIns="90000" bIns="45000" anchor="ctr">
             <a:noAutofit/>
           </a:bodyPr>
+          <a:lstStyle/>
           <a:p>
             <a:pPr>
               <a:lnSpc>
@@ -1962,7 +2452,7 @@
               </a:lnSpc>
             </a:pPr>
             <a:r>
-              <a:rPr b="0" lang="pt-BR" sz="4400" spc="-1" strike="noStrike">
+              <a:rPr lang="pt-BR" sz="4400" b="0" strike="noStrike" spc="-1" dirty="0">
                 <a:solidFill>
                   <a:srgbClr val="000000"/>
                 </a:solidFill>
@@ -1972,24 +2462,24 @@
               <a:t>Cenário: </a:t>
             </a:r>
             <a:r>
-              <a:rPr b="0" lang="pt-BR" sz="2800" spc="-1" strike="noStrike">
+              <a:rPr lang="pt-BR" sz="2800" b="0" strike="noStrike" spc="-1" dirty="0">
                 <a:solidFill>
                   <a:srgbClr val="000000"/>
                 </a:solidFill>
                 <a:latin typeface="Calibri"/>
                 <a:ea typeface="Microsoft YaHei"/>
               </a:rPr>
-              <a:t>Atender Cliente</a:t>
+              <a:t>Solicitar orçamento</a:t>
             </a:r>
-            <a:endParaRPr b="0" lang="pt-BR" sz="2800" spc="-1" strike="noStrike">
-              <a:latin typeface="Arial"/>
-            </a:endParaRPr>
-          </a:p>
-        </p:txBody>
-      </p:sp>
-      <p:sp>
-        <p:nvSpPr>
-          <p:cNvPr id="44" name="CustomShape 2"/>
+            <a:endParaRPr lang="pt-BR" sz="2800" b="0" strike="noStrike" spc="-1" dirty="0">
+              <a:latin typeface="Arial"/>
+            </a:endParaRPr>
+          </a:p>
+        </p:txBody>
+      </p:sp>
+      <p:sp>
+        <p:nvSpPr>
+          <p:cNvPr id="51" name="CustomShape 2"/>
           <p:cNvSpPr/>
           <p:nvPr/>
         </p:nvSpPr>
@@ -2004,25 +2494,32 @@
             </a:avLst>
           </a:prstGeom>
           <a:solidFill>
-            <a:srgbClr val="ffc000"/>
+            <a:srgbClr val="FFC000"/>
           </a:solidFill>
           <a:ln w="12600">
             <a:solidFill>
-              <a:srgbClr val="4472c4"/>
+              <a:srgbClr val="4472C4"/>
             </a:solidFill>
             <a:miter/>
           </a:ln>
         </p:spPr>
         <p:style>
-          <a:lnRef idx="0"/>
-          <a:fillRef idx="0"/>
-          <a:effectRef idx="0"/>
+          <a:lnRef idx="0">
+            <a:scrgbClr r="0" g="0" b="0"/>
+          </a:lnRef>
+          <a:fillRef idx="0">
+            <a:scrgbClr r="0" g="0" b="0"/>
+          </a:fillRef>
+          <a:effectRef idx="0">
+            <a:scrgbClr r="0" g="0" b="0"/>
+          </a:effectRef>
           <a:fontRef idx="minor"/>
         </p:style>
         <p:txBody>
-          <a:bodyPr lIns="90000" rIns="90000" tIns="45000" bIns="45000">
+          <a:bodyPr lIns="90000" tIns="45000" rIns="90000" bIns="45000">
             <a:noAutofit/>
           </a:bodyPr>
+          <a:lstStyle/>
           <a:p>
             <a:pPr algn="ctr">
               <a:lnSpc>
@@ -2030,7 +2527,7 @@
               </a:lnSpc>
             </a:pPr>
             <a:r>
-              <a:rPr b="0" lang="pt-BR" sz="1000" spc="-1" strike="noStrike">
+              <a:rPr lang="pt-BR" sz="1000" b="0" strike="noStrike" spc="-1">
                 <a:solidFill>
                   <a:srgbClr val="000000"/>
                 </a:solidFill>
@@ -2039,7 +2536,7 @@
               </a:rPr>
               <a:t>Técnico</a:t>
             </a:r>
-            <a:endParaRPr b="0" lang="pt-BR" sz="1000" spc="-1" strike="noStrike">
+            <a:endParaRPr lang="pt-BR" sz="1000" b="0" strike="noStrike" spc="-1">
               <a:latin typeface="Arial"/>
             </a:endParaRPr>
           </a:p>
@@ -2050,7 +2547,7 @@
               </a:lnSpc>
             </a:pPr>
             <a:r>
-              <a:rPr b="1" lang="pt-BR" sz="1000" spc="-1" strike="noStrike">
+              <a:rPr lang="pt-BR" sz="1000" b="1" strike="noStrike" spc="-1">
                 <a:solidFill>
                   <a:srgbClr val="000000"/>
                 </a:solidFill>
@@ -2059,7 +2556,7 @@
               </a:rPr>
               <a:t>(Nó Operacional)</a:t>
             </a:r>
-            <a:endParaRPr b="0" lang="pt-BR" sz="1000" spc="-1" strike="noStrike">
+            <a:endParaRPr lang="pt-BR" sz="1000" b="0" strike="noStrike" spc="-1">
               <a:latin typeface="Arial"/>
             </a:endParaRPr>
           </a:p>
@@ -2069,22 +2566,22 @@
                 <a:spcPct val="100000"/>
               </a:lnSpc>
             </a:pPr>
-            <a:endParaRPr b="0" lang="pt-BR" sz="1000" spc="-1" strike="noStrike">
-              <a:latin typeface="Arial"/>
-            </a:endParaRPr>
-          </a:p>
-        </p:txBody>
-      </p:sp>
-      <p:sp>
-        <p:nvSpPr>
-          <p:cNvPr id="45" name="CustomShape 3"/>
+            <a:endParaRPr lang="pt-BR" sz="1000" b="0" strike="noStrike" spc="-1">
+              <a:latin typeface="Arial"/>
+            </a:endParaRPr>
+          </a:p>
+        </p:txBody>
+      </p:sp>
+      <p:sp>
+        <p:nvSpPr>
+          <p:cNvPr id="52" name="CustomShape 3"/>
           <p:cNvSpPr/>
           <p:nvPr/>
         </p:nvSpPr>
         <p:spPr>
           <a:xfrm>
             <a:off x="6318000" y="3551760"/>
-            <a:ext cx="1097640" cy="839880"/>
+            <a:ext cx="1097640" cy="911880"/>
           </a:xfrm>
           <a:prstGeom prst="roundRect">
             <a:avLst>
@@ -2092,22 +2589,29 @@
             </a:avLst>
           </a:prstGeom>
           <a:solidFill>
-            <a:srgbClr val="70ad47"/>
+            <a:srgbClr val="70AD47"/>
           </a:solidFill>
           <a:ln>
             <a:noFill/>
           </a:ln>
         </p:spPr>
         <p:style>
-          <a:lnRef idx="0"/>
-          <a:fillRef idx="0"/>
-          <a:effectRef idx="0"/>
+          <a:lnRef idx="0">
+            <a:scrgbClr r="0" g="0" b="0"/>
+          </a:lnRef>
+          <a:fillRef idx="0">
+            <a:scrgbClr r="0" g="0" b="0"/>
+          </a:fillRef>
+          <a:effectRef idx="0">
+            <a:scrgbClr r="0" g="0" b="0"/>
+          </a:effectRef>
           <a:fontRef idx="minor"/>
         </p:style>
         <p:txBody>
-          <a:bodyPr lIns="90000" rIns="90000" tIns="45000" bIns="45000" anchor="ctr">
+          <a:bodyPr lIns="90000" tIns="45000" rIns="90000" bIns="45000" anchor="ctr">
             <a:noAutofit/>
           </a:bodyPr>
+          <a:lstStyle/>
           <a:p>
             <a:pPr algn="ctr">
               <a:lnSpc>
@@ -2115,24 +2619,24 @@
               </a:lnSpc>
             </a:pPr>
             <a:r>
-              <a:rPr b="1" lang="pt-BR" sz="1200" spc="-1" strike="noStrike">
+              <a:rPr lang="pt-BR" sz="1200" b="1" strike="noStrike" spc="-1">
                 <a:solidFill>
-                  <a:srgbClr val="ffffff"/>
+                  <a:srgbClr val="FFFFFF"/>
                 </a:solidFill>
                 <a:latin typeface="Calibri"/>
                 <a:ea typeface="DejaVu Sans"/>
               </a:rPr>
-              <a:t>Montar maquina</a:t>
+              <a:t>Elaborar orçamento</a:t>
             </a:r>
-            <a:endParaRPr b="0" lang="pt-BR" sz="1200" spc="-1" strike="noStrike">
-              <a:latin typeface="Arial"/>
-            </a:endParaRPr>
-          </a:p>
-        </p:txBody>
-      </p:sp>
-      <p:sp>
-        <p:nvSpPr>
-          <p:cNvPr id="46" name="CustomShape 4"/>
+            <a:endParaRPr lang="pt-BR" sz="1200" b="0" strike="noStrike" spc="-1">
+              <a:latin typeface="Arial"/>
+            </a:endParaRPr>
+          </a:p>
+        </p:txBody>
+      </p:sp>
+      <p:sp>
+        <p:nvSpPr>
+          <p:cNvPr id="53" name="CustomShape 4"/>
           <p:cNvSpPr/>
           <p:nvPr/>
         </p:nvSpPr>
@@ -2145,7 +2649,7 @@
             <a:avLst/>
           </a:prstGeom>
           <a:solidFill>
-            <a:srgbClr val="4472c4"/>
+            <a:srgbClr val="4472C4"/>
           </a:solidFill>
           <a:ln w="12600">
             <a:solidFill>
@@ -2155,15 +2659,22 @@
           </a:ln>
         </p:spPr>
         <p:style>
-          <a:lnRef idx="0"/>
-          <a:fillRef idx="0"/>
-          <a:effectRef idx="0"/>
+          <a:lnRef idx="0">
+            <a:scrgbClr r="0" g="0" b="0"/>
+          </a:lnRef>
+          <a:fillRef idx="0">
+            <a:scrgbClr r="0" g="0" b="0"/>
+          </a:fillRef>
+          <a:effectRef idx="0">
+            <a:scrgbClr r="0" g="0" b="0"/>
+          </a:effectRef>
           <a:fontRef idx="minor"/>
         </p:style>
         <p:txBody>
-          <a:bodyPr lIns="90000" rIns="90000" tIns="45000" bIns="45000" anchor="ctr">
+          <a:bodyPr lIns="90000" tIns="45000" rIns="90000" bIns="45000" anchor="ctr">
             <a:noAutofit/>
           </a:bodyPr>
+          <a:lstStyle/>
           <a:p>
             <a:pPr algn="ctr">
               <a:lnSpc>
@@ -2171,24 +2682,24 @@
               </a:lnSpc>
             </a:pPr>
             <a:r>
-              <a:rPr b="0" lang="pt-BR" sz="1800" spc="-1" strike="noStrike">
+              <a:rPr lang="pt-BR" sz="1800" b="0" strike="noStrike" spc="-1">
                 <a:solidFill>
-                  <a:srgbClr val="ffffff"/>
+                  <a:srgbClr val="FFFFFF"/>
                 </a:solidFill>
                 <a:latin typeface="Calibri"/>
                 <a:ea typeface="DejaVu Sans"/>
               </a:rPr>
               <a:t>Cliente</a:t>
             </a:r>
-            <a:endParaRPr b="0" lang="pt-BR" sz="1800" spc="-1" strike="noStrike">
-              <a:latin typeface="Arial"/>
-            </a:endParaRPr>
-          </a:p>
-        </p:txBody>
-      </p:sp>
-      <p:sp>
-        <p:nvSpPr>
-          <p:cNvPr id="47" name="CustomShape 5"/>
+            <a:endParaRPr lang="pt-BR" sz="1800" b="0" strike="noStrike" spc="-1">
+              <a:latin typeface="Arial"/>
+            </a:endParaRPr>
+          </a:p>
+        </p:txBody>
+      </p:sp>
+      <p:sp>
+        <p:nvSpPr>
+          <p:cNvPr id="54" name="CustomShape 5"/>
           <p:cNvSpPr/>
           <p:nvPr/>
         </p:nvSpPr>
@@ -2205,21 +2716,67 @@
           <a:noFill/>
           <a:ln w="6480">
             <a:solidFill>
-              <a:srgbClr val="4472c4"/>
+              <a:srgbClr val="4472C4"/>
             </a:solidFill>
             <a:miter/>
           </a:ln>
         </p:spPr>
         <p:style>
-          <a:lnRef idx="0"/>
-          <a:fillRef idx="0"/>
-          <a:effectRef idx="0"/>
+          <a:lnRef idx="0">
+            <a:scrgbClr r="0" g="0" b="0"/>
+          </a:lnRef>
+          <a:fillRef idx="0">
+            <a:scrgbClr r="0" g="0" b="0"/>
+          </a:fillRef>
+          <a:effectRef idx="0">
+            <a:scrgbClr r="0" g="0" b="0"/>
+          </a:effectRef>
           <a:fontRef idx="minor"/>
         </p:style>
       </p:sp>
       <p:sp>
         <p:nvSpPr>
-          <p:cNvPr id="48" name="CustomShape 6"/>
+          <p:cNvPr id="56" name="Line 7"/>
+          <p:cNvSpPr/>
+          <p:nvPr/>
+        </p:nvSpPr>
+        <p:spPr>
+          <a:xfrm>
+            <a:off x="6843600" y="3120120"/>
+            <a:ext cx="2520" cy="432000"/>
+          </a:xfrm>
+          <a:prstGeom prst="line">
+            <a:avLst/>
+          </a:prstGeom>
+          <a:ln w="6480">
+            <a:solidFill>
+              <a:srgbClr val="4472C4"/>
+            </a:solidFill>
+            <a:miter/>
+          </a:ln>
+        </p:spPr>
+        <p:style>
+          <a:lnRef idx="0">
+            <a:scrgbClr r="0" g="0" b="0"/>
+          </a:lnRef>
+          <a:fillRef idx="0">
+            <a:scrgbClr r="0" g="0" b="0"/>
+          </a:fillRef>
+          <a:effectRef idx="0">
+            <a:scrgbClr r="0" g="0" b="0"/>
+          </a:effectRef>
+          <a:fontRef idx="minor"/>
+        </p:style>
+      </p:sp>
+      <p:sp>
+        <p:nvSpPr>
+          <p:cNvPr id="9" name="CustomShape 6">
+            <a:extLst>
+              <a:ext uri="{FF2B5EF4-FFF2-40B4-BE49-F238E27FC236}">
+                <a16:creationId xmlns:a16="http://schemas.microsoft.com/office/drawing/2014/main" id="{1EF13074-7758-473E-AF94-33DABA5D1D61}"/>
+              </a:ext>
+            </a:extLst>
+          </p:cNvPr>
           <p:cNvSpPr/>
           <p:nvPr/>
         </p:nvSpPr>
@@ -2242,15 +2799,22 @@
           </a:ln>
         </p:spPr>
         <p:style>
-          <a:lnRef idx="0"/>
-          <a:fillRef idx="0"/>
-          <a:effectRef idx="0"/>
+          <a:lnRef idx="0">
+            <a:scrgbClr r="0" g="0" b="0"/>
+          </a:lnRef>
+          <a:fillRef idx="0">
+            <a:scrgbClr r="0" g="0" b="0"/>
+          </a:fillRef>
+          <a:effectRef idx="0">
+            <a:scrgbClr r="0" g="0" b="0"/>
+          </a:effectRef>
           <a:fontRef idx="minor"/>
         </p:style>
         <p:txBody>
-          <a:bodyPr lIns="90000" rIns="90000" tIns="45000" bIns="45000">
+          <a:bodyPr lIns="90000" tIns="45000" rIns="90000" bIns="45000">
             <a:noAutofit/>
           </a:bodyPr>
+          <a:lstStyle/>
           <a:p>
             <a:pPr algn="ctr">
               <a:lnSpc>
@@ -2258,7 +2822,7 @@
               </a:lnSpc>
             </a:pPr>
             <a:r>
-              <a:rPr b="0" lang="pt-BR" sz="1800" spc="-1" strike="noStrike">
+              <a:rPr lang="pt-BR" sz="1800" b="0" strike="noStrike" spc="-1">
                 <a:solidFill>
                   <a:srgbClr val="000000"/>
                 </a:solidFill>
@@ -2267,55 +2831,22 @@
               </a:rPr>
               <a:t>Loja de computador</a:t>
             </a:r>
-            <a:endParaRPr b="0" lang="pt-BR" sz="1800" spc="-1" strike="noStrike">
-              <a:latin typeface="Arial"/>
-            </a:endParaRPr>
-          </a:p>
-        </p:txBody>
-      </p:sp>
-      <p:sp>
-        <p:nvSpPr>
-          <p:cNvPr id="49" name="Line 7"/>
-          <p:cNvSpPr/>
-          <p:nvPr/>
-        </p:nvSpPr>
-        <p:spPr>
-          <a:xfrm>
-            <a:off x="6843600" y="3120120"/>
-            <a:ext cx="2520" cy="432000"/>
-          </a:xfrm>
-          <a:prstGeom prst="line">
-            <a:avLst/>
-          </a:prstGeom>
-          <a:ln w="6480">
-            <a:solidFill>
-              <a:srgbClr val="4472c4"/>
-            </a:solidFill>
-            <a:miter/>
-          </a:ln>
-        </p:spPr>
-        <p:style>
-          <a:lnRef idx="0"/>
-          <a:fillRef idx="0"/>
-          <a:effectRef idx="0"/>
-          <a:fontRef idx="minor"/>
-        </p:style>
+            <a:endParaRPr lang="pt-BR" sz="1800" b="0" strike="noStrike" spc="-1">
+              <a:latin typeface="Arial"/>
+            </a:endParaRPr>
+          </a:p>
+        </p:txBody>
       </p:sp>
     </p:spTree>
   </p:cSld>
-  <mc:AlternateContent>
-    <mc:Choice Requires="p14">
-      <p:transition spd="slow" p14:dur="2000"/>
-    </mc:Choice>
-    <mc:Fallback>
-      <p:transition spd="slow"/>
-    </mc:Fallback>
-  </mc:AlternateContent>
+  <p:clrMapOvr>
+    <a:masterClrMapping/>
+  </p:clrMapOvr>
 </p:sld>
 </file>
 
 <file path=ppt/slides/slide3.xml><?xml version="1.0" encoding="utf-8"?>
-<p:sld xmlns:a="http://schemas.openxmlformats.org/drawingml/2006/main" xmlns:p="http://schemas.openxmlformats.org/presentationml/2006/main" xmlns:r="http://schemas.openxmlformats.org/officeDocument/2006/relationships" xmlns:p14="http://schemas.microsoft.com/office/powerpoint/2010/main" xmlns:p15="http://schemas.microsoft.com/office/powerpoint/2012/main" xmlns:mc="http://schemas.openxmlformats.org/markup-compatibility/2006">
+<p:sld xmlns:a="http://schemas.openxmlformats.org/drawingml/2006/main" xmlns:r="http://schemas.openxmlformats.org/officeDocument/2006/relationships" xmlns:p="http://schemas.openxmlformats.org/presentationml/2006/main">
   <p:cSld>
     <p:spTree>
       <p:nvGrpSpPr>
@@ -2333,13 +2864,13 @@
       </p:grpSpPr>
       <p:sp>
         <p:nvSpPr>
-          <p:cNvPr id="50" name="CustomShape 1"/>
+          <p:cNvPr id="43" name="CustomShape 1"/>
           <p:cNvSpPr/>
           <p:nvPr/>
         </p:nvSpPr>
         <p:spPr>
           <a:xfrm>
-            <a:off x="692640" y="301680"/>
+            <a:off x="693672" y="301680"/>
             <a:ext cx="8693280" cy="1095120"/>
           </a:xfrm>
           <a:prstGeom prst="rect">
@@ -2351,15 +2882,22 @@
           </a:ln>
         </p:spPr>
         <p:style>
-          <a:lnRef idx="0"/>
-          <a:fillRef idx="0"/>
-          <a:effectRef idx="0"/>
+          <a:lnRef idx="0">
+            <a:scrgbClr r="0" g="0" b="0"/>
+          </a:lnRef>
+          <a:fillRef idx="0">
+            <a:scrgbClr r="0" g="0" b="0"/>
+          </a:fillRef>
+          <a:effectRef idx="0">
+            <a:scrgbClr r="0" g="0" b="0"/>
+          </a:effectRef>
           <a:fontRef idx="minor"/>
         </p:style>
         <p:txBody>
-          <a:bodyPr lIns="90000" rIns="90000" tIns="45000" bIns="45000" anchor="ctr">
+          <a:bodyPr lIns="90000" tIns="45000" rIns="90000" bIns="45000" anchor="ctr">
             <a:noAutofit/>
           </a:bodyPr>
+          <a:lstStyle/>
           <a:p>
             <a:pPr>
               <a:lnSpc>
@@ -2367,7 +2905,7 @@
               </a:lnSpc>
             </a:pPr>
             <a:r>
-              <a:rPr b="0" lang="pt-BR" sz="4400" spc="-1" strike="noStrike">
+              <a:rPr lang="pt-BR" sz="4400" b="0" strike="noStrike" spc="-1" dirty="0">
                 <a:solidFill>
                   <a:srgbClr val="000000"/>
                 </a:solidFill>
@@ -2377,24 +2915,24 @@
               <a:t>Cenário: </a:t>
             </a:r>
             <a:r>
-              <a:rPr b="0" lang="pt-BR" sz="2800" spc="-1" strike="noStrike">
+              <a:rPr lang="pt-BR" sz="2800" b="0" strike="noStrike" spc="-1" dirty="0">
                 <a:solidFill>
                   <a:srgbClr val="000000"/>
                 </a:solidFill>
                 <a:latin typeface="Calibri"/>
                 <a:ea typeface="Microsoft YaHei"/>
               </a:rPr>
-              <a:t>Atender Cliente</a:t>
+              <a:t>Fazer pedido de peças</a:t>
             </a:r>
-            <a:endParaRPr b="0" lang="pt-BR" sz="2800" spc="-1" strike="noStrike">
-              <a:latin typeface="Arial"/>
-            </a:endParaRPr>
-          </a:p>
-        </p:txBody>
-      </p:sp>
-      <p:sp>
-        <p:nvSpPr>
-          <p:cNvPr id="51" name="CustomShape 2"/>
+            <a:endParaRPr lang="pt-BR" sz="2800" b="0" strike="noStrike" spc="-1" dirty="0">
+              <a:latin typeface="Arial"/>
+            </a:endParaRPr>
+          </a:p>
+        </p:txBody>
+      </p:sp>
+      <p:sp>
+        <p:nvSpPr>
+          <p:cNvPr id="44" name="CustomShape 2"/>
           <p:cNvSpPr/>
           <p:nvPr/>
         </p:nvSpPr>
@@ -2409,25 +2947,32 @@
             </a:avLst>
           </a:prstGeom>
           <a:solidFill>
-            <a:srgbClr val="ffc000"/>
+            <a:srgbClr val="FFC000"/>
           </a:solidFill>
           <a:ln w="12600">
             <a:solidFill>
-              <a:srgbClr val="4472c4"/>
+              <a:srgbClr val="4472C4"/>
             </a:solidFill>
             <a:miter/>
           </a:ln>
         </p:spPr>
         <p:style>
-          <a:lnRef idx="0"/>
-          <a:fillRef idx="0"/>
-          <a:effectRef idx="0"/>
+          <a:lnRef idx="0">
+            <a:scrgbClr r="0" g="0" b="0"/>
+          </a:lnRef>
+          <a:fillRef idx="0">
+            <a:scrgbClr r="0" g="0" b="0"/>
+          </a:fillRef>
+          <a:effectRef idx="0">
+            <a:scrgbClr r="0" g="0" b="0"/>
+          </a:effectRef>
           <a:fontRef idx="minor"/>
         </p:style>
         <p:txBody>
-          <a:bodyPr lIns="90000" rIns="90000" tIns="45000" bIns="45000">
+          <a:bodyPr lIns="90000" tIns="45000" rIns="90000" bIns="45000">
             <a:noAutofit/>
           </a:bodyPr>
+          <a:lstStyle/>
           <a:p>
             <a:pPr algn="ctr">
               <a:lnSpc>
@@ -2435,7 +2980,7 @@
               </a:lnSpc>
             </a:pPr>
             <a:r>
-              <a:rPr b="0" lang="pt-BR" sz="1000" spc="-1" strike="noStrike">
+              <a:rPr lang="pt-BR" sz="1000" b="0" strike="noStrike" spc="-1">
                 <a:solidFill>
                   <a:srgbClr val="000000"/>
                 </a:solidFill>
@@ -2444,7 +2989,7 @@
               </a:rPr>
               <a:t>Técnico</a:t>
             </a:r>
-            <a:endParaRPr b="0" lang="pt-BR" sz="1000" spc="-1" strike="noStrike">
+            <a:endParaRPr lang="pt-BR" sz="1000" b="0" strike="noStrike" spc="-1">
               <a:latin typeface="Arial"/>
             </a:endParaRPr>
           </a:p>
@@ -2455,7 +3000,7 @@
               </a:lnSpc>
             </a:pPr>
             <a:r>
-              <a:rPr b="1" lang="pt-BR" sz="1000" spc="-1" strike="noStrike">
+              <a:rPr lang="pt-BR" sz="1000" b="1" strike="noStrike" spc="-1">
                 <a:solidFill>
                   <a:srgbClr val="000000"/>
                 </a:solidFill>
@@ -2464,7 +3009,7 @@
               </a:rPr>
               <a:t>(Nó Operacional)</a:t>
             </a:r>
-            <a:endParaRPr b="0" lang="pt-BR" sz="1000" spc="-1" strike="noStrike">
+            <a:endParaRPr lang="pt-BR" sz="1000" b="0" strike="noStrike" spc="-1">
               <a:latin typeface="Arial"/>
             </a:endParaRPr>
           </a:p>
@@ -2474,22 +3019,22 @@
                 <a:spcPct val="100000"/>
               </a:lnSpc>
             </a:pPr>
-            <a:endParaRPr b="0" lang="pt-BR" sz="1000" spc="-1" strike="noStrike">
-              <a:latin typeface="Arial"/>
-            </a:endParaRPr>
-          </a:p>
-        </p:txBody>
-      </p:sp>
-      <p:sp>
-        <p:nvSpPr>
-          <p:cNvPr id="52" name="CustomShape 3"/>
+            <a:endParaRPr lang="pt-BR" sz="1000" b="0" strike="noStrike" spc="-1">
+              <a:latin typeface="Arial"/>
+            </a:endParaRPr>
+          </a:p>
+        </p:txBody>
+      </p:sp>
+      <p:sp>
+        <p:nvSpPr>
+          <p:cNvPr id="45" name="CustomShape 3"/>
           <p:cNvSpPr/>
           <p:nvPr/>
         </p:nvSpPr>
         <p:spPr>
           <a:xfrm>
-            <a:off x="6318000" y="3551760"/>
-            <a:ext cx="1097640" cy="911880"/>
+            <a:off x="6171120" y="3543828"/>
+            <a:ext cx="1344960" cy="709200"/>
           </a:xfrm>
           <a:prstGeom prst="roundRect">
             <a:avLst>
@@ -2497,22 +3042,29 @@
             </a:avLst>
           </a:prstGeom>
           <a:solidFill>
-            <a:srgbClr val="70ad47"/>
+            <a:srgbClr val="70AD47"/>
           </a:solidFill>
           <a:ln>
             <a:noFill/>
           </a:ln>
         </p:spPr>
         <p:style>
-          <a:lnRef idx="0"/>
-          <a:fillRef idx="0"/>
-          <a:effectRef idx="0"/>
+          <a:lnRef idx="0">
+            <a:scrgbClr r="0" g="0" b="0"/>
+          </a:lnRef>
+          <a:fillRef idx="0">
+            <a:scrgbClr r="0" g="0" b="0"/>
+          </a:fillRef>
+          <a:effectRef idx="0">
+            <a:scrgbClr r="0" g="0" b="0"/>
+          </a:effectRef>
           <a:fontRef idx="minor"/>
         </p:style>
         <p:txBody>
-          <a:bodyPr lIns="90000" rIns="90000" tIns="45000" bIns="45000" anchor="ctr">
+          <a:bodyPr lIns="90000" tIns="45000" rIns="90000" bIns="45000" anchor="ctr">
             <a:noAutofit/>
           </a:bodyPr>
+          <a:lstStyle/>
           <a:p>
             <a:pPr algn="ctr">
               <a:lnSpc>
@@ -2520,24 +3072,24 @@
               </a:lnSpc>
             </a:pPr>
             <a:r>
-              <a:rPr b="1" lang="pt-BR" sz="1200" spc="-1" strike="noStrike">
+              <a:rPr lang="pt-BR" sz="1200" b="1" strike="noStrike" spc="-1" dirty="0">
                 <a:solidFill>
-                  <a:srgbClr val="ffffff"/>
+                  <a:srgbClr val="FFFFFF"/>
                 </a:solidFill>
                 <a:latin typeface="Calibri"/>
                 <a:ea typeface="DejaVu Sans"/>
               </a:rPr>
-              <a:t>Elaborar orçamento</a:t>
+              <a:t>Fornecer peças especificadas pelo cliente</a:t>
             </a:r>
-            <a:endParaRPr b="0" lang="pt-BR" sz="1200" spc="-1" strike="noStrike">
-              <a:latin typeface="Arial"/>
-            </a:endParaRPr>
-          </a:p>
-        </p:txBody>
-      </p:sp>
-      <p:sp>
-        <p:nvSpPr>
-          <p:cNvPr id="53" name="CustomShape 4"/>
+            <a:endParaRPr lang="pt-BR" sz="1200" b="0" strike="noStrike" spc="-1" dirty="0">
+              <a:latin typeface="Arial"/>
+            </a:endParaRPr>
+          </a:p>
+        </p:txBody>
+      </p:sp>
+      <p:sp>
+        <p:nvSpPr>
+          <p:cNvPr id="46" name="CustomShape 4"/>
           <p:cNvSpPr/>
           <p:nvPr/>
         </p:nvSpPr>
@@ -2550,7 +3102,7 @@
             <a:avLst/>
           </a:prstGeom>
           <a:solidFill>
-            <a:srgbClr val="4472c4"/>
+            <a:srgbClr val="4472C4"/>
           </a:solidFill>
           <a:ln w="12600">
             <a:solidFill>
@@ -2560,15 +3112,22 @@
           </a:ln>
         </p:spPr>
         <p:style>
-          <a:lnRef idx="0"/>
-          <a:fillRef idx="0"/>
-          <a:effectRef idx="0"/>
+          <a:lnRef idx="0">
+            <a:scrgbClr r="0" g="0" b="0"/>
+          </a:lnRef>
+          <a:fillRef idx="0">
+            <a:scrgbClr r="0" g="0" b="0"/>
+          </a:fillRef>
+          <a:effectRef idx="0">
+            <a:scrgbClr r="0" g="0" b="0"/>
+          </a:effectRef>
           <a:fontRef idx="minor"/>
         </p:style>
         <p:txBody>
-          <a:bodyPr lIns="90000" rIns="90000" tIns="45000" bIns="45000" anchor="ctr">
+          <a:bodyPr lIns="90000" tIns="45000" rIns="90000" bIns="45000" anchor="ctr">
             <a:noAutofit/>
           </a:bodyPr>
+          <a:lstStyle/>
           <a:p>
             <a:pPr algn="ctr">
               <a:lnSpc>
@@ -2576,24 +3135,24 @@
               </a:lnSpc>
             </a:pPr>
             <a:r>
-              <a:rPr b="0" lang="pt-BR" sz="1800" spc="-1" strike="noStrike">
+              <a:rPr lang="pt-BR" sz="1800" b="0" strike="noStrike" spc="-1">
                 <a:solidFill>
-                  <a:srgbClr val="ffffff"/>
+                  <a:srgbClr val="FFFFFF"/>
                 </a:solidFill>
                 <a:latin typeface="Calibri"/>
                 <a:ea typeface="DejaVu Sans"/>
               </a:rPr>
               <a:t>Cliente</a:t>
             </a:r>
-            <a:endParaRPr b="0" lang="pt-BR" sz="1800" spc="-1" strike="noStrike">
-              <a:latin typeface="Arial"/>
-            </a:endParaRPr>
-          </a:p>
-        </p:txBody>
-      </p:sp>
-      <p:sp>
-        <p:nvSpPr>
-          <p:cNvPr id="54" name="CustomShape 5"/>
+            <a:endParaRPr lang="pt-BR" sz="1800" b="0" strike="noStrike" spc="-1">
+              <a:latin typeface="Arial"/>
+            </a:endParaRPr>
+          </a:p>
+        </p:txBody>
+      </p:sp>
+      <p:sp>
+        <p:nvSpPr>
+          <p:cNvPr id="47" name="CustomShape 5"/>
           <p:cNvSpPr/>
           <p:nvPr/>
         </p:nvSpPr>
@@ -2610,28 +3169,34 @@
           <a:noFill/>
           <a:ln w="6480">
             <a:solidFill>
-              <a:srgbClr val="4472c4"/>
+              <a:srgbClr val="4472C4"/>
             </a:solidFill>
             <a:miter/>
           </a:ln>
         </p:spPr>
         <p:style>
-          <a:lnRef idx="0"/>
-          <a:fillRef idx="0"/>
-          <a:effectRef idx="0"/>
+          <a:lnRef idx="0">
+            <a:scrgbClr r="0" g="0" b="0"/>
+          </a:lnRef>
+          <a:fillRef idx="0">
+            <a:scrgbClr r="0" g="0" b="0"/>
+          </a:fillRef>
+          <a:effectRef idx="0">
+            <a:scrgbClr r="0" g="0" b="0"/>
+          </a:effectRef>
           <a:fontRef idx="minor"/>
         </p:style>
       </p:sp>
       <p:sp>
         <p:nvSpPr>
-          <p:cNvPr id="55" name="CustomShape 6"/>
+          <p:cNvPr id="48" name="CustomShape 6"/>
           <p:cNvSpPr/>
           <p:nvPr/>
         </p:nvSpPr>
         <p:spPr>
           <a:xfrm>
-            <a:off x="5412240" y="1982520"/>
-            <a:ext cx="3011400" cy="2697120"/>
+            <a:off x="5412240" y="1584000"/>
+            <a:ext cx="3011400" cy="3095640"/>
           </a:xfrm>
           <a:prstGeom prst="roundRect">
             <a:avLst>
@@ -2647,15 +3212,22 @@
           </a:ln>
         </p:spPr>
         <p:style>
-          <a:lnRef idx="0"/>
-          <a:fillRef idx="0"/>
-          <a:effectRef idx="0"/>
+          <a:lnRef idx="0">
+            <a:scrgbClr r="0" g="0" b="0"/>
+          </a:lnRef>
+          <a:fillRef idx="0">
+            <a:scrgbClr r="0" g="0" b="0"/>
+          </a:fillRef>
+          <a:effectRef idx="0">
+            <a:scrgbClr r="0" g="0" b="0"/>
+          </a:effectRef>
           <a:fontRef idx="minor"/>
         </p:style>
         <p:txBody>
-          <a:bodyPr lIns="90000" rIns="90000" tIns="45000" bIns="45000">
+          <a:bodyPr lIns="90000" tIns="45000" rIns="90000" bIns="45000">
             <a:noAutofit/>
           </a:bodyPr>
+          <a:lstStyle/>
           <a:p>
             <a:pPr algn="ctr">
               <a:lnSpc>
@@ -2663,7 +3235,7 @@
               </a:lnSpc>
             </a:pPr>
             <a:r>
-              <a:rPr b="0" lang="pt-BR" sz="1800" spc="-1" strike="noStrike">
+              <a:rPr lang="pt-BR" sz="1800" b="0" strike="noStrike" spc="-1">
                 <a:solidFill>
                   <a:srgbClr val="000000"/>
                 </a:solidFill>
@@ -2672,15 +3244,15 @@
               </a:rPr>
               <a:t>Loja de computador</a:t>
             </a:r>
-            <a:endParaRPr b="0" lang="pt-BR" sz="1800" spc="-1" strike="noStrike">
-              <a:latin typeface="Arial"/>
-            </a:endParaRPr>
-          </a:p>
-        </p:txBody>
-      </p:sp>
-      <p:sp>
-        <p:nvSpPr>
-          <p:cNvPr id="56" name="Line 7"/>
+            <a:endParaRPr lang="pt-BR" sz="1800" b="0" strike="noStrike" spc="-1">
+              <a:latin typeface="Arial"/>
+            </a:endParaRPr>
+          </a:p>
+        </p:txBody>
+      </p:sp>
+      <p:sp>
+        <p:nvSpPr>
+          <p:cNvPr id="49" name="Line 7"/>
           <p:cNvSpPr/>
           <p:nvPr/>
         </p:nvSpPr>
@@ -2694,433 +3266,29 @@
           </a:prstGeom>
           <a:ln w="6480">
             <a:solidFill>
-              <a:srgbClr val="4472c4"/>
+              <a:srgbClr val="4472C4"/>
             </a:solidFill>
             <a:miter/>
           </a:ln>
         </p:spPr>
         <p:style>
-          <a:lnRef idx="0"/>
-          <a:fillRef idx="0"/>
-          <a:effectRef idx="0"/>
+          <a:lnRef idx="0">
+            <a:scrgbClr r="0" g="0" b="0"/>
+          </a:lnRef>
+          <a:fillRef idx="0">
+            <a:scrgbClr r="0" g="0" b="0"/>
+          </a:fillRef>
+          <a:effectRef idx="0">
+            <a:scrgbClr r="0" g="0" b="0"/>
+          </a:effectRef>
           <a:fontRef idx="minor"/>
         </p:style>
       </p:sp>
     </p:spTree>
   </p:cSld>
-  <mc:AlternateContent>
-    <mc:Choice Requires="p14">
-      <p:transition spd="slow" p14:dur="2000"/>
-    </mc:Choice>
-    <mc:Fallback>
-      <p:transition spd="slow"/>
-    </mc:Fallback>
-  </mc:AlternateContent>
-</p:sld>
-</file>
-
-<file path=ppt/slides/slide4.xml><?xml version="1.0" encoding="utf-8"?>
-<p:sld xmlns:a="http://schemas.openxmlformats.org/drawingml/2006/main" xmlns:p="http://schemas.openxmlformats.org/presentationml/2006/main" xmlns:r="http://schemas.openxmlformats.org/officeDocument/2006/relationships" xmlns:p14="http://schemas.microsoft.com/office/powerpoint/2010/main" xmlns:p15="http://schemas.microsoft.com/office/powerpoint/2012/main" xmlns:mc="http://schemas.openxmlformats.org/markup-compatibility/2006">
-  <p:cSld>
-    <p:spTree>
-      <p:nvGrpSpPr>
-        <p:cNvPr id="1" name=""/>
-        <p:cNvGrpSpPr/>
-        <p:nvPr/>
-      </p:nvGrpSpPr>
-      <p:grpSpPr>
-        <a:xfrm>
-          <a:off x="0" y="0"/>
-          <a:ext cx="0" cy="0"/>
-          <a:chOff x="0" y="0"/>
-          <a:chExt cx="0" cy="0"/>
-        </a:xfrm>
-      </p:grpSpPr>
-      <p:sp>
-        <p:nvSpPr>
-          <p:cNvPr id="57" name="CustomShape 1"/>
-          <p:cNvSpPr/>
-          <p:nvPr/>
-        </p:nvSpPr>
-        <p:spPr>
-          <a:xfrm>
-            <a:off x="692640" y="301680"/>
-            <a:ext cx="8693280" cy="1095120"/>
-          </a:xfrm>
-          <a:prstGeom prst="rect">
-            <a:avLst/>
-          </a:prstGeom>
-          <a:noFill/>
-          <a:ln>
-            <a:noFill/>
-          </a:ln>
-        </p:spPr>
-        <p:style>
-          <a:lnRef idx="0"/>
-          <a:fillRef idx="0"/>
-          <a:effectRef idx="0"/>
-          <a:fontRef idx="minor"/>
-        </p:style>
-        <p:txBody>
-          <a:bodyPr lIns="90000" rIns="90000" tIns="45000" bIns="45000" anchor="ctr">
-            <a:noAutofit/>
-          </a:bodyPr>
-          <a:p>
-            <a:pPr>
-              <a:lnSpc>
-                <a:spcPct val="90000"/>
-              </a:lnSpc>
-            </a:pPr>
-            <a:r>
-              <a:rPr b="0" lang="pt-BR" sz="4400" spc="-1" strike="noStrike">
-                <a:solidFill>
-                  <a:srgbClr val="000000"/>
-                </a:solidFill>
-                <a:latin typeface="Calibri Light"/>
-                <a:ea typeface="Microsoft YaHei"/>
-              </a:rPr>
-              <a:t>Cenário: </a:t>
-            </a:r>
-            <a:r>
-              <a:rPr b="0" lang="pt-BR" sz="2800" spc="-1" strike="noStrike">
-                <a:solidFill>
-                  <a:srgbClr val="000000"/>
-                </a:solidFill>
-                <a:latin typeface="Calibri"/>
-                <a:ea typeface="Microsoft YaHei"/>
-              </a:rPr>
-              <a:t>Atender Cliente</a:t>
-            </a:r>
-            <a:endParaRPr b="0" lang="pt-BR" sz="2800" spc="-1" strike="noStrike">
-              <a:latin typeface="Arial"/>
-            </a:endParaRPr>
-          </a:p>
-        </p:txBody>
-      </p:sp>
-      <p:sp>
-        <p:nvSpPr>
-          <p:cNvPr id="58" name="CustomShape 2"/>
-          <p:cNvSpPr/>
-          <p:nvPr/>
-        </p:nvSpPr>
-        <p:spPr>
-          <a:xfrm>
-            <a:off x="6231600" y="2637000"/>
-            <a:ext cx="1344960" cy="482400"/>
-          </a:xfrm>
-          <a:prstGeom prst="cube">
-            <a:avLst>
-              <a:gd name="adj" fmla="val 25000"/>
-            </a:avLst>
-          </a:prstGeom>
-          <a:solidFill>
-            <a:srgbClr val="ffc000"/>
-          </a:solidFill>
-          <a:ln w="12600">
-            <a:solidFill>
-              <a:srgbClr val="4472c4"/>
-            </a:solidFill>
-            <a:miter/>
-          </a:ln>
-        </p:spPr>
-        <p:style>
-          <a:lnRef idx="0"/>
-          <a:fillRef idx="0"/>
-          <a:effectRef idx="0"/>
-          <a:fontRef idx="minor"/>
-        </p:style>
-        <p:txBody>
-          <a:bodyPr lIns="90000" rIns="90000" tIns="45000" bIns="45000">
-            <a:noAutofit/>
-          </a:bodyPr>
-          <a:p>
-            <a:pPr algn="ctr">
-              <a:lnSpc>
-                <a:spcPct val="100000"/>
-              </a:lnSpc>
-            </a:pPr>
-            <a:r>
-              <a:rPr b="0" lang="pt-BR" sz="1000" spc="-1" strike="noStrike">
-                <a:solidFill>
-                  <a:srgbClr val="000000"/>
-                </a:solidFill>
-                <a:latin typeface="Calibri"/>
-                <a:ea typeface="DejaVu Sans"/>
-              </a:rPr>
-              <a:t>Técnico</a:t>
-            </a:r>
-            <a:endParaRPr b="0" lang="pt-BR" sz="1000" spc="-1" strike="noStrike">
-              <a:latin typeface="Arial"/>
-            </a:endParaRPr>
-          </a:p>
-          <a:p>
-            <a:pPr algn="ctr">
-              <a:lnSpc>
-                <a:spcPct val="100000"/>
-              </a:lnSpc>
-            </a:pPr>
-            <a:r>
-              <a:rPr b="1" lang="pt-BR" sz="1000" spc="-1" strike="noStrike">
-                <a:solidFill>
-                  <a:srgbClr val="000000"/>
-                </a:solidFill>
-                <a:latin typeface="Calibri"/>
-                <a:ea typeface="DejaVu Sans"/>
-              </a:rPr>
-              <a:t>(Nó Operacional)</a:t>
-            </a:r>
-            <a:endParaRPr b="0" lang="pt-BR" sz="1000" spc="-1" strike="noStrike">
-              <a:latin typeface="Arial"/>
-            </a:endParaRPr>
-          </a:p>
-          <a:p>
-            <a:pPr>
-              <a:lnSpc>
-                <a:spcPct val="100000"/>
-              </a:lnSpc>
-            </a:pPr>
-            <a:endParaRPr b="0" lang="pt-BR" sz="1000" spc="-1" strike="noStrike">
-              <a:latin typeface="Arial"/>
-            </a:endParaRPr>
-          </a:p>
-        </p:txBody>
-      </p:sp>
-      <p:sp>
-        <p:nvSpPr>
-          <p:cNvPr id="59" name="CustomShape 3"/>
-          <p:cNvSpPr/>
-          <p:nvPr/>
-        </p:nvSpPr>
-        <p:spPr>
-          <a:xfrm>
-            <a:off x="6318000" y="3551760"/>
-            <a:ext cx="1098000" cy="984240"/>
-          </a:xfrm>
-          <a:prstGeom prst="roundRect">
-            <a:avLst>
-              <a:gd name="adj" fmla="val 16667"/>
-            </a:avLst>
-          </a:prstGeom>
-          <a:solidFill>
-            <a:srgbClr val="70ad47"/>
-          </a:solidFill>
-          <a:ln>
-            <a:noFill/>
-          </a:ln>
-        </p:spPr>
-        <p:style>
-          <a:lnRef idx="0"/>
-          <a:fillRef idx="0"/>
-          <a:effectRef idx="0"/>
-          <a:fontRef idx="minor"/>
-        </p:style>
-        <p:txBody>
-          <a:bodyPr lIns="90000" rIns="90000" tIns="45000" bIns="45000" anchor="ctr">
-            <a:noAutofit/>
-          </a:bodyPr>
-          <a:p>
-            <a:pPr algn="ctr">
-              <a:lnSpc>
-                <a:spcPct val="100000"/>
-              </a:lnSpc>
-            </a:pPr>
-            <a:r>
-              <a:rPr b="1" lang="pt-BR" sz="1200" spc="-1" strike="noStrike">
-                <a:solidFill>
-                  <a:srgbClr val="ffffff"/>
-                </a:solidFill>
-                <a:latin typeface="Calibri"/>
-                <a:ea typeface="DejaVu Sans"/>
-              </a:rPr>
-              <a:t>Atualizar computador</a:t>
-            </a:r>
-            <a:endParaRPr b="0" lang="pt-BR" sz="1200" spc="-1" strike="noStrike">
-              <a:latin typeface="Arial"/>
-            </a:endParaRPr>
-          </a:p>
-        </p:txBody>
-      </p:sp>
-      <p:sp>
-        <p:nvSpPr>
-          <p:cNvPr id="60" name="CustomShape 4"/>
-          <p:cNvSpPr/>
-          <p:nvPr/>
-        </p:nvSpPr>
-        <p:spPr>
-          <a:xfrm>
-            <a:off x="1682280" y="2561040"/>
-            <a:ext cx="1104120" cy="755280"/>
-          </a:xfrm>
-          <a:prstGeom prst="rect">
-            <a:avLst/>
-          </a:prstGeom>
-          <a:solidFill>
-            <a:srgbClr val="4472c4"/>
-          </a:solidFill>
-          <a:ln w="12600">
-            <a:solidFill>
-              <a:srgbClr val="325490"/>
-            </a:solidFill>
-            <a:miter/>
-          </a:ln>
-        </p:spPr>
-        <p:style>
-          <a:lnRef idx="0"/>
-          <a:fillRef idx="0"/>
-          <a:effectRef idx="0"/>
-          <a:fontRef idx="minor"/>
-        </p:style>
-        <p:txBody>
-          <a:bodyPr lIns="90000" rIns="90000" tIns="45000" bIns="45000" anchor="ctr">
-            <a:noAutofit/>
-          </a:bodyPr>
-          <a:p>
-            <a:pPr algn="ctr">
-              <a:lnSpc>
-                <a:spcPct val="100000"/>
-              </a:lnSpc>
-            </a:pPr>
-            <a:r>
-              <a:rPr b="0" lang="pt-BR" sz="1800" spc="-1" strike="noStrike">
-                <a:solidFill>
-                  <a:srgbClr val="ffffff"/>
-                </a:solidFill>
-                <a:latin typeface="Calibri"/>
-                <a:ea typeface="DejaVu Sans"/>
-              </a:rPr>
-              <a:t>Cliente</a:t>
-            </a:r>
-            <a:endParaRPr b="0" lang="pt-BR" sz="1800" spc="-1" strike="noStrike">
-              <a:latin typeface="Arial"/>
-            </a:endParaRPr>
-          </a:p>
-        </p:txBody>
-      </p:sp>
-      <p:sp>
-        <p:nvSpPr>
-          <p:cNvPr id="61" name="CustomShape 5"/>
-          <p:cNvSpPr/>
-          <p:nvPr/>
-        </p:nvSpPr>
-        <p:spPr>
-          <a:xfrm>
-            <a:off x="2787120" y="2939040"/>
-            <a:ext cx="3443760" cy="9720"/>
-          </a:xfrm>
-          <a:prstGeom prst="curvedConnector3">
-            <a:avLst>
-              <a:gd name="adj1" fmla="val 50000"/>
-            </a:avLst>
-          </a:prstGeom>
-          <a:noFill/>
-          <a:ln w="6480">
-            <a:solidFill>
-              <a:srgbClr val="4472c4"/>
-            </a:solidFill>
-            <a:miter/>
-          </a:ln>
-        </p:spPr>
-        <p:style>
-          <a:lnRef idx="0"/>
-          <a:fillRef idx="0"/>
-          <a:effectRef idx="0"/>
-          <a:fontRef idx="minor"/>
-        </p:style>
-      </p:sp>
-      <p:sp>
-        <p:nvSpPr>
-          <p:cNvPr id="62" name="CustomShape 6"/>
-          <p:cNvSpPr/>
-          <p:nvPr/>
-        </p:nvSpPr>
-        <p:spPr>
-          <a:xfrm>
-            <a:off x="5412240" y="1584000"/>
-            <a:ext cx="3011400" cy="3095640"/>
-          </a:xfrm>
-          <a:prstGeom prst="roundRect">
-            <a:avLst>
-              <a:gd name="adj" fmla="val 16667"/>
-            </a:avLst>
-          </a:prstGeom>
-          <a:noFill/>
-          <a:ln w="12600">
-            <a:solidFill>
-              <a:srgbClr val="325490"/>
-            </a:solidFill>
-            <a:miter/>
-          </a:ln>
-        </p:spPr>
-        <p:style>
-          <a:lnRef idx="0"/>
-          <a:fillRef idx="0"/>
-          <a:effectRef idx="0"/>
-          <a:fontRef idx="minor"/>
-        </p:style>
-        <p:txBody>
-          <a:bodyPr lIns="90000" rIns="90000" tIns="45000" bIns="45000">
-            <a:noAutofit/>
-          </a:bodyPr>
-          <a:p>
-            <a:pPr algn="ctr">
-              <a:lnSpc>
-                <a:spcPct val="100000"/>
-              </a:lnSpc>
-            </a:pPr>
-            <a:r>
-              <a:rPr b="0" lang="pt-BR" sz="1800" spc="-1" strike="noStrike">
-                <a:solidFill>
-                  <a:srgbClr val="000000"/>
-                </a:solidFill>
-                <a:latin typeface="Calibri"/>
-                <a:ea typeface="DejaVu Sans"/>
-              </a:rPr>
-              <a:t>Loja de computador</a:t>
-            </a:r>
-            <a:endParaRPr b="0" lang="pt-BR" sz="1800" spc="-1" strike="noStrike">
-              <a:latin typeface="Arial"/>
-            </a:endParaRPr>
-          </a:p>
-        </p:txBody>
-      </p:sp>
-      <p:sp>
-        <p:nvSpPr>
-          <p:cNvPr id="63" name="Line 7"/>
-          <p:cNvSpPr/>
-          <p:nvPr/>
-        </p:nvSpPr>
-        <p:spPr>
-          <a:xfrm>
-            <a:off x="6843600" y="3120120"/>
-            <a:ext cx="2520" cy="432000"/>
-          </a:xfrm>
-          <a:prstGeom prst="line">
-            <a:avLst/>
-          </a:prstGeom>
-          <a:ln w="6480">
-            <a:solidFill>
-              <a:srgbClr val="4472c4"/>
-            </a:solidFill>
-            <a:miter/>
-          </a:ln>
-        </p:spPr>
-        <p:style>
-          <a:lnRef idx="0"/>
-          <a:fillRef idx="0"/>
-          <a:effectRef idx="0"/>
-          <a:fontRef idx="minor"/>
-        </p:style>
-      </p:sp>
-    </p:spTree>
-  </p:cSld>
-  <mc:AlternateContent>
-    <mc:Choice Requires="p14">
-      <p:transition spd="slow" p14:dur="2000"/>
-    </mc:Choice>
-    <mc:Fallback>
-      <p:transition spd="slow"/>
-    </mc:Fallback>
-  </mc:AlternateContent>
+  <p:clrMapOvr>
+    <a:masterClrMapping/>
+  </p:clrMapOvr>
 </p:sld>
 </file>
 
@@ -3135,31 +3303,31 @@
         <a:sysClr val="window" lastClr="FFFFFF"/>
       </a:lt1>
       <a:dk2>
-        <a:srgbClr val="1f497d"/>
+        <a:srgbClr val="1F497D"/>
       </a:dk2>
       <a:lt2>
-        <a:srgbClr val="eeece1"/>
+        <a:srgbClr val="EEECE1"/>
       </a:lt2>
       <a:accent1>
-        <a:srgbClr val="4f81bd"/>
+        <a:srgbClr val="4F81BD"/>
       </a:accent1>
       <a:accent2>
-        <a:srgbClr val="c0504d"/>
+        <a:srgbClr val="C0504D"/>
       </a:accent2>
       <a:accent3>
-        <a:srgbClr val="9bbb59"/>
+        <a:srgbClr val="9BBB59"/>
       </a:accent3>
       <a:accent4>
-        <a:srgbClr val="8064a2"/>
+        <a:srgbClr val="8064A2"/>
       </a:accent4>
       <a:accent5>
-        <a:srgbClr val="4bacc6"/>
+        <a:srgbClr val="4BACC6"/>
       </a:accent5>
       <a:accent6>
-        <a:srgbClr val="f79646"/>
+        <a:srgbClr val="F79646"/>
       </a:accent6>
       <a:hlink>
-        <a:srgbClr val="0000ff"/>
+        <a:srgbClr val="0000FF"/>
       </a:hlink>
       <a:folHlink>
         <a:srgbClr val="800080"/>
@@ -3347,5 +3515,7 @@
       </a:bgFillStyleLst>
     </a:fmtScheme>
   </a:themeElements>
+  <a:objectDefaults/>
+  <a:extraClrSchemeLst/>
 </a:theme>
 </file>
</xml_diff>

<commit_message>
update artefato 15 11 03 2021
</commit_message>
<xml_diff>
--- a/Artefatos/15-ArquiteturaDeNegocioParaCadaCenario.pptx
+++ b/Artefatos/15-ArquiteturaDeNegocioParaCadaCenario.pptx
@@ -7,7 +7,6 @@
   <p:sldIdLst>
     <p:sldId id="256" r:id="rId2"/>
     <p:sldId id="258" r:id="rId3"/>
-    <p:sldId id="257" r:id="rId4"/>
   </p:sldIdLst>
   <p:sldSz cx="10080625" cy="5670550"/>
   <p:notesSz cx="7559675" cy="10691813"/>
@@ -106,6 +105,11 @@
       </a:defRPr>
     </a:lvl9pPr>
   </p:defaultTextStyle>
+  <p:extLst>
+    <p:ext uri="{EFAFB233-063F-42B5-8137-9DF3F51BA10A}">
+      <p15:sldGuideLst xmlns:p15="http://schemas.microsoft.com/office/powerpoint/2012/main"/>
+    </p:ext>
+  </p:extLst>
 </p:presentation>
 </file>
 
@@ -2238,7 +2242,7 @@
         <p:spPr>
           <a:xfrm>
             <a:off x="2741040" y="1935000"/>
-            <a:ext cx="2137230" cy="521766"/>
+            <a:ext cx="1944163" cy="306323"/>
           </a:xfrm>
           <a:prstGeom prst="rect">
             <a:avLst/>
@@ -2290,33 +2294,6 @@
                 <a:srgbClr val="000000"/>
               </a:solidFill>
               <a:latin typeface="Calibri"/>
-            </a:endParaRPr>
-          </a:p>
-          <a:p>
-            <a:pPr marL="343080" indent="-342360">
-              <a:lnSpc>
-                <a:spcPct val="100000"/>
-              </a:lnSpc>
-              <a:buClr>
-                <a:srgbClr val="000000"/>
-              </a:buClr>
-              <a:buFont typeface="StarSymbol"/>
-              <a:buAutoNum type="arabicPeriod"/>
-            </a:pPr>
-            <a:r>
-              <a:rPr lang="pt-BR" sz="1400" spc="-1" dirty="0">
-                <a:solidFill>
-                  <a:srgbClr val="000000"/>
-                </a:solidFill>
-                <a:latin typeface="Calibri"/>
-              </a:rPr>
-              <a:t>Fazer pedido de peças</a:t>
-            </a:r>
-            <a:endParaRPr lang="pt-BR" sz="1400" spc="-1" dirty="0">
-              <a:solidFill>
-                <a:srgbClr val="000000"/>
-              </a:solidFill>
-              <a:latin typeface="Arial"/>
             </a:endParaRPr>
           </a:p>
         </p:txBody>
@@ -2619,16 +2596,16 @@
               </a:lnSpc>
             </a:pPr>
             <a:r>
-              <a:rPr lang="pt-BR" sz="1200" b="1" strike="noStrike" spc="-1">
+              <a:rPr lang="pt-BR" sz="1200" b="1" strike="noStrike" spc="-1" dirty="0">
                 <a:solidFill>
                   <a:srgbClr val="FFFFFF"/>
                 </a:solidFill>
                 <a:latin typeface="Calibri"/>
                 <a:ea typeface="DejaVu Sans"/>
               </a:rPr>
-              <a:t>Elaborar orçamento</a:t>
+              <a:t>Elaborar orçamento dadas as </a:t>
             </a:r>
-            <a:endParaRPr lang="pt-BR" sz="1200" b="0" strike="noStrike" spc="-1">
+            <a:endParaRPr lang="pt-BR" sz="1200" b="0" strike="noStrike" spc="-1" dirty="0">
               <a:latin typeface="Arial"/>
             </a:endParaRPr>
           </a:p>
@@ -2836,453 +2813,6 @@
             </a:endParaRPr>
           </a:p>
         </p:txBody>
-      </p:sp>
-    </p:spTree>
-  </p:cSld>
-  <p:clrMapOvr>
-    <a:masterClrMapping/>
-  </p:clrMapOvr>
-</p:sld>
-</file>
-
-<file path=ppt/slides/slide3.xml><?xml version="1.0" encoding="utf-8"?>
-<p:sld xmlns:a="http://schemas.openxmlformats.org/drawingml/2006/main" xmlns:r="http://schemas.openxmlformats.org/officeDocument/2006/relationships" xmlns:p="http://schemas.openxmlformats.org/presentationml/2006/main">
-  <p:cSld>
-    <p:spTree>
-      <p:nvGrpSpPr>
-        <p:cNvPr id="1" name=""/>
-        <p:cNvGrpSpPr/>
-        <p:nvPr/>
-      </p:nvGrpSpPr>
-      <p:grpSpPr>
-        <a:xfrm>
-          <a:off x="0" y="0"/>
-          <a:ext cx="0" cy="0"/>
-          <a:chOff x="0" y="0"/>
-          <a:chExt cx="0" cy="0"/>
-        </a:xfrm>
-      </p:grpSpPr>
-      <p:sp>
-        <p:nvSpPr>
-          <p:cNvPr id="43" name="CustomShape 1"/>
-          <p:cNvSpPr/>
-          <p:nvPr/>
-        </p:nvSpPr>
-        <p:spPr>
-          <a:xfrm>
-            <a:off x="693672" y="301680"/>
-            <a:ext cx="8693280" cy="1095120"/>
-          </a:xfrm>
-          <a:prstGeom prst="rect">
-            <a:avLst/>
-          </a:prstGeom>
-          <a:noFill/>
-          <a:ln>
-            <a:noFill/>
-          </a:ln>
-        </p:spPr>
-        <p:style>
-          <a:lnRef idx="0">
-            <a:scrgbClr r="0" g="0" b="0"/>
-          </a:lnRef>
-          <a:fillRef idx="0">
-            <a:scrgbClr r="0" g="0" b="0"/>
-          </a:fillRef>
-          <a:effectRef idx="0">
-            <a:scrgbClr r="0" g="0" b="0"/>
-          </a:effectRef>
-          <a:fontRef idx="minor"/>
-        </p:style>
-        <p:txBody>
-          <a:bodyPr lIns="90000" tIns="45000" rIns="90000" bIns="45000" anchor="ctr">
-            <a:noAutofit/>
-          </a:bodyPr>
-          <a:lstStyle/>
-          <a:p>
-            <a:pPr>
-              <a:lnSpc>
-                <a:spcPct val="90000"/>
-              </a:lnSpc>
-            </a:pPr>
-            <a:r>
-              <a:rPr lang="pt-BR" sz="4400" b="0" strike="noStrike" spc="-1" dirty="0">
-                <a:solidFill>
-                  <a:srgbClr val="000000"/>
-                </a:solidFill>
-                <a:latin typeface="Calibri Light"/>
-                <a:ea typeface="Microsoft YaHei"/>
-              </a:rPr>
-              <a:t>Cenário: </a:t>
-            </a:r>
-            <a:r>
-              <a:rPr lang="pt-BR" sz="2800" b="0" strike="noStrike" spc="-1" dirty="0">
-                <a:solidFill>
-                  <a:srgbClr val="000000"/>
-                </a:solidFill>
-                <a:latin typeface="Calibri"/>
-                <a:ea typeface="Microsoft YaHei"/>
-              </a:rPr>
-              <a:t>Fazer pedido de peças</a:t>
-            </a:r>
-            <a:endParaRPr lang="pt-BR" sz="2800" b="0" strike="noStrike" spc="-1" dirty="0">
-              <a:latin typeface="Arial"/>
-            </a:endParaRPr>
-          </a:p>
-        </p:txBody>
-      </p:sp>
-      <p:sp>
-        <p:nvSpPr>
-          <p:cNvPr id="44" name="CustomShape 2"/>
-          <p:cNvSpPr/>
-          <p:nvPr/>
-        </p:nvSpPr>
-        <p:spPr>
-          <a:xfrm>
-            <a:off x="6231600" y="2637000"/>
-            <a:ext cx="1344960" cy="482400"/>
-          </a:xfrm>
-          <a:prstGeom prst="cube">
-            <a:avLst>
-              <a:gd name="adj" fmla="val 25000"/>
-            </a:avLst>
-          </a:prstGeom>
-          <a:solidFill>
-            <a:srgbClr val="FFC000"/>
-          </a:solidFill>
-          <a:ln w="12600">
-            <a:solidFill>
-              <a:srgbClr val="4472C4"/>
-            </a:solidFill>
-            <a:miter/>
-          </a:ln>
-        </p:spPr>
-        <p:style>
-          <a:lnRef idx="0">
-            <a:scrgbClr r="0" g="0" b="0"/>
-          </a:lnRef>
-          <a:fillRef idx="0">
-            <a:scrgbClr r="0" g="0" b="0"/>
-          </a:fillRef>
-          <a:effectRef idx="0">
-            <a:scrgbClr r="0" g="0" b="0"/>
-          </a:effectRef>
-          <a:fontRef idx="minor"/>
-        </p:style>
-        <p:txBody>
-          <a:bodyPr lIns="90000" tIns="45000" rIns="90000" bIns="45000">
-            <a:noAutofit/>
-          </a:bodyPr>
-          <a:lstStyle/>
-          <a:p>
-            <a:pPr algn="ctr">
-              <a:lnSpc>
-                <a:spcPct val="100000"/>
-              </a:lnSpc>
-            </a:pPr>
-            <a:r>
-              <a:rPr lang="pt-BR" sz="1000" b="0" strike="noStrike" spc="-1">
-                <a:solidFill>
-                  <a:srgbClr val="000000"/>
-                </a:solidFill>
-                <a:latin typeface="Calibri"/>
-                <a:ea typeface="DejaVu Sans"/>
-              </a:rPr>
-              <a:t>Técnico</a:t>
-            </a:r>
-            <a:endParaRPr lang="pt-BR" sz="1000" b="0" strike="noStrike" spc="-1">
-              <a:latin typeface="Arial"/>
-            </a:endParaRPr>
-          </a:p>
-          <a:p>
-            <a:pPr algn="ctr">
-              <a:lnSpc>
-                <a:spcPct val="100000"/>
-              </a:lnSpc>
-            </a:pPr>
-            <a:r>
-              <a:rPr lang="pt-BR" sz="1000" b="1" strike="noStrike" spc="-1">
-                <a:solidFill>
-                  <a:srgbClr val="000000"/>
-                </a:solidFill>
-                <a:latin typeface="Calibri"/>
-                <a:ea typeface="DejaVu Sans"/>
-              </a:rPr>
-              <a:t>(Nó Operacional)</a:t>
-            </a:r>
-            <a:endParaRPr lang="pt-BR" sz="1000" b="0" strike="noStrike" spc="-1">
-              <a:latin typeface="Arial"/>
-            </a:endParaRPr>
-          </a:p>
-          <a:p>
-            <a:pPr>
-              <a:lnSpc>
-                <a:spcPct val="100000"/>
-              </a:lnSpc>
-            </a:pPr>
-            <a:endParaRPr lang="pt-BR" sz="1000" b="0" strike="noStrike" spc="-1">
-              <a:latin typeface="Arial"/>
-            </a:endParaRPr>
-          </a:p>
-        </p:txBody>
-      </p:sp>
-      <p:sp>
-        <p:nvSpPr>
-          <p:cNvPr id="45" name="CustomShape 3"/>
-          <p:cNvSpPr/>
-          <p:nvPr/>
-        </p:nvSpPr>
-        <p:spPr>
-          <a:xfrm>
-            <a:off x="6171120" y="3543828"/>
-            <a:ext cx="1344960" cy="709200"/>
-          </a:xfrm>
-          <a:prstGeom prst="roundRect">
-            <a:avLst>
-              <a:gd name="adj" fmla="val 16667"/>
-            </a:avLst>
-          </a:prstGeom>
-          <a:solidFill>
-            <a:srgbClr val="70AD47"/>
-          </a:solidFill>
-          <a:ln>
-            <a:noFill/>
-          </a:ln>
-        </p:spPr>
-        <p:style>
-          <a:lnRef idx="0">
-            <a:scrgbClr r="0" g="0" b="0"/>
-          </a:lnRef>
-          <a:fillRef idx="0">
-            <a:scrgbClr r="0" g="0" b="0"/>
-          </a:fillRef>
-          <a:effectRef idx="0">
-            <a:scrgbClr r="0" g="0" b="0"/>
-          </a:effectRef>
-          <a:fontRef idx="minor"/>
-        </p:style>
-        <p:txBody>
-          <a:bodyPr lIns="90000" tIns="45000" rIns="90000" bIns="45000" anchor="ctr">
-            <a:noAutofit/>
-          </a:bodyPr>
-          <a:lstStyle/>
-          <a:p>
-            <a:pPr algn="ctr">
-              <a:lnSpc>
-                <a:spcPct val="100000"/>
-              </a:lnSpc>
-            </a:pPr>
-            <a:r>
-              <a:rPr lang="pt-BR" sz="1200" b="1" strike="noStrike" spc="-1" dirty="0">
-                <a:solidFill>
-                  <a:srgbClr val="FFFFFF"/>
-                </a:solidFill>
-                <a:latin typeface="Calibri"/>
-                <a:ea typeface="DejaVu Sans"/>
-              </a:rPr>
-              <a:t>Fornecer peças especificadas pelo cliente</a:t>
-            </a:r>
-            <a:endParaRPr lang="pt-BR" sz="1200" b="0" strike="noStrike" spc="-1" dirty="0">
-              <a:latin typeface="Arial"/>
-            </a:endParaRPr>
-          </a:p>
-        </p:txBody>
-      </p:sp>
-      <p:sp>
-        <p:nvSpPr>
-          <p:cNvPr id="46" name="CustomShape 4"/>
-          <p:cNvSpPr/>
-          <p:nvPr/>
-        </p:nvSpPr>
-        <p:spPr>
-          <a:xfrm>
-            <a:off x="1682280" y="2561040"/>
-            <a:ext cx="1104120" cy="755280"/>
-          </a:xfrm>
-          <a:prstGeom prst="rect">
-            <a:avLst/>
-          </a:prstGeom>
-          <a:solidFill>
-            <a:srgbClr val="4472C4"/>
-          </a:solidFill>
-          <a:ln w="12600">
-            <a:solidFill>
-              <a:srgbClr val="325490"/>
-            </a:solidFill>
-            <a:miter/>
-          </a:ln>
-        </p:spPr>
-        <p:style>
-          <a:lnRef idx="0">
-            <a:scrgbClr r="0" g="0" b="0"/>
-          </a:lnRef>
-          <a:fillRef idx="0">
-            <a:scrgbClr r="0" g="0" b="0"/>
-          </a:fillRef>
-          <a:effectRef idx="0">
-            <a:scrgbClr r="0" g="0" b="0"/>
-          </a:effectRef>
-          <a:fontRef idx="minor"/>
-        </p:style>
-        <p:txBody>
-          <a:bodyPr lIns="90000" tIns="45000" rIns="90000" bIns="45000" anchor="ctr">
-            <a:noAutofit/>
-          </a:bodyPr>
-          <a:lstStyle/>
-          <a:p>
-            <a:pPr algn="ctr">
-              <a:lnSpc>
-                <a:spcPct val="100000"/>
-              </a:lnSpc>
-            </a:pPr>
-            <a:r>
-              <a:rPr lang="pt-BR" sz="1800" b="0" strike="noStrike" spc="-1">
-                <a:solidFill>
-                  <a:srgbClr val="FFFFFF"/>
-                </a:solidFill>
-                <a:latin typeface="Calibri"/>
-                <a:ea typeface="DejaVu Sans"/>
-              </a:rPr>
-              <a:t>Cliente</a:t>
-            </a:r>
-            <a:endParaRPr lang="pt-BR" sz="1800" b="0" strike="noStrike" spc="-1">
-              <a:latin typeface="Arial"/>
-            </a:endParaRPr>
-          </a:p>
-        </p:txBody>
-      </p:sp>
-      <p:sp>
-        <p:nvSpPr>
-          <p:cNvPr id="47" name="CustomShape 5"/>
-          <p:cNvSpPr/>
-          <p:nvPr/>
-        </p:nvSpPr>
-        <p:spPr>
-          <a:xfrm>
-            <a:off x="2787120" y="2939040"/>
-            <a:ext cx="3443760" cy="9720"/>
-          </a:xfrm>
-          <a:prstGeom prst="curvedConnector3">
-            <a:avLst>
-              <a:gd name="adj1" fmla="val 50000"/>
-            </a:avLst>
-          </a:prstGeom>
-          <a:noFill/>
-          <a:ln w="6480">
-            <a:solidFill>
-              <a:srgbClr val="4472C4"/>
-            </a:solidFill>
-            <a:miter/>
-          </a:ln>
-        </p:spPr>
-        <p:style>
-          <a:lnRef idx="0">
-            <a:scrgbClr r="0" g="0" b="0"/>
-          </a:lnRef>
-          <a:fillRef idx="0">
-            <a:scrgbClr r="0" g="0" b="0"/>
-          </a:fillRef>
-          <a:effectRef idx="0">
-            <a:scrgbClr r="0" g="0" b="0"/>
-          </a:effectRef>
-          <a:fontRef idx="minor"/>
-        </p:style>
-      </p:sp>
-      <p:sp>
-        <p:nvSpPr>
-          <p:cNvPr id="48" name="CustomShape 6"/>
-          <p:cNvSpPr/>
-          <p:nvPr/>
-        </p:nvSpPr>
-        <p:spPr>
-          <a:xfrm>
-            <a:off x="5412240" y="1584000"/>
-            <a:ext cx="3011400" cy="3095640"/>
-          </a:xfrm>
-          <a:prstGeom prst="roundRect">
-            <a:avLst>
-              <a:gd name="adj" fmla="val 16667"/>
-            </a:avLst>
-          </a:prstGeom>
-          <a:noFill/>
-          <a:ln w="12600">
-            <a:solidFill>
-              <a:srgbClr val="325490"/>
-            </a:solidFill>
-            <a:miter/>
-          </a:ln>
-        </p:spPr>
-        <p:style>
-          <a:lnRef idx="0">
-            <a:scrgbClr r="0" g="0" b="0"/>
-          </a:lnRef>
-          <a:fillRef idx="0">
-            <a:scrgbClr r="0" g="0" b="0"/>
-          </a:fillRef>
-          <a:effectRef idx="0">
-            <a:scrgbClr r="0" g="0" b="0"/>
-          </a:effectRef>
-          <a:fontRef idx="minor"/>
-        </p:style>
-        <p:txBody>
-          <a:bodyPr lIns="90000" tIns="45000" rIns="90000" bIns="45000">
-            <a:noAutofit/>
-          </a:bodyPr>
-          <a:lstStyle/>
-          <a:p>
-            <a:pPr algn="ctr">
-              <a:lnSpc>
-                <a:spcPct val="100000"/>
-              </a:lnSpc>
-            </a:pPr>
-            <a:r>
-              <a:rPr lang="pt-BR" sz="1800" b="0" strike="noStrike" spc="-1">
-                <a:solidFill>
-                  <a:srgbClr val="000000"/>
-                </a:solidFill>
-                <a:latin typeface="Calibri"/>
-                <a:ea typeface="DejaVu Sans"/>
-              </a:rPr>
-              <a:t>Loja de computador</a:t>
-            </a:r>
-            <a:endParaRPr lang="pt-BR" sz="1800" b="0" strike="noStrike" spc="-1">
-              <a:latin typeface="Arial"/>
-            </a:endParaRPr>
-          </a:p>
-        </p:txBody>
-      </p:sp>
-      <p:sp>
-        <p:nvSpPr>
-          <p:cNvPr id="49" name="Line 7"/>
-          <p:cNvSpPr/>
-          <p:nvPr/>
-        </p:nvSpPr>
-        <p:spPr>
-          <a:xfrm>
-            <a:off x="6843600" y="3120120"/>
-            <a:ext cx="2520" cy="432000"/>
-          </a:xfrm>
-          <a:prstGeom prst="line">
-            <a:avLst/>
-          </a:prstGeom>
-          <a:ln w="6480">
-            <a:solidFill>
-              <a:srgbClr val="4472C4"/>
-            </a:solidFill>
-            <a:miter/>
-          </a:ln>
-        </p:spPr>
-        <p:style>
-          <a:lnRef idx="0">
-            <a:scrgbClr r="0" g="0" b="0"/>
-          </a:lnRef>
-          <a:fillRef idx="0">
-            <a:scrgbClr r="0" g="0" b="0"/>
-          </a:fillRef>
-          <a:effectRef idx="0">
-            <a:scrgbClr r="0" g="0" b="0"/>
-          </a:effectRef>
-          <a:fontRef idx="minor"/>
-        </p:style>
       </p:sp>
     </p:spTree>
   </p:cSld>

</xml_diff>

<commit_message>
artefato 15 com novo cliente GA Tecnologia
</commit_message>
<xml_diff>
--- a/Artefatos/15-ArquiteturaDeNegocioParaCadaCenario.pptx
+++ b/Artefatos/15-ArquiteturaDeNegocioParaCadaCenario.pptx
@@ -6,7 +6,9 @@
   </p:sldMasterIdLst>
   <p:sldIdLst>
     <p:sldId id="256" r:id="rId2"/>
-    <p:sldId id="258" r:id="rId3"/>
+    <p:sldId id="257" r:id="rId3"/>
+    <p:sldId id="258" r:id="rId4"/>
+    <p:sldId id="259" r:id="rId5"/>
   </p:sldIdLst>
   <p:sldSz cx="10080625" cy="5670550"/>
   <p:notesSz cx="7559675" cy="10691813"/>
@@ -105,11 +107,6 @@
       </a:defRPr>
     </a:lvl9pPr>
   </p:defaultTextStyle>
-  <p:extLst>
-    <p:ext uri="{EFAFB233-063F-42B5-8137-9DF3F51BA10A}">
-      <p15:sldGuideLst xmlns:p15="http://schemas.microsoft.com/office/powerpoint/2012/main"/>
-    </p:ext>
-  </p:extLst>
 </p:presentation>
 </file>
 
@@ -168,7 +165,7 @@
         <p:spPr>
           <a:xfrm>
             <a:off x="692640" y="375840"/>
-            <a:ext cx="8693280" cy="946800"/>
+            <a:ext cx="8692920" cy="946800"/>
           </a:xfrm>
           <a:prstGeom prst="rect">
             <a:avLst/>
@@ -287,7 +284,7 @@
         <p:spPr>
           <a:xfrm>
             <a:off x="692640" y="375840"/>
-            <a:ext cx="8693280" cy="946800"/>
+            <a:ext cx="8692920" cy="946800"/>
           </a:xfrm>
           <a:prstGeom prst="rect">
             <a:avLst/>
@@ -468,7 +465,7 @@
         <p:spPr>
           <a:xfrm>
             <a:off x="692640" y="375840"/>
-            <a:ext cx="8693280" cy="946800"/>
+            <a:ext cx="8692920" cy="946800"/>
           </a:xfrm>
           <a:prstGeom prst="rect">
             <a:avLst/>
@@ -711,7 +708,7 @@
         <p:spPr>
           <a:xfrm>
             <a:off x="692640" y="375840"/>
-            <a:ext cx="8693280" cy="946800"/>
+            <a:ext cx="8692920" cy="946800"/>
           </a:xfrm>
           <a:prstGeom prst="rect">
             <a:avLst/>
@@ -800,7 +797,7 @@
         <p:spPr>
           <a:xfrm>
             <a:off x="692640" y="375840"/>
-            <a:ext cx="8693280" cy="946800"/>
+            <a:ext cx="8692920" cy="946800"/>
           </a:xfrm>
           <a:prstGeom prst="rect">
             <a:avLst/>
@@ -888,7 +885,7 @@
         <p:spPr>
           <a:xfrm>
             <a:off x="692640" y="375840"/>
-            <a:ext cx="8693280" cy="946800"/>
+            <a:ext cx="8692920" cy="946800"/>
           </a:xfrm>
           <a:prstGeom prst="rect">
             <a:avLst/>
@@ -1007,7 +1004,7 @@
         <p:spPr>
           <a:xfrm>
             <a:off x="692640" y="375840"/>
-            <a:ext cx="8693280" cy="946800"/>
+            <a:ext cx="8692920" cy="946800"/>
           </a:xfrm>
           <a:prstGeom prst="rect">
             <a:avLst/>
@@ -1064,7 +1061,7 @@
         <p:spPr>
           <a:xfrm>
             <a:off x="692640" y="375840"/>
-            <a:ext cx="8693280" cy="4390200"/>
+            <a:ext cx="8692920" cy="4390200"/>
           </a:xfrm>
           <a:prstGeom prst="rect">
             <a:avLst/>
@@ -1121,7 +1118,7 @@
         <p:spPr>
           <a:xfrm>
             <a:off x="692640" y="375840"/>
-            <a:ext cx="8693280" cy="946800"/>
+            <a:ext cx="8692920" cy="946800"/>
           </a:xfrm>
           <a:prstGeom prst="rect">
             <a:avLst/>
@@ -1271,7 +1268,7 @@
         <p:spPr>
           <a:xfrm>
             <a:off x="692640" y="375840"/>
-            <a:ext cx="8693280" cy="946800"/>
+            <a:ext cx="8692920" cy="946800"/>
           </a:xfrm>
           <a:prstGeom prst="rect">
             <a:avLst/>
@@ -1421,7 +1418,7 @@
         <p:spPr>
           <a:xfrm>
             <a:off x="692640" y="375840"/>
-            <a:ext cx="8693280" cy="946800"/>
+            <a:ext cx="8692920" cy="946800"/>
           </a:xfrm>
           <a:prstGeom prst="rect">
             <a:avLst/>
@@ -1579,7 +1576,7 @@
         <p:spPr>
           <a:xfrm>
             <a:off x="692640" y="375840"/>
-            <a:ext cx="8693280" cy="946800"/>
+            <a:ext cx="8692920" cy="946800"/>
           </a:xfrm>
           <a:prstGeom prst="rect">
             <a:avLst/>
@@ -2085,7 +2082,7 @@
         <p:spPr>
           <a:xfrm>
             <a:off x="692640" y="367560"/>
-            <a:ext cx="8693280" cy="1095120"/>
+            <a:ext cx="8692920" cy="1094760"/>
           </a:xfrm>
           <a:prstGeom prst="rect">
             <a:avLst/>
@@ -2124,6 +2121,7 @@
                   <a:srgbClr val="000000"/>
                 </a:solidFill>
                 <a:latin typeface="Calibri Light"/>
+                <a:ea typeface="DejaVu Sans"/>
               </a:rPr>
               <a:t>Contexto de Negócio</a:t>
             </a:r>
@@ -2141,8 +2139,8 @@
         </p:nvSpPr>
         <p:spPr>
           <a:xfrm>
-            <a:off x="288000" y="2700360"/>
-            <a:ext cx="1104120" cy="755280"/>
+            <a:off x="192240" y="2736000"/>
+            <a:ext cx="1103760" cy="754920"/>
           </a:xfrm>
           <a:prstGeom prst="rect">
             <a:avLst/>
@@ -2204,8 +2202,8 @@
         </p:nvSpPr>
         <p:spPr>
           <a:xfrm flipV="1">
-            <a:off x="1392480" y="3165840"/>
-            <a:ext cx="4727160" cy="12960"/>
+            <a:off x="1392480" y="3164760"/>
+            <a:ext cx="4726800" cy="12600"/>
           </a:xfrm>
           <a:prstGeom prst="curvedConnector3">
             <a:avLst>
@@ -2241,8 +2239,8 @@
         </p:nvSpPr>
         <p:spPr>
           <a:xfrm>
-            <a:off x="2741040" y="1935000"/>
-            <a:ext cx="1944163" cy="306323"/>
+            <a:off x="2646360" y="1584000"/>
+            <a:ext cx="1843944" cy="737210"/>
           </a:xfrm>
           <a:prstGeom prst="rect">
             <a:avLst/>
@@ -2270,7 +2268,7 @@
           </a:bodyPr>
           <a:lstStyle/>
           <a:p>
-            <a:pPr marL="343080" indent="-342360">
+            <a:pPr marL="343080" indent="-342000">
               <a:lnSpc>
                 <a:spcPct val="100000"/>
               </a:lnSpc>
@@ -2286,14 +2284,62 @@
                   <a:srgbClr val="000000"/>
                 </a:solidFill>
                 <a:latin typeface="Calibri"/>
+                <a:ea typeface="DejaVu Sans"/>
               </a:rPr>
-              <a:t>Solicitar orçamento</a:t>
+              <a:t>Comprar máquina</a:t>
             </a:r>
-            <a:endParaRPr lang="pt-BR" sz="1400" spc="-1" dirty="0">
-              <a:solidFill>
+            <a:endParaRPr lang="pt-BR" sz="1400" b="0" strike="noStrike" spc="-1" dirty="0">
+              <a:latin typeface="Arial"/>
+            </a:endParaRPr>
+          </a:p>
+          <a:p>
+            <a:pPr marL="343080" indent="-342000">
+              <a:lnSpc>
+                <a:spcPct val="100000"/>
+              </a:lnSpc>
+              <a:buClr>
                 <a:srgbClr val="000000"/>
-              </a:solidFill>
-              <a:latin typeface="Calibri"/>
+              </a:buClr>
+              <a:buFont typeface="StarSymbol"/>
+              <a:buAutoNum type="arabicPeriod"/>
+            </a:pPr>
+            <a:r>
+              <a:rPr lang="pt-BR" sz="1400" b="0" strike="noStrike" spc="-1" dirty="0">
+                <a:solidFill>
+                  <a:srgbClr val="000000"/>
+                </a:solidFill>
+                <a:latin typeface="Calibri"/>
+                <a:ea typeface="DejaVu Sans"/>
+              </a:rPr>
+              <a:t>Solicitar projeto</a:t>
+            </a:r>
+            <a:endParaRPr lang="pt-BR" sz="1400" b="0" strike="noStrike" spc="-1" dirty="0">
+              <a:latin typeface="Arial"/>
+            </a:endParaRPr>
+          </a:p>
+          <a:p>
+            <a:pPr marL="343080" indent="-342000">
+              <a:lnSpc>
+                <a:spcPct val="100000"/>
+              </a:lnSpc>
+              <a:buClr>
+                <a:srgbClr val="000000"/>
+              </a:buClr>
+              <a:buFont typeface="StarSymbol"/>
+              <a:buAutoNum type="arabicPeriod"/>
+            </a:pPr>
+            <a:r>
+              <a:rPr lang="pt-BR" sz="1400" b="0" strike="noStrike" spc="-1" dirty="0">
+                <a:solidFill>
+                  <a:srgbClr val="000000"/>
+                </a:solidFill>
+                <a:latin typeface="Calibri"/>
+                <a:ea typeface="DejaVu Sans"/>
+              </a:rPr>
+              <a:t>Solicitar reparo</a:t>
+            </a:r>
+            <a:endParaRPr lang="pt-BR" sz="1400" b="0" strike="noStrike" spc="-1" dirty="0">
+              <a:latin typeface="Arial"/>
             </a:endParaRPr>
           </a:p>
         </p:txBody>
@@ -2307,7 +2353,7 @@
         <p:spPr>
           <a:xfrm>
             <a:off x="6048000" y="2016000"/>
-            <a:ext cx="2984400" cy="2376720"/>
+            <a:ext cx="2984040" cy="2376360"/>
           </a:xfrm>
           <a:prstGeom prst="roundRect">
             <a:avLst>
@@ -2353,7 +2399,7 @@
                 <a:latin typeface="Calibri"/>
                 <a:ea typeface="DejaVu Sans"/>
               </a:rPr>
-              <a:t>Loja De Computador</a:t>
+              <a:t>G.A Tecnologia</a:t>
             </a:r>
             <a:endParaRPr lang="pt-BR" sz="1800" b="0" strike="noStrike" spc="-1">
               <a:latin typeface="Arial"/>
@@ -2388,14 +2434,14 @@
       </p:grpSpPr>
       <p:sp>
         <p:nvSpPr>
-          <p:cNvPr id="50" name="CustomShape 1"/>
+          <p:cNvPr id="43" name="CustomShape 1"/>
           <p:cNvSpPr/>
           <p:nvPr/>
         </p:nvSpPr>
         <p:spPr>
           <a:xfrm>
             <a:off x="692640" y="301680"/>
-            <a:ext cx="8693280" cy="1095120"/>
+            <a:ext cx="8692920" cy="1094760"/>
           </a:xfrm>
           <a:prstGeom prst="rect">
             <a:avLst/>
@@ -2446,7 +2492,7 @@
                 <a:latin typeface="Calibri"/>
                 <a:ea typeface="Microsoft YaHei"/>
               </a:rPr>
-              <a:t>Solicitar orçamento</a:t>
+              <a:t>Comprar Máquina</a:t>
             </a:r>
             <a:endParaRPr lang="pt-BR" sz="2800" b="0" strike="noStrike" spc="-1" dirty="0">
               <a:latin typeface="Arial"/>
@@ -2456,14 +2502,14 @@
       </p:sp>
       <p:sp>
         <p:nvSpPr>
-          <p:cNvPr id="51" name="CustomShape 2"/>
+          <p:cNvPr id="44" name="CustomShape 2"/>
           <p:cNvSpPr/>
           <p:nvPr/>
         </p:nvSpPr>
         <p:spPr>
           <a:xfrm>
             <a:off x="6231600" y="2637000"/>
-            <a:ext cx="1344960" cy="482400"/>
+            <a:ext cx="1344600" cy="482040"/>
           </a:xfrm>
           <a:prstGeom prst="cube">
             <a:avLst>
@@ -2511,7 +2557,7 @@
                 <a:latin typeface="Calibri"/>
                 <a:ea typeface="DejaVu Sans"/>
               </a:rPr>
-              <a:t>Técnico</a:t>
+              <a:t>Comercial</a:t>
             </a:r>
             <a:endParaRPr lang="pt-BR" sz="1000" b="0" strike="noStrike" spc="-1">
               <a:latin typeface="Arial"/>
@@ -2551,14 +2597,14 @@
       </p:sp>
       <p:sp>
         <p:nvSpPr>
-          <p:cNvPr id="52" name="CustomShape 3"/>
+          <p:cNvPr id="45" name="CustomShape 3"/>
           <p:cNvSpPr/>
           <p:nvPr/>
         </p:nvSpPr>
         <p:spPr>
           <a:xfrm>
             <a:off x="6318000" y="3551760"/>
-            <a:ext cx="1097640" cy="911880"/>
+            <a:ext cx="1097280" cy="839520"/>
           </a:xfrm>
           <a:prstGeom prst="roundRect">
             <a:avLst>
@@ -2603,7 +2649,7 @@
                 <a:latin typeface="Calibri"/>
                 <a:ea typeface="DejaVu Sans"/>
               </a:rPr>
-              <a:t>Elaborar orçamento </a:t>
+              <a:t>Criar Pedido</a:t>
             </a:r>
             <a:endParaRPr lang="pt-BR" sz="1200" b="0" strike="noStrike" spc="-1" dirty="0">
               <a:latin typeface="Arial"/>
@@ -2613,14 +2659,14 @@
       </p:sp>
       <p:sp>
         <p:nvSpPr>
-          <p:cNvPr id="53" name="CustomShape 4"/>
+          <p:cNvPr id="46" name="CustomShape 4"/>
           <p:cNvSpPr/>
           <p:nvPr/>
         </p:nvSpPr>
         <p:spPr>
           <a:xfrm>
             <a:off x="1682280" y="2561040"/>
-            <a:ext cx="1104120" cy="755280"/>
+            <a:ext cx="1103760" cy="754920"/>
           </a:xfrm>
           <a:prstGeom prst="rect">
             <a:avLst/>
@@ -2676,14 +2722,14 @@
       </p:sp>
       <p:sp>
         <p:nvSpPr>
-          <p:cNvPr id="54" name="CustomShape 5"/>
+          <p:cNvPr id="47" name="CustomShape 5"/>
           <p:cNvSpPr/>
           <p:nvPr/>
         </p:nvSpPr>
         <p:spPr>
           <a:xfrm>
             <a:off x="2787120" y="2939040"/>
-            <a:ext cx="3443760" cy="9720"/>
+            <a:ext cx="3443400" cy="9360"/>
           </a:xfrm>
           <a:prstGeom prst="curvedConnector3">
             <a:avLst>
@@ -2713,54 +2759,14 @@
       </p:sp>
       <p:sp>
         <p:nvSpPr>
-          <p:cNvPr id="56" name="Line 7"/>
+          <p:cNvPr id="48" name="CustomShape 6"/>
           <p:cNvSpPr/>
           <p:nvPr/>
         </p:nvSpPr>
         <p:spPr>
           <a:xfrm>
-            <a:off x="6843600" y="3120120"/>
-            <a:ext cx="2520" cy="432000"/>
-          </a:xfrm>
-          <a:prstGeom prst="line">
-            <a:avLst/>
-          </a:prstGeom>
-          <a:ln w="6480">
-            <a:solidFill>
-              <a:srgbClr val="4472C4"/>
-            </a:solidFill>
-            <a:miter/>
-          </a:ln>
-        </p:spPr>
-        <p:style>
-          <a:lnRef idx="0">
-            <a:scrgbClr r="0" g="0" b="0"/>
-          </a:lnRef>
-          <a:fillRef idx="0">
-            <a:scrgbClr r="0" g="0" b="0"/>
-          </a:fillRef>
-          <a:effectRef idx="0">
-            <a:scrgbClr r="0" g="0" b="0"/>
-          </a:effectRef>
-          <a:fontRef idx="minor"/>
-        </p:style>
-      </p:sp>
-      <p:sp>
-        <p:nvSpPr>
-          <p:cNvPr id="9" name="CustomShape 6">
-            <a:extLst>
-              <a:ext uri="{FF2B5EF4-FFF2-40B4-BE49-F238E27FC236}">
-                <a16:creationId xmlns:a16="http://schemas.microsoft.com/office/drawing/2014/main" id="{1EF13074-7758-473E-AF94-33DABA5D1D61}"/>
-              </a:ext>
-            </a:extLst>
-          </p:cNvPr>
-          <p:cNvSpPr/>
-          <p:nvPr/>
-        </p:nvSpPr>
-        <p:spPr>
-          <a:xfrm>
             <a:off x="5412240" y="1584000"/>
-            <a:ext cx="3011400" cy="3095640"/>
+            <a:ext cx="3011040" cy="3095280"/>
           </a:xfrm>
           <a:prstGeom prst="roundRect">
             <a:avLst>
@@ -2813,6 +2819,932 @@
             </a:endParaRPr>
           </a:p>
         </p:txBody>
+      </p:sp>
+      <p:sp>
+        <p:nvSpPr>
+          <p:cNvPr id="49" name="Line 7"/>
+          <p:cNvSpPr/>
+          <p:nvPr/>
+        </p:nvSpPr>
+        <p:spPr>
+          <a:xfrm>
+            <a:off x="6843600" y="3120120"/>
+            <a:ext cx="2520" cy="432000"/>
+          </a:xfrm>
+          <a:prstGeom prst="line">
+            <a:avLst/>
+          </a:prstGeom>
+          <a:ln w="6480">
+            <a:solidFill>
+              <a:srgbClr val="4472C4"/>
+            </a:solidFill>
+            <a:miter/>
+          </a:ln>
+        </p:spPr>
+        <p:style>
+          <a:lnRef idx="0">
+            <a:scrgbClr r="0" g="0" b="0"/>
+          </a:lnRef>
+          <a:fillRef idx="0">
+            <a:scrgbClr r="0" g="0" b="0"/>
+          </a:fillRef>
+          <a:effectRef idx="0">
+            <a:scrgbClr r="0" g="0" b="0"/>
+          </a:effectRef>
+          <a:fontRef idx="minor"/>
+        </p:style>
+      </p:sp>
+    </p:spTree>
+  </p:cSld>
+  <p:clrMapOvr>
+    <a:masterClrMapping/>
+  </p:clrMapOvr>
+</p:sld>
+</file>
+
+<file path=ppt/slides/slide3.xml><?xml version="1.0" encoding="utf-8"?>
+<p:sld xmlns:a="http://schemas.openxmlformats.org/drawingml/2006/main" xmlns:r="http://schemas.openxmlformats.org/officeDocument/2006/relationships" xmlns:p="http://schemas.openxmlformats.org/presentationml/2006/main">
+  <p:cSld>
+    <p:spTree>
+      <p:nvGrpSpPr>
+        <p:cNvPr id="1" name=""/>
+        <p:cNvGrpSpPr/>
+        <p:nvPr/>
+      </p:nvGrpSpPr>
+      <p:grpSpPr>
+        <a:xfrm>
+          <a:off x="0" y="0"/>
+          <a:ext cx="0" cy="0"/>
+          <a:chOff x="0" y="0"/>
+          <a:chExt cx="0" cy="0"/>
+        </a:xfrm>
+      </p:grpSpPr>
+      <p:sp>
+        <p:nvSpPr>
+          <p:cNvPr id="50" name="CustomShape 1"/>
+          <p:cNvSpPr/>
+          <p:nvPr/>
+        </p:nvSpPr>
+        <p:spPr>
+          <a:xfrm>
+            <a:off x="692640" y="301680"/>
+            <a:ext cx="8692920" cy="1094760"/>
+          </a:xfrm>
+          <a:prstGeom prst="rect">
+            <a:avLst/>
+          </a:prstGeom>
+          <a:noFill/>
+          <a:ln>
+            <a:noFill/>
+          </a:ln>
+        </p:spPr>
+        <p:style>
+          <a:lnRef idx="0">
+            <a:scrgbClr r="0" g="0" b="0"/>
+          </a:lnRef>
+          <a:fillRef idx="0">
+            <a:scrgbClr r="0" g="0" b="0"/>
+          </a:fillRef>
+          <a:effectRef idx="0">
+            <a:scrgbClr r="0" g="0" b="0"/>
+          </a:effectRef>
+          <a:fontRef idx="minor"/>
+        </p:style>
+        <p:txBody>
+          <a:bodyPr lIns="90000" tIns="45000" rIns="90000" bIns="45000" anchor="ctr">
+            <a:noAutofit/>
+          </a:bodyPr>
+          <a:lstStyle/>
+          <a:p>
+            <a:pPr>
+              <a:lnSpc>
+                <a:spcPct val="90000"/>
+              </a:lnSpc>
+            </a:pPr>
+            <a:r>
+              <a:rPr lang="pt-BR" sz="4400" b="0" strike="noStrike" spc="-1">
+                <a:solidFill>
+                  <a:srgbClr val="000000"/>
+                </a:solidFill>
+                <a:latin typeface="Calibri Light"/>
+                <a:ea typeface="Microsoft YaHei"/>
+              </a:rPr>
+              <a:t>Cenário: </a:t>
+            </a:r>
+            <a:r>
+              <a:rPr lang="pt-BR" sz="2800" b="0" strike="noStrike" spc="-1">
+                <a:solidFill>
+                  <a:srgbClr val="000000"/>
+                </a:solidFill>
+                <a:latin typeface="Calibri"/>
+                <a:ea typeface="Microsoft YaHei"/>
+              </a:rPr>
+              <a:t>Solicitar projeto </a:t>
+            </a:r>
+            <a:endParaRPr lang="pt-BR" sz="2800" b="0" strike="noStrike" spc="-1">
+              <a:latin typeface="Arial"/>
+            </a:endParaRPr>
+          </a:p>
+        </p:txBody>
+      </p:sp>
+      <p:sp>
+        <p:nvSpPr>
+          <p:cNvPr id="51" name="CustomShape 2"/>
+          <p:cNvSpPr/>
+          <p:nvPr/>
+        </p:nvSpPr>
+        <p:spPr>
+          <a:xfrm>
+            <a:off x="6231600" y="2637000"/>
+            <a:ext cx="1344600" cy="482040"/>
+          </a:xfrm>
+          <a:prstGeom prst="cube">
+            <a:avLst>
+              <a:gd name="adj" fmla="val 25000"/>
+            </a:avLst>
+          </a:prstGeom>
+          <a:solidFill>
+            <a:srgbClr val="FFC000"/>
+          </a:solidFill>
+          <a:ln w="12600">
+            <a:solidFill>
+              <a:srgbClr val="4472C4"/>
+            </a:solidFill>
+            <a:miter/>
+          </a:ln>
+        </p:spPr>
+        <p:style>
+          <a:lnRef idx="0">
+            <a:scrgbClr r="0" g="0" b="0"/>
+          </a:lnRef>
+          <a:fillRef idx="0">
+            <a:scrgbClr r="0" g="0" b="0"/>
+          </a:fillRef>
+          <a:effectRef idx="0">
+            <a:scrgbClr r="0" g="0" b="0"/>
+          </a:effectRef>
+          <a:fontRef idx="minor"/>
+        </p:style>
+        <p:txBody>
+          <a:bodyPr lIns="90000" tIns="45000" rIns="90000" bIns="45000">
+            <a:noAutofit/>
+          </a:bodyPr>
+          <a:lstStyle/>
+          <a:p>
+            <a:pPr algn="ctr">
+              <a:lnSpc>
+                <a:spcPct val="100000"/>
+              </a:lnSpc>
+            </a:pPr>
+            <a:r>
+              <a:rPr lang="pt-BR" sz="1000" b="0" strike="noStrike" spc="-1">
+                <a:solidFill>
+                  <a:srgbClr val="000000"/>
+                </a:solidFill>
+                <a:latin typeface="Calibri"/>
+                <a:ea typeface="DejaVu Sans"/>
+              </a:rPr>
+              <a:t>Comercial</a:t>
+            </a:r>
+            <a:endParaRPr lang="pt-BR" sz="1000" b="0" strike="noStrike" spc="-1">
+              <a:latin typeface="Arial"/>
+            </a:endParaRPr>
+          </a:p>
+          <a:p>
+            <a:pPr algn="ctr">
+              <a:lnSpc>
+                <a:spcPct val="100000"/>
+              </a:lnSpc>
+            </a:pPr>
+            <a:r>
+              <a:rPr lang="pt-BR" sz="1000" b="1" strike="noStrike" spc="-1">
+                <a:solidFill>
+                  <a:srgbClr val="000000"/>
+                </a:solidFill>
+                <a:latin typeface="Calibri"/>
+                <a:ea typeface="DejaVu Sans"/>
+              </a:rPr>
+              <a:t>(Nó Operacional)</a:t>
+            </a:r>
+            <a:endParaRPr lang="pt-BR" sz="1000" b="0" strike="noStrike" spc="-1">
+              <a:latin typeface="Arial"/>
+            </a:endParaRPr>
+          </a:p>
+          <a:p>
+            <a:pPr>
+              <a:lnSpc>
+                <a:spcPct val="100000"/>
+              </a:lnSpc>
+            </a:pPr>
+            <a:endParaRPr lang="pt-BR" sz="1000" b="0" strike="noStrike" spc="-1">
+              <a:latin typeface="Arial"/>
+            </a:endParaRPr>
+          </a:p>
+        </p:txBody>
+      </p:sp>
+      <p:sp>
+        <p:nvSpPr>
+          <p:cNvPr id="52" name="CustomShape 3"/>
+          <p:cNvSpPr/>
+          <p:nvPr/>
+        </p:nvSpPr>
+        <p:spPr>
+          <a:xfrm>
+            <a:off x="6318000" y="3551760"/>
+            <a:ext cx="1097280" cy="1020240"/>
+          </a:xfrm>
+          <a:prstGeom prst="roundRect">
+            <a:avLst>
+              <a:gd name="adj" fmla="val 16667"/>
+            </a:avLst>
+          </a:prstGeom>
+          <a:solidFill>
+            <a:srgbClr val="70AD47"/>
+          </a:solidFill>
+          <a:ln>
+            <a:noFill/>
+          </a:ln>
+        </p:spPr>
+        <p:style>
+          <a:lnRef idx="0">
+            <a:scrgbClr r="0" g="0" b="0"/>
+          </a:lnRef>
+          <a:fillRef idx="0">
+            <a:scrgbClr r="0" g="0" b="0"/>
+          </a:fillRef>
+          <a:effectRef idx="0">
+            <a:scrgbClr r="0" g="0" b="0"/>
+          </a:effectRef>
+          <a:fontRef idx="minor"/>
+        </p:style>
+        <p:txBody>
+          <a:bodyPr lIns="90000" tIns="45000" rIns="90000" bIns="45000" anchor="ctr">
+            <a:noAutofit/>
+          </a:bodyPr>
+          <a:lstStyle/>
+          <a:p>
+            <a:pPr algn="ctr">
+              <a:lnSpc>
+                <a:spcPct val="100000"/>
+              </a:lnSpc>
+            </a:pPr>
+            <a:r>
+              <a:rPr lang="pt-BR" sz="1200" b="1" spc="-1" dirty="0">
+                <a:solidFill>
+                  <a:srgbClr val="FFFFFF"/>
+                </a:solidFill>
+                <a:latin typeface="Calibri"/>
+              </a:rPr>
+              <a:t>Analisar solicitação e encaminhar para Diretor de Negócios</a:t>
+            </a:r>
+            <a:endParaRPr lang="pt-BR" sz="1200" b="0" strike="noStrike" spc="-1" dirty="0">
+              <a:latin typeface="Arial"/>
+            </a:endParaRPr>
+          </a:p>
+        </p:txBody>
+      </p:sp>
+      <p:sp>
+        <p:nvSpPr>
+          <p:cNvPr id="53" name="CustomShape 4"/>
+          <p:cNvSpPr/>
+          <p:nvPr/>
+        </p:nvSpPr>
+        <p:spPr>
+          <a:xfrm>
+            <a:off x="1682280" y="2561040"/>
+            <a:ext cx="1103760" cy="754920"/>
+          </a:xfrm>
+          <a:prstGeom prst="rect">
+            <a:avLst/>
+          </a:prstGeom>
+          <a:solidFill>
+            <a:srgbClr val="4472C4"/>
+          </a:solidFill>
+          <a:ln w="12600">
+            <a:solidFill>
+              <a:srgbClr val="325490"/>
+            </a:solidFill>
+            <a:miter/>
+          </a:ln>
+        </p:spPr>
+        <p:style>
+          <a:lnRef idx="0">
+            <a:scrgbClr r="0" g="0" b="0"/>
+          </a:lnRef>
+          <a:fillRef idx="0">
+            <a:scrgbClr r="0" g="0" b="0"/>
+          </a:fillRef>
+          <a:effectRef idx="0">
+            <a:scrgbClr r="0" g="0" b="0"/>
+          </a:effectRef>
+          <a:fontRef idx="minor"/>
+        </p:style>
+        <p:txBody>
+          <a:bodyPr lIns="90000" tIns="45000" rIns="90000" bIns="45000" anchor="ctr">
+            <a:noAutofit/>
+          </a:bodyPr>
+          <a:lstStyle/>
+          <a:p>
+            <a:pPr algn="ctr">
+              <a:lnSpc>
+                <a:spcPct val="100000"/>
+              </a:lnSpc>
+            </a:pPr>
+            <a:r>
+              <a:rPr lang="pt-BR" sz="1800" b="0" strike="noStrike" spc="-1">
+                <a:solidFill>
+                  <a:srgbClr val="FFFFFF"/>
+                </a:solidFill>
+                <a:latin typeface="Calibri"/>
+                <a:ea typeface="DejaVu Sans"/>
+              </a:rPr>
+              <a:t>Cliente</a:t>
+            </a:r>
+            <a:endParaRPr lang="pt-BR" sz="1800" b="0" strike="noStrike" spc="-1">
+              <a:latin typeface="Arial"/>
+            </a:endParaRPr>
+          </a:p>
+        </p:txBody>
+      </p:sp>
+      <p:sp>
+        <p:nvSpPr>
+          <p:cNvPr id="54" name="CustomShape 5"/>
+          <p:cNvSpPr/>
+          <p:nvPr/>
+        </p:nvSpPr>
+        <p:spPr>
+          <a:xfrm>
+            <a:off x="2787120" y="2939040"/>
+            <a:ext cx="3443400" cy="9360"/>
+          </a:xfrm>
+          <a:prstGeom prst="curvedConnector3">
+            <a:avLst>
+              <a:gd name="adj1" fmla="val 50000"/>
+            </a:avLst>
+          </a:prstGeom>
+          <a:noFill/>
+          <a:ln w="6480">
+            <a:solidFill>
+              <a:srgbClr val="4472C4"/>
+            </a:solidFill>
+            <a:miter/>
+          </a:ln>
+        </p:spPr>
+        <p:style>
+          <a:lnRef idx="0">
+            <a:scrgbClr r="0" g="0" b="0"/>
+          </a:lnRef>
+          <a:fillRef idx="0">
+            <a:scrgbClr r="0" g="0" b="0"/>
+          </a:fillRef>
+          <a:effectRef idx="0">
+            <a:scrgbClr r="0" g="0" b="0"/>
+          </a:effectRef>
+          <a:fontRef idx="minor"/>
+        </p:style>
+      </p:sp>
+      <p:sp>
+        <p:nvSpPr>
+          <p:cNvPr id="55" name="CustomShape 6"/>
+          <p:cNvSpPr/>
+          <p:nvPr/>
+        </p:nvSpPr>
+        <p:spPr>
+          <a:xfrm>
+            <a:off x="5412240" y="1584000"/>
+            <a:ext cx="3011040" cy="3095280"/>
+          </a:xfrm>
+          <a:prstGeom prst="roundRect">
+            <a:avLst>
+              <a:gd name="adj" fmla="val 16667"/>
+            </a:avLst>
+          </a:prstGeom>
+          <a:noFill/>
+          <a:ln w="12600">
+            <a:solidFill>
+              <a:srgbClr val="325490"/>
+            </a:solidFill>
+            <a:miter/>
+          </a:ln>
+        </p:spPr>
+        <p:style>
+          <a:lnRef idx="0">
+            <a:scrgbClr r="0" g="0" b="0"/>
+          </a:lnRef>
+          <a:fillRef idx="0">
+            <a:scrgbClr r="0" g="0" b="0"/>
+          </a:fillRef>
+          <a:effectRef idx="0">
+            <a:scrgbClr r="0" g="0" b="0"/>
+          </a:effectRef>
+          <a:fontRef idx="minor"/>
+        </p:style>
+        <p:txBody>
+          <a:bodyPr lIns="90000" tIns="45000" rIns="90000" bIns="45000">
+            <a:noAutofit/>
+          </a:bodyPr>
+          <a:lstStyle/>
+          <a:p>
+            <a:pPr algn="ctr">
+              <a:lnSpc>
+                <a:spcPct val="100000"/>
+              </a:lnSpc>
+            </a:pPr>
+            <a:r>
+              <a:rPr lang="pt-BR" sz="1800" b="0" strike="noStrike" spc="-1">
+                <a:solidFill>
+                  <a:srgbClr val="000000"/>
+                </a:solidFill>
+                <a:latin typeface="Calibri"/>
+                <a:ea typeface="DejaVu Sans"/>
+              </a:rPr>
+              <a:t>Loja de computador</a:t>
+            </a:r>
+            <a:endParaRPr lang="pt-BR" sz="1800" b="0" strike="noStrike" spc="-1">
+              <a:latin typeface="Arial"/>
+            </a:endParaRPr>
+          </a:p>
+        </p:txBody>
+      </p:sp>
+      <p:sp>
+        <p:nvSpPr>
+          <p:cNvPr id="56" name="Line 7"/>
+          <p:cNvSpPr/>
+          <p:nvPr/>
+        </p:nvSpPr>
+        <p:spPr>
+          <a:xfrm>
+            <a:off x="6843600" y="3120120"/>
+            <a:ext cx="2520" cy="432000"/>
+          </a:xfrm>
+          <a:prstGeom prst="line">
+            <a:avLst/>
+          </a:prstGeom>
+          <a:ln w="6480">
+            <a:solidFill>
+              <a:srgbClr val="4472C4"/>
+            </a:solidFill>
+            <a:miter/>
+          </a:ln>
+        </p:spPr>
+        <p:style>
+          <a:lnRef idx="0">
+            <a:scrgbClr r="0" g="0" b="0"/>
+          </a:lnRef>
+          <a:fillRef idx="0">
+            <a:scrgbClr r="0" g="0" b="0"/>
+          </a:fillRef>
+          <a:effectRef idx="0">
+            <a:scrgbClr r="0" g="0" b="0"/>
+          </a:effectRef>
+          <a:fontRef idx="minor"/>
+        </p:style>
+      </p:sp>
+    </p:spTree>
+  </p:cSld>
+  <p:clrMapOvr>
+    <a:masterClrMapping/>
+  </p:clrMapOvr>
+</p:sld>
+</file>
+
+<file path=ppt/slides/slide4.xml><?xml version="1.0" encoding="utf-8"?>
+<p:sld xmlns:a="http://schemas.openxmlformats.org/drawingml/2006/main" xmlns:r="http://schemas.openxmlformats.org/officeDocument/2006/relationships" xmlns:p="http://schemas.openxmlformats.org/presentationml/2006/main">
+  <p:cSld>
+    <p:spTree>
+      <p:nvGrpSpPr>
+        <p:cNvPr id="1" name=""/>
+        <p:cNvGrpSpPr/>
+        <p:nvPr/>
+      </p:nvGrpSpPr>
+      <p:grpSpPr>
+        <a:xfrm>
+          <a:off x="0" y="0"/>
+          <a:ext cx="0" cy="0"/>
+          <a:chOff x="0" y="0"/>
+          <a:chExt cx="0" cy="0"/>
+        </a:xfrm>
+      </p:grpSpPr>
+      <p:sp>
+        <p:nvSpPr>
+          <p:cNvPr id="57" name="CustomShape 1"/>
+          <p:cNvSpPr/>
+          <p:nvPr/>
+        </p:nvSpPr>
+        <p:spPr>
+          <a:xfrm>
+            <a:off x="692640" y="301680"/>
+            <a:ext cx="8692920" cy="1094760"/>
+          </a:xfrm>
+          <a:prstGeom prst="rect">
+            <a:avLst/>
+          </a:prstGeom>
+          <a:noFill/>
+          <a:ln>
+            <a:noFill/>
+          </a:ln>
+        </p:spPr>
+        <p:style>
+          <a:lnRef idx="0">
+            <a:scrgbClr r="0" g="0" b="0"/>
+          </a:lnRef>
+          <a:fillRef idx="0">
+            <a:scrgbClr r="0" g="0" b="0"/>
+          </a:fillRef>
+          <a:effectRef idx="0">
+            <a:scrgbClr r="0" g="0" b="0"/>
+          </a:effectRef>
+          <a:fontRef idx="minor"/>
+        </p:style>
+        <p:txBody>
+          <a:bodyPr lIns="90000" tIns="45000" rIns="90000" bIns="45000" anchor="ctr">
+            <a:noAutofit/>
+          </a:bodyPr>
+          <a:lstStyle/>
+          <a:p>
+            <a:pPr>
+              <a:lnSpc>
+                <a:spcPct val="90000"/>
+              </a:lnSpc>
+            </a:pPr>
+            <a:r>
+              <a:rPr lang="pt-BR" sz="4400" b="0" strike="noStrike" spc="-1">
+                <a:solidFill>
+                  <a:srgbClr val="000000"/>
+                </a:solidFill>
+                <a:latin typeface="Calibri Light"/>
+                <a:ea typeface="Microsoft YaHei"/>
+              </a:rPr>
+              <a:t>Cenário: </a:t>
+            </a:r>
+            <a:r>
+              <a:rPr lang="pt-BR" sz="2800" b="0" strike="noStrike" spc="-1">
+                <a:solidFill>
+                  <a:srgbClr val="000000"/>
+                </a:solidFill>
+                <a:latin typeface="Calibri"/>
+                <a:ea typeface="Microsoft YaHei"/>
+              </a:rPr>
+              <a:t>Solicitar reparo</a:t>
+            </a:r>
+            <a:endParaRPr lang="pt-BR" sz="2800" b="0" strike="noStrike" spc="-1">
+              <a:latin typeface="Arial"/>
+            </a:endParaRPr>
+          </a:p>
+        </p:txBody>
+      </p:sp>
+      <p:sp>
+        <p:nvSpPr>
+          <p:cNvPr id="58" name="CustomShape 2"/>
+          <p:cNvSpPr/>
+          <p:nvPr/>
+        </p:nvSpPr>
+        <p:spPr>
+          <a:xfrm>
+            <a:off x="6231600" y="2637000"/>
+            <a:ext cx="1344600" cy="482040"/>
+          </a:xfrm>
+          <a:prstGeom prst="cube">
+            <a:avLst>
+              <a:gd name="adj" fmla="val 25000"/>
+            </a:avLst>
+          </a:prstGeom>
+          <a:solidFill>
+            <a:srgbClr val="FFC000"/>
+          </a:solidFill>
+          <a:ln w="12600">
+            <a:solidFill>
+              <a:srgbClr val="4472C4"/>
+            </a:solidFill>
+            <a:miter/>
+          </a:ln>
+        </p:spPr>
+        <p:style>
+          <a:lnRef idx="0">
+            <a:scrgbClr r="0" g="0" b="0"/>
+          </a:lnRef>
+          <a:fillRef idx="0">
+            <a:scrgbClr r="0" g="0" b="0"/>
+          </a:fillRef>
+          <a:effectRef idx="0">
+            <a:scrgbClr r="0" g="0" b="0"/>
+          </a:effectRef>
+          <a:fontRef idx="minor"/>
+        </p:style>
+        <p:txBody>
+          <a:bodyPr lIns="90000" tIns="45000" rIns="90000" bIns="45000">
+            <a:noAutofit/>
+          </a:bodyPr>
+          <a:lstStyle/>
+          <a:p>
+            <a:pPr algn="ctr">
+              <a:lnSpc>
+                <a:spcPct val="100000"/>
+              </a:lnSpc>
+            </a:pPr>
+            <a:r>
+              <a:rPr lang="pt-BR" sz="1000" b="0" strike="noStrike" spc="-1">
+                <a:solidFill>
+                  <a:srgbClr val="000000"/>
+                </a:solidFill>
+                <a:latin typeface="Calibri"/>
+                <a:ea typeface="DejaVu Sans"/>
+              </a:rPr>
+              <a:t>Comercial</a:t>
+            </a:r>
+            <a:endParaRPr lang="pt-BR" sz="1000" b="0" strike="noStrike" spc="-1">
+              <a:latin typeface="Arial"/>
+            </a:endParaRPr>
+          </a:p>
+          <a:p>
+            <a:pPr algn="ctr">
+              <a:lnSpc>
+                <a:spcPct val="100000"/>
+              </a:lnSpc>
+            </a:pPr>
+            <a:r>
+              <a:rPr lang="pt-BR" sz="1000" b="1" strike="noStrike" spc="-1">
+                <a:solidFill>
+                  <a:srgbClr val="000000"/>
+                </a:solidFill>
+                <a:latin typeface="Calibri"/>
+                <a:ea typeface="DejaVu Sans"/>
+              </a:rPr>
+              <a:t>(Nó Operacional)</a:t>
+            </a:r>
+            <a:endParaRPr lang="pt-BR" sz="1000" b="0" strike="noStrike" spc="-1">
+              <a:latin typeface="Arial"/>
+            </a:endParaRPr>
+          </a:p>
+          <a:p>
+            <a:pPr>
+              <a:lnSpc>
+                <a:spcPct val="100000"/>
+              </a:lnSpc>
+            </a:pPr>
+            <a:endParaRPr lang="pt-BR" sz="1000" b="0" strike="noStrike" spc="-1">
+              <a:latin typeface="Arial"/>
+            </a:endParaRPr>
+          </a:p>
+        </p:txBody>
+      </p:sp>
+      <p:sp>
+        <p:nvSpPr>
+          <p:cNvPr id="59" name="CustomShape 3"/>
+          <p:cNvSpPr/>
+          <p:nvPr/>
+        </p:nvSpPr>
+        <p:spPr>
+          <a:xfrm>
+            <a:off x="6318000" y="3551760"/>
+            <a:ext cx="1097280" cy="839520"/>
+          </a:xfrm>
+          <a:prstGeom prst="roundRect">
+            <a:avLst>
+              <a:gd name="adj" fmla="val 16667"/>
+            </a:avLst>
+          </a:prstGeom>
+          <a:solidFill>
+            <a:srgbClr val="70AD47"/>
+          </a:solidFill>
+          <a:ln>
+            <a:noFill/>
+          </a:ln>
+        </p:spPr>
+        <p:style>
+          <a:lnRef idx="0">
+            <a:scrgbClr r="0" g="0" b="0"/>
+          </a:lnRef>
+          <a:fillRef idx="0">
+            <a:scrgbClr r="0" g="0" b="0"/>
+          </a:fillRef>
+          <a:effectRef idx="0">
+            <a:scrgbClr r="0" g="0" b="0"/>
+          </a:effectRef>
+          <a:fontRef idx="minor"/>
+        </p:style>
+        <p:txBody>
+          <a:bodyPr lIns="90000" tIns="45000" rIns="90000" bIns="45000" anchor="ctr">
+            <a:noAutofit/>
+          </a:bodyPr>
+          <a:lstStyle/>
+          <a:p>
+            <a:pPr algn="ctr">
+              <a:lnSpc>
+                <a:spcPct val="100000"/>
+              </a:lnSpc>
+            </a:pPr>
+            <a:r>
+              <a:rPr lang="pt-BR" sz="1200" b="1" spc="-1" dirty="0">
+                <a:solidFill>
+                  <a:srgbClr val="FFFFFF"/>
+                </a:solidFill>
+                <a:latin typeface="Calibri"/>
+              </a:rPr>
+              <a:t>Gerar solicitação de manutenção</a:t>
+            </a:r>
+            <a:endParaRPr lang="pt-BR" sz="1200" b="0" strike="noStrike" spc="-1" dirty="0">
+              <a:latin typeface="Arial"/>
+            </a:endParaRPr>
+          </a:p>
+        </p:txBody>
+      </p:sp>
+      <p:sp>
+        <p:nvSpPr>
+          <p:cNvPr id="60" name="CustomShape 4"/>
+          <p:cNvSpPr/>
+          <p:nvPr/>
+        </p:nvSpPr>
+        <p:spPr>
+          <a:xfrm>
+            <a:off x="1682280" y="2561040"/>
+            <a:ext cx="1103760" cy="754920"/>
+          </a:xfrm>
+          <a:prstGeom prst="rect">
+            <a:avLst/>
+          </a:prstGeom>
+          <a:solidFill>
+            <a:srgbClr val="4472C4"/>
+          </a:solidFill>
+          <a:ln w="12600">
+            <a:solidFill>
+              <a:srgbClr val="325490"/>
+            </a:solidFill>
+            <a:miter/>
+          </a:ln>
+        </p:spPr>
+        <p:style>
+          <a:lnRef idx="0">
+            <a:scrgbClr r="0" g="0" b="0"/>
+          </a:lnRef>
+          <a:fillRef idx="0">
+            <a:scrgbClr r="0" g="0" b="0"/>
+          </a:fillRef>
+          <a:effectRef idx="0">
+            <a:scrgbClr r="0" g="0" b="0"/>
+          </a:effectRef>
+          <a:fontRef idx="minor"/>
+        </p:style>
+        <p:txBody>
+          <a:bodyPr lIns="90000" tIns="45000" rIns="90000" bIns="45000" anchor="ctr">
+            <a:noAutofit/>
+          </a:bodyPr>
+          <a:lstStyle/>
+          <a:p>
+            <a:pPr algn="ctr">
+              <a:lnSpc>
+                <a:spcPct val="100000"/>
+              </a:lnSpc>
+            </a:pPr>
+            <a:r>
+              <a:rPr lang="pt-BR" sz="1800" b="0" strike="noStrike" spc="-1">
+                <a:solidFill>
+                  <a:srgbClr val="FFFFFF"/>
+                </a:solidFill>
+                <a:latin typeface="Calibri"/>
+                <a:ea typeface="DejaVu Sans"/>
+              </a:rPr>
+              <a:t>Cliente</a:t>
+            </a:r>
+            <a:endParaRPr lang="pt-BR" sz="1800" b="0" strike="noStrike" spc="-1">
+              <a:latin typeface="Arial"/>
+            </a:endParaRPr>
+          </a:p>
+        </p:txBody>
+      </p:sp>
+      <p:sp>
+        <p:nvSpPr>
+          <p:cNvPr id="61" name="CustomShape 5"/>
+          <p:cNvSpPr/>
+          <p:nvPr/>
+        </p:nvSpPr>
+        <p:spPr>
+          <a:xfrm>
+            <a:off x="2787120" y="2939040"/>
+            <a:ext cx="3443400" cy="9360"/>
+          </a:xfrm>
+          <a:prstGeom prst="curvedConnector3">
+            <a:avLst>
+              <a:gd name="adj1" fmla="val 50000"/>
+            </a:avLst>
+          </a:prstGeom>
+          <a:noFill/>
+          <a:ln w="6480">
+            <a:solidFill>
+              <a:srgbClr val="4472C4"/>
+            </a:solidFill>
+            <a:miter/>
+          </a:ln>
+        </p:spPr>
+        <p:style>
+          <a:lnRef idx="0">
+            <a:scrgbClr r="0" g="0" b="0"/>
+          </a:lnRef>
+          <a:fillRef idx="0">
+            <a:scrgbClr r="0" g="0" b="0"/>
+          </a:fillRef>
+          <a:effectRef idx="0">
+            <a:scrgbClr r="0" g="0" b="0"/>
+          </a:effectRef>
+          <a:fontRef idx="minor"/>
+        </p:style>
+      </p:sp>
+      <p:sp>
+        <p:nvSpPr>
+          <p:cNvPr id="62" name="CustomShape 6"/>
+          <p:cNvSpPr/>
+          <p:nvPr/>
+        </p:nvSpPr>
+        <p:spPr>
+          <a:xfrm>
+            <a:off x="5412240" y="1584000"/>
+            <a:ext cx="3011040" cy="3095280"/>
+          </a:xfrm>
+          <a:prstGeom prst="roundRect">
+            <a:avLst>
+              <a:gd name="adj" fmla="val 16667"/>
+            </a:avLst>
+          </a:prstGeom>
+          <a:noFill/>
+          <a:ln w="12600">
+            <a:solidFill>
+              <a:srgbClr val="325490"/>
+            </a:solidFill>
+            <a:miter/>
+          </a:ln>
+        </p:spPr>
+        <p:style>
+          <a:lnRef idx="0">
+            <a:scrgbClr r="0" g="0" b="0"/>
+          </a:lnRef>
+          <a:fillRef idx="0">
+            <a:scrgbClr r="0" g="0" b="0"/>
+          </a:fillRef>
+          <a:effectRef idx="0">
+            <a:scrgbClr r="0" g="0" b="0"/>
+          </a:effectRef>
+          <a:fontRef idx="minor"/>
+        </p:style>
+        <p:txBody>
+          <a:bodyPr lIns="90000" tIns="45000" rIns="90000" bIns="45000">
+            <a:noAutofit/>
+          </a:bodyPr>
+          <a:lstStyle/>
+          <a:p>
+            <a:pPr algn="ctr">
+              <a:lnSpc>
+                <a:spcPct val="100000"/>
+              </a:lnSpc>
+            </a:pPr>
+            <a:r>
+              <a:rPr lang="pt-BR" sz="1800" b="0" strike="noStrike" spc="-1">
+                <a:solidFill>
+                  <a:srgbClr val="000000"/>
+                </a:solidFill>
+                <a:latin typeface="Calibri"/>
+                <a:ea typeface="DejaVu Sans"/>
+              </a:rPr>
+              <a:t>Loja de computador</a:t>
+            </a:r>
+            <a:endParaRPr lang="pt-BR" sz="1800" b="0" strike="noStrike" spc="-1">
+              <a:latin typeface="Arial"/>
+            </a:endParaRPr>
+          </a:p>
+        </p:txBody>
+      </p:sp>
+      <p:sp>
+        <p:nvSpPr>
+          <p:cNvPr id="63" name="Line 7"/>
+          <p:cNvSpPr/>
+          <p:nvPr/>
+        </p:nvSpPr>
+        <p:spPr>
+          <a:xfrm>
+            <a:off x="6843600" y="3120120"/>
+            <a:ext cx="2520" cy="432000"/>
+          </a:xfrm>
+          <a:prstGeom prst="line">
+            <a:avLst/>
+          </a:prstGeom>
+          <a:ln w="6480">
+            <a:solidFill>
+              <a:srgbClr val="4472C4"/>
+            </a:solidFill>
+            <a:miter/>
+          </a:ln>
+        </p:spPr>
+        <p:style>
+          <a:lnRef idx="0">
+            <a:scrgbClr r="0" g="0" b="0"/>
+          </a:lnRef>
+          <a:fillRef idx="0">
+            <a:scrgbClr r="0" g="0" b="0"/>
+          </a:fillRef>
+          <a:effectRef idx="0">
+            <a:scrgbClr r="0" g="0" b="0"/>
+          </a:effectRef>
+          <a:fontRef idx="minor"/>
+        </p:style>
       </p:sp>
     </p:spTree>
   </p:cSld>

</xml_diff>

<commit_message>
artefato 15 GA revisado
</commit_message>
<xml_diff>
--- a/Artefatos/15-ArquiteturaDeNegocioParaCadaCenario.pptx
+++ b/Artefatos/15-ArquiteturaDeNegocioParaCadaCenario.pptx
@@ -107,6 +107,11 @@
       </a:defRPr>
     </a:lvl9pPr>
   </p:defaultTextStyle>
+  <p:extLst>
+    <p:ext uri="{EFAFB233-063F-42B5-8137-9DF3F51BA10A}">
+      <p15:sldGuideLst xmlns:p15="http://schemas.microsoft.com/office/powerpoint/2012/main"/>
+    </p:ext>
+  </p:extLst>
 </p:presentation>
 </file>
 
@@ -2642,6 +2647,16 @@
               </a:lnSpc>
             </a:pPr>
             <a:r>
+              <a:rPr lang="pt-BR" sz="1200" b="1" spc="-1" dirty="0">
+                <a:solidFill>
+                  <a:srgbClr val="FFFFFF"/>
+                </a:solidFill>
+                <a:latin typeface="Calibri"/>
+                <a:ea typeface="DejaVu Sans"/>
+              </a:rPr>
+              <a:t>Criar</a:t>
+            </a:r>
+            <a:r>
               <a:rPr lang="pt-BR" sz="1200" b="1" strike="noStrike" spc="-1" dirty="0">
                 <a:solidFill>
                   <a:srgbClr val="FFFFFF"/>
@@ -2649,7 +2664,7 @@
                 <a:latin typeface="Calibri"/>
                 <a:ea typeface="DejaVu Sans"/>
               </a:rPr>
-              <a:t>Criar Pedido</a:t>
+              <a:t> Pedido</a:t>
             </a:r>
             <a:endParaRPr lang="pt-BR" sz="1200" b="0" strike="noStrike" spc="-1" dirty="0">
               <a:latin typeface="Arial"/>
@@ -3095,7 +3110,7 @@
                 </a:solidFill>
                 <a:latin typeface="Calibri"/>
               </a:rPr>
-              <a:t>Analisar solicitação e encaminhar para Diretor de Negócios</a:t>
+              <a:t>Criar Solicitação de Projeto</a:t>
             </a:r>
             <a:endParaRPr lang="pt-BR" sz="1200" b="0" strike="noStrike" spc="-1" dirty="0">
               <a:latin typeface="Arial"/>
@@ -3541,7 +3556,7 @@
                 </a:solidFill>
                 <a:latin typeface="Calibri"/>
               </a:rPr>
-              <a:t>Gerar solicitação de manutenção</a:t>
+              <a:t>Criar solicitação de manutenção</a:t>
             </a:r>
             <a:endParaRPr lang="pt-BR" sz="1200" b="0" strike="noStrike" spc="-1" dirty="0">
               <a:latin typeface="Arial"/>

</xml_diff>

<commit_message>
artefato 15 GA tecnologia [2]
</commit_message>
<xml_diff>
--- a/Artefatos/15-ArquiteturaDeNegocioParaCadaCenario.pptx
+++ b/Artefatos/15-ArquiteturaDeNegocioParaCadaCenario.pptx
@@ -6,9 +6,11 @@
   </p:sldMasterIdLst>
   <p:sldIdLst>
     <p:sldId id="256" r:id="rId2"/>
-    <p:sldId id="257" r:id="rId3"/>
-    <p:sldId id="258" r:id="rId4"/>
-    <p:sldId id="259" r:id="rId5"/>
+    <p:sldId id="260" r:id="rId3"/>
+    <p:sldId id="257" r:id="rId4"/>
+    <p:sldId id="258" r:id="rId5"/>
+    <p:sldId id="259" r:id="rId6"/>
+    <p:sldId id="261" r:id="rId7"/>
   </p:sldIdLst>
   <p:sldSz cx="10080625" cy="5670550"/>
   <p:notesSz cx="7559675" cy="10691813"/>
@@ -2245,7 +2247,7 @@
         <p:spPr>
           <a:xfrm>
             <a:off x="2646360" y="1584000"/>
-            <a:ext cx="1843944" cy="737210"/>
+            <a:ext cx="1964875" cy="1168097"/>
           </a:xfrm>
           <a:prstGeom prst="rect">
             <a:avLst/>
@@ -2293,9 +2295,6 @@
               </a:rPr>
               <a:t>Comprar máquina</a:t>
             </a:r>
-            <a:endParaRPr lang="pt-BR" sz="1400" b="0" strike="noStrike" spc="-1" dirty="0">
-              <a:latin typeface="Arial"/>
-            </a:endParaRPr>
           </a:p>
           <a:p>
             <a:pPr marL="343080" indent="-342000">
@@ -2309,14 +2308,13 @@
               <a:buAutoNum type="arabicPeriod"/>
             </a:pPr>
             <a:r>
-              <a:rPr lang="pt-BR" sz="1400" b="0" strike="noStrike" spc="-1" dirty="0">
+              <a:rPr lang="pt-BR" sz="1400" spc="-1" dirty="0">
                 <a:solidFill>
                   <a:srgbClr val="000000"/>
                 </a:solidFill>
                 <a:latin typeface="Calibri"/>
-                <a:ea typeface="DejaVu Sans"/>
-              </a:rPr>
-              <a:t>Solicitar projeto</a:t>
+              </a:rPr>
+              <a:t>Solicitar orçamento</a:t>
             </a:r>
             <a:endParaRPr lang="pt-BR" sz="1400" b="0" strike="noStrike" spc="-1" dirty="0">
               <a:latin typeface="Arial"/>
@@ -2341,7 +2339,53 @@
                 <a:latin typeface="Calibri"/>
                 <a:ea typeface="DejaVu Sans"/>
               </a:rPr>
+              <a:t>Solicitar projeto</a:t>
+            </a:r>
+            <a:endParaRPr lang="pt-BR" sz="1400" b="0" strike="noStrike" spc="-1" dirty="0">
+              <a:latin typeface="Arial"/>
+            </a:endParaRPr>
+          </a:p>
+          <a:p>
+            <a:pPr marL="343080" indent="-342000">
+              <a:lnSpc>
+                <a:spcPct val="100000"/>
+              </a:lnSpc>
+              <a:buClr>
+                <a:srgbClr val="000000"/>
+              </a:buClr>
+              <a:buFont typeface="StarSymbol"/>
+              <a:buAutoNum type="arabicPeriod"/>
+            </a:pPr>
+            <a:r>
+              <a:rPr lang="pt-BR" sz="1400" b="0" strike="noStrike" spc="-1" dirty="0">
+                <a:solidFill>
+                  <a:srgbClr val="000000"/>
+                </a:solidFill>
+                <a:latin typeface="Calibri"/>
+                <a:ea typeface="DejaVu Sans"/>
+              </a:rPr>
               <a:t>Solicitar reparo</a:t>
+            </a:r>
+          </a:p>
+          <a:p>
+            <a:pPr marL="343080" indent="-342000">
+              <a:lnSpc>
+                <a:spcPct val="100000"/>
+              </a:lnSpc>
+              <a:buClr>
+                <a:srgbClr val="000000"/>
+              </a:buClr>
+              <a:buFont typeface="StarSymbol"/>
+              <a:buAutoNum type="arabicPeriod"/>
+            </a:pPr>
+            <a:r>
+              <a:rPr lang="pt-BR" sz="1400" spc="-1" dirty="0">
+                <a:solidFill>
+                  <a:srgbClr val="000000"/>
+                </a:solidFill>
+                <a:latin typeface="Calibri"/>
+              </a:rPr>
+              <a:t>Solicitar consultoria</a:t>
             </a:r>
             <a:endParaRPr lang="pt-BR" sz="1400" b="0" strike="noStrike" spc="-1" dirty="0">
               <a:latin typeface="Arial"/>
@@ -2870,6 +2914,11 @@
         </p:style>
       </p:sp>
     </p:spTree>
+    <p:extLst>
+      <p:ext uri="{BB962C8B-B14F-4D97-AF65-F5344CB8AC3E}">
+        <p14:creationId xmlns:p14="http://schemas.microsoft.com/office/powerpoint/2010/main" val="2309475354"/>
+      </p:ext>
+    </p:extLst>
   </p:cSld>
   <p:clrMapOvr>
     <a:masterClrMapping/>
@@ -2896,7 +2945,7 @@
       </p:grpSpPr>
       <p:sp>
         <p:nvSpPr>
-          <p:cNvPr id="50" name="CustomShape 1"/>
+          <p:cNvPr id="43" name="CustomShape 1"/>
           <p:cNvSpPr/>
           <p:nvPr/>
         </p:nvSpPr>
@@ -2937,7 +2986,7 @@
               </a:lnSpc>
             </a:pPr>
             <a:r>
-              <a:rPr lang="pt-BR" sz="4400" b="0" strike="noStrike" spc="-1">
+              <a:rPr lang="pt-BR" sz="4400" b="0" strike="noStrike" spc="-1" dirty="0">
                 <a:solidFill>
                   <a:srgbClr val="000000"/>
                 </a:solidFill>
@@ -2947,24 +2996,24 @@
               <a:t>Cenário: </a:t>
             </a:r>
             <a:r>
-              <a:rPr lang="pt-BR" sz="2800" b="0" strike="noStrike" spc="-1">
+              <a:rPr lang="pt-BR" sz="2800" b="0" strike="noStrike" spc="-1" dirty="0">
                 <a:solidFill>
                   <a:srgbClr val="000000"/>
                 </a:solidFill>
                 <a:latin typeface="Calibri"/>
                 <a:ea typeface="Microsoft YaHei"/>
               </a:rPr>
-              <a:t>Solicitar projeto </a:t>
-            </a:r>
-            <a:endParaRPr lang="pt-BR" sz="2800" b="0" strike="noStrike" spc="-1">
-              <a:latin typeface="Arial"/>
-            </a:endParaRPr>
-          </a:p>
-        </p:txBody>
-      </p:sp>
-      <p:sp>
-        <p:nvSpPr>
-          <p:cNvPr id="51" name="CustomShape 2"/>
+              <a:t>Solicitar Orçamento</a:t>
+            </a:r>
+            <a:endParaRPr lang="pt-BR" sz="2800" b="0" strike="noStrike" spc="-1" dirty="0">
+              <a:latin typeface="Arial"/>
+            </a:endParaRPr>
+          </a:p>
+        </p:txBody>
+      </p:sp>
+      <p:sp>
+        <p:nvSpPr>
+          <p:cNvPr id="44" name="CustomShape 2"/>
           <p:cNvSpPr/>
           <p:nvPr/>
         </p:nvSpPr>
@@ -3059,14 +3108,14 @@
       </p:sp>
       <p:sp>
         <p:nvSpPr>
-          <p:cNvPr id="52" name="CustomShape 3"/>
+          <p:cNvPr id="45" name="CustomShape 3"/>
           <p:cNvSpPr/>
           <p:nvPr/>
         </p:nvSpPr>
         <p:spPr>
           <a:xfrm>
             <a:off x="6318000" y="3551760"/>
-            <a:ext cx="1097280" cy="1020240"/>
+            <a:ext cx="1097280" cy="839520"/>
           </a:xfrm>
           <a:prstGeom prst="roundRect">
             <a:avLst>
@@ -3109,8 +3158,9 @@
                   <a:srgbClr val="FFFFFF"/>
                 </a:solidFill>
                 <a:latin typeface="Calibri"/>
-              </a:rPr>
-              <a:t>Criar Solicitação de Projeto</a:t>
+                <a:ea typeface="DejaVu Sans"/>
+              </a:rPr>
+              <a:t>Elaborar orçamento </a:t>
             </a:r>
             <a:endParaRPr lang="pt-BR" sz="1200" b="0" strike="noStrike" spc="-1" dirty="0">
               <a:latin typeface="Arial"/>
@@ -3120,7 +3170,7 @@
       </p:sp>
       <p:sp>
         <p:nvSpPr>
-          <p:cNvPr id="53" name="CustomShape 4"/>
+          <p:cNvPr id="46" name="CustomShape 4"/>
           <p:cNvSpPr/>
           <p:nvPr/>
         </p:nvSpPr>
@@ -3183,7 +3233,7 @@
       </p:sp>
       <p:sp>
         <p:nvSpPr>
-          <p:cNvPr id="54" name="CustomShape 5"/>
+          <p:cNvPr id="47" name="CustomShape 5"/>
           <p:cNvSpPr/>
           <p:nvPr/>
         </p:nvSpPr>
@@ -3220,7 +3270,7 @@
       </p:sp>
       <p:sp>
         <p:nvSpPr>
-          <p:cNvPr id="55" name="CustomShape 6"/>
+          <p:cNvPr id="48" name="CustomShape 6"/>
           <p:cNvSpPr/>
           <p:nvPr/>
         </p:nvSpPr>
@@ -3283,7 +3333,7 @@
       </p:sp>
       <p:sp>
         <p:nvSpPr>
-          <p:cNvPr id="56" name="Line 7"/>
+          <p:cNvPr id="49" name="Line 7"/>
           <p:cNvSpPr/>
           <p:nvPr/>
         </p:nvSpPr>
@@ -3342,7 +3392,7 @@
       </p:grpSpPr>
       <p:sp>
         <p:nvSpPr>
-          <p:cNvPr id="57" name="CustomShape 1"/>
+          <p:cNvPr id="50" name="CustomShape 1"/>
           <p:cNvSpPr/>
           <p:nvPr/>
         </p:nvSpPr>
@@ -3400,7 +3450,7 @@
                 <a:latin typeface="Calibri"/>
                 <a:ea typeface="Microsoft YaHei"/>
               </a:rPr>
-              <a:t>Solicitar reparo</a:t>
+              <a:t>Solicitar projeto </a:t>
             </a:r>
             <a:endParaRPr lang="pt-BR" sz="2800" b="0" strike="noStrike" spc="-1">
               <a:latin typeface="Arial"/>
@@ -3410,7 +3460,7 @@
       </p:sp>
       <p:sp>
         <p:nvSpPr>
-          <p:cNvPr id="58" name="CustomShape 2"/>
+          <p:cNvPr id="51" name="CustomShape 2"/>
           <p:cNvSpPr/>
           <p:nvPr/>
         </p:nvSpPr>
@@ -3505,14 +3555,14 @@
       </p:sp>
       <p:sp>
         <p:nvSpPr>
-          <p:cNvPr id="59" name="CustomShape 3"/>
+          <p:cNvPr id="52" name="CustomShape 3"/>
           <p:cNvSpPr/>
           <p:nvPr/>
         </p:nvSpPr>
         <p:spPr>
           <a:xfrm>
             <a:off x="6318000" y="3551760"/>
-            <a:ext cx="1097280" cy="839520"/>
+            <a:ext cx="1097280" cy="1020240"/>
           </a:xfrm>
           <a:prstGeom prst="roundRect">
             <a:avLst>
@@ -3556,7 +3606,7 @@
                 </a:solidFill>
                 <a:latin typeface="Calibri"/>
               </a:rPr>
-              <a:t>Criar solicitação de manutenção</a:t>
+              <a:t>Criar Solicitação de Projeto</a:t>
             </a:r>
             <a:endParaRPr lang="pt-BR" sz="1200" b="0" strike="noStrike" spc="-1" dirty="0">
               <a:latin typeface="Arial"/>
@@ -3566,7 +3616,7 @@
       </p:sp>
       <p:sp>
         <p:nvSpPr>
-          <p:cNvPr id="60" name="CustomShape 4"/>
+          <p:cNvPr id="53" name="CustomShape 4"/>
           <p:cNvSpPr/>
           <p:nvPr/>
         </p:nvSpPr>
@@ -3629,7 +3679,7 @@
       </p:sp>
       <p:sp>
         <p:nvSpPr>
-          <p:cNvPr id="61" name="CustomShape 5"/>
+          <p:cNvPr id="54" name="CustomShape 5"/>
           <p:cNvSpPr/>
           <p:nvPr/>
         </p:nvSpPr>
@@ -3666,7 +3716,7 @@
       </p:sp>
       <p:sp>
         <p:nvSpPr>
-          <p:cNvPr id="62" name="CustomShape 6"/>
+          <p:cNvPr id="55" name="CustomShape 6"/>
           <p:cNvSpPr/>
           <p:nvPr/>
         </p:nvSpPr>
@@ -3729,7 +3779,7 @@
       </p:sp>
       <p:sp>
         <p:nvSpPr>
-          <p:cNvPr id="63" name="Line 7"/>
+          <p:cNvPr id="56" name="Line 7"/>
           <p:cNvSpPr/>
           <p:nvPr/>
         </p:nvSpPr>
@@ -3762,6 +3812,902 @@
         </p:style>
       </p:sp>
     </p:spTree>
+  </p:cSld>
+  <p:clrMapOvr>
+    <a:masterClrMapping/>
+  </p:clrMapOvr>
+</p:sld>
+</file>
+
+<file path=ppt/slides/slide5.xml><?xml version="1.0" encoding="utf-8"?>
+<p:sld xmlns:a="http://schemas.openxmlformats.org/drawingml/2006/main" xmlns:r="http://schemas.openxmlformats.org/officeDocument/2006/relationships" xmlns:p="http://schemas.openxmlformats.org/presentationml/2006/main">
+  <p:cSld>
+    <p:spTree>
+      <p:nvGrpSpPr>
+        <p:cNvPr id="1" name=""/>
+        <p:cNvGrpSpPr/>
+        <p:nvPr/>
+      </p:nvGrpSpPr>
+      <p:grpSpPr>
+        <a:xfrm>
+          <a:off x="0" y="0"/>
+          <a:ext cx="0" cy="0"/>
+          <a:chOff x="0" y="0"/>
+          <a:chExt cx="0" cy="0"/>
+        </a:xfrm>
+      </p:grpSpPr>
+      <p:sp>
+        <p:nvSpPr>
+          <p:cNvPr id="57" name="CustomShape 1"/>
+          <p:cNvSpPr/>
+          <p:nvPr/>
+        </p:nvSpPr>
+        <p:spPr>
+          <a:xfrm>
+            <a:off x="692640" y="301680"/>
+            <a:ext cx="8692920" cy="1094760"/>
+          </a:xfrm>
+          <a:prstGeom prst="rect">
+            <a:avLst/>
+          </a:prstGeom>
+          <a:noFill/>
+          <a:ln>
+            <a:noFill/>
+          </a:ln>
+        </p:spPr>
+        <p:style>
+          <a:lnRef idx="0">
+            <a:scrgbClr r="0" g="0" b="0"/>
+          </a:lnRef>
+          <a:fillRef idx="0">
+            <a:scrgbClr r="0" g="0" b="0"/>
+          </a:fillRef>
+          <a:effectRef idx="0">
+            <a:scrgbClr r="0" g="0" b="0"/>
+          </a:effectRef>
+          <a:fontRef idx="minor"/>
+        </p:style>
+        <p:txBody>
+          <a:bodyPr lIns="90000" tIns="45000" rIns="90000" bIns="45000" anchor="ctr">
+            <a:noAutofit/>
+          </a:bodyPr>
+          <a:lstStyle/>
+          <a:p>
+            <a:pPr>
+              <a:lnSpc>
+                <a:spcPct val="90000"/>
+              </a:lnSpc>
+            </a:pPr>
+            <a:r>
+              <a:rPr lang="pt-BR" sz="4400" b="0" strike="noStrike" spc="-1">
+                <a:solidFill>
+                  <a:srgbClr val="000000"/>
+                </a:solidFill>
+                <a:latin typeface="Calibri Light"/>
+                <a:ea typeface="Microsoft YaHei"/>
+              </a:rPr>
+              <a:t>Cenário: </a:t>
+            </a:r>
+            <a:r>
+              <a:rPr lang="pt-BR" sz="2800" b="0" strike="noStrike" spc="-1">
+                <a:solidFill>
+                  <a:srgbClr val="000000"/>
+                </a:solidFill>
+                <a:latin typeface="Calibri"/>
+                <a:ea typeface="Microsoft YaHei"/>
+              </a:rPr>
+              <a:t>Solicitar reparo</a:t>
+            </a:r>
+            <a:endParaRPr lang="pt-BR" sz="2800" b="0" strike="noStrike" spc="-1">
+              <a:latin typeface="Arial"/>
+            </a:endParaRPr>
+          </a:p>
+        </p:txBody>
+      </p:sp>
+      <p:sp>
+        <p:nvSpPr>
+          <p:cNvPr id="58" name="CustomShape 2"/>
+          <p:cNvSpPr/>
+          <p:nvPr/>
+        </p:nvSpPr>
+        <p:spPr>
+          <a:xfrm>
+            <a:off x="6231600" y="2637000"/>
+            <a:ext cx="1344600" cy="482040"/>
+          </a:xfrm>
+          <a:prstGeom prst="cube">
+            <a:avLst>
+              <a:gd name="adj" fmla="val 25000"/>
+            </a:avLst>
+          </a:prstGeom>
+          <a:solidFill>
+            <a:srgbClr val="FFC000"/>
+          </a:solidFill>
+          <a:ln w="12600">
+            <a:solidFill>
+              <a:srgbClr val="4472C4"/>
+            </a:solidFill>
+            <a:miter/>
+          </a:ln>
+        </p:spPr>
+        <p:style>
+          <a:lnRef idx="0">
+            <a:scrgbClr r="0" g="0" b="0"/>
+          </a:lnRef>
+          <a:fillRef idx="0">
+            <a:scrgbClr r="0" g="0" b="0"/>
+          </a:fillRef>
+          <a:effectRef idx="0">
+            <a:scrgbClr r="0" g="0" b="0"/>
+          </a:effectRef>
+          <a:fontRef idx="minor"/>
+        </p:style>
+        <p:txBody>
+          <a:bodyPr lIns="90000" tIns="45000" rIns="90000" bIns="45000">
+            <a:noAutofit/>
+          </a:bodyPr>
+          <a:lstStyle/>
+          <a:p>
+            <a:pPr algn="ctr">
+              <a:lnSpc>
+                <a:spcPct val="100000"/>
+              </a:lnSpc>
+            </a:pPr>
+            <a:r>
+              <a:rPr lang="pt-BR" sz="1000" b="0" strike="noStrike" spc="-1">
+                <a:solidFill>
+                  <a:srgbClr val="000000"/>
+                </a:solidFill>
+                <a:latin typeface="Calibri"/>
+                <a:ea typeface="DejaVu Sans"/>
+              </a:rPr>
+              <a:t>Comercial</a:t>
+            </a:r>
+            <a:endParaRPr lang="pt-BR" sz="1000" b="0" strike="noStrike" spc="-1">
+              <a:latin typeface="Arial"/>
+            </a:endParaRPr>
+          </a:p>
+          <a:p>
+            <a:pPr algn="ctr">
+              <a:lnSpc>
+                <a:spcPct val="100000"/>
+              </a:lnSpc>
+            </a:pPr>
+            <a:r>
+              <a:rPr lang="pt-BR" sz="1000" b="1" strike="noStrike" spc="-1">
+                <a:solidFill>
+                  <a:srgbClr val="000000"/>
+                </a:solidFill>
+                <a:latin typeface="Calibri"/>
+                <a:ea typeface="DejaVu Sans"/>
+              </a:rPr>
+              <a:t>(Nó Operacional)</a:t>
+            </a:r>
+            <a:endParaRPr lang="pt-BR" sz="1000" b="0" strike="noStrike" spc="-1">
+              <a:latin typeface="Arial"/>
+            </a:endParaRPr>
+          </a:p>
+          <a:p>
+            <a:pPr>
+              <a:lnSpc>
+                <a:spcPct val="100000"/>
+              </a:lnSpc>
+            </a:pPr>
+            <a:endParaRPr lang="pt-BR" sz="1000" b="0" strike="noStrike" spc="-1">
+              <a:latin typeface="Arial"/>
+            </a:endParaRPr>
+          </a:p>
+        </p:txBody>
+      </p:sp>
+      <p:sp>
+        <p:nvSpPr>
+          <p:cNvPr id="59" name="CustomShape 3"/>
+          <p:cNvSpPr/>
+          <p:nvPr/>
+        </p:nvSpPr>
+        <p:spPr>
+          <a:xfrm>
+            <a:off x="6318000" y="3551760"/>
+            <a:ext cx="1097280" cy="839520"/>
+          </a:xfrm>
+          <a:prstGeom prst="roundRect">
+            <a:avLst>
+              <a:gd name="adj" fmla="val 16667"/>
+            </a:avLst>
+          </a:prstGeom>
+          <a:solidFill>
+            <a:srgbClr val="70AD47"/>
+          </a:solidFill>
+          <a:ln>
+            <a:noFill/>
+          </a:ln>
+        </p:spPr>
+        <p:style>
+          <a:lnRef idx="0">
+            <a:scrgbClr r="0" g="0" b="0"/>
+          </a:lnRef>
+          <a:fillRef idx="0">
+            <a:scrgbClr r="0" g="0" b="0"/>
+          </a:fillRef>
+          <a:effectRef idx="0">
+            <a:scrgbClr r="0" g="0" b="0"/>
+          </a:effectRef>
+          <a:fontRef idx="minor"/>
+        </p:style>
+        <p:txBody>
+          <a:bodyPr lIns="90000" tIns="45000" rIns="90000" bIns="45000" anchor="ctr">
+            <a:noAutofit/>
+          </a:bodyPr>
+          <a:lstStyle/>
+          <a:p>
+            <a:pPr algn="ctr">
+              <a:lnSpc>
+                <a:spcPct val="100000"/>
+              </a:lnSpc>
+            </a:pPr>
+            <a:r>
+              <a:rPr lang="pt-BR" sz="1200" b="1" spc="-1" dirty="0">
+                <a:solidFill>
+                  <a:srgbClr val="FFFFFF"/>
+                </a:solidFill>
+                <a:latin typeface="Calibri"/>
+              </a:rPr>
+              <a:t>Criar solicitação de manutenção</a:t>
+            </a:r>
+            <a:endParaRPr lang="pt-BR" sz="1200" b="0" strike="noStrike" spc="-1" dirty="0">
+              <a:latin typeface="Arial"/>
+            </a:endParaRPr>
+          </a:p>
+        </p:txBody>
+      </p:sp>
+      <p:sp>
+        <p:nvSpPr>
+          <p:cNvPr id="60" name="CustomShape 4"/>
+          <p:cNvSpPr/>
+          <p:nvPr/>
+        </p:nvSpPr>
+        <p:spPr>
+          <a:xfrm>
+            <a:off x="1682280" y="2561040"/>
+            <a:ext cx="1103760" cy="754920"/>
+          </a:xfrm>
+          <a:prstGeom prst="rect">
+            <a:avLst/>
+          </a:prstGeom>
+          <a:solidFill>
+            <a:srgbClr val="4472C4"/>
+          </a:solidFill>
+          <a:ln w="12600">
+            <a:solidFill>
+              <a:srgbClr val="325490"/>
+            </a:solidFill>
+            <a:miter/>
+          </a:ln>
+        </p:spPr>
+        <p:style>
+          <a:lnRef idx="0">
+            <a:scrgbClr r="0" g="0" b="0"/>
+          </a:lnRef>
+          <a:fillRef idx="0">
+            <a:scrgbClr r="0" g="0" b="0"/>
+          </a:fillRef>
+          <a:effectRef idx="0">
+            <a:scrgbClr r="0" g="0" b="0"/>
+          </a:effectRef>
+          <a:fontRef idx="minor"/>
+        </p:style>
+        <p:txBody>
+          <a:bodyPr lIns="90000" tIns="45000" rIns="90000" bIns="45000" anchor="ctr">
+            <a:noAutofit/>
+          </a:bodyPr>
+          <a:lstStyle/>
+          <a:p>
+            <a:pPr algn="ctr">
+              <a:lnSpc>
+                <a:spcPct val="100000"/>
+              </a:lnSpc>
+            </a:pPr>
+            <a:r>
+              <a:rPr lang="pt-BR" sz="1800" b="0" strike="noStrike" spc="-1">
+                <a:solidFill>
+                  <a:srgbClr val="FFFFFF"/>
+                </a:solidFill>
+                <a:latin typeface="Calibri"/>
+                <a:ea typeface="DejaVu Sans"/>
+              </a:rPr>
+              <a:t>Cliente</a:t>
+            </a:r>
+            <a:endParaRPr lang="pt-BR" sz="1800" b="0" strike="noStrike" spc="-1">
+              <a:latin typeface="Arial"/>
+            </a:endParaRPr>
+          </a:p>
+        </p:txBody>
+      </p:sp>
+      <p:sp>
+        <p:nvSpPr>
+          <p:cNvPr id="61" name="CustomShape 5"/>
+          <p:cNvSpPr/>
+          <p:nvPr/>
+        </p:nvSpPr>
+        <p:spPr>
+          <a:xfrm>
+            <a:off x="2787120" y="2939040"/>
+            <a:ext cx="3443400" cy="9360"/>
+          </a:xfrm>
+          <a:prstGeom prst="curvedConnector3">
+            <a:avLst>
+              <a:gd name="adj1" fmla="val 50000"/>
+            </a:avLst>
+          </a:prstGeom>
+          <a:noFill/>
+          <a:ln w="6480">
+            <a:solidFill>
+              <a:srgbClr val="4472C4"/>
+            </a:solidFill>
+            <a:miter/>
+          </a:ln>
+        </p:spPr>
+        <p:style>
+          <a:lnRef idx="0">
+            <a:scrgbClr r="0" g="0" b="0"/>
+          </a:lnRef>
+          <a:fillRef idx="0">
+            <a:scrgbClr r="0" g="0" b="0"/>
+          </a:fillRef>
+          <a:effectRef idx="0">
+            <a:scrgbClr r="0" g="0" b="0"/>
+          </a:effectRef>
+          <a:fontRef idx="minor"/>
+        </p:style>
+      </p:sp>
+      <p:sp>
+        <p:nvSpPr>
+          <p:cNvPr id="62" name="CustomShape 6"/>
+          <p:cNvSpPr/>
+          <p:nvPr/>
+        </p:nvSpPr>
+        <p:spPr>
+          <a:xfrm>
+            <a:off x="5412240" y="1584000"/>
+            <a:ext cx="3011040" cy="3095280"/>
+          </a:xfrm>
+          <a:prstGeom prst="roundRect">
+            <a:avLst>
+              <a:gd name="adj" fmla="val 16667"/>
+            </a:avLst>
+          </a:prstGeom>
+          <a:noFill/>
+          <a:ln w="12600">
+            <a:solidFill>
+              <a:srgbClr val="325490"/>
+            </a:solidFill>
+            <a:miter/>
+          </a:ln>
+        </p:spPr>
+        <p:style>
+          <a:lnRef idx="0">
+            <a:scrgbClr r="0" g="0" b="0"/>
+          </a:lnRef>
+          <a:fillRef idx="0">
+            <a:scrgbClr r="0" g="0" b="0"/>
+          </a:fillRef>
+          <a:effectRef idx="0">
+            <a:scrgbClr r="0" g="0" b="0"/>
+          </a:effectRef>
+          <a:fontRef idx="minor"/>
+        </p:style>
+        <p:txBody>
+          <a:bodyPr lIns="90000" tIns="45000" rIns="90000" bIns="45000">
+            <a:noAutofit/>
+          </a:bodyPr>
+          <a:lstStyle/>
+          <a:p>
+            <a:pPr algn="ctr">
+              <a:lnSpc>
+                <a:spcPct val="100000"/>
+              </a:lnSpc>
+            </a:pPr>
+            <a:r>
+              <a:rPr lang="pt-BR" sz="1800" b="0" strike="noStrike" spc="-1">
+                <a:solidFill>
+                  <a:srgbClr val="000000"/>
+                </a:solidFill>
+                <a:latin typeface="Calibri"/>
+                <a:ea typeface="DejaVu Sans"/>
+              </a:rPr>
+              <a:t>Loja de computador</a:t>
+            </a:r>
+            <a:endParaRPr lang="pt-BR" sz="1800" b="0" strike="noStrike" spc="-1">
+              <a:latin typeface="Arial"/>
+            </a:endParaRPr>
+          </a:p>
+        </p:txBody>
+      </p:sp>
+      <p:sp>
+        <p:nvSpPr>
+          <p:cNvPr id="63" name="Line 7"/>
+          <p:cNvSpPr/>
+          <p:nvPr/>
+        </p:nvSpPr>
+        <p:spPr>
+          <a:xfrm>
+            <a:off x="6843600" y="3120120"/>
+            <a:ext cx="2520" cy="432000"/>
+          </a:xfrm>
+          <a:prstGeom prst="line">
+            <a:avLst/>
+          </a:prstGeom>
+          <a:ln w="6480">
+            <a:solidFill>
+              <a:srgbClr val="4472C4"/>
+            </a:solidFill>
+            <a:miter/>
+          </a:ln>
+        </p:spPr>
+        <p:style>
+          <a:lnRef idx="0">
+            <a:scrgbClr r="0" g="0" b="0"/>
+          </a:lnRef>
+          <a:fillRef idx="0">
+            <a:scrgbClr r="0" g="0" b="0"/>
+          </a:fillRef>
+          <a:effectRef idx="0">
+            <a:scrgbClr r="0" g="0" b="0"/>
+          </a:effectRef>
+          <a:fontRef idx="minor"/>
+        </p:style>
+      </p:sp>
+    </p:spTree>
+  </p:cSld>
+  <p:clrMapOvr>
+    <a:masterClrMapping/>
+  </p:clrMapOvr>
+</p:sld>
+</file>
+
+<file path=ppt/slides/slide6.xml><?xml version="1.0" encoding="utf-8"?>
+<p:sld xmlns:a="http://schemas.openxmlformats.org/drawingml/2006/main" xmlns:r="http://schemas.openxmlformats.org/officeDocument/2006/relationships" xmlns:p="http://schemas.openxmlformats.org/presentationml/2006/main">
+  <p:cSld>
+    <p:spTree>
+      <p:nvGrpSpPr>
+        <p:cNvPr id="1" name=""/>
+        <p:cNvGrpSpPr/>
+        <p:nvPr/>
+      </p:nvGrpSpPr>
+      <p:grpSpPr>
+        <a:xfrm>
+          <a:off x="0" y="0"/>
+          <a:ext cx="0" cy="0"/>
+          <a:chOff x="0" y="0"/>
+          <a:chExt cx="0" cy="0"/>
+        </a:xfrm>
+      </p:grpSpPr>
+      <p:sp>
+        <p:nvSpPr>
+          <p:cNvPr id="57" name="CustomShape 1"/>
+          <p:cNvSpPr/>
+          <p:nvPr/>
+        </p:nvSpPr>
+        <p:spPr>
+          <a:xfrm>
+            <a:off x="692640" y="301680"/>
+            <a:ext cx="8692920" cy="1094760"/>
+          </a:xfrm>
+          <a:prstGeom prst="rect">
+            <a:avLst/>
+          </a:prstGeom>
+          <a:noFill/>
+          <a:ln>
+            <a:noFill/>
+          </a:ln>
+        </p:spPr>
+        <p:style>
+          <a:lnRef idx="0">
+            <a:scrgbClr r="0" g="0" b="0"/>
+          </a:lnRef>
+          <a:fillRef idx="0">
+            <a:scrgbClr r="0" g="0" b="0"/>
+          </a:fillRef>
+          <a:effectRef idx="0">
+            <a:scrgbClr r="0" g="0" b="0"/>
+          </a:effectRef>
+          <a:fontRef idx="minor"/>
+        </p:style>
+        <p:txBody>
+          <a:bodyPr lIns="90000" tIns="45000" rIns="90000" bIns="45000" anchor="ctr">
+            <a:noAutofit/>
+          </a:bodyPr>
+          <a:lstStyle/>
+          <a:p>
+            <a:pPr>
+              <a:lnSpc>
+                <a:spcPct val="90000"/>
+              </a:lnSpc>
+            </a:pPr>
+            <a:r>
+              <a:rPr lang="pt-BR" sz="4400" b="0" strike="noStrike" spc="-1" dirty="0">
+                <a:solidFill>
+                  <a:srgbClr val="000000"/>
+                </a:solidFill>
+                <a:latin typeface="Calibri Light"/>
+                <a:ea typeface="Microsoft YaHei"/>
+              </a:rPr>
+              <a:t>Cenário: </a:t>
+            </a:r>
+            <a:r>
+              <a:rPr lang="pt-BR" sz="2800" spc="-1" dirty="0">
+                <a:solidFill>
+                  <a:srgbClr val="000000"/>
+                </a:solidFill>
+                <a:latin typeface="Calibri"/>
+              </a:rPr>
+              <a:t>Solicitar consultoria</a:t>
+            </a:r>
+            <a:endParaRPr lang="pt-BR" sz="2800" b="0" strike="noStrike" spc="-1" dirty="0">
+              <a:latin typeface="Arial"/>
+            </a:endParaRPr>
+          </a:p>
+        </p:txBody>
+      </p:sp>
+      <p:sp>
+        <p:nvSpPr>
+          <p:cNvPr id="58" name="CustomShape 2"/>
+          <p:cNvSpPr/>
+          <p:nvPr/>
+        </p:nvSpPr>
+        <p:spPr>
+          <a:xfrm>
+            <a:off x="6231600" y="2637000"/>
+            <a:ext cx="1344600" cy="482040"/>
+          </a:xfrm>
+          <a:prstGeom prst="cube">
+            <a:avLst>
+              <a:gd name="adj" fmla="val 25000"/>
+            </a:avLst>
+          </a:prstGeom>
+          <a:solidFill>
+            <a:srgbClr val="FFC000"/>
+          </a:solidFill>
+          <a:ln w="12600">
+            <a:solidFill>
+              <a:srgbClr val="4472C4"/>
+            </a:solidFill>
+            <a:miter/>
+          </a:ln>
+        </p:spPr>
+        <p:style>
+          <a:lnRef idx="0">
+            <a:scrgbClr r="0" g="0" b="0"/>
+          </a:lnRef>
+          <a:fillRef idx="0">
+            <a:scrgbClr r="0" g="0" b="0"/>
+          </a:fillRef>
+          <a:effectRef idx="0">
+            <a:scrgbClr r="0" g="0" b="0"/>
+          </a:effectRef>
+          <a:fontRef idx="minor"/>
+        </p:style>
+        <p:txBody>
+          <a:bodyPr lIns="90000" tIns="45000" rIns="90000" bIns="45000">
+            <a:noAutofit/>
+          </a:bodyPr>
+          <a:lstStyle/>
+          <a:p>
+            <a:pPr algn="ctr">
+              <a:lnSpc>
+                <a:spcPct val="100000"/>
+              </a:lnSpc>
+            </a:pPr>
+            <a:r>
+              <a:rPr lang="pt-BR" sz="1000" b="0" strike="noStrike" spc="-1">
+                <a:solidFill>
+                  <a:srgbClr val="000000"/>
+                </a:solidFill>
+                <a:latin typeface="Calibri"/>
+                <a:ea typeface="DejaVu Sans"/>
+              </a:rPr>
+              <a:t>Comercial</a:t>
+            </a:r>
+            <a:endParaRPr lang="pt-BR" sz="1000" b="0" strike="noStrike" spc="-1">
+              <a:latin typeface="Arial"/>
+            </a:endParaRPr>
+          </a:p>
+          <a:p>
+            <a:pPr algn="ctr">
+              <a:lnSpc>
+                <a:spcPct val="100000"/>
+              </a:lnSpc>
+            </a:pPr>
+            <a:r>
+              <a:rPr lang="pt-BR" sz="1000" b="1" strike="noStrike" spc="-1">
+                <a:solidFill>
+                  <a:srgbClr val="000000"/>
+                </a:solidFill>
+                <a:latin typeface="Calibri"/>
+                <a:ea typeface="DejaVu Sans"/>
+              </a:rPr>
+              <a:t>(Nó Operacional)</a:t>
+            </a:r>
+            <a:endParaRPr lang="pt-BR" sz="1000" b="0" strike="noStrike" spc="-1">
+              <a:latin typeface="Arial"/>
+            </a:endParaRPr>
+          </a:p>
+          <a:p>
+            <a:pPr>
+              <a:lnSpc>
+                <a:spcPct val="100000"/>
+              </a:lnSpc>
+            </a:pPr>
+            <a:endParaRPr lang="pt-BR" sz="1000" b="0" strike="noStrike" spc="-1">
+              <a:latin typeface="Arial"/>
+            </a:endParaRPr>
+          </a:p>
+        </p:txBody>
+      </p:sp>
+      <p:sp>
+        <p:nvSpPr>
+          <p:cNvPr id="59" name="CustomShape 3"/>
+          <p:cNvSpPr/>
+          <p:nvPr/>
+        </p:nvSpPr>
+        <p:spPr>
+          <a:xfrm>
+            <a:off x="6318000" y="3551760"/>
+            <a:ext cx="1097280" cy="839520"/>
+          </a:xfrm>
+          <a:prstGeom prst="roundRect">
+            <a:avLst>
+              <a:gd name="adj" fmla="val 16667"/>
+            </a:avLst>
+          </a:prstGeom>
+          <a:solidFill>
+            <a:srgbClr val="70AD47"/>
+          </a:solidFill>
+          <a:ln>
+            <a:noFill/>
+          </a:ln>
+        </p:spPr>
+        <p:style>
+          <a:lnRef idx="0">
+            <a:scrgbClr r="0" g="0" b="0"/>
+          </a:lnRef>
+          <a:fillRef idx="0">
+            <a:scrgbClr r="0" g="0" b="0"/>
+          </a:fillRef>
+          <a:effectRef idx="0">
+            <a:scrgbClr r="0" g="0" b="0"/>
+          </a:effectRef>
+          <a:fontRef idx="minor"/>
+        </p:style>
+        <p:txBody>
+          <a:bodyPr lIns="90000" tIns="45000" rIns="90000" bIns="45000" anchor="ctr">
+            <a:noAutofit/>
+          </a:bodyPr>
+          <a:lstStyle/>
+          <a:p>
+            <a:pPr algn="ctr">
+              <a:lnSpc>
+                <a:spcPct val="100000"/>
+              </a:lnSpc>
+            </a:pPr>
+            <a:r>
+              <a:rPr lang="pt-BR" sz="1200" b="1" spc="-1" dirty="0">
+                <a:solidFill>
+                  <a:srgbClr val="FFFFFF"/>
+                </a:solidFill>
+                <a:latin typeface="Calibri"/>
+              </a:rPr>
+              <a:t>Criar solicitação de consultoria</a:t>
+            </a:r>
+            <a:endParaRPr lang="pt-BR" sz="1200" b="0" strike="noStrike" spc="-1" dirty="0">
+              <a:latin typeface="Arial"/>
+            </a:endParaRPr>
+          </a:p>
+        </p:txBody>
+      </p:sp>
+      <p:sp>
+        <p:nvSpPr>
+          <p:cNvPr id="60" name="CustomShape 4"/>
+          <p:cNvSpPr/>
+          <p:nvPr/>
+        </p:nvSpPr>
+        <p:spPr>
+          <a:xfrm>
+            <a:off x="1682280" y="2561040"/>
+            <a:ext cx="1103760" cy="754920"/>
+          </a:xfrm>
+          <a:prstGeom prst="rect">
+            <a:avLst/>
+          </a:prstGeom>
+          <a:solidFill>
+            <a:srgbClr val="4472C4"/>
+          </a:solidFill>
+          <a:ln w="12600">
+            <a:solidFill>
+              <a:srgbClr val="325490"/>
+            </a:solidFill>
+            <a:miter/>
+          </a:ln>
+        </p:spPr>
+        <p:style>
+          <a:lnRef idx="0">
+            <a:scrgbClr r="0" g="0" b="0"/>
+          </a:lnRef>
+          <a:fillRef idx="0">
+            <a:scrgbClr r="0" g="0" b="0"/>
+          </a:fillRef>
+          <a:effectRef idx="0">
+            <a:scrgbClr r="0" g="0" b="0"/>
+          </a:effectRef>
+          <a:fontRef idx="minor"/>
+        </p:style>
+        <p:txBody>
+          <a:bodyPr lIns="90000" tIns="45000" rIns="90000" bIns="45000" anchor="ctr">
+            <a:noAutofit/>
+          </a:bodyPr>
+          <a:lstStyle/>
+          <a:p>
+            <a:pPr algn="ctr">
+              <a:lnSpc>
+                <a:spcPct val="100000"/>
+              </a:lnSpc>
+            </a:pPr>
+            <a:r>
+              <a:rPr lang="pt-BR" sz="1800" b="0" strike="noStrike" spc="-1">
+                <a:solidFill>
+                  <a:srgbClr val="FFFFFF"/>
+                </a:solidFill>
+                <a:latin typeface="Calibri"/>
+                <a:ea typeface="DejaVu Sans"/>
+              </a:rPr>
+              <a:t>Cliente</a:t>
+            </a:r>
+            <a:endParaRPr lang="pt-BR" sz="1800" b="0" strike="noStrike" spc="-1">
+              <a:latin typeface="Arial"/>
+            </a:endParaRPr>
+          </a:p>
+        </p:txBody>
+      </p:sp>
+      <p:sp>
+        <p:nvSpPr>
+          <p:cNvPr id="61" name="CustomShape 5"/>
+          <p:cNvSpPr/>
+          <p:nvPr/>
+        </p:nvSpPr>
+        <p:spPr>
+          <a:xfrm>
+            <a:off x="2787120" y="2939040"/>
+            <a:ext cx="3443400" cy="9360"/>
+          </a:xfrm>
+          <a:prstGeom prst="curvedConnector3">
+            <a:avLst>
+              <a:gd name="adj1" fmla="val 50000"/>
+            </a:avLst>
+          </a:prstGeom>
+          <a:noFill/>
+          <a:ln w="6480">
+            <a:solidFill>
+              <a:srgbClr val="4472C4"/>
+            </a:solidFill>
+            <a:miter/>
+          </a:ln>
+        </p:spPr>
+        <p:style>
+          <a:lnRef idx="0">
+            <a:scrgbClr r="0" g="0" b="0"/>
+          </a:lnRef>
+          <a:fillRef idx="0">
+            <a:scrgbClr r="0" g="0" b="0"/>
+          </a:fillRef>
+          <a:effectRef idx="0">
+            <a:scrgbClr r="0" g="0" b="0"/>
+          </a:effectRef>
+          <a:fontRef idx="minor"/>
+        </p:style>
+      </p:sp>
+      <p:sp>
+        <p:nvSpPr>
+          <p:cNvPr id="62" name="CustomShape 6"/>
+          <p:cNvSpPr/>
+          <p:nvPr/>
+        </p:nvSpPr>
+        <p:spPr>
+          <a:xfrm>
+            <a:off x="5412240" y="1584000"/>
+            <a:ext cx="3011040" cy="3095280"/>
+          </a:xfrm>
+          <a:prstGeom prst="roundRect">
+            <a:avLst>
+              <a:gd name="adj" fmla="val 16667"/>
+            </a:avLst>
+          </a:prstGeom>
+          <a:noFill/>
+          <a:ln w="12600">
+            <a:solidFill>
+              <a:srgbClr val="325490"/>
+            </a:solidFill>
+            <a:miter/>
+          </a:ln>
+        </p:spPr>
+        <p:style>
+          <a:lnRef idx="0">
+            <a:scrgbClr r="0" g="0" b="0"/>
+          </a:lnRef>
+          <a:fillRef idx="0">
+            <a:scrgbClr r="0" g="0" b="0"/>
+          </a:fillRef>
+          <a:effectRef idx="0">
+            <a:scrgbClr r="0" g="0" b="0"/>
+          </a:effectRef>
+          <a:fontRef idx="minor"/>
+        </p:style>
+        <p:txBody>
+          <a:bodyPr lIns="90000" tIns="45000" rIns="90000" bIns="45000">
+            <a:noAutofit/>
+          </a:bodyPr>
+          <a:lstStyle/>
+          <a:p>
+            <a:pPr algn="ctr">
+              <a:lnSpc>
+                <a:spcPct val="100000"/>
+              </a:lnSpc>
+            </a:pPr>
+            <a:r>
+              <a:rPr lang="pt-BR" sz="1800" b="0" strike="noStrike" spc="-1">
+                <a:solidFill>
+                  <a:srgbClr val="000000"/>
+                </a:solidFill>
+                <a:latin typeface="Calibri"/>
+                <a:ea typeface="DejaVu Sans"/>
+              </a:rPr>
+              <a:t>Loja de computador</a:t>
+            </a:r>
+            <a:endParaRPr lang="pt-BR" sz="1800" b="0" strike="noStrike" spc="-1">
+              <a:latin typeface="Arial"/>
+            </a:endParaRPr>
+          </a:p>
+        </p:txBody>
+      </p:sp>
+      <p:sp>
+        <p:nvSpPr>
+          <p:cNvPr id="63" name="Line 7"/>
+          <p:cNvSpPr/>
+          <p:nvPr/>
+        </p:nvSpPr>
+        <p:spPr>
+          <a:xfrm>
+            <a:off x="6843600" y="3120120"/>
+            <a:ext cx="2520" cy="432000"/>
+          </a:xfrm>
+          <a:prstGeom prst="line">
+            <a:avLst/>
+          </a:prstGeom>
+          <a:ln w="6480">
+            <a:solidFill>
+              <a:srgbClr val="4472C4"/>
+            </a:solidFill>
+            <a:miter/>
+          </a:ln>
+        </p:spPr>
+        <p:style>
+          <a:lnRef idx="0">
+            <a:scrgbClr r="0" g="0" b="0"/>
+          </a:lnRef>
+          <a:fillRef idx="0">
+            <a:scrgbClr r="0" g="0" b="0"/>
+          </a:fillRef>
+          <a:effectRef idx="0">
+            <a:scrgbClr r="0" g="0" b="0"/>
+          </a:effectRef>
+          <a:fontRef idx="minor"/>
+        </p:style>
+      </p:sp>
+    </p:spTree>
+    <p:extLst>
+      <p:ext uri="{BB962C8B-B14F-4D97-AF65-F5344CB8AC3E}">
+        <p14:creationId xmlns:p14="http://schemas.microsoft.com/office/powerpoint/2010/main" val="2262120210"/>
+      </p:ext>
+    </p:extLst>
   </p:cSld>
   <p:clrMapOvr>
     <a:masterClrMapping/>

</xml_diff>

<commit_message>
Artefato 15 e 16 corrigidos falta solicitacao reparo
</commit_message>
<xml_diff>
--- a/Artefatos/15-ArquiteturaDeNegocioParaCadaCenario.pptx
+++ b/Artefatos/15-ArquiteturaDeNegocioParaCadaCenario.pptx
@@ -1,121 +1,23 @@
 
 <file path=ppt/presentation.xml><?xml version="1.0" encoding="utf-8"?>
-<p:presentation xmlns:a="http://schemas.openxmlformats.org/drawingml/2006/main" xmlns:r="http://schemas.openxmlformats.org/officeDocument/2006/relationships" xmlns:p="http://schemas.openxmlformats.org/presentationml/2006/main">
+<p:presentation xmlns:a="http://schemas.openxmlformats.org/drawingml/2006/main" xmlns:p="http://schemas.openxmlformats.org/presentationml/2006/main" xmlns:r="http://schemas.openxmlformats.org/officeDocument/2006/relationships" xmlns:p14="http://schemas.microsoft.com/office/powerpoint/2010/main" xmlns:p15="http://schemas.microsoft.com/office/powerpoint/2012/main" xmlns:mc="http://schemas.openxmlformats.org/markup-compatibility/2006">
   <p:sldMasterIdLst>
-    <p:sldMasterId id="2147483648" r:id="rId1"/>
+    <p:sldMasterId id="2147483648" r:id="rId2"/>
   </p:sldMasterIdLst>
   <p:sldIdLst>
-    <p:sldId id="256" r:id="rId2"/>
-    <p:sldId id="260" r:id="rId3"/>
+    <p:sldId id="256" r:id="rId3"/>
     <p:sldId id="257" r:id="rId4"/>
+    <p:sldId id="258" r:id="rId5"/>
+    <p:sldId id="259" r:id="rId6"/>
+    <p:sldId id="260" r:id="rId7"/>
   </p:sldIdLst>
   <p:sldSz cx="10080625" cy="5670550"/>
-  <p:notesSz cx="7559675" cy="10691813"/>
-  <p:defaultTextStyle>
-    <a:defPPr>
-      <a:defRPr lang="pt-BR"/>
-    </a:defPPr>
-    <a:lvl1pPr marL="0" algn="l" defTabSz="914400" rtl="0" eaLnBrk="1" latinLnBrk="0" hangingPunct="1">
-      <a:defRPr sz="1800" kern="1200">
-        <a:solidFill>
-          <a:schemeClr val="tx1"/>
-        </a:solidFill>
-        <a:latin typeface="+mn-lt"/>
-        <a:ea typeface="+mn-ea"/>
-        <a:cs typeface="+mn-cs"/>
-      </a:defRPr>
-    </a:lvl1pPr>
-    <a:lvl2pPr marL="457200" algn="l" defTabSz="914400" rtl="0" eaLnBrk="1" latinLnBrk="0" hangingPunct="1">
-      <a:defRPr sz="1800" kern="1200">
-        <a:solidFill>
-          <a:schemeClr val="tx1"/>
-        </a:solidFill>
-        <a:latin typeface="+mn-lt"/>
-        <a:ea typeface="+mn-ea"/>
-        <a:cs typeface="+mn-cs"/>
-      </a:defRPr>
-    </a:lvl2pPr>
-    <a:lvl3pPr marL="914400" algn="l" defTabSz="914400" rtl="0" eaLnBrk="1" latinLnBrk="0" hangingPunct="1">
-      <a:defRPr sz="1800" kern="1200">
-        <a:solidFill>
-          <a:schemeClr val="tx1"/>
-        </a:solidFill>
-        <a:latin typeface="+mn-lt"/>
-        <a:ea typeface="+mn-ea"/>
-        <a:cs typeface="+mn-cs"/>
-      </a:defRPr>
-    </a:lvl3pPr>
-    <a:lvl4pPr marL="1371600" algn="l" defTabSz="914400" rtl="0" eaLnBrk="1" latinLnBrk="0" hangingPunct="1">
-      <a:defRPr sz="1800" kern="1200">
-        <a:solidFill>
-          <a:schemeClr val="tx1"/>
-        </a:solidFill>
-        <a:latin typeface="+mn-lt"/>
-        <a:ea typeface="+mn-ea"/>
-        <a:cs typeface="+mn-cs"/>
-      </a:defRPr>
-    </a:lvl4pPr>
-    <a:lvl5pPr marL="1828800" algn="l" defTabSz="914400" rtl="0" eaLnBrk="1" latinLnBrk="0" hangingPunct="1">
-      <a:defRPr sz="1800" kern="1200">
-        <a:solidFill>
-          <a:schemeClr val="tx1"/>
-        </a:solidFill>
-        <a:latin typeface="+mn-lt"/>
-        <a:ea typeface="+mn-ea"/>
-        <a:cs typeface="+mn-cs"/>
-      </a:defRPr>
-    </a:lvl5pPr>
-    <a:lvl6pPr marL="2286000" algn="l" defTabSz="914400" rtl="0" eaLnBrk="1" latinLnBrk="0" hangingPunct="1">
-      <a:defRPr sz="1800" kern="1200">
-        <a:solidFill>
-          <a:schemeClr val="tx1"/>
-        </a:solidFill>
-        <a:latin typeface="+mn-lt"/>
-        <a:ea typeface="+mn-ea"/>
-        <a:cs typeface="+mn-cs"/>
-      </a:defRPr>
-    </a:lvl6pPr>
-    <a:lvl7pPr marL="2743200" algn="l" defTabSz="914400" rtl="0" eaLnBrk="1" latinLnBrk="0" hangingPunct="1">
-      <a:defRPr sz="1800" kern="1200">
-        <a:solidFill>
-          <a:schemeClr val="tx1"/>
-        </a:solidFill>
-        <a:latin typeface="+mn-lt"/>
-        <a:ea typeface="+mn-ea"/>
-        <a:cs typeface="+mn-cs"/>
-      </a:defRPr>
-    </a:lvl7pPr>
-    <a:lvl8pPr marL="3200400" algn="l" defTabSz="914400" rtl="0" eaLnBrk="1" latinLnBrk="0" hangingPunct="1">
-      <a:defRPr sz="1800" kern="1200">
-        <a:solidFill>
-          <a:schemeClr val="tx1"/>
-        </a:solidFill>
-        <a:latin typeface="+mn-lt"/>
-        <a:ea typeface="+mn-ea"/>
-        <a:cs typeface="+mn-cs"/>
-      </a:defRPr>
-    </a:lvl8pPr>
-    <a:lvl9pPr marL="3657600" algn="l" defTabSz="914400" rtl="0" eaLnBrk="1" latinLnBrk="0" hangingPunct="1">
-      <a:defRPr sz="1800" kern="1200">
-        <a:solidFill>
-          <a:schemeClr val="tx1"/>
-        </a:solidFill>
-        <a:latin typeface="+mn-lt"/>
-        <a:ea typeface="+mn-ea"/>
-        <a:cs typeface="+mn-cs"/>
-      </a:defRPr>
-    </a:lvl9pPr>
-  </p:defaultTextStyle>
-  <p:extLst>
-    <p:ext uri="{EFAFB233-063F-42B5-8137-9DF3F51BA10A}">
-      <p15:sldGuideLst xmlns:p15="http://schemas.microsoft.com/office/powerpoint/2012/main"/>
-    </p:ext>
-  </p:extLst>
+  <p:notesSz cx="7559675" cy="10691812"/>
 </p:presentation>
 </file>
 
 <file path=ppt/slideLayouts/slideLayout1.xml><?xml version="1.0" encoding="utf-8"?>
-<p:sldLayout xmlns:a="http://schemas.openxmlformats.org/drawingml/2006/main" xmlns:r="http://schemas.openxmlformats.org/officeDocument/2006/relationships" xmlns:p="http://schemas.openxmlformats.org/presentationml/2006/main" type="blank" preserve="1">
+<p:sldLayout xmlns:a="http://schemas.openxmlformats.org/drawingml/2006/main" xmlns:p="http://schemas.openxmlformats.org/presentationml/2006/main" xmlns:r="http://schemas.openxmlformats.org/officeDocument/2006/relationships" xmlns:p14="http://schemas.microsoft.com/office/powerpoint/2010/main" xmlns:p15="http://schemas.microsoft.com/office/powerpoint/2012/main" xmlns:mc="http://schemas.openxmlformats.org/markup-compatibility/2006" type="blank" preserve="1">
   <p:cSld name="Blank Slide">
     <p:spTree>
       <p:nvGrpSpPr>
@@ -133,14 +35,11 @@
       </p:grpSpPr>
     </p:spTree>
   </p:cSld>
-  <p:clrMapOvr>
-    <a:masterClrMapping/>
-  </p:clrMapOvr>
 </p:sldLayout>
 </file>
 
 <file path=ppt/slideLayouts/slideLayout10.xml><?xml version="1.0" encoding="utf-8"?>
-<p:sldLayout xmlns:a="http://schemas.openxmlformats.org/drawingml/2006/main" xmlns:r="http://schemas.openxmlformats.org/officeDocument/2006/relationships" xmlns:p="http://schemas.openxmlformats.org/presentationml/2006/main" type="objOverTx" preserve="1">
+<p:sldLayout xmlns:a="http://schemas.openxmlformats.org/drawingml/2006/main" xmlns:p="http://schemas.openxmlformats.org/presentationml/2006/main" xmlns:r="http://schemas.openxmlformats.org/officeDocument/2006/relationships" xmlns:p14="http://schemas.microsoft.com/office/powerpoint/2010/main" xmlns:p15="http://schemas.microsoft.com/office/powerpoint/2012/main" xmlns:mc="http://schemas.openxmlformats.org/markup-compatibility/2006" type="objOverTx" preserve="1">
   <p:cSld name="Title, Content over Content">
     <p:spTree>
       <p:nvGrpSpPr>
@@ -168,21 +67,20 @@
         </p:nvSpPr>
         <p:spPr>
           <a:xfrm>
-            <a:off x="692640" y="375840"/>
-            <a:ext cx="8692920" cy="946800"/>
-          </a:xfrm>
-          <a:prstGeom prst="rect">
-            <a:avLst/>
-          </a:prstGeom>
-        </p:spPr>
-        <p:txBody>
-          <a:bodyPr lIns="0" tIns="0" rIns="0" bIns="0" anchor="ctr">
+            <a:off x="692640" y="375480"/>
+            <a:ext cx="8692200" cy="946800"/>
+          </a:xfrm>
+          <a:prstGeom prst="rect">
+            <a:avLst/>
+          </a:prstGeom>
+        </p:spPr>
+        <p:txBody>
+          <a:bodyPr lIns="0" rIns="0" tIns="0" bIns="0" anchor="ctr">
             <a:spAutoFit/>
           </a:bodyPr>
-          <a:lstStyle/>
           <a:p>
             <a:pPr algn="ctr"/>
-            <a:endParaRPr lang="pt-BR" sz="4400" b="0" strike="noStrike" spc="-1">
+            <a:endParaRPr b="0" lang="pt-BR" sz="4400" spc="-1" strike="noStrike">
               <a:latin typeface="Arial"/>
             </a:endParaRPr>
           </a:p>
@@ -208,12 +106,11 @@
           </a:prstGeom>
         </p:spPr>
         <p:txBody>
-          <a:bodyPr lIns="0" tIns="0" rIns="0" bIns="0">
+          <a:bodyPr lIns="0" rIns="0" tIns="0" bIns="0">
             <a:normAutofit/>
           </a:bodyPr>
-          <a:lstStyle/>
-          <a:p>
-            <a:endParaRPr lang="pt-BR" sz="3200" b="0" strike="noStrike" spc="-1">
+          <a:p>
+            <a:endParaRPr b="0" lang="pt-BR" sz="3200" spc="-1" strike="noStrike">
               <a:latin typeface="Arial"/>
             </a:endParaRPr>
           </a:p>
@@ -239,12 +136,11 @@
           </a:prstGeom>
         </p:spPr>
         <p:txBody>
-          <a:bodyPr lIns="0" tIns="0" rIns="0" bIns="0">
+          <a:bodyPr lIns="0" rIns="0" tIns="0" bIns="0">
             <a:normAutofit/>
           </a:bodyPr>
-          <a:lstStyle/>
-          <a:p>
-            <a:endParaRPr lang="pt-BR" sz="3200" b="0" strike="noStrike" spc="-1">
+          <a:p>
+            <a:endParaRPr b="0" lang="pt-BR" sz="3200" spc="-1" strike="noStrike">
               <a:latin typeface="Arial"/>
             </a:endParaRPr>
           </a:p>
@@ -252,14 +148,11 @@
       </p:sp>
     </p:spTree>
   </p:cSld>
-  <p:clrMapOvr>
-    <a:masterClrMapping/>
-  </p:clrMapOvr>
 </p:sldLayout>
 </file>
 
 <file path=ppt/slideLayouts/slideLayout11.xml><?xml version="1.0" encoding="utf-8"?>
-<p:sldLayout xmlns:a="http://schemas.openxmlformats.org/drawingml/2006/main" xmlns:r="http://schemas.openxmlformats.org/officeDocument/2006/relationships" xmlns:p="http://schemas.openxmlformats.org/presentationml/2006/main" type="fourObj" preserve="1">
+<p:sldLayout xmlns:a="http://schemas.openxmlformats.org/drawingml/2006/main" xmlns:p="http://schemas.openxmlformats.org/presentationml/2006/main" xmlns:r="http://schemas.openxmlformats.org/officeDocument/2006/relationships" xmlns:p14="http://schemas.microsoft.com/office/powerpoint/2010/main" xmlns:p15="http://schemas.microsoft.com/office/powerpoint/2012/main" xmlns:mc="http://schemas.openxmlformats.org/markup-compatibility/2006" type="fourObj" preserve="1">
   <p:cSld name="Title, 4 Content">
     <p:spTree>
       <p:nvGrpSpPr>
@@ -287,21 +180,20 @@
         </p:nvSpPr>
         <p:spPr>
           <a:xfrm>
-            <a:off x="692640" y="375840"/>
-            <a:ext cx="8692920" cy="946800"/>
-          </a:xfrm>
-          <a:prstGeom prst="rect">
-            <a:avLst/>
-          </a:prstGeom>
-        </p:spPr>
-        <p:txBody>
-          <a:bodyPr lIns="0" tIns="0" rIns="0" bIns="0" anchor="ctr">
+            <a:off x="692640" y="375480"/>
+            <a:ext cx="8692200" cy="946800"/>
+          </a:xfrm>
+          <a:prstGeom prst="rect">
+            <a:avLst/>
+          </a:prstGeom>
+        </p:spPr>
+        <p:txBody>
+          <a:bodyPr lIns="0" rIns="0" tIns="0" bIns="0" anchor="ctr">
             <a:spAutoFit/>
           </a:bodyPr>
-          <a:lstStyle/>
           <a:p>
             <a:pPr algn="ctr"/>
-            <a:endParaRPr lang="pt-BR" sz="4400" b="0" strike="noStrike" spc="-1">
+            <a:endParaRPr b="0" lang="pt-BR" sz="4400" spc="-1" strike="noStrike">
               <a:latin typeface="Arial"/>
             </a:endParaRPr>
           </a:p>
@@ -327,12 +219,11 @@
           </a:prstGeom>
         </p:spPr>
         <p:txBody>
-          <a:bodyPr lIns="0" tIns="0" rIns="0" bIns="0">
+          <a:bodyPr lIns="0" rIns="0" tIns="0" bIns="0">
             <a:normAutofit/>
           </a:bodyPr>
-          <a:lstStyle/>
-          <a:p>
-            <a:endParaRPr lang="pt-BR" sz="3200" b="0" strike="noStrike" spc="-1">
+          <a:p>
+            <a:endParaRPr b="0" lang="pt-BR" sz="3200" spc="-1" strike="noStrike">
               <a:latin typeface="Arial"/>
             </a:endParaRPr>
           </a:p>
@@ -358,12 +249,11 @@
           </a:prstGeom>
         </p:spPr>
         <p:txBody>
-          <a:bodyPr lIns="0" tIns="0" rIns="0" bIns="0">
+          <a:bodyPr lIns="0" rIns="0" tIns="0" bIns="0">
             <a:normAutofit/>
           </a:bodyPr>
-          <a:lstStyle/>
-          <a:p>
-            <a:endParaRPr lang="pt-BR" sz="3200" b="0" strike="noStrike" spc="-1">
+          <a:p>
+            <a:endParaRPr b="0" lang="pt-BR" sz="3200" spc="-1" strike="noStrike">
               <a:latin typeface="Arial"/>
             </a:endParaRPr>
           </a:p>
@@ -389,12 +279,11 @@
           </a:prstGeom>
         </p:spPr>
         <p:txBody>
-          <a:bodyPr lIns="0" tIns="0" rIns="0" bIns="0">
+          <a:bodyPr lIns="0" rIns="0" tIns="0" bIns="0">
             <a:normAutofit/>
           </a:bodyPr>
-          <a:lstStyle/>
-          <a:p>
-            <a:endParaRPr lang="pt-BR" sz="3200" b="0" strike="noStrike" spc="-1">
+          <a:p>
+            <a:endParaRPr b="0" lang="pt-BR" sz="3200" spc="-1" strike="noStrike">
               <a:latin typeface="Arial"/>
             </a:endParaRPr>
           </a:p>
@@ -420,12 +309,11 @@
           </a:prstGeom>
         </p:spPr>
         <p:txBody>
-          <a:bodyPr lIns="0" tIns="0" rIns="0" bIns="0">
+          <a:bodyPr lIns="0" rIns="0" tIns="0" bIns="0">
             <a:normAutofit/>
           </a:bodyPr>
-          <a:lstStyle/>
-          <a:p>
-            <a:endParaRPr lang="pt-BR" sz="3200" b="0" strike="noStrike" spc="-1">
+          <a:p>
+            <a:endParaRPr b="0" lang="pt-BR" sz="3200" spc="-1" strike="noStrike">
               <a:latin typeface="Arial"/>
             </a:endParaRPr>
           </a:p>
@@ -433,14 +321,11 @@
       </p:sp>
     </p:spTree>
   </p:cSld>
-  <p:clrMapOvr>
-    <a:masterClrMapping/>
-  </p:clrMapOvr>
 </p:sldLayout>
 </file>
 
 <file path=ppt/slideLayouts/slideLayout12.xml><?xml version="1.0" encoding="utf-8"?>
-<p:sldLayout xmlns:a="http://schemas.openxmlformats.org/drawingml/2006/main" xmlns:r="http://schemas.openxmlformats.org/officeDocument/2006/relationships" xmlns:p="http://schemas.openxmlformats.org/presentationml/2006/main" type="blank" preserve="1">
+<p:sldLayout xmlns:a="http://schemas.openxmlformats.org/drawingml/2006/main" xmlns:p="http://schemas.openxmlformats.org/presentationml/2006/main" xmlns:r="http://schemas.openxmlformats.org/officeDocument/2006/relationships" xmlns:p14="http://schemas.microsoft.com/office/powerpoint/2010/main" xmlns:p15="http://schemas.microsoft.com/office/powerpoint/2012/main" xmlns:mc="http://schemas.openxmlformats.org/markup-compatibility/2006" type="blank" preserve="1">
   <p:cSld name="Title, 6 Content">
     <p:spTree>
       <p:nvGrpSpPr>
@@ -468,21 +353,20 @@
         </p:nvSpPr>
         <p:spPr>
           <a:xfrm>
-            <a:off x="692640" y="375840"/>
-            <a:ext cx="8692920" cy="946800"/>
-          </a:xfrm>
-          <a:prstGeom prst="rect">
-            <a:avLst/>
-          </a:prstGeom>
-        </p:spPr>
-        <p:txBody>
-          <a:bodyPr lIns="0" tIns="0" rIns="0" bIns="0" anchor="ctr">
+            <a:off x="692640" y="375480"/>
+            <a:ext cx="8692200" cy="946800"/>
+          </a:xfrm>
+          <a:prstGeom prst="rect">
+            <a:avLst/>
+          </a:prstGeom>
+        </p:spPr>
+        <p:txBody>
+          <a:bodyPr lIns="0" rIns="0" tIns="0" bIns="0" anchor="ctr">
             <a:spAutoFit/>
           </a:bodyPr>
-          <a:lstStyle/>
           <a:p>
             <a:pPr algn="ctr"/>
-            <a:endParaRPr lang="pt-BR" sz="4400" b="0" strike="noStrike" spc="-1">
+            <a:endParaRPr b="0" lang="pt-BR" sz="4400" spc="-1" strike="noStrike">
               <a:latin typeface="Arial"/>
             </a:endParaRPr>
           </a:p>
@@ -508,12 +392,11 @@
           </a:prstGeom>
         </p:spPr>
         <p:txBody>
-          <a:bodyPr lIns="0" tIns="0" rIns="0" bIns="0">
+          <a:bodyPr lIns="0" rIns="0" tIns="0" bIns="0">
             <a:normAutofit/>
           </a:bodyPr>
-          <a:lstStyle/>
-          <a:p>
-            <a:endParaRPr lang="pt-BR" sz="3200" b="0" strike="noStrike" spc="-1">
+          <a:p>
+            <a:endParaRPr b="0" lang="pt-BR" sz="3200" spc="-1" strike="noStrike">
               <a:latin typeface="Arial"/>
             </a:endParaRPr>
           </a:p>
@@ -539,12 +422,11 @@
           </a:prstGeom>
         </p:spPr>
         <p:txBody>
-          <a:bodyPr lIns="0" tIns="0" rIns="0" bIns="0">
+          <a:bodyPr lIns="0" rIns="0" tIns="0" bIns="0">
             <a:normAutofit/>
           </a:bodyPr>
-          <a:lstStyle/>
-          <a:p>
-            <a:endParaRPr lang="pt-BR" sz="3200" b="0" strike="noStrike" spc="-1">
+          <a:p>
+            <a:endParaRPr b="0" lang="pt-BR" sz="3200" spc="-1" strike="noStrike">
               <a:latin typeface="Arial"/>
             </a:endParaRPr>
           </a:p>
@@ -570,12 +452,11 @@
           </a:prstGeom>
         </p:spPr>
         <p:txBody>
-          <a:bodyPr lIns="0" tIns="0" rIns="0" bIns="0">
+          <a:bodyPr lIns="0" rIns="0" tIns="0" bIns="0">
             <a:normAutofit/>
           </a:bodyPr>
-          <a:lstStyle/>
-          <a:p>
-            <a:endParaRPr lang="pt-BR" sz="3200" b="0" strike="noStrike" spc="-1">
+          <a:p>
+            <a:endParaRPr b="0" lang="pt-BR" sz="3200" spc="-1" strike="noStrike">
               <a:latin typeface="Arial"/>
             </a:endParaRPr>
           </a:p>
@@ -601,12 +482,11 @@
           </a:prstGeom>
         </p:spPr>
         <p:txBody>
-          <a:bodyPr lIns="0" tIns="0" rIns="0" bIns="0">
+          <a:bodyPr lIns="0" rIns="0" tIns="0" bIns="0">
             <a:normAutofit/>
           </a:bodyPr>
-          <a:lstStyle/>
-          <a:p>
-            <a:endParaRPr lang="pt-BR" sz="3200" b="0" strike="noStrike" spc="-1">
+          <a:p>
+            <a:endParaRPr b="0" lang="pt-BR" sz="3200" spc="-1" strike="noStrike">
               <a:latin typeface="Arial"/>
             </a:endParaRPr>
           </a:p>
@@ -632,12 +512,11 @@
           </a:prstGeom>
         </p:spPr>
         <p:txBody>
-          <a:bodyPr lIns="0" tIns="0" rIns="0" bIns="0">
+          <a:bodyPr lIns="0" rIns="0" tIns="0" bIns="0">
             <a:normAutofit/>
           </a:bodyPr>
-          <a:lstStyle/>
-          <a:p>
-            <a:endParaRPr lang="pt-BR" sz="3200" b="0" strike="noStrike" spc="-1">
+          <a:p>
+            <a:endParaRPr b="0" lang="pt-BR" sz="3200" spc="-1" strike="noStrike">
               <a:latin typeface="Arial"/>
             </a:endParaRPr>
           </a:p>
@@ -663,12 +542,11 @@
           </a:prstGeom>
         </p:spPr>
         <p:txBody>
-          <a:bodyPr lIns="0" tIns="0" rIns="0" bIns="0">
+          <a:bodyPr lIns="0" rIns="0" tIns="0" bIns="0">
             <a:normAutofit/>
           </a:bodyPr>
-          <a:lstStyle/>
-          <a:p>
-            <a:endParaRPr lang="pt-BR" sz="3200" b="0" strike="noStrike" spc="-1">
+          <a:p>
+            <a:endParaRPr b="0" lang="pt-BR" sz="3200" spc="-1" strike="noStrike">
               <a:latin typeface="Arial"/>
             </a:endParaRPr>
           </a:p>
@@ -676,14 +554,11 @@
       </p:sp>
     </p:spTree>
   </p:cSld>
-  <p:clrMapOvr>
-    <a:masterClrMapping/>
-  </p:clrMapOvr>
 </p:sldLayout>
 </file>
 
 <file path=ppt/slideLayouts/slideLayout2.xml><?xml version="1.0" encoding="utf-8"?>
-<p:sldLayout xmlns:a="http://schemas.openxmlformats.org/drawingml/2006/main" xmlns:r="http://schemas.openxmlformats.org/officeDocument/2006/relationships" xmlns:p="http://schemas.openxmlformats.org/presentationml/2006/main" type="tx" preserve="1">
+<p:sldLayout xmlns:a="http://schemas.openxmlformats.org/drawingml/2006/main" xmlns:p="http://schemas.openxmlformats.org/presentationml/2006/main" xmlns:r="http://schemas.openxmlformats.org/officeDocument/2006/relationships" xmlns:p14="http://schemas.microsoft.com/office/powerpoint/2010/main" xmlns:p15="http://schemas.microsoft.com/office/powerpoint/2012/main" xmlns:mc="http://schemas.openxmlformats.org/markup-compatibility/2006" type="tx" preserve="1">
   <p:cSld name="Title Slide">
     <p:spTree>
       <p:nvGrpSpPr>
@@ -711,21 +586,20 @@
         </p:nvSpPr>
         <p:spPr>
           <a:xfrm>
-            <a:off x="692640" y="375840"/>
-            <a:ext cx="8692920" cy="946800"/>
-          </a:xfrm>
-          <a:prstGeom prst="rect">
-            <a:avLst/>
-          </a:prstGeom>
-        </p:spPr>
-        <p:txBody>
-          <a:bodyPr lIns="0" tIns="0" rIns="0" bIns="0" anchor="ctr">
+            <a:off x="692640" y="375480"/>
+            <a:ext cx="8692200" cy="946800"/>
+          </a:xfrm>
+          <a:prstGeom prst="rect">
+            <a:avLst/>
+          </a:prstGeom>
+        </p:spPr>
+        <p:txBody>
+          <a:bodyPr lIns="0" rIns="0" tIns="0" bIns="0" anchor="ctr">
             <a:spAutoFit/>
           </a:bodyPr>
-          <a:lstStyle/>
           <a:p>
             <a:pPr algn="ctr"/>
-            <a:endParaRPr lang="pt-BR" sz="4400" b="0" strike="noStrike" spc="-1">
+            <a:endParaRPr b="0" lang="pt-BR" sz="4400" spc="-1" strike="noStrike">
               <a:latin typeface="Arial"/>
             </a:endParaRPr>
           </a:p>
@@ -751,13 +625,12 @@
           </a:prstGeom>
         </p:spPr>
         <p:txBody>
-          <a:bodyPr lIns="0" tIns="0" rIns="0" bIns="0" anchor="ctr">
+          <a:bodyPr lIns="0" rIns="0" tIns="0" bIns="0" anchor="ctr">
             <a:spAutoFit/>
           </a:bodyPr>
-          <a:lstStyle/>
           <a:p>
             <a:pPr algn="ctr"/>
-            <a:endParaRPr lang="pt-BR" sz="3200" b="0" strike="noStrike" spc="-1">
+            <a:endParaRPr b="0" lang="pt-BR" sz="3200" spc="-1" strike="noStrike">
               <a:latin typeface="Arial"/>
             </a:endParaRPr>
           </a:p>
@@ -765,14 +638,11 @@
       </p:sp>
     </p:spTree>
   </p:cSld>
-  <p:clrMapOvr>
-    <a:masterClrMapping/>
-  </p:clrMapOvr>
 </p:sldLayout>
 </file>
 
 <file path=ppt/slideLayouts/slideLayout3.xml><?xml version="1.0" encoding="utf-8"?>
-<p:sldLayout xmlns:a="http://schemas.openxmlformats.org/drawingml/2006/main" xmlns:r="http://schemas.openxmlformats.org/officeDocument/2006/relationships" xmlns:p="http://schemas.openxmlformats.org/presentationml/2006/main" type="obj" preserve="1">
+<p:sldLayout xmlns:a="http://schemas.openxmlformats.org/drawingml/2006/main" xmlns:p="http://schemas.openxmlformats.org/presentationml/2006/main" xmlns:r="http://schemas.openxmlformats.org/officeDocument/2006/relationships" xmlns:p14="http://schemas.microsoft.com/office/powerpoint/2010/main" xmlns:p15="http://schemas.microsoft.com/office/powerpoint/2012/main" xmlns:mc="http://schemas.openxmlformats.org/markup-compatibility/2006" type="obj" preserve="1">
   <p:cSld name="Title, Content">
     <p:spTree>
       <p:nvGrpSpPr>
@@ -800,21 +670,20 @@
         </p:nvSpPr>
         <p:spPr>
           <a:xfrm>
-            <a:off x="692640" y="375840"/>
-            <a:ext cx="8692920" cy="946800"/>
-          </a:xfrm>
-          <a:prstGeom prst="rect">
-            <a:avLst/>
-          </a:prstGeom>
-        </p:spPr>
-        <p:txBody>
-          <a:bodyPr lIns="0" tIns="0" rIns="0" bIns="0" anchor="ctr">
+            <a:off x="692640" y="375480"/>
+            <a:ext cx="8692200" cy="946800"/>
+          </a:xfrm>
+          <a:prstGeom prst="rect">
+            <a:avLst/>
+          </a:prstGeom>
+        </p:spPr>
+        <p:txBody>
+          <a:bodyPr lIns="0" rIns="0" tIns="0" bIns="0" anchor="ctr">
             <a:spAutoFit/>
           </a:bodyPr>
-          <a:lstStyle/>
           <a:p>
             <a:pPr algn="ctr"/>
-            <a:endParaRPr lang="pt-BR" sz="4400" b="0" strike="noStrike" spc="-1">
+            <a:endParaRPr b="0" lang="pt-BR" sz="4400" spc="-1" strike="noStrike">
               <a:latin typeface="Arial"/>
             </a:endParaRPr>
           </a:p>
@@ -840,12 +709,11 @@
           </a:prstGeom>
         </p:spPr>
         <p:txBody>
-          <a:bodyPr lIns="0" tIns="0" rIns="0" bIns="0">
+          <a:bodyPr lIns="0" rIns="0" tIns="0" bIns="0">
             <a:normAutofit/>
           </a:bodyPr>
-          <a:lstStyle/>
-          <a:p>
-            <a:endParaRPr lang="pt-BR" sz="3200" b="0" strike="noStrike" spc="-1">
+          <a:p>
+            <a:endParaRPr b="0" lang="pt-BR" sz="3200" spc="-1" strike="noStrike">
               <a:latin typeface="Arial"/>
             </a:endParaRPr>
           </a:p>
@@ -853,14 +721,11 @@
       </p:sp>
     </p:spTree>
   </p:cSld>
-  <p:clrMapOvr>
-    <a:masterClrMapping/>
-  </p:clrMapOvr>
 </p:sldLayout>
 </file>
 
 <file path=ppt/slideLayouts/slideLayout4.xml><?xml version="1.0" encoding="utf-8"?>
-<p:sldLayout xmlns:a="http://schemas.openxmlformats.org/drawingml/2006/main" xmlns:r="http://schemas.openxmlformats.org/officeDocument/2006/relationships" xmlns:p="http://schemas.openxmlformats.org/presentationml/2006/main" type="twoObj" preserve="1">
+<p:sldLayout xmlns:a="http://schemas.openxmlformats.org/drawingml/2006/main" xmlns:p="http://schemas.openxmlformats.org/presentationml/2006/main" xmlns:r="http://schemas.openxmlformats.org/officeDocument/2006/relationships" xmlns:p14="http://schemas.microsoft.com/office/powerpoint/2010/main" xmlns:p15="http://schemas.microsoft.com/office/powerpoint/2012/main" xmlns:mc="http://schemas.openxmlformats.org/markup-compatibility/2006" type="twoObj" preserve="1">
   <p:cSld name="Title, 2 Content">
     <p:spTree>
       <p:nvGrpSpPr>
@@ -888,21 +753,20 @@
         </p:nvSpPr>
         <p:spPr>
           <a:xfrm>
-            <a:off x="692640" y="375840"/>
-            <a:ext cx="8692920" cy="946800"/>
-          </a:xfrm>
-          <a:prstGeom prst="rect">
-            <a:avLst/>
-          </a:prstGeom>
-        </p:spPr>
-        <p:txBody>
-          <a:bodyPr lIns="0" tIns="0" rIns="0" bIns="0" anchor="ctr">
+            <a:off x="692640" y="375480"/>
+            <a:ext cx="8692200" cy="946800"/>
+          </a:xfrm>
+          <a:prstGeom prst="rect">
+            <a:avLst/>
+          </a:prstGeom>
+        </p:spPr>
+        <p:txBody>
+          <a:bodyPr lIns="0" rIns="0" tIns="0" bIns="0" anchor="ctr">
             <a:spAutoFit/>
           </a:bodyPr>
-          <a:lstStyle/>
           <a:p>
             <a:pPr algn="ctr"/>
-            <a:endParaRPr lang="pt-BR" sz="4400" b="0" strike="noStrike" spc="-1">
+            <a:endParaRPr b="0" lang="pt-BR" sz="4400" spc="-1" strike="noStrike">
               <a:latin typeface="Arial"/>
             </a:endParaRPr>
           </a:p>
@@ -928,12 +792,11 @@
           </a:prstGeom>
         </p:spPr>
         <p:txBody>
-          <a:bodyPr lIns="0" tIns="0" rIns="0" bIns="0">
+          <a:bodyPr lIns="0" rIns="0" tIns="0" bIns="0">
             <a:normAutofit/>
           </a:bodyPr>
-          <a:lstStyle/>
-          <a:p>
-            <a:endParaRPr lang="pt-BR" sz="3200" b="0" strike="noStrike" spc="-1">
+          <a:p>
+            <a:endParaRPr b="0" lang="pt-BR" sz="3200" spc="-1" strike="noStrike">
               <a:latin typeface="Arial"/>
             </a:endParaRPr>
           </a:p>
@@ -959,12 +822,11 @@
           </a:prstGeom>
         </p:spPr>
         <p:txBody>
-          <a:bodyPr lIns="0" tIns="0" rIns="0" bIns="0">
+          <a:bodyPr lIns="0" rIns="0" tIns="0" bIns="0">
             <a:normAutofit/>
           </a:bodyPr>
-          <a:lstStyle/>
-          <a:p>
-            <a:endParaRPr lang="pt-BR" sz="3200" b="0" strike="noStrike" spc="-1">
+          <a:p>
+            <a:endParaRPr b="0" lang="pt-BR" sz="3200" spc="-1" strike="noStrike">
               <a:latin typeface="Arial"/>
             </a:endParaRPr>
           </a:p>
@@ -972,14 +834,11 @@
       </p:sp>
     </p:spTree>
   </p:cSld>
-  <p:clrMapOvr>
-    <a:masterClrMapping/>
-  </p:clrMapOvr>
 </p:sldLayout>
 </file>
 
 <file path=ppt/slideLayouts/slideLayout5.xml><?xml version="1.0" encoding="utf-8"?>
-<p:sldLayout xmlns:a="http://schemas.openxmlformats.org/drawingml/2006/main" xmlns:r="http://schemas.openxmlformats.org/officeDocument/2006/relationships" xmlns:p="http://schemas.openxmlformats.org/presentationml/2006/main" type="titleOnly" preserve="1">
+<p:sldLayout xmlns:a="http://schemas.openxmlformats.org/drawingml/2006/main" xmlns:p="http://schemas.openxmlformats.org/presentationml/2006/main" xmlns:r="http://schemas.openxmlformats.org/officeDocument/2006/relationships" xmlns:p14="http://schemas.microsoft.com/office/powerpoint/2010/main" xmlns:p15="http://schemas.microsoft.com/office/powerpoint/2012/main" xmlns:mc="http://schemas.openxmlformats.org/markup-compatibility/2006" type="titleOnly" preserve="1">
   <p:cSld name="Title Only">
     <p:spTree>
       <p:nvGrpSpPr>
@@ -1007,21 +866,20 @@
         </p:nvSpPr>
         <p:spPr>
           <a:xfrm>
-            <a:off x="692640" y="375840"/>
-            <a:ext cx="8692920" cy="946800"/>
-          </a:xfrm>
-          <a:prstGeom prst="rect">
-            <a:avLst/>
-          </a:prstGeom>
-        </p:spPr>
-        <p:txBody>
-          <a:bodyPr lIns="0" tIns="0" rIns="0" bIns="0" anchor="ctr">
+            <a:off x="692640" y="375480"/>
+            <a:ext cx="8692200" cy="946800"/>
+          </a:xfrm>
+          <a:prstGeom prst="rect">
+            <a:avLst/>
+          </a:prstGeom>
+        </p:spPr>
+        <p:txBody>
+          <a:bodyPr lIns="0" rIns="0" tIns="0" bIns="0" anchor="ctr">
             <a:spAutoFit/>
           </a:bodyPr>
-          <a:lstStyle/>
           <a:p>
             <a:pPr algn="ctr"/>
-            <a:endParaRPr lang="pt-BR" sz="4400" b="0" strike="noStrike" spc="-1">
+            <a:endParaRPr b="0" lang="pt-BR" sz="4400" spc="-1" strike="noStrike">
               <a:latin typeface="Arial"/>
             </a:endParaRPr>
           </a:p>
@@ -1029,14 +887,11 @@
       </p:sp>
     </p:spTree>
   </p:cSld>
-  <p:clrMapOvr>
-    <a:masterClrMapping/>
-  </p:clrMapOvr>
 </p:sldLayout>
 </file>
 
 <file path=ppt/slideLayouts/slideLayout6.xml><?xml version="1.0" encoding="utf-8"?>
-<p:sldLayout xmlns:a="http://schemas.openxmlformats.org/drawingml/2006/main" xmlns:r="http://schemas.openxmlformats.org/officeDocument/2006/relationships" xmlns:p="http://schemas.openxmlformats.org/presentationml/2006/main" type="objOnly" preserve="1">
+<p:sldLayout xmlns:a="http://schemas.openxmlformats.org/drawingml/2006/main" xmlns:p="http://schemas.openxmlformats.org/presentationml/2006/main" xmlns:r="http://schemas.openxmlformats.org/officeDocument/2006/relationships" xmlns:p14="http://schemas.microsoft.com/office/powerpoint/2010/main" xmlns:p15="http://schemas.microsoft.com/office/powerpoint/2012/main" xmlns:mc="http://schemas.openxmlformats.org/markup-compatibility/2006" type="objOnly" preserve="1">
   <p:cSld name="Centered Text">
     <p:spTree>
       <p:nvGrpSpPr>
@@ -1064,21 +919,20 @@
         </p:nvSpPr>
         <p:spPr>
           <a:xfrm>
-            <a:off x="692640" y="375840"/>
-            <a:ext cx="8692920" cy="4390200"/>
-          </a:xfrm>
-          <a:prstGeom prst="rect">
-            <a:avLst/>
-          </a:prstGeom>
-        </p:spPr>
-        <p:txBody>
-          <a:bodyPr lIns="0" tIns="0" rIns="0" bIns="0" anchor="ctr">
+            <a:off x="692640" y="375480"/>
+            <a:ext cx="8692200" cy="4390200"/>
+          </a:xfrm>
+          <a:prstGeom prst="rect">
+            <a:avLst/>
+          </a:prstGeom>
+        </p:spPr>
+        <p:txBody>
+          <a:bodyPr lIns="0" rIns="0" tIns="0" bIns="0" anchor="ctr">
             <a:spAutoFit/>
           </a:bodyPr>
-          <a:lstStyle/>
           <a:p>
             <a:pPr algn="ctr"/>
-            <a:endParaRPr lang="pt-BR" sz="3200" b="0" strike="noStrike" spc="-1">
+            <a:endParaRPr b="0" lang="pt-BR" sz="3200" spc="-1" strike="noStrike">
               <a:latin typeface="Arial"/>
             </a:endParaRPr>
           </a:p>
@@ -1086,14 +940,11 @@
       </p:sp>
     </p:spTree>
   </p:cSld>
-  <p:clrMapOvr>
-    <a:masterClrMapping/>
-  </p:clrMapOvr>
 </p:sldLayout>
 </file>
 
 <file path=ppt/slideLayouts/slideLayout7.xml><?xml version="1.0" encoding="utf-8"?>
-<p:sldLayout xmlns:a="http://schemas.openxmlformats.org/drawingml/2006/main" xmlns:r="http://schemas.openxmlformats.org/officeDocument/2006/relationships" xmlns:p="http://schemas.openxmlformats.org/presentationml/2006/main" type="twoObjAndObj" preserve="1">
+<p:sldLayout xmlns:a="http://schemas.openxmlformats.org/drawingml/2006/main" xmlns:p="http://schemas.openxmlformats.org/presentationml/2006/main" xmlns:r="http://schemas.openxmlformats.org/officeDocument/2006/relationships" xmlns:p14="http://schemas.microsoft.com/office/powerpoint/2010/main" xmlns:p15="http://schemas.microsoft.com/office/powerpoint/2012/main" xmlns:mc="http://schemas.openxmlformats.org/markup-compatibility/2006" type="twoObjAndObj" preserve="1">
   <p:cSld name="Title, 2 Content and Content">
     <p:spTree>
       <p:nvGrpSpPr>
@@ -1121,21 +972,20 @@
         </p:nvSpPr>
         <p:spPr>
           <a:xfrm>
-            <a:off x="692640" y="375840"/>
-            <a:ext cx="8692920" cy="946800"/>
-          </a:xfrm>
-          <a:prstGeom prst="rect">
-            <a:avLst/>
-          </a:prstGeom>
-        </p:spPr>
-        <p:txBody>
-          <a:bodyPr lIns="0" tIns="0" rIns="0" bIns="0" anchor="ctr">
+            <a:off x="692640" y="375480"/>
+            <a:ext cx="8692200" cy="946800"/>
+          </a:xfrm>
+          <a:prstGeom prst="rect">
+            <a:avLst/>
+          </a:prstGeom>
+        </p:spPr>
+        <p:txBody>
+          <a:bodyPr lIns="0" rIns="0" tIns="0" bIns="0" anchor="ctr">
             <a:spAutoFit/>
           </a:bodyPr>
-          <a:lstStyle/>
           <a:p>
             <a:pPr algn="ctr"/>
-            <a:endParaRPr lang="pt-BR" sz="4400" b="0" strike="noStrike" spc="-1">
+            <a:endParaRPr b="0" lang="pt-BR" sz="4400" spc="-1" strike="noStrike">
               <a:latin typeface="Arial"/>
             </a:endParaRPr>
           </a:p>
@@ -1161,12 +1011,11 @@
           </a:prstGeom>
         </p:spPr>
         <p:txBody>
-          <a:bodyPr lIns="0" tIns="0" rIns="0" bIns="0">
+          <a:bodyPr lIns="0" rIns="0" tIns="0" bIns="0">
             <a:normAutofit/>
           </a:bodyPr>
-          <a:lstStyle/>
-          <a:p>
-            <a:endParaRPr lang="pt-BR" sz="3200" b="0" strike="noStrike" spc="-1">
+          <a:p>
+            <a:endParaRPr b="0" lang="pt-BR" sz="3200" spc="-1" strike="noStrike">
               <a:latin typeface="Arial"/>
             </a:endParaRPr>
           </a:p>
@@ -1192,12 +1041,11 @@
           </a:prstGeom>
         </p:spPr>
         <p:txBody>
-          <a:bodyPr lIns="0" tIns="0" rIns="0" bIns="0">
+          <a:bodyPr lIns="0" rIns="0" tIns="0" bIns="0">
             <a:normAutofit/>
           </a:bodyPr>
-          <a:lstStyle/>
-          <a:p>
-            <a:endParaRPr lang="pt-BR" sz="3200" b="0" strike="noStrike" spc="-1">
+          <a:p>
+            <a:endParaRPr b="0" lang="pt-BR" sz="3200" spc="-1" strike="noStrike">
               <a:latin typeface="Arial"/>
             </a:endParaRPr>
           </a:p>
@@ -1223,12 +1071,11 @@
           </a:prstGeom>
         </p:spPr>
         <p:txBody>
-          <a:bodyPr lIns="0" tIns="0" rIns="0" bIns="0">
+          <a:bodyPr lIns="0" rIns="0" tIns="0" bIns="0">
             <a:normAutofit/>
           </a:bodyPr>
-          <a:lstStyle/>
-          <a:p>
-            <a:endParaRPr lang="pt-BR" sz="3200" b="0" strike="noStrike" spc="-1">
+          <a:p>
+            <a:endParaRPr b="0" lang="pt-BR" sz="3200" spc="-1" strike="noStrike">
               <a:latin typeface="Arial"/>
             </a:endParaRPr>
           </a:p>
@@ -1236,14 +1083,11 @@
       </p:sp>
     </p:spTree>
   </p:cSld>
-  <p:clrMapOvr>
-    <a:masterClrMapping/>
-  </p:clrMapOvr>
 </p:sldLayout>
 </file>
 
 <file path=ppt/slideLayouts/slideLayout8.xml><?xml version="1.0" encoding="utf-8"?>
-<p:sldLayout xmlns:a="http://schemas.openxmlformats.org/drawingml/2006/main" xmlns:r="http://schemas.openxmlformats.org/officeDocument/2006/relationships" xmlns:p="http://schemas.openxmlformats.org/presentationml/2006/main" type="objAndTwoObj" preserve="1">
+<p:sldLayout xmlns:a="http://schemas.openxmlformats.org/drawingml/2006/main" xmlns:p="http://schemas.openxmlformats.org/presentationml/2006/main" xmlns:r="http://schemas.openxmlformats.org/officeDocument/2006/relationships" xmlns:p14="http://schemas.microsoft.com/office/powerpoint/2010/main" xmlns:p15="http://schemas.microsoft.com/office/powerpoint/2012/main" xmlns:mc="http://schemas.openxmlformats.org/markup-compatibility/2006" type="objAndTwoObj" preserve="1">
   <p:cSld name="Title Content and 2 Content">
     <p:spTree>
       <p:nvGrpSpPr>
@@ -1271,21 +1115,20 @@
         </p:nvSpPr>
         <p:spPr>
           <a:xfrm>
-            <a:off x="692640" y="375840"/>
-            <a:ext cx="8692920" cy="946800"/>
-          </a:xfrm>
-          <a:prstGeom prst="rect">
-            <a:avLst/>
-          </a:prstGeom>
-        </p:spPr>
-        <p:txBody>
-          <a:bodyPr lIns="0" tIns="0" rIns="0" bIns="0" anchor="ctr">
+            <a:off x="692640" y="375480"/>
+            <a:ext cx="8692200" cy="946800"/>
+          </a:xfrm>
+          <a:prstGeom prst="rect">
+            <a:avLst/>
+          </a:prstGeom>
+        </p:spPr>
+        <p:txBody>
+          <a:bodyPr lIns="0" rIns="0" tIns="0" bIns="0" anchor="ctr">
             <a:spAutoFit/>
           </a:bodyPr>
-          <a:lstStyle/>
           <a:p>
             <a:pPr algn="ctr"/>
-            <a:endParaRPr lang="pt-BR" sz="4400" b="0" strike="noStrike" spc="-1">
+            <a:endParaRPr b="0" lang="pt-BR" sz="4400" spc="-1" strike="noStrike">
               <a:latin typeface="Arial"/>
             </a:endParaRPr>
           </a:p>
@@ -1311,12 +1154,11 @@
           </a:prstGeom>
         </p:spPr>
         <p:txBody>
-          <a:bodyPr lIns="0" tIns="0" rIns="0" bIns="0">
+          <a:bodyPr lIns="0" rIns="0" tIns="0" bIns="0">
             <a:normAutofit/>
           </a:bodyPr>
-          <a:lstStyle/>
-          <a:p>
-            <a:endParaRPr lang="pt-BR" sz="3200" b="0" strike="noStrike" spc="-1">
+          <a:p>
+            <a:endParaRPr b="0" lang="pt-BR" sz="3200" spc="-1" strike="noStrike">
               <a:latin typeface="Arial"/>
             </a:endParaRPr>
           </a:p>
@@ -1342,12 +1184,11 @@
           </a:prstGeom>
         </p:spPr>
         <p:txBody>
-          <a:bodyPr lIns="0" tIns="0" rIns="0" bIns="0">
+          <a:bodyPr lIns="0" rIns="0" tIns="0" bIns="0">
             <a:normAutofit/>
           </a:bodyPr>
-          <a:lstStyle/>
-          <a:p>
-            <a:endParaRPr lang="pt-BR" sz="3200" b="0" strike="noStrike" spc="-1">
+          <a:p>
+            <a:endParaRPr b="0" lang="pt-BR" sz="3200" spc="-1" strike="noStrike">
               <a:latin typeface="Arial"/>
             </a:endParaRPr>
           </a:p>
@@ -1373,12 +1214,11 @@
           </a:prstGeom>
         </p:spPr>
         <p:txBody>
-          <a:bodyPr lIns="0" tIns="0" rIns="0" bIns="0">
+          <a:bodyPr lIns="0" rIns="0" tIns="0" bIns="0">
             <a:normAutofit/>
           </a:bodyPr>
-          <a:lstStyle/>
-          <a:p>
-            <a:endParaRPr lang="pt-BR" sz="3200" b="0" strike="noStrike" spc="-1">
+          <a:p>
+            <a:endParaRPr b="0" lang="pt-BR" sz="3200" spc="-1" strike="noStrike">
               <a:latin typeface="Arial"/>
             </a:endParaRPr>
           </a:p>
@@ -1386,14 +1226,11 @@
       </p:sp>
     </p:spTree>
   </p:cSld>
-  <p:clrMapOvr>
-    <a:masterClrMapping/>
-  </p:clrMapOvr>
 </p:sldLayout>
 </file>
 
 <file path=ppt/slideLayouts/slideLayout9.xml><?xml version="1.0" encoding="utf-8"?>
-<p:sldLayout xmlns:a="http://schemas.openxmlformats.org/drawingml/2006/main" xmlns:r="http://schemas.openxmlformats.org/officeDocument/2006/relationships" xmlns:p="http://schemas.openxmlformats.org/presentationml/2006/main" type="twoObjOverTx" preserve="1">
+<p:sldLayout xmlns:a="http://schemas.openxmlformats.org/drawingml/2006/main" xmlns:p="http://schemas.openxmlformats.org/presentationml/2006/main" xmlns:r="http://schemas.openxmlformats.org/officeDocument/2006/relationships" xmlns:p14="http://schemas.microsoft.com/office/powerpoint/2010/main" xmlns:p15="http://schemas.microsoft.com/office/powerpoint/2012/main" xmlns:mc="http://schemas.openxmlformats.org/markup-compatibility/2006" type="twoObjOverTx" preserve="1">
   <p:cSld name="Title, 2 Content over Content">
     <p:spTree>
       <p:nvGrpSpPr>
@@ -1421,21 +1258,20 @@
         </p:nvSpPr>
         <p:spPr>
           <a:xfrm>
-            <a:off x="692640" y="375840"/>
-            <a:ext cx="8692920" cy="946800"/>
-          </a:xfrm>
-          <a:prstGeom prst="rect">
-            <a:avLst/>
-          </a:prstGeom>
-        </p:spPr>
-        <p:txBody>
-          <a:bodyPr lIns="0" tIns="0" rIns="0" bIns="0" anchor="ctr">
+            <a:off x="692640" y="375480"/>
+            <a:ext cx="8692200" cy="946800"/>
+          </a:xfrm>
+          <a:prstGeom prst="rect">
+            <a:avLst/>
+          </a:prstGeom>
+        </p:spPr>
+        <p:txBody>
+          <a:bodyPr lIns="0" rIns="0" tIns="0" bIns="0" anchor="ctr">
             <a:spAutoFit/>
           </a:bodyPr>
-          <a:lstStyle/>
           <a:p>
             <a:pPr algn="ctr"/>
-            <a:endParaRPr lang="pt-BR" sz="4400" b="0" strike="noStrike" spc="-1">
+            <a:endParaRPr b="0" lang="pt-BR" sz="4400" spc="-1" strike="noStrike">
               <a:latin typeface="Arial"/>
             </a:endParaRPr>
           </a:p>
@@ -1461,12 +1297,11 @@
           </a:prstGeom>
         </p:spPr>
         <p:txBody>
-          <a:bodyPr lIns="0" tIns="0" rIns="0" bIns="0">
+          <a:bodyPr lIns="0" rIns="0" tIns="0" bIns="0">
             <a:normAutofit/>
           </a:bodyPr>
-          <a:lstStyle/>
-          <a:p>
-            <a:endParaRPr lang="pt-BR" sz="3200" b="0" strike="noStrike" spc="-1">
+          <a:p>
+            <a:endParaRPr b="0" lang="pt-BR" sz="3200" spc="-1" strike="noStrike">
               <a:latin typeface="Arial"/>
             </a:endParaRPr>
           </a:p>
@@ -1492,12 +1327,11 @@
           </a:prstGeom>
         </p:spPr>
         <p:txBody>
-          <a:bodyPr lIns="0" tIns="0" rIns="0" bIns="0">
+          <a:bodyPr lIns="0" rIns="0" tIns="0" bIns="0">
             <a:normAutofit/>
           </a:bodyPr>
-          <a:lstStyle/>
-          <a:p>
-            <a:endParaRPr lang="pt-BR" sz="3200" b="0" strike="noStrike" spc="-1">
+          <a:p>
+            <a:endParaRPr b="0" lang="pt-BR" sz="3200" spc="-1" strike="noStrike">
               <a:latin typeface="Arial"/>
             </a:endParaRPr>
           </a:p>
@@ -1523,12 +1357,11 @@
           </a:prstGeom>
         </p:spPr>
         <p:txBody>
-          <a:bodyPr lIns="0" tIns="0" rIns="0" bIns="0">
+          <a:bodyPr lIns="0" rIns="0" tIns="0" bIns="0">
             <a:normAutofit/>
           </a:bodyPr>
-          <a:lstStyle/>
-          <a:p>
-            <a:endParaRPr lang="pt-BR" sz="3200" b="0" strike="noStrike" spc="-1">
+          <a:p>
+            <a:endParaRPr b="0" lang="pt-BR" sz="3200" spc="-1" strike="noStrike">
               <a:latin typeface="Arial"/>
             </a:endParaRPr>
           </a:p>
@@ -1536,21 +1369,17 @@
       </p:sp>
     </p:spTree>
   </p:cSld>
-  <p:clrMapOvr>
-    <a:masterClrMapping/>
-  </p:clrMapOvr>
 </p:sldLayout>
 </file>
 
 <file path=ppt/slideMasters/slideMaster1.xml><?xml version="1.0" encoding="utf-8"?>
-<p:sldMaster xmlns:a="http://schemas.openxmlformats.org/drawingml/2006/main" xmlns:r="http://schemas.openxmlformats.org/officeDocument/2006/relationships" xmlns:p="http://schemas.openxmlformats.org/presentationml/2006/main">
+<p:sldMaster xmlns:a="http://schemas.openxmlformats.org/drawingml/2006/main" xmlns:p="http://schemas.openxmlformats.org/presentationml/2006/main" xmlns:r="http://schemas.openxmlformats.org/officeDocument/2006/relationships" xmlns:p14="http://schemas.microsoft.com/office/powerpoint/2010/main" xmlns:p15="http://schemas.microsoft.com/office/powerpoint/2012/main" xmlns:mc="http://schemas.openxmlformats.org/markup-compatibility/2006">
   <p:cSld>
     <p:bg>
       <p:bgPr>
         <a:solidFill>
-          <a:srgbClr val="FFFFFF"/>
+          <a:srgbClr val="ffffff"/>
         </a:solidFill>
-        <a:effectLst/>
       </p:bgPr>
     </p:bg>
     <p:spTree>
@@ -1569,7 +1398,7 @@
       </p:grpSpPr>
       <p:sp>
         <p:nvSpPr>
-          <p:cNvPr id="2" name="PlaceHolder 1"/>
+          <p:cNvPr id="0" name="PlaceHolder 1"/>
           <p:cNvSpPr>
             <a:spLocks noGrp="1"/>
           </p:cNvSpPr>
@@ -1579,31 +1408,33 @@
         </p:nvSpPr>
         <p:spPr>
           <a:xfrm>
-            <a:off x="692640" y="375840"/>
-            <a:ext cx="8692920" cy="946800"/>
-          </a:xfrm>
-          <a:prstGeom prst="rect">
-            <a:avLst/>
-          </a:prstGeom>
-        </p:spPr>
-        <p:txBody>
-          <a:bodyPr lIns="0" tIns="0" rIns="0" bIns="0" anchor="ctr">
+            <a:off x="692640" y="375480"/>
+            <a:ext cx="8692200" cy="946800"/>
+          </a:xfrm>
+          <a:prstGeom prst="rect">
+            <a:avLst/>
+          </a:prstGeom>
+        </p:spPr>
+        <p:txBody>
+          <a:bodyPr lIns="0" rIns="0" tIns="0" bIns="0" anchor="ctr">
             <a:spAutoFit/>
           </a:bodyPr>
-          <a:lstStyle/>
-          <a:p>
-            <a:r>
-              <a:rPr lang="pt-BR" sz="1800" b="0" strike="noStrike" spc="-1">
+          <a:p>
+            <a:r>
+              <a:rPr b="0" lang="pt-BR" sz="1800" spc="-1" strike="noStrike">
                 <a:latin typeface="Arial"/>
               </a:rPr>
               <a:t>Clique para editar o formato do texto do título</a:t>
             </a:r>
-          </a:p>
-        </p:txBody>
-      </p:sp>
-      <p:sp>
-        <p:nvSpPr>
-          <p:cNvPr id="3" name="PlaceHolder 2"/>
+            <a:endParaRPr b="0" lang="pt-BR" sz="1800" spc="-1" strike="noStrike">
+              <a:latin typeface="Arial"/>
+            </a:endParaRPr>
+          </a:p>
+        </p:txBody>
+      </p:sp>
+      <p:sp>
+        <p:nvSpPr>
+          <p:cNvPr id="1" name="PlaceHolder 2"/>
           <p:cNvSpPr>
             <a:spLocks noGrp="1"/>
           </p:cNvSpPr>
@@ -1621,10 +1452,9 @@
           </a:prstGeom>
         </p:spPr>
         <p:txBody>
-          <a:bodyPr lIns="0" tIns="0" rIns="0" bIns="0">
+          <a:bodyPr lIns="0" rIns="0" tIns="0" bIns="0">
             <a:normAutofit fontScale="94000"/>
           </a:bodyPr>
-          <a:lstStyle/>
           <a:p>
             <a:pPr marL="432000" indent="-324000">
               <a:spcBef>
@@ -1638,14 +1468,17 @@
               <a:buChar char=""/>
             </a:pPr>
             <a:r>
-              <a:rPr lang="pt-BR" sz="3200" b="0" strike="noStrike" spc="-1">
+              <a:rPr b="0" lang="pt-BR" sz="3200" spc="-1" strike="noStrike">
                 <a:latin typeface="Arial"/>
               </a:rPr>
               <a:t>Clique para editar o formato do texto da estrutura de tópicos</a:t>
             </a:r>
-          </a:p>
-          <a:p>
-            <a:pPr marL="864000" lvl="1" indent="-324000">
+            <a:endParaRPr b="0" lang="pt-BR" sz="3200" spc="-1" strike="noStrike">
+              <a:latin typeface="Arial"/>
+            </a:endParaRPr>
+          </a:p>
+          <a:p>
+            <a:pPr lvl="1" marL="864000" indent="-324000">
               <a:spcBef>
                 <a:spcPts val="1134"/>
               </a:spcBef>
@@ -1657,14 +1490,17 @@
               <a:buChar char=""/>
             </a:pPr>
             <a:r>
-              <a:rPr lang="pt-BR" sz="2800" b="0" strike="noStrike" spc="-1">
+              <a:rPr b="0" lang="pt-BR" sz="2800" spc="-1" strike="noStrike">
                 <a:latin typeface="Arial"/>
               </a:rPr>
               <a:t>2.º nível da estrutura de tópicos</a:t>
             </a:r>
-          </a:p>
-          <a:p>
-            <a:pPr marL="1296000" lvl="2" indent="-288000">
+            <a:endParaRPr b="0" lang="pt-BR" sz="2800" spc="-1" strike="noStrike">
+              <a:latin typeface="Arial"/>
+            </a:endParaRPr>
+          </a:p>
+          <a:p>
+            <a:pPr lvl="2" marL="1296000" indent="-288000">
               <a:spcBef>
                 <a:spcPts val="850"/>
               </a:spcBef>
@@ -1676,14 +1512,17 @@
               <a:buChar char=""/>
             </a:pPr>
             <a:r>
-              <a:rPr lang="pt-BR" sz="2400" b="0" strike="noStrike" spc="-1">
+              <a:rPr b="0" lang="pt-BR" sz="2400" spc="-1" strike="noStrike">
                 <a:latin typeface="Arial"/>
               </a:rPr>
               <a:t>3.º nível da estrutura de tópicos</a:t>
             </a:r>
-          </a:p>
-          <a:p>
-            <a:pPr marL="1728000" lvl="3" indent="-216000">
+            <a:endParaRPr b="0" lang="pt-BR" sz="2400" spc="-1" strike="noStrike">
+              <a:latin typeface="Arial"/>
+            </a:endParaRPr>
+          </a:p>
+          <a:p>
+            <a:pPr lvl="3" marL="1728000" indent="-216000">
               <a:spcBef>
                 <a:spcPts val="567"/>
               </a:spcBef>
@@ -1695,14 +1534,17 @@
               <a:buChar char=""/>
             </a:pPr>
             <a:r>
-              <a:rPr lang="pt-BR" sz="2000" b="0" strike="noStrike" spc="-1">
+              <a:rPr b="0" lang="pt-BR" sz="2000" spc="-1" strike="noStrike">
                 <a:latin typeface="Arial"/>
               </a:rPr>
               <a:t>4.º nível da estrutura de tópicos</a:t>
             </a:r>
-          </a:p>
-          <a:p>
-            <a:pPr marL="2160000" lvl="4" indent="-216000">
+            <a:endParaRPr b="0" lang="pt-BR" sz="2000" spc="-1" strike="noStrike">
+              <a:latin typeface="Arial"/>
+            </a:endParaRPr>
+          </a:p>
+          <a:p>
+            <a:pPr lvl="4" marL="2160000" indent="-216000">
               <a:spcBef>
                 <a:spcPts val="283"/>
               </a:spcBef>
@@ -1714,14 +1556,17 @@
               <a:buChar char=""/>
             </a:pPr>
             <a:r>
-              <a:rPr lang="pt-BR" sz="2000" b="0" strike="noStrike" spc="-1">
+              <a:rPr b="0" lang="pt-BR" sz="2000" spc="-1" strike="noStrike">
                 <a:latin typeface="Arial"/>
               </a:rPr>
               <a:t>5.º nível da estrutura de tópicos</a:t>
             </a:r>
-          </a:p>
-          <a:p>
-            <a:pPr marL="2592000" lvl="5" indent="-216000">
+            <a:endParaRPr b="0" lang="pt-BR" sz="2000" spc="-1" strike="noStrike">
+              <a:latin typeface="Arial"/>
+            </a:endParaRPr>
+          </a:p>
+          <a:p>
+            <a:pPr lvl="5" marL="2592000" indent="-216000">
               <a:spcBef>
                 <a:spcPts val="283"/>
               </a:spcBef>
@@ -1733,14 +1578,17 @@
               <a:buChar char=""/>
             </a:pPr>
             <a:r>
-              <a:rPr lang="pt-BR" sz="2000" b="0" strike="noStrike" spc="-1">
+              <a:rPr b="0" lang="pt-BR" sz="2000" spc="-1" strike="noStrike">
                 <a:latin typeface="Arial"/>
               </a:rPr>
               <a:t>6.º nível da estrutura de tópicos</a:t>
             </a:r>
-          </a:p>
-          <a:p>
-            <a:pPr marL="3024000" lvl="6" indent="-216000">
+            <a:endParaRPr b="0" lang="pt-BR" sz="2000" spc="-1" strike="noStrike">
+              <a:latin typeface="Arial"/>
+            </a:endParaRPr>
+          </a:p>
+          <a:p>
+            <a:pPr lvl="6" marL="3024000" indent="-216000">
               <a:spcBef>
                 <a:spcPts val="283"/>
               </a:spcBef>
@@ -1752,316 +1600,39 @@
               <a:buChar char=""/>
             </a:pPr>
             <a:r>
-              <a:rPr lang="pt-BR" sz="2000" b="0" strike="noStrike" spc="-1">
+              <a:rPr b="0" lang="pt-BR" sz="2000" spc="-1" strike="noStrike">
                 <a:latin typeface="Arial"/>
               </a:rPr>
               <a:t>7.º nível da estrutura de tópicos</a:t>
             </a:r>
+            <a:endParaRPr b="0" lang="pt-BR" sz="2000" spc="-1" strike="noStrike">
+              <a:latin typeface="Arial"/>
+            </a:endParaRPr>
           </a:p>
         </p:txBody>
       </p:sp>
     </p:spTree>
   </p:cSld>
-  <p:clrMap bg1="lt1" tx1="dk1" bg2="lt2" tx2="dk2" accent1="accent1" accent2="accent2" accent3="accent3" accent4="accent4" accent5="accent5" accent6="accent6" hlink="hlink" folHlink="folHlink"/>
+  <p:clrMap bg1="lt1" bg2="lt2" tx1="dk1" tx2="dk2" accent1="accent1" accent2="accent2" accent3="accent3" accent4="accent4" accent5="accent5" accent6="accent6" hlink="hlink" folHlink="folHlink"/>
   <p:sldLayoutIdLst>
-    <p:sldLayoutId id="2147483649" r:id="rId1"/>
-    <p:sldLayoutId id="2147483650" r:id="rId2"/>
-    <p:sldLayoutId id="2147483651" r:id="rId3"/>
-    <p:sldLayoutId id="2147483652" r:id="rId4"/>
-    <p:sldLayoutId id="2147483653" r:id="rId5"/>
-    <p:sldLayoutId id="2147483654" r:id="rId6"/>
-    <p:sldLayoutId id="2147483655" r:id="rId7"/>
-    <p:sldLayoutId id="2147483656" r:id="rId8"/>
-    <p:sldLayoutId id="2147483657" r:id="rId9"/>
-    <p:sldLayoutId id="2147483658" r:id="rId10"/>
-    <p:sldLayoutId id="2147483659" r:id="rId11"/>
-    <p:sldLayoutId id="2147483660" r:id="rId12"/>
+    <p:sldLayoutId id="2147483649" r:id="rId2"/>
+    <p:sldLayoutId id="2147483650" r:id="rId3"/>
+    <p:sldLayoutId id="2147483651" r:id="rId4"/>
+    <p:sldLayoutId id="2147483652" r:id="rId5"/>
+    <p:sldLayoutId id="2147483653" r:id="rId6"/>
+    <p:sldLayoutId id="2147483654" r:id="rId7"/>
+    <p:sldLayoutId id="2147483655" r:id="rId8"/>
+    <p:sldLayoutId id="2147483656" r:id="rId9"/>
+    <p:sldLayoutId id="2147483657" r:id="rId10"/>
+    <p:sldLayoutId id="2147483658" r:id="rId11"/>
+    <p:sldLayoutId id="2147483659" r:id="rId12"/>
+    <p:sldLayoutId id="2147483660" r:id="rId13"/>
   </p:sldLayoutIdLst>
-  <p:txStyles>
-    <p:titleStyle>
-      <a:lvl1pPr algn="l" defTabSz="914400" rtl="0" eaLnBrk="1" latinLnBrk="0" hangingPunct="1">
-        <a:lnSpc>
-          <a:spcPct val="90000"/>
-        </a:lnSpc>
-        <a:spcBef>
-          <a:spcPct val="0"/>
-        </a:spcBef>
-        <a:buNone/>
-        <a:defRPr sz="4400" kern="1200">
-          <a:solidFill>
-            <a:schemeClr val="tx1"/>
-          </a:solidFill>
-          <a:latin typeface="+mj-lt"/>
-          <a:ea typeface="+mj-ea"/>
-          <a:cs typeface="+mj-cs"/>
-        </a:defRPr>
-      </a:lvl1pPr>
-    </p:titleStyle>
-    <p:bodyStyle>
-      <a:lvl1pPr marL="228600" indent="-228600" algn="l" defTabSz="914400" rtl="0" eaLnBrk="1" latinLnBrk="0" hangingPunct="1">
-        <a:lnSpc>
-          <a:spcPct val="90000"/>
-        </a:lnSpc>
-        <a:spcBef>
-          <a:spcPts val="1000"/>
-        </a:spcBef>
-        <a:buFont typeface="Arial" panose="020B0604020202020204" pitchFamily="34" charset="0"/>
-        <a:buChar char="•"/>
-        <a:defRPr sz="2800" kern="1200">
-          <a:solidFill>
-            <a:schemeClr val="tx1"/>
-          </a:solidFill>
-          <a:latin typeface="+mn-lt"/>
-          <a:ea typeface="+mn-ea"/>
-          <a:cs typeface="+mn-cs"/>
-        </a:defRPr>
-      </a:lvl1pPr>
-      <a:lvl2pPr marL="685800" indent="-228600" algn="l" defTabSz="914400" rtl="0" eaLnBrk="1" latinLnBrk="0" hangingPunct="1">
-        <a:lnSpc>
-          <a:spcPct val="90000"/>
-        </a:lnSpc>
-        <a:spcBef>
-          <a:spcPts val="500"/>
-        </a:spcBef>
-        <a:buFont typeface="Arial" panose="020B0604020202020204" pitchFamily="34" charset="0"/>
-        <a:buChar char="•"/>
-        <a:defRPr sz="2400" kern="1200">
-          <a:solidFill>
-            <a:schemeClr val="tx1"/>
-          </a:solidFill>
-          <a:latin typeface="+mn-lt"/>
-          <a:ea typeface="+mn-ea"/>
-          <a:cs typeface="+mn-cs"/>
-        </a:defRPr>
-      </a:lvl2pPr>
-      <a:lvl3pPr marL="1143000" indent="-228600" algn="l" defTabSz="914400" rtl="0" eaLnBrk="1" latinLnBrk="0" hangingPunct="1">
-        <a:lnSpc>
-          <a:spcPct val="90000"/>
-        </a:lnSpc>
-        <a:spcBef>
-          <a:spcPts val="500"/>
-        </a:spcBef>
-        <a:buFont typeface="Arial" panose="020B0604020202020204" pitchFamily="34" charset="0"/>
-        <a:buChar char="•"/>
-        <a:defRPr sz="2000" kern="1200">
-          <a:solidFill>
-            <a:schemeClr val="tx1"/>
-          </a:solidFill>
-          <a:latin typeface="+mn-lt"/>
-          <a:ea typeface="+mn-ea"/>
-          <a:cs typeface="+mn-cs"/>
-        </a:defRPr>
-      </a:lvl3pPr>
-      <a:lvl4pPr marL="1600200" indent="-228600" algn="l" defTabSz="914400" rtl="0" eaLnBrk="1" latinLnBrk="0" hangingPunct="1">
-        <a:lnSpc>
-          <a:spcPct val="90000"/>
-        </a:lnSpc>
-        <a:spcBef>
-          <a:spcPts val="500"/>
-        </a:spcBef>
-        <a:buFont typeface="Arial" panose="020B0604020202020204" pitchFamily="34" charset="0"/>
-        <a:buChar char="•"/>
-        <a:defRPr sz="1800" kern="1200">
-          <a:solidFill>
-            <a:schemeClr val="tx1"/>
-          </a:solidFill>
-          <a:latin typeface="+mn-lt"/>
-          <a:ea typeface="+mn-ea"/>
-          <a:cs typeface="+mn-cs"/>
-        </a:defRPr>
-      </a:lvl4pPr>
-      <a:lvl5pPr marL="2057400" indent="-228600" algn="l" defTabSz="914400" rtl="0" eaLnBrk="1" latinLnBrk="0" hangingPunct="1">
-        <a:lnSpc>
-          <a:spcPct val="90000"/>
-        </a:lnSpc>
-        <a:spcBef>
-          <a:spcPts val="500"/>
-        </a:spcBef>
-        <a:buFont typeface="Arial" panose="020B0604020202020204" pitchFamily="34" charset="0"/>
-        <a:buChar char="•"/>
-        <a:defRPr sz="1800" kern="1200">
-          <a:solidFill>
-            <a:schemeClr val="tx1"/>
-          </a:solidFill>
-          <a:latin typeface="+mn-lt"/>
-          <a:ea typeface="+mn-ea"/>
-          <a:cs typeface="+mn-cs"/>
-        </a:defRPr>
-      </a:lvl5pPr>
-      <a:lvl6pPr marL="2514600" indent="-228600" algn="l" defTabSz="914400" rtl="0" eaLnBrk="1" latinLnBrk="0" hangingPunct="1">
-        <a:lnSpc>
-          <a:spcPct val="90000"/>
-        </a:lnSpc>
-        <a:spcBef>
-          <a:spcPts val="500"/>
-        </a:spcBef>
-        <a:buFont typeface="Arial" panose="020B0604020202020204" pitchFamily="34" charset="0"/>
-        <a:buChar char="•"/>
-        <a:defRPr sz="1800" kern="1200">
-          <a:solidFill>
-            <a:schemeClr val="tx1"/>
-          </a:solidFill>
-          <a:latin typeface="+mn-lt"/>
-          <a:ea typeface="+mn-ea"/>
-          <a:cs typeface="+mn-cs"/>
-        </a:defRPr>
-      </a:lvl6pPr>
-      <a:lvl7pPr marL="2971800" indent="-228600" algn="l" defTabSz="914400" rtl="0" eaLnBrk="1" latinLnBrk="0" hangingPunct="1">
-        <a:lnSpc>
-          <a:spcPct val="90000"/>
-        </a:lnSpc>
-        <a:spcBef>
-          <a:spcPts val="500"/>
-        </a:spcBef>
-        <a:buFont typeface="Arial" panose="020B0604020202020204" pitchFamily="34" charset="0"/>
-        <a:buChar char="•"/>
-        <a:defRPr sz="1800" kern="1200">
-          <a:solidFill>
-            <a:schemeClr val="tx1"/>
-          </a:solidFill>
-          <a:latin typeface="+mn-lt"/>
-          <a:ea typeface="+mn-ea"/>
-          <a:cs typeface="+mn-cs"/>
-        </a:defRPr>
-      </a:lvl7pPr>
-      <a:lvl8pPr marL="3429000" indent="-228600" algn="l" defTabSz="914400" rtl="0" eaLnBrk="1" latinLnBrk="0" hangingPunct="1">
-        <a:lnSpc>
-          <a:spcPct val="90000"/>
-        </a:lnSpc>
-        <a:spcBef>
-          <a:spcPts val="500"/>
-        </a:spcBef>
-        <a:buFont typeface="Arial" panose="020B0604020202020204" pitchFamily="34" charset="0"/>
-        <a:buChar char="•"/>
-        <a:defRPr sz="1800" kern="1200">
-          <a:solidFill>
-            <a:schemeClr val="tx1"/>
-          </a:solidFill>
-          <a:latin typeface="+mn-lt"/>
-          <a:ea typeface="+mn-ea"/>
-          <a:cs typeface="+mn-cs"/>
-        </a:defRPr>
-      </a:lvl8pPr>
-      <a:lvl9pPr marL="3886200" indent="-228600" algn="l" defTabSz="914400" rtl="0" eaLnBrk="1" latinLnBrk="0" hangingPunct="1">
-        <a:lnSpc>
-          <a:spcPct val="90000"/>
-        </a:lnSpc>
-        <a:spcBef>
-          <a:spcPts val="500"/>
-        </a:spcBef>
-        <a:buFont typeface="Arial" panose="020B0604020202020204" pitchFamily="34" charset="0"/>
-        <a:buChar char="•"/>
-        <a:defRPr sz="1800" kern="1200">
-          <a:solidFill>
-            <a:schemeClr val="tx1"/>
-          </a:solidFill>
-          <a:latin typeface="+mn-lt"/>
-          <a:ea typeface="+mn-ea"/>
-          <a:cs typeface="+mn-cs"/>
-        </a:defRPr>
-      </a:lvl9pPr>
-    </p:bodyStyle>
-    <p:otherStyle>
-      <a:defPPr>
-        <a:defRPr lang="pt-BR"/>
-      </a:defPPr>
-      <a:lvl1pPr marL="0" algn="l" defTabSz="914400" rtl="0" eaLnBrk="1" latinLnBrk="0" hangingPunct="1">
-        <a:defRPr sz="1800" kern="1200">
-          <a:solidFill>
-            <a:schemeClr val="tx1"/>
-          </a:solidFill>
-          <a:latin typeface="+mn-lt"/>
-          <a:ea typeface="+mn-ea"/>
-          <a:cs typeface="+mn-cs"/>
-        </a:defRPr>
-      </a:lvl1pPr>
-      <a:lvl2pPr marL="457200" algn="l" defTabSz="914400" rtl="0" eaLnBrk="1" latinLnBrk="0" hangingPunct="1">
-        <a:defRPr sz="1800" kern="1200">
-          <a:solidFill>
-            <a:schemeClr val="tx1"/>
-          </a:solidFill>
-          <a:latin typeface="+mn-lt"/>
-          <a:ea typeface="+mn-ea"/>
-          <a:cs typeface="+mn-cs"/>
-        </a:defRPr>
-      </a:lvl2pPr>
-      <a:lvl3pPr marL="914400" algn="l" defTabSz="914400" rtl="0" eaLnBrk="1" latinLnBrk="0" hangingPunct="1">
-        <a:defRPr sz="1800" kern="1200">
-          <a:solidFill>
-            <a:schemeClr val="tx1"/>
-          </a:solidFill>
-          <a:latin typeface="+mn-lt"/>
-          <a:ea typeface="+mn-ea"/>
-          <a:cs typeface="+mn-cs"/>
-        </a:defRPr>
-      </a:lvl3pPr>
-      <a:lvl4pPr marL="1371600" algn="l" defTabSz="914400" rtl="0" eaLnBrk="1" latinLnBrk="0" hangingPunct="1">
-        <a:defRPr sz="1800" kern="1200">
-          <a:solidFill>
-            <a:schemeClr val="tx1"/>
-          </a:solidFill>
-          <a:latin typeface="+mn-lt"/>
-          <a:ea typeface="+mn-ea"/>
-          <a:cs typeface="+mn-cs"/>
-        </a:defRPr>
-      </a:lvl4pPr>
-      <a:lvl5pPr marL="1828800" algn="l" defTabSz="914400" rtl="0" eaLnBrk="1" latinLnBrk="0" hangingPunct="1">
-        <a:defRPr sz="1800" kern="1200">
-          <a:solidFill>
-            <a:schemeClr val="tx1"/>
-          </a:solidFill>
-          <a:latin typeface="+mn-lt"/>
-          <a:ea typeface="+mn-ea"/>
-          <a:cs typeface="+mn-cs"/>
-        </a:defRPr>
-      </a:lvl5pPr>
-      <a:lvl6pPr marL="2286000" algn="l" defTabSz="914400" rtl="0" eaLnBrk="1" latinLnBrk="0" hangingPunct="1">
-        <a:defRPr sz="1800" kern="1200">
-          <a:solidFill>
-            <a:schemeClr val="tx1"/>
-          </a:solidFill>
-          <a:latin typeface="+mn-lt"/>
-          <a:ea typeface="+mn-ea"/>
-          <a:cs typeface="+mn-cs"/>
-        </a:defRPr>
-      </a:lvl6pPr>
-      <a:lvl7pPr marL="2743200" algn="l" defTabSz="914400" rtl="0" eaLnBrk="1" latinLnBrk="0" hangingPunct="1">
-        <a:defRPr sz="1800" kern="1200">
-          <a:solidFill>
-            <a:schemeClr val="tx1"/>
-          </a:solidFill>
-          <a:latin typeface="+mn-lt"/>
-          <a:ea typeface="+mn-ea"/>
-          <a:cs typeface="+mn-cs"/>
-        </a:defRPr>
-      </a:lvl7pPr>
-      <a:lvl8pPr marL="3200400" algn="l" defTabSz="914400" rtl="0" eaLnBrk="1" latinLnBrk="0" hangingPunct="1">
-        <a:defRPr sz="1800" kern="1200">
-          <a:solidFill>
-            <a:schemeClr val="tx1"/>
-          </a:solidFill>
-          <a:latin typeface="+mn-lt"/>
-          <a:ea typeface="+mn-ea"/>
-          <a:cs typeface="+mn-cs"/>
-        </a:defRPr>
-      </a:lvl8pPr>
-      <a:lvl9pPr marL="3657600" algn="l" defTabSz="914400" rtl="0" eaLnBrk="1" latinLnBrk="0" hangingPunct="1">
-        <a:defRPr sz="1800" kern="1200">
-          <a:solidFill>
-            <a:schemeClr val="tx1"/>
-          </a:solidFill>
-          <a:latin typeface="+mn-lt"/>
-          <a:ea typeface="+mn-ea"/>
-          <a:cs typeface="+mn-cs"/>
-        </a:defRPr>
-      </a:lvl9pPr>
-    </p:otherStyle>
-  </p:txStyles>
 </p:sldMaster>
 </file>
 
 <file path=ppt/slides/slide1.xml><?xml version="1.0" encoding="utf-8"?>
-<p:sld xmlns:a="http://schemas.openxmlformats.org/drawingml/2006/main" xmlns:r="http://schemas.openxmlformats.org/officeDocument/2006/relationships" xmlns:p="http://schemas.openxmlformats.org/presentationml/2006/main">
+<p:sld xmlns:a="http://schemas.openxmlformats.org/drawingml/2006/main" xmlns:p="http://schemas.openxmlformats.org/presentationml/2006/main" xmlns:r="http://schemas.openxmlformats.org/officeDocument/2006/relationships" xmlns:p14="http://schemas.microsoft.com/office/powerpoint/2010/main" xmlns:p15="http://schemas.microsoft.com/office/powerpoint/2012/main" xmlns:mc="http://schemas.openxmlformats.org/markup-compatibility/2006">
   <p:cSld>
     <p:spTree>
       <p:nvGrpSpPr>
@@ -2086,7 +1657,7 @@
         <p:spPr>
           <a:xfrm>
             <a:off x="692640" y="367560"/>
-            <a:ext cx="8692920" cy="1094760"/>
+            <a:ext cx="8692200" cy="1094040"/>
           </a:xfrm>
           <a:prstGeom prst="rect">
             <a:avLst/>
@@ -2097,22 +1668,15 @@
           </a:ln>
         </p:spPr>
         <p:style>
-          <a:lnRef idx="0">
-            <a:scrgbClr r="0" g="0" b="0"/>
-          </a:lnRef>
-          <a:fillRef idx="0">
-            <a:scrgbClr r="0" g="0" b="0"/>
-          </a:fillRef>
-          <a:effectRef idx="0">
-            <a:scrgbClr r="0" g="0" b="0"/>
-          </a:effectRef>
-          <a:fontRef idx="minor"/>
-        </p:style>
-        <p:txBody>
-          <a:bodyPr lIns="90000" tIns="45000" rIns="90000" bIns="45000" anchor="ctr">
+          <a:lnRef idx="0"/>
+          <a:fillRef idx="0"/>
+          <a:effectRef idx="0"/>
+          <a:fontRef idx="minor"/>
+        </p:style>
+        <p:txBody>
+          <a:bodyPr lIns="90000" rIns="90000" tIns="45000" bIns="45000" anchor="ctr">
             <a:noAutofit/>
           </a:bodyPr>
-          <a:lstStyle/>
           <a:p>
             <a:pPr>
               <a:lnSpc>
@@ -2120,7 +1684,7 @@
               </a:lnSpc>
             </a:pPr>
             <a:r>
-              <a:rPr lang="pt-BR" sz="4400" b="0" strike="noStrike" spc="-1">
+              <a:rPr b="0" lang="pt-BR" sz="4400" spc="-1" strike="noStrike">
                 <a:solidFill>
                   <a:srgbClr val="000000"/>
                 </a:solidFill>
@@ -2129,7 +1693,7 @@
               </a:rPr>
               <a:t>Contexto de Negócio</a:t>
             </a:r>
-            <a:endParaRPr lang="pt-BR" sz="4400" b="0" strike="noStrike" spc="-1">
+            <a:endParaRPr b="0" lang="pt-BR" sz="4400" spc="-1" strike="noStrike">
               <a:latin typeface="Arial"/>
             </a:endParaRPr>
           </a:p>
@@ -2144,13 +1708,13 @@
         <p:spPr>
           <a:xfrm>
             <a:off x="192240" y="2736000"/>
-            <a:ext cx="1103760" cy="754920"/>
+            <a:ext cx="1175400" cy="754200"/>
           </a:xfrm>
           <a:prstGeom prst="rect">
             <a:avLst/>
           </a:prstGeom>
           <a:solidFill>
-            <a:srgbClr val="4472C4"/>
+            <a:srgbClr val="4472c4"/>
           </a:solidFill>
           <a:ln w="12600">
             <a:solidFill>
@@ -2160,22 +1724,15 @@
           </a:ln>
         </p:spPr>
         <p:style>
-          <a:lnRef idx="0">
-            <a:scrgbClr r="0" g="0" b="0"/>
-          </a:lnRef>
-          <a:fillRef idx="0">
-            <a:scrgbClr r="0" g="0" b="0"/>
-          </a:fillRef>
-          <a:effectRef idx="0">
-            <a:scrgbClr r="0" g="0" b="0"/>
-          </a:effectRef>
-          <a:fontRef idx="minor"/>
-        </p:style>
-        <p:txBody>
-          <a:bodyPr lIns="90000" tIns="45000" rIns="90000" bIns="45000" anchor="ctr">
+          <a:lnRef idx="0"/>
+          <a:fillRef idx="0"/>
+          <a:effectRef idx="0"/>
+          <a:fontRef idx="minor"/>
+        </p:style>
+        <p:txBody>
+          <a:bodyPr lIns="90000" rIns="90000" tIns="45000" bIns="45000" anchor="ctr">
             <a:noAutofit/>
           </a:bodyPr>
-          <a:lstStyle/>
           <a:p>
             <a:pPr algn="ctr">
               <a:lnSpc>
@@ -2183,31 +1740,31 @@
               </a:lnSpc>
             </a:pPr>
             <a:r>
-              <a:rPr lang="pt-BR" sz="1800" b="0" strike="noStrike" spc="-1">
+              <a:rPr b="0" lang="pt-BR" sz="1800" spc="-1" strike="noStrike">
                 <a:solidFill>
-                  <a:srgbClr val="FFFFFF"/>
+                  <a:srgbClr val="ffffff"/>
                 </a:solidFill>
                 <a:latin typeface="Calibri"/>
                 <a:ea typeface="DejaVu Sans"/>
               </a:rPr>
-              <a:t>Cliente</a:t>
-            </a:r>
-            <a:endParaRPr lang="pt-BR" sz="1800" b="0" strike="noStrike" spc="-1">
-              <a:latin typeface="Arial"/>
-            </a:endParaRPr>
-          </a:p>
-        </p:txBody>
-      </p:sp>
-      <p:sp>
-        <p:nvSpPr>
-          <p:cNvPr id="41" name="CustomShape 4"/>
-          <p:cNvSpPr/>
-          <p:nvPr/>
-        </p:nvSpPr>
-        <p:spPr>
-          <a:xfrm>
-            <a:off x="2646360" y="1584000"/>
-            <a:ext cx="2757784" cy="521766"/>
+              <a:t>Comercial</a:t>
+            </a:r>
+            <a:endParaRPr b="0" lang="pt-BR" sz="1800" spc="-1" strike="noStrike">
+              <a:latin typeface="Arial"/>
+            </a:endParaRPr>
+          </a:p>
+        </p:txBody>
+      </p:sp>
+      <p:sp>
+        <p:nvSpPr>
+          <p:cNvPr id="40" name="CustomShape 3"/>
+          <p:cNvSpPr/>
+          <p:nvPr/>
+        </p:nvSpPr>
+        <p:spPr>
+          <a:xfrm>
+            <a:off x="2658240" y="1584000"/>
+            <a:ext cx="2733480" cy="729000"/>
           </a:xfrm>
           <a:prstGeom prst="rect">
             <a:avLst/>
@@ -2218,24 +1775,17 @@
           </a:ln>
         </p:spPr>
         <p:style>
-          <a:lnRef idx="0">
-            <a:scrgbClr r="0" g="0" b="0"/>
-          </a:lnRef>
-          <a:fillRef idx="0">
-            <a:scrgbClr r="0" g="0" b="0"/>
-          </a:fillRef>
-          <a:effectRef idx="0">
-            <a:scrgbClr r="0" g="0" b="0"/>
-          </a:effectRef>
-          <a:fontRef idx="minor"/>
-        </p:style>
-        <p:txBody>
-          <a:bodyPr wrap="none" lIns="90000" tIns="45000" rIns="90000" bIns="45000">
+          <a:lnRef idx="0"/>
+          <a:fillRef idx="0"/>
+          <a:effectRef idx="0"/>
+          <a:fontRef idx="minor"/>
+        </p:style>
+        <p:txBody>
+          <a:bodyPr wrap="none" lIns="90000" rIns="90000" tIns="45000" bIns="45000">
             <a:spAutoFit/>
           </a:bodyPr>
-          <a:lstStyle/>
-          <a:p>
-            <a:pPr marL="343080" indent="-342000">
+          <a:p>
+            <a:pPr marL="343080" indent="-341280">
               <a:lnSpc>
                 <a:spcPct val="100000"/>
               </a:lnSpc>
@@ -2246,7 +1796,7 @@
               <a:buAutoNum type="arabicPeriod"/>
             </a:pPr>
             <a:r>
-              <a:rPr lang="pt-BR" sz="1400" b="0" strike="noStrike" spc="-1" dirty="0">
+              <a:rPr b="0" lang="pt-BR" sz="1400" spc="-1" strike="noStrike">
                 <a:solidFill>
                   <a:srgbClr val="000000"/>
                 </a:solidFill>
@@ -2255,9 +1805,12 @@
               </a:rPr>
               <a:t>Solicitar Reparo</a:t>
             </a:r>
-          </a:p>
-          <a:p>
-            <a:pPr marL="343080" indent="-342000">
+            <a:endParaRPr b="0" lang="pt-BR" sz="1400" spc="-1" strike="noStrike">
+              <a:latin typeface="Arial"/>
+            </a:endParaRPr>
+          </a:p>
+          <a:p>
+            <a:pPr marL="343080" indent="-341280">
               <a:lnSpc>
                 <a:spcPct val="100000"/>
               </a:lnSpc>
@@ -2268,30 +1821,41 @@
               <a:buAutoNum type="arabicPeriod"/>
             </a:pPr>
             <a:r>
-              <a:rPr lang="pt-BR" sz="1400" spc="-1" dirty="0">
+              <a:rPr b="0" lang="pt-BR" sz="1400" spc="-1" strike="noStrike">
                 <a:solidFill>
                   <a:srgbClr val="000000"/>
                 </a:solidFill>
                 <a:latin typeface="Calibri"/>
+                <a:ea typeface="DejaVu Sans"/>
               </a:rPr>
               <a:t>Solicitar Produção de Máquina</a:t>
             </a:r>
-            <a:endParaRPr lang="pt-BR" sz="1400" b="0" strike="noStrike" spc="-1" dirty="0">
-              <a:latin typeface="Arial"/>
-            </a:endParaRPr>
-          </a:p>
-        </p:txBody>
-      </p:sp>
-      <p:sp>
-        <p:nvSpPr>
-          <p:cNvPr id="42" name="CustomShape 5"/>
+            <a:endParaRPr b="0" lang="pt-BR" sz="1400" spc="-1" strike="noStrike">
+              <a:latin typeface="Arial"/>
+            </a:endParaRPr>
+          </a:p>
+          <a:p>
+            <a:pPr>
+              <a:lnSpc>
+                <a:spcPct val="100000"/>
+              </a:lnSpc>
+            </a:pPr>
+            <a:endParaRPr b="0" lang="pt-BR" sz="1400" spc="-1" strike="noStrike">
+              <a:latin typeface="Arial"/>
+            </a:endParaRPr>
+          </a:p>
+        </p:txBody>
+      </p:sp>
+      <p:sp>
+        <p:nvSpPr>
+          <p:cNvPr id="41" name="CustomShape 4"/>
           <p:cNvSpPr/>
           <p:nvPr/>
         </p:nvSpPr>
         <p:spPr>
           <a:xfrm>
             <a:off x="6048000" y="2016000"/>
-            <a:ext cx="2984040" cy="2376360"/>
+            <a:ext cx="2983320" cy="2375640"/>
           </a:xfrm>
           <a:prstGeom prst="roundRect">
             <a:avLst>
@@ -2307,22 +1871,15 @@
           </a:ln>
         </p:spPr>
         <p:style>
-          <a:lnRef idx="0">
-            <a:scrgbClr r="0" g="0" b="0"/>
-          </a:lnRef>
-          <a:fillRef idx="0">
-            <a:scrgbClr r="0" g="0" b="0"/>
-          </a:fillRef>
-          <a:effectRef idx="0">
-            <a:scrgbClr r="0" g="0" b="0"/>
-          </a:effectRef>
-          <a:fontRef idx="minor"/>
-        </p:style>
-        <p:txBody>
-          <a:bodyPr lIns="90000" tIns="45000" rIns="90000" bIns="45000">
+          <a:lnRef idx="0"/>
+          <a:fillRef idx="0"/>
+          <a:effectRef idx="0"/>
+          <a:fontRef idx="minor"/>
+        </p:style>
+        <p:txBody>
+          <a:bodyPr lIns="90000" rIns="90000" tIns="45000" bIns="45000">
             <a:noAutofit/>
           </a:bodyPr>
-          <a:lstStyle/>
           <a:p>
             <a:pPr algn="ctr">
               <a:lnSpc>
@@ -2330,44 +1887,40 @@
               </a:lnSpc>
             </a:pPr>
             <a:r>
-              <a:rPr lang="pt-BR" sz="1800" b="0" strike="noStrike" spc="-1" dirty="0">
+              <a:rPr b="0" lang="pt-BR" sz="1800" spc="-1" strike="noStrike">
                 <a:solidFill>
                   <a:srgbClr val="000000"/>
                 </a:solidFill>
                 <a:latin typeface="Calibri"/>
                 <a:ea typeface="DejaVu Sans"/>
               </a:rPr>
-              <a:t>G.A Tecnologia</a:t>
-            </a:r>
-            <a:endParaRPr lang="pt-BR" sz="1800" b="0" strike="noStrike" spc="-1" dirty="0">
-              <a:latin typeface="Arial"/>
-            </a:endParaRPr>
-          </a:p>
-        </p:txBody>
-      </p:sp>
-      <p:cxnSp>
-        <p:nvCxnSpPr>
-          <p:cNvPr id="7" name="Conector reto 6">
-            <a:extLst>
-              <a:ext uri="{FF2B5EF4-FFF2-40B4-BE49-F238E27FC236}">
-                <a16:creationId xmlns:a16="http://schemas.microsoft.com/office/drawing/2014/main" id="{25FCDEEE-46DA-4A6E-91DA-AD8753858607}"/>
-              </a:ext>
-            </a:extLst>
-          </p:cNvPr>
-          <p:cNvCxnSpPr>
-            <a:cxnSpLocks/>
-            <a:stCxn id="39" idx="3"/>
-          </p:cNvCxnSpPr>
-          <p:nvPr/>
-        </p:nvCxnSpPr>
+              <a:t>Produção</a:t>
+            </a:r>
+            <a:endParaRPr b="0" lang="pt-BR" sz="1800" spc="-1" strike="noStrike">
+              <a:latin typeface="Arial"/>
+            </a:endParaRPr>
+          </a:p>
+        </p:txBody>
+      </p:sp>
+      <p:sp>
+        <p:nvSpPr>
+          <p:cNvPr id="42" name="Line 5"/>
+          <p:cNvSpPr/>
+          <p:nvPr/>
+        </p:nvSpPr>
         <p:spPr>
           <a:xfrm flipV="1">
-            <a:off x="1296000" y="3101740"/>
-            <a:ext cx="4752000" cy="11720"/>
+            <a:off x="1296000" y="3101400"/>
+            <a:ext cx="4752000" cy="11880"/>
           </a:xfrm>
           <a:prstGeom prst="line">
             <a:avLst/>
           </a:prstGeom>
+          <a:ln>
+            <a:solidFill>
+              <a:srgbClr val="4a7ebb"/>
+            </a:solidFill>
+          </a:ln>
         </p:spPr>
         <p:style>
           <a:lnRef idx="1">
@@ -2379,21 +1932,286 @@
           <a:effectRef idx="0">
             <a:schemeClr val="accent1"/>
           </a:effectRef>
-          <a:fontRef idx="minor">
-            <a:schemeClr val="tx1"/>
-          </a:fontRef>
-        </p:style>
-      </p:cxnSp>
+          <a:fontRef idx="minor"/>
+        </p:style>
+      </p:sp>
+      <p:sp>
+        <p:nvSpPr>
+          <p:cNvPr id="43" name="CustomShape 6"/>
+          <p:cNvSpPr/>
+          <p:nvPr/>
+        </p:nvSpPr>
+        <p:spPr>
+          <a:xfrm>
+            <a:off x="72000" y="4141440"/>
+            <a:ext cx="1175400" cy="754200"/>
+          </a:xfrm>
+          <a:prstGeom prst="rect">
+            <a:avLst/>
+          </a:prstGeom>
+          <a:solidFill>
+            <a:srgbClr val="4472c4"/>
+          </a:solidFill>
+          <a:ln w="12600">
+            <a:solidFill>
+              <a:srgbClr val="325490"/>
+            </a:solidFill>
+            <a:miter/>
+          </a:ln>
+        </p:spPr>
+        <p:style>
+          <a:lnRef idx="0"/>
+          <a:fillRef idx="0"/>
+          <a:effectRef idx="0"/>
+          <a:fontRef idx="minor"/>
+        </p:style>
+        <p:txBody>
+          <a:bodyPr lIns="90000" rIns="90000" tIns="45000" bIns="45000" anchor="ctr">
+            <a:noAutofit/>
+          </a:bodyPr>
+          <a:p>
+            <a:pPr algn="ctr">
+              <a:lnSpc>
+                <a:spcPct val="100000"/>
+              </a:lnSpc>
+            </a:pPr>
+            <a:r>
+              <a:rPr b="0" lang="pt-BR" sz="1800" spc="-1" strike="noStrike">
+                <a:solidFill>
+                  <a:srgbClr val="ffffff"/>
+                </a:solidFill>
+                <a:latin typeface="Calibri"/>
+                <a:ea typeface="DejaVu Sans"/>
+              </a:rPr>
+              <a:t>Cliente</a:t>
+            </a:r>
+            <a:endParaRPr b="0" lang="pt-BR" sz="1800" spc="-1" strike="noStrike">
+              <a:latin typeface="Arial"/>
+            </a:endParaRPr>
+          </a:p>
+        </p:txBody>
+      </p:sp>
+      <p:sp>
+        <p:nvSpPr>
+          <p:cNvPr id="44" name="CustomShape 7"/>
+          <p:cNvSpPr/>
+          <p:nvPr/>
+        </p:nvSpPr>
+        <p:spPr>
+          <a:xfrm>
+            <a:off x="2709000" y="3512520"/>
+            <a:ext cx="1851480" cy="303120"/>
+          </a:xfrm>
+          <a:prstGeom prst="rect">
+            <a:avLst/>
+          </a:prstGeom>
+          <a:noFill/>
+          <a:ln>
+            <a:noFill/>
+          </a:ln>
+        </p:spPr>
+        <p:style>
+          <a:lnRef idx="0"/>
+          <a:fillRef idx="0"/>
+          <a:effectRef idx="0"/>
+          <a:fontRef idx="minor"/>
+        </p:style>
+        <p:txBody>
+          <a:bodyPr wrap="none" lIns="90000" rIns="90000" tIns="45000" bIns="45000">
+            <a:spAutoFit/>
+          </a:bodyPr>
+          <a:p>
+            <a:pPr marL="343080" indent="-341280">
+              <a:lnSpc>
+                <a:spcPct val="100000"/>
+              </a:lnSpc>
+              <a:buClr>
+                <a:srgbClr val="000000"/>
+              </a:buClr>
+              <a:buFont typeface="StarSymbol"/>
+              <a:buAutoNum type="arabicPeriod"/>
+            </a:pPr>
+            <a:r>
+              <a:rPr b="0" lang="pt-BR" sz="1400" spc="-1" strike="noStrike">
+                <a:solidFill>
+                  <a:srgbClr val="000000"/>
+                </a:solidFill>
+                <a:latin typeface="Calibri"/>
+                <a:ea typeface="DejaVu Sans"/>
+              </a:rPr>
+              <a:t>(3)Enviar Máquina</a:t>
+            </a:r>
+            <a:endParaRPr b="0" lang="pt-BR" sz="1400" spc="-1" strike="noStrike">
+              <a:latin typeface="Arial"/>
+            </a:endParaRPr>
+          </a:p>
+        </p:txBody>
+      </p:sp>
+      <p:sp>
+        <p:nvSpPr>
+          <p:cNvPr id="45" name="Line 8"/>
+          <p:cNvSpPr/>
+          <p:nvPr/>
+        </p:nvSpPr>
+        <p:spPr>
+          <a:xfrm flipV="1">
+            <a:off x="1391760" y="4104000"/>
+            <a:ext cx="4656240" cy="288000"/>
+          </a:xfrm>
+          <a:prstGeom prst="line">
+            <a:avLst/>
+          </a:prstGeom>
+          <a:ln>
+            <a:solidFill>
+              <a:srgbClr val="3465a4"/>
+            </a:solidFill>
+            <a:tailEnd len="med" type="triangle" w="med"/>
+          </a:ln>
+        </p:spPr>
+        <p:style>
+          <a:lnRef idx="0"/>
+          <a:fillRef idx="0"/>
+          <a:effectRef idx="0"/>
+          <a:fontRef idx="minor"/>
+        </p:style>
+      </p:sp>
+      <p:sp>
+        <p:nvSpPr>
+          <p:cNvPr id="46" name="CustomShape 9"/>
+          <p:cNvSpPr/>
+          <p:nvPr/>
+        </p:nvSpPr>
+        <p:spPr>
+          <a:xfrm>
+            <a:off x="1800000" y="4717440"/>
+            <a:ext cx="1175400" cy="754200"/>
+          </a:xfrm>
+          <a:prstGeom prst="rect">
+            <a:avLst/>
+          </a:prstGeom>
+          <a:solidFill>
+            <a:srgbClr val="4472c4"/>
+          </a:solidFill>
+          <a:ln w="12600">
+            <a:solidFill>
+              <a:srgbClr val="325490"/>
+            </a:solidFill>
+            <a:miter/>
+          </a:ln>
+        </p:spPr>
+        <p:style>
+          <a:lnRef idx="0"/>
+          <a:fillRef idx="0"/>
+          <a:effectRef idx="0"/>
+          <a:fontRef idx="minor"/>
+        </p:style>
+        <p:txBody>
+          <a:bodyPr lIns="90000" rIns="90000" tIns="45000" bIns="45000" anchor="ctr">
+            <a:noAutofit/>
+          </a:bodyPr>
+          <a:p>
+            <a:pPr algn="ctr">
+              <a:lnSpc>
+                <a:spcPct val="100000"/>
+              </a:lnSpc>
+            </a:pPr>
+            <a:r>
+              <a:rPr b="0" lang="pt-BR" sz="1800" spc="-1" strike="noStrike">
+                <a:solidFill>
+                  <a:srgbClr val="ffffff"/>
+                </a:solidFill>
+                <a:latin typeface="Calibri"/>
+                <a:ea typeface="DejaVu Sans"/>
+              </a:rPr>
+              <a:t>Negocios</a:t>
+            </a:r>
+            <a:endParaRPr b="0" lang="pt-BR" sz="1800" spc="-1" strike="noStrike">
+              <a:latin typeface="Arial"/>
+            </a:endParaRPr>
+          </a:p>
+        </p:txBody>
+      </p:sp>
+      <p:sp>
+        <p:nvSpPr>
+          <p:cNvPr id="47" name="CustomShape 10"/>
+          <p:cNvSpPr/>
+          <p:nvPr/>
+        </p:nvSpPr>
+        <p:spPr>
+          <a:xfrm>
+            <a:off x="3229560" y="4379400"/>
+            <a:ext cx="2052720" cy="516240"/>
+          </a:xfrm>
+          <a:prstGeom prst="rect">
+            <a:avLst/>
+          </a:prstGeom>
+          <a:noFill/>
+          <a:ln>
+            <a:noFill/>
+          </a:ln>
+        </p:spPr>
+        <p:style>
+          <a:lnRef idx="0"/>
+          <a:fillRef idx="0"/>
+          <a:effectRef idx="0"/>
+          <a:fontRef idx="minor"/>
+        </p:style>
+        <p:txBody>
+          <a:bodyPr wrap="none" lIns="90000" rIns="90000" tIns="45000" bIns="45000">
+            <a:spAutoFit/>
+          </a:bodyPr>
+          <a:p>
+            <a:pPr marL="343080" indent="-341280">
+              <a:lnSpc>
+                <a:spcPct val="100000"/>
+              </a:lnSpc>
+              <a:buClr>
+                <a:srgbClr val="000000"/>
+              </a:buClr>
+              <a:buFont typeface="StarSymbol"/>
+              <a:buAutoNum type="arabicPeriod"/>
+            </a:pPr>
+            <a:r>
+              <a:rPr b="0" lang="pt-BR" sz="1400" spc="-1" strike="noStrike">
+                <a:solidFill>
+                  <a:srgbClr val="000000"/>
+                </a:solidFill>
+                <a:latin typeface="Calibri"/>
+                <a:ea typeface="DejaVu Sans"/>
+              </a:rPr>
+              <a:t>(4)Priorizar Produção</a:t>
+            </a:r>
+            <a:endParaRPr b="0" lang="pt-BR" sz="1400" spc="-1" strike="noStrike">
+              <a:latin typeface="Arial"/>
+            </a:endParaRPr>
+          </a:p>
+          <a:p>
+            <a:pPr>
+              <a:lnSpc>
+                <a:spcPct val="100000"/>
+              </a:lnSpc>
+            </a:pPr>
+            <a:endParaRPr b="0" lang="pt-BR" sz="1400" spc="-1" strike="noStrike">
+              <a:latin typeface="Arial"/>
+            </a:endParaRPr>
+          </a:p>
+        </p:txBody>
+      </p:sp>
     </p:spTree>
   </p:cSld>
-  <p:clrMapOvr>
-    <a:masterClrMapping/>
-  </p:clrMapOvr>
+  <mc:AlternateContent>
+    <mc:Choice Requires="p14">
+      <p:transition spd="slow" p14:dur="2000"/>
+    </mc:Choice>
+    <mc:Fallback>
+      <p:transition spd="slow"/>
+    </mc:Fallback>
+  </mc:AlternateContent>
 </p:sld>
 </file>
 
 <file path=ppt/slides/slide2.xml><?xml version="1.0" encoding="utf-8"?>
-<p:sld xmlns:a="http://schemas.openxmlformats.org/drawingml/2006/main" xmlns:r="http://schemas.openxmlformats.org/officeDocument/2006/relationships" xmlns:p="http://schemas.openxmlformats.org/presentationml/2006/main">
+<p:sld xmlns:a="http://schemas.openxmlformats.org/drawingml/2006/main" xmlns:p="http://schemas.openxmlformats.org/presentationml/2006/main" xmlns:r="http://schemas.openxmlformats.org/officeDocument/2006/relationships" xmlns:p14="http://schemas.microsoft.com/office/powerpoint/2010/main" xmlns:p15="http://schemas.microsoft.com/office/powerpoint/2012/main" xmlns:mc="http://schemas.openxmlformats.org/markup-compatibility/2006">
   <p:cSld>
     <p:spTree>
       <p:nvGrpSpPr>
@@ -2411,14 +2229,14 @@
       </p:grpSpPr>
       <p:sp>
         <p:nvSpPr>
-          <p:cNvPr id="43" name="CustomShape 1"/>
+          <p:cNvPr id="48" name="CustomShape 1"/>
           <p:cNvSpPr/>
           <p:nvPr/>
         </p:nvSpPr>
         <p:spPr>
           <a:xfrm>
             <a:off x="692640" y="301680"/>
-            <a:ext cx="8692920" cy="1094760"/>
+            <a:ext cx="8692200" cy="1094040"/>
           </a:xfrm>
           <a:prstGeom prst="rect">
             <a:avLst/>
@@ -2429,22 +2247,15 @@
           </a:ln>
         </p:spPr>
         <p:style>
-          <a:lnRef idx="0">
-            <a:scrgbClr r="0" g="0" b="0"/>
-          </a:lnRef>
-          <a:fillRef idx="0">
-            <a:scrgbClr r="0" g="0" b="0"/>
-          </a:fillRef>
-          <a:effectRef idx="0">
-            <a:scrgbClr r="0" g="0" b="0"/>
-          </a:effectRef>
-          <a:fontRef idx="minor"/>
-        </p:style>
-        <p:txBody>
-          <a:bodyPr lIns="90000" tIns="45000" rIns="90000" bIns="45000" anchor="ctr">
+          <a:lnRef idx="0"/>
+          <a:fillRef idx="0"/>
+          <a:effectRef idx="0"/>
+          <a:fontRef idx="minor"/>
+        </p:style>
+        <p:txBody>
+          <a:bodyPr lIns="90000" rIns="90000" tIns="45000" bIns="45000" anchor="ctr">
             <a:noAutofit/>
           </a:bodyPr>
-          <a:lstStyle/>
           <a:p>
             <a:pPr>
               <a:lnSpc>
@@ -2452,7 +2263,7 @@
               </a:lnSpc>
             </a:pPr>
             <a:r>
-              <a:rPr lang="pt-BR" sz="4400" b="0" strike="noStrike" spc="-1" dirty="0">
+              <a:rPr b="0" lang="pt-BR" sz="4400" spc="-1" strike="noStrike">
                 <a:solidFill>
                   <a:srgbClr val="000000"/>
                 </a:solidFill>
@@ -2462,31 +2273,31 @@
               <a:t>Cenário: </a:t>
             </a:r>
             <a:r>
-              <a:rPr lang="pt-BR" sz="3200" b="0" strike="noStrike" spc="-1" dirty="0">
+              <a:rPr b="0" lang="pt-BR" sz="3200" spc="-1" strike="noStrike">
                 <a:solidFill>
                   <a:srgbClr val="000000"/>
                 </a:solidFill>
                 <a:latin typeface="Calibri"/>
                 <a:ea typeface="Microsoft YaHei"/>
               </a:rPr>
-              <a:t>Solicitar Reparo</a:t>
-            </a:r>
-            <a:endParaRPr lang="pt-BR" sz="2800" b="0" strike="noStrike" spc="-1" dirty="0">
-              <a:latin typeface="Arial"/>
-            </a:endParaRPr>
-          </a:p>
-        </p:txBody>
-      </p:sp>
-      <p:sp>
-        <p:nvSpPr>
-          <p:cNvPr id="44" name="CustomShape 2"/>
-          <p:cNvSpPr/>
-          <p:nvPr/>
-        </p:nvSpPr>
-        <p:spPr>
-          <a:xfrm>
-            <a:off x="6231600" y="2637000"/>
-            <a:ext cx="1344600" cy="482040"/>
+              <a:t>Solicitar Produção de Máquina</a:t>
+            </a:r>
+            <a:endParaRPr b="0" lang="pt-BR" sz="3200" spc="-1" strike="noStrike">
+              <a:latin typeface="Arial"/>
+            </a:endParaRPr>
+          </a:p>
+        </p:txBody>
+      </p:sp>
+      <p:sp>
+        <p:nvSpPr>
+          <p:cNvPr id="49" name="CustomShape 2"/>
+          <p:cNvSpPr/>
+          <p:nvPr/>
+        </p:nvSpPr>
+        <p:spPr>
+          <a:xfrm>
+            <a:off x="3696120" y="2592000"/>
+            <a:ext cx="1343880" cy="481320"/>
           </a:xfrm>
           <a:prstGeom prst="cube">
             <a:avLst>
@@ -2494,32 +2305,25 @@
             </a:avLst>
           </a:prstGeom>
           <a:solidFill>
-            <a:srgbClr val="FFC000"/>
+            <a:srgbClr val="ffc000"/>
           </a:solidFill>
           <a:ln w="12600">
             <a:solidFill>
-              <a:srgbClr val="4472C4"/>
+              <a:srgbClr val="4472c4"/>
             </a:solidFill>
             <a:miter/>
           </a:ln>
         </p:spPr>
         <p:style>
-          <a:lnRef idx="0">
-            <a:scrgbClr r="0" g="0" b="0"/>
-          </a:lnRef>
-          <a:fillRef idx="0">
-            <a:scrgbClr r="0" g="0" b="0"/>
-          </a:fillRef>
-          <a:effectRef idx="0">
-            <a:scrgbClr r="0" g="0" b="0"/>
-          </a:effectRef>
-          <a:fontRef idx="minor"/>
-        </p:style>
-        <p:txBody>
-          <a:bodyPr lIns="90000" tIns="45000" rIns="90000" bIns="45000">
+          <a:lnRef idx="0"/>
+          <a:fillRef idx="0"/>
+          <a:effectRef idx="0"/>
+          <a:fontRef idx="minor"/>
+        </p:style>
+        <p:txBody>
+          <a:bodyPr lIns="90000" rIns="90000" tIns="45000" bIns="45000">
             <a:noAutofit/>
           </a:bodyPr>
-          <a:lstStyle/>
           <a:p>
             <a:pPr algn="ctr">
               <a:lnSpc>
@@ -2527,16 +2331,16 @@
               </a:lnSpc>
             </a:pPr>
             <a:r>
-              <a:rPr lang="pt-BR" sz="1000" b="0" strike="noStrike" spc="-1">
+              <a:rPr b="0" lang="pt-BR" sz="1000" spc="-1" strike="noStrike">
                 <a:solidFill>
                   <a:srgbClr val="000000"/>
                 </a:solidFill>
                 <a:latin typeface="Calibri"/>
                 <a:ea typeface="DejaVu Sans"/>
               </a:rPr>
-              <a:t>Comercial</a:t>
-            </a:r>
-            <a:endParaRPr lang="pt-BR" sz="1000" b="0" strike="noStrike" spc="-1">
+              <a:t>Gerencia</a:t>
+            </a:r>
+            <a:endParaRPr b="0" lang="pt-BR" sz="1000" spc="-1" strike="noStrike">
               <a:latin typeface="Arial"/>
             </a:endParaRPr>
           </a:p>
@@ -2547,7 +2351,7 @@
               </a:lnSpc>
             </a:pPr>
             <a:r>
-              <a:rPr lang="pt-BR" sz="1000" b="1" strike="noStrike" spc="-1">
+              <a:rPr b="1" lang="pt-BR" sz="1000" spc="-1" strike="noStrike">
                 <a:solidFill>
                   <a:srgbClr val="000000"/>
                 </a:solidFill>
@@ -2556,7 +2360,7 @@
               </a:rPr>
               <a:t>(Nó Operacional)</a:t>
             </a:r>
-            <a:endParaRPr lang="pt-BR" sz="1000" b="0" strike="noStrike" spc="-1">
+            <a:endParaRPr b="0" lang="pt-BR" sz="1000" spc="-1" strike="noStrike">
               <a:latin typeface="Arial"/>
             </a:endParaRPr>
           </a:p>
@@ -2566,22 +2370,22 @@
                 <a:spcPct val="100000"/>
               </a:lnSpc>
             </a:pPr>
-            <a:endParaRPr lang="pt-BR" sz="1000" b="0" strike="noStrike" spc="-1">
-              <a:latin typeface="Arial"/>
-            </a:endParaRPr>
-          </a:p>
-        </p:txBody>
-      </p:sp>
-      <p:sp>
-        <p:nvSpPr>
-          <p:cNvPr id="45" name="CustomShape 3"/>
-          <p:cNvSpPr/>
-          <p:nvPr/>
-        </p:nvSpPr>
-        <p:spPr>
-          <a:xfrm>
-            <a:off x="6318000" y="3551760"/>
-            <a:ext cx="1097280" cy="839520"/>
+            <a:endParaRPr b="0" lang="pt-BR" sz="1000" spc="-1" strike="noStrike">
+              <a:latin typeface="Arial"/>
+            </a:endParaRPr>
+          </a:p>
+        </p:txBody>
+      </p:sp>
+      <p:sp>
+        <p:nvSpPr>
+          <p:cNvPr id="50" name="CustomShape 3"/>
+          <p:cNvSpPr/>
+          <p:nvPr/>
+        </p:nvSpPr>
+        <p:spPr>
+          <a:xfrm>
+            <a:off x="3727440" y="3625200"/>
+            <a:ext cx="1096560" cy="838800"/>
           </a:xfrm>
           <a:prstGeom prst="roundRect">
             <a:avLst>
@@ -2589,29 +2393,22 @@
             </a:avLst>
           </a:prstGeom>
           <a:solidFill>
-            <a:srgbClr val="70AD47"/>
+            <a:srgbClr val="70ad47"/>
           </a:solidFill>
           <a:ln>
             <a:noFill/>
           </a:ln>
         </p:spPr>
         <p:style>
-          <a:lnRef idx="0">
-            <a:scrgbClr r="0" g="0" b="0"/>
-          </a:lnRef>
-          <a:fillRef idx="0">
-            <a:scrgbClr r="0" g="0" b="0"/>
-          </a:fillRef>
-          <a:effectRef idx="0">
-            <a:scrgbClr r="0" g="0" b="0"/>
-          </a:effectRef>
-          <a:fontRef idx="minor"/>
-        </p:style>
-        <p:txBody>
-          <a:bodyPr lIns="90000" tIns="45000" rIns="90000" bIns="45000" anchor="ctr">
+          <a:lnRef idx="0"/>
+          <a:fillRef idx="0"/>
+          <a:effectRef idx="0"/>
+          <a:fontRef idx="minor"/>
+        </p:style>
+        <p:txBody>
+          <a:bodyPr lIns="90000" rIns="90000" tIns="45000" bIns="45000" anchor="ctr">
             <a:noAutofit/>
           </a:bodyPr>
-          <a:lstStyle/>
           <a:p>
             <a:pPr algn="ctr">
               <a:lnSpc>
@@ -2619,36 +2416,37 @@
               </a:lnSpc>
             </a:pPr>
             <a:r>
-              <a:rPr lang="pt-BR" sz="1200" b="1" strike="noStrike" spc="-1" dirty="0">
+              <a:rPr b="1" lang="pt-BR" sz="1200" spc="-1" strike="noStrike">
                 <a:solidFill>
-                  <a:srgbClr val="FFFFFF"/>
+                  <a:srgbClr val="ffffff"/>
                 </a:solidFill>
                 <a:latin typeface="Calibri"/>
-              </a:rPr>
-              <a:t>Realizar Reparo</a:t>
-            </a:r>
-            <a:endParaRPr lang="pt-BR" sz="1200" b="0" strike="noStrike" spc="-1" dirty="0">
-              <a:latin typeface="Arial"/>
-            </a:endParaRPr>
-          </a:p>
-        </p:txBody>
-      </p:sp>
-      <p:sp>
-        <p:nvSpPr>
-          <p:cNvPr id="46" name="CustomShape 4"/>
-          <p:cNvSpPr/>
-          <p:nvPr/>
-        </p:nvSpPr>
-        <p:spPr>
-          <a:xfrm>
-            <a:off x="1682280" y="2561040"/>
-            <a:ext cx="1103760" cy="754920"/>
+                <a:ea typeface="DejaVu Sans"/>
+              </a:rPr>
+              <a:t>Planejar Produção</a:t>
+            </a:r>
+            <a:endParaRPr b="0" lang="pt-BR" sz="1200" spc="-1" strike="noStrike">
+              <a:latin typeface="Arial"/>
+            </a:endParaRPr>
+          </a:p>
+        </p:txBody>
+      </p:sp>
+      <p:sp>
+        <p:nvSpPr>
+          <p:cNvPr id="51" name="CustomShape 4"/>
+          <p:cNvSpPr/>
+          <p:nvPr/>
+        </p:nvSpPr>
+        <p:spPr>
+          <a:xfrm>
+            <a:off x="120960" y="2520000"/>
+            <a:ext cx="1103040" cy="754200"/>
           </a:xfrm>
           <a:prstGeom prst="rect">
             <a:avLst/>
           </a:prstGeom>
           <a:solidFill>
-            <a:srgbClr val="4472C4"/>
+            <a:srgbClr val="4472c4"/>
           </a:solidFill>
           <a:ln w="12600">
             <a:solidFill>
@@ -2658,22 +2456,15 @@
           </a:ln>
         </p:spPr>
         <p:style>
-          <a:lnRef idx="0">
-            <a:scrgbClr r="0" g="0" b="0"/>
-          </a:lnRef>
-          <a:fillRef idx="0">
-            <a:scrgbClr r="0" g="0" b="0"/>
-          </a:fillRef>
-          <a:effectRef idx="0">
-            <a:scrgbClr r="0" g="0" b="0"/>
-          </a:effectRef>
-          <a:fontRef idx="minor"/>
-        </p:style>
-        <p:txBody>
-          <a:bodyPr lIns="90000" tIns="45000" rIns="90000" bIns="45000" anchor="ctr">
+          <a:lnRef idx="0"/>
+          <a:fillRef idx="0"/>
+          <a:effectRef idx="0"/>
+          <a:fontRef idx="minor"/>
+        </p:style>
+        <p:txBody>
+          <a:bodyPr lIns="90000" rIns="90000" tIns="45000" bIns="45000" anchor="ctr">
             <a:noAutofit/>
           </a:bodyPr>
-          <a:lstStyle/>
           <a:p>
             <a:pPr algn="ctr">
               <a:lnSpc>
@@ -2681,31 +2472,31 @@
               </a:lnSpc>
             </a:pPr>
             <a:r>
-              <a:rPr lang="pt-BR" sz="1800" b="0" strike="noStrike" spc="-1">
+              <a:rPr b="0" lang="pt-BR" sz="1800" spc="-1" strike="noStrike">
                 <a:solidFill>
-                  <a:srgbClr val="FFFFFF"/>
+                  <a:srgbClr val="ffffff"/>
                 </a:solidFill>
                 <a:latin typeface="Calibri"/>
                 <a:ea typeface="DejaVu Sans"/>
               </a:rPr>
-              <a:t>Cliente</a:t>
-            </a:r>
-            <a:endParaRPr lang="pt-BR" sz="1800" b="0" strike="noStrike" spc="-1">
-              <a:latin typeface="Arial"/>
-            </a:endParaRPr>
-          </a:p>
-        </p:txBody>
-      </p:sp>
-      <p:sp>
-        <p:nvSpPr>
-          <p:cNvPr id="48" name="CustomShape 6"/>
-          <p:cNvSpPr/>
-          <p:nvPr/>
-        </p:nvSpPr>
-        <p:spPr>
-          <a:xfrm>
-            <a:off x="5412240" y="1584000"/>
-            <a:ext cx="3011040" cy="3095280"/>
+              <a:t>Comercial</a:t>
+            </a:r>
+            <a:endParaRPr b="0" lang="pt-BR" sz="1800" spc="-1" strike="noStrike">
+              <a:latin typeface="Arial"/>
+            </a:endParaRPr>
+          </a:p>
+        </p:txBody>
+      </p:sp>
+      <p:sp>
+        <p:nvSpPr>
+          <p:cNvPr id="52" name="CustomShape 5"/>
+          <p:cNvSpPr/>
+          <p:nvPr/>
+        </p:nvSpPr>
+        <p:spPr>
+          <a:xfrm>
+            <a:off x="3672000" y="1395720"/>
+            <a:ext cx="5975640" cy="3571920"/>
           </a:xfrm>
           <a:prstGeom prst="roundRect">
             <a:avLst>
@@ -2721,94 +2512,84 @@
           </a:ln>
         </p:spPr>
         <p:style>
-          <a:lnRef idx="0">
-            <a:scrgbClr r="0" g="0" b="0"/>
-          </a:lnRef>
-          <a:fillRef idx="0">
-            <a:scrgbClr r="0" g="0" b="0"/>
-          </a:fillRef>
-          <a:effectRef idx="0">
-            <a:scrgbClr r="0" g="0" b="0"/>
-          </a:effectRef>
-          <a:fontRef idx="minor"/>
-        </p:style>
-        <p:txBody>
-          <a:bodyPr lIns="90000" tIns="45000" rIns="90000" bIns="45000">
+          <a:lnRef idx="0"/>
+          <a:fillRef idx="0"/>
+          <a:effectRef idx="0"/>
+          <a:fontRef idx="minor"/>
+        </p:style>
+        <p:txBody>
+          <a:bodyPr lIns="90000" rIns="90000" tIns="45000" bIns="45000">
             <a:noAutofit/>
           </a:bodyPr>
-          <a:lstStyle/>
-          <a:p>
-            <a:pPr algn="ctr"/>
-            <a:r>
-              <a:rPr lang="pt-BR" sz="1800" b="0" strike="noStrike" spc="-1" dirty="0">
+          <a:p>
+            <a:pPr algn="ctr">
+              <a:lnSpc>
+                <a:spcPct val="100000"/>
+              </a:lnSpc>
+            </a:pPr>
+            <a:r>
+              <a:rPr b="0" lang="pt-BR" sz="1800" spc="-1" strike="noStrike">
                 <a:solidFill>
                   <a:srgbClr val="000000"/>
                 </a:solidFill>
                 <a:latin typeface="Calibri"/>
                 <a:ea typeface="DejaVu Sans"/>
               </a:rPr>
-              <a:t>G.A Tecnologia</a:t>
-            </a:r>
-            <a:endParaRPr lang="pt-BR" sz="1800" b="0" strike="noStrike" spc="-1" dirty="0">
-              <a:latin typeface="Arial"/>
-            </a:endParaRPr>
-          </a:p>
-        </p:txBody>
-      </p:sp>
-      <p:sp>
-        <p:nvSpPr>
-          <p:cNvPr id="49" name="Line 7"/>
-          <p:cNvSpPr/>
-          <p:nvPr/>
-        </p:nvSpPr>
-        <p:spPr>
-          <a:xfrm>
-            <a:off x="6843600" y="3120120"/>
-            <a:ext cx="2520" cy="432000"/>
+              <a:t>Produção</a:t>
+            </a:r>
+            <a:endParaRPr b="0" lang="pt-BR" sz="1800" spc="-1" strike="noStrike">
+              <a:latin typeface="Arial"/>
+            </a:endParaRPr>
+          </a:p>
+        </p:txBody>
+      </p:sp>
+      <p:sp>
+        <p:nvSpPr>
+          <p:cNvPr id="53" name="Line 6"/>
+          <p:cNvSpPr/>
+          <p:nvPr/>
+        </p:nvSpPr>
+        <p:spPr>
+          <a:xfrm>
+            <a:off x="4248000" y="3143160"/>
+            <a:ext cx="72000" cy="456840"/>
           </a:xfrm>
           <a:prstGeom prst="line">
             <a:avLst/>
           </a:prstGeom>
           <a:ln w="6480">
             <a:solidFill>
-              <a:srgbClr val="4472C4"/>
+              <a:srgbClr val="4472c4"/>
             </a:solidFill>
             <a:miter/>
           </a:ln>
         </p:spPr>
         <p:style>
-          <a:lnRef idx="0">
-            <a:scrgbClr r="0" g="0" b="0"/>
-          </a:lnRef>
-          <a:fillRef idx="0">
-            <a:scrgbClr r="0" g="0" b="0"/>
-          </a:fillRef>
-          <a:effectRef idx="0">
-            <a:scrgbClr r="0" g="0" b="0"/>
-          </a:effectRef>
-          <a:fontRef idx="minor"/>
-        </p:style>
-      </p:sp>
-      <p:cxnSp>
-        <p:nvCxnSpPr>
-          <p:cNvPr id="9" name="Conector reto 8">
-            <a:extLst>
-              <a:ext uri="{FF2B5EF4-FFF2-40B4-BE49-F238E27FC236}">
-                <a16:creationId xmlns:a16="http://schemas.microsoft.com/office/drawing/2014/main" id="{D12F6040-2062-47DE-B6E9-D011ADB3889E}"/>
-              </a:ext>
-            </a:extLst>
-          </p:cNvPr>
-          <p:cNvCxnSpPr/>
-          <p:nvPr/>
-        </p:nvCxnSpPr>
-        <p:spPr>
-          <a:xfrm>
-            <a:off x="2786040" y="2938500"/>
-            <a:ext cx="2626200" cy="11177"/>
+          <a:lnRef idx="0"/>
+          <a:fillRef idx="0"/>
+          <a:effectRef idx="0"/>
+          <a:fontRef idx="minor"/>
+        </p:style>
+      </p:sp>
+      <p:sp>
+        <p:nvSpPr>
+          <p:cNvPr id="54" name="Line 7"/>
+          <p:cNvSpPr/>
+          <p:nvPr/>
+        </p:nvSpPr>
+        <p:spPr>
+          <a:xfrm>
+            <a:off x="1045800" y="2927160"/>
+            <a:ext cx="2626200" cy="11160"/>
           </a:xfrm>
           <a:prstGeom prst="line">
             <a:avLst/>
           </a:prstGeom>
+          <a:ln>
+            <a:solidFill>
+              <a:srgbClr val="4a7ebb"/>
+            </a:solidFill>
+          </a:ln>
         </p:spPr>
         <p:style>
           <a:lnRef idx="1">
@@ -2820,26 +2601,532 @@
           <a:effectRef idx="0">
             <a:schemeClr val="accent1"/>
           </a:effectRef>
-          <a:fontRef idx="minor">
-            <a:schemeClr val="tx1"/>
-          </a:fontRef>
-        </p:style>
-      </p:cxnSp>
+          <a:fontRef idx="minor"/>
+        </p:style>
+      </p:sp>
+      <p:sp>
+        <p:nvSpPr>
+          <p:cNvPr id="55" name="CustomShape 8"/>
+          <p:cNvSpPr/>
+          <p:nvPr/>
+        </p:nvSpPr>
+        <p:spPr>
+          <a:xfrm>
+            <a:off x="8208000" y="2470680"/>
+            <a:ext cx="1343880" cy="481320"/>
+          </a:xfrm>
+          <a:prstGeom prst="cube">
+            <a:avLst>
+              <a:gd name="adj" fmla="val 25000"/>
+            </a:avLst>
+          </a:prstGeom>
+          <a:solidFill>
+            <a:srgbClr val="ffc000"/>
+          </a:solidFill>
+          <a:ln w="12600">
+            <a:solidFill>
+              <a:srgbClr val="4472c4"/>
+            </a:solidFill>
+            <a:miter/>
+          </a:ln>
+        </p:spPr>
+        <p:style>
+          <a:lnRef idx="0"/>
+          <a:fillRef idx="0"/>
+          <a:effectRef idx="0"/>
+          <a:fontRef idx="minor"/>
+        </p:style>
+        <p:txBody>
+          <a:bodyPr lIns="90000" rIns="90000" tIns="45000" bIns="45000">
+            <a:noAutofit/>
+          </a:bodyPr>
+          <a:p>
+            <a:pPr algn="ctr">
+              <a:lnSpc>
+                <a:spcPct val="100000"/>
+              </a:lnSpc>
+            </a:pPr>
+            <a:r>
+              <a:rPr b="0" lang="pt-BR" sz="1000" spc="-1" strike="noStrike">
+                <a:solidFill>
+                  <a:srgbClr val="000000"/>
+                </a:solidFill>
+                <a:latin typeface="Calibri"/>
+                <a:ea typeface="DejaVu Sans"/>
+              </a:rPr>
+              <a:t>Linha de produção</a:t>
+            </a:r>
+            <a:endParaRPr b="0" lang="pt-BR" sz="1000" spc="-1" strike="noStrike">
+              <a:latin typeface="Arial"/>
+            </a:endParaRPr>
+          </a:p>
+          <a:p>
+            <a:pPr algn="ctr">
+              <a:lnSpc>
+                <a:spcPct val="100000"/>
+              </a:lnSpc>
+            </a:pPr>
+            <a:r>
+              <a:rPr b="1" lang="pt-BR" sz="1000" spc="-1" strike="noStrike">
+                <a:solidFill>
+                  <a:srgbClr val="000000"/>
+                </a:solidFill>
+                <a:latin typeface="Calibri"/>
+                <a:ea typeface="DejaVu Sans"/>
+              </a:rPr>
+              <a:t>(Nó Operacional)</a:t>
+            </a:r>
+            <a:endParaRPr b="0" lang="pt-BR" sz="1000" spc="-1" strike="noStrike">
+              <a:latin typeface="Arial"/>
+            </a:endParaRPr>
+          </a:p>
+          <a:p>
+            <a:pPr>
+              <a:lnSpc>
+                <a:spcPct val="100000"/>
+              </a:lnSpc>
+            </a:pPr>
+            <a:endParaRPr b="0" lang="pt-BR" sz="1000" spc="-1" strike="noStrike">
+              <a:latin typeface="Arial"/>
+            </a:endParaRPr>
+          </a:p>
+        </p:txBody>
+      </p:sp>
+      <p:sp>
+        <p:nvSpPr>
+          <p:cNvPr id="56" name="CustomShape 9"/>
+          <p:cNvSpPr/>
+          <p:nvPr/>
+        </p:nvSpPr>
+        <p:spPr>
+          <a:xfrm>
+            <a:off x="8119080" y="3552840"/>
+            <a:ext cx="1096560" cy="838800"/>
+          </a:xfrm>
+          <a:prstGeom prst="roundRect">
+            <a:avLst>
+              <a:gd name="adj" fmla="val 16667"/>
+            </a:avLst>
+          </a:prstGeom>
+          <a:solidFill>
+            <a:srgbClr val="70ad47"/>
+          </a:solidFill>
+          <a:ln>
+            <a:noFill/>
+          </a:ln>
+        </p:spPr>
+        <p:style>
+          <a:lnRef idx="0"/>
+          <a:fillRef idx="0"/>
+          <a:effectRef idx="0"/>
+          <a:fontRef idx="minor"/>
+        </p:style>
+        <p:txBody>
+          <a:bodyPr lIns="90000" rIns="90000" tIns="45000" bIns="45000" anchor="ctr">
+            <a:noAutofit/>
+          </a:bodyPr>
+          <a:p>
+            <a:pPr algn="ctr">
+              <a:lnSpc>
+                <a:spcPct val="100000"/>
+              </a:lnSpc>
+            </a:pPr>
+            <a:r>
+              <a:rPr b="1" lang="pt-BR" sz="1200" spc="-1" strike="noStrike">
+                <a:solidFill>
+                  <a:srgbClr val="ffffff"/>
+                </a:solidFill>
+                <a:latin typeface="Calibri"/>
+                <a:ea typeface="DejaVu Sans"/>
+              </a:rPr>
+              <a:t>Produzir  Sub componente</a:t>
+            </a:r>
+            <a:endParaRPr b="0" lang="pt-BR" sz="1200" spc="-1" strike="noStrike">
+              <a:latin typeface="Arial"/>
+            </a:endParaRPr>
+          </a:p>
+        </p:txBody>
+      </p:sp>
+      <p:sp>
+        <p:nvSpPr>
+          <p:cNvPr id="57" name="Line 10"/>
+          <p:cNvSpPr/>
+          <p:nvPr/>
+        </p:nvSpPr>
+        <p:spPr>
+          <a:xfrm>
+            <a:off x="8640000" y="3021480"/>
+            <a:ext cx="0" cy="506520"/>
+          </a:xfrm>
+          <a:prstGeom prst="line">
+            <a:avLst/>
+          </a:prstGeom>
+          <a:ln w="6480">
+            <a:solidFill>
+              <a:srgbClr val="4472c4"/>
+            </a:solidFill>
+            <a:miter/>
+          </a:ln>
+        </p:spPr>
+        <p:style>
+          <a:lnRef idx="0"/>
+          <a:fillRef idx="0"/>
+          <a:effectRef idx="0"/>
+          <a:fontRef idx="minor"/>
+        </p:style>
+      </p:sp>
+      <p:sp>
+        <p:nvSpPr>
+          <p:cNvPr id="58" name="CustomShape 11"/>
+          <p:cNvSpPr/>
+          <p:nvPr/>
+        </p:nvSpPr>
+        <p:spPr>
+          <a:xfrm>
+            <a:off x="4824000" y="3697200"/>
+            <a:ext cx="1096560" cy="838800"/>
+          </a:xfrm>
+          <a:prstGeom prst="roundRect">
+            <a:avLst>
+              <a:gd name="adj" fmla="val 16667"/>
+            </a:avLst>
+          </a:prstGeom>
+          <a:solidFill>
+            <a:srgbClr val="70ad47"/>
+          </a:solidFill>
+          <a:ln>
+            <a:noFill/>
+          </a:ln>
+        </p:spPr>
+        <p:style>
+          <a:lnRef idx="0"/>
+          <a:fillRef idx="0"/>
+          <a:effectRef idx="0"/>
+          <a:fontRef idx="minor"/>
+        </p:style>
+        <p:txBody>
+          <a:bodyPr lIns="90000" rIns="90000" tIns="45000" bIns="45000" anchor="ctr">
+            <a:noAutofit/>
+          </a:bodyPr>
+          <a:p>
+            <a:pPr algn="ctr">
+              <a:lnSpc>
+                <a:spcPct val="100000"/>
+              </a:lnSpc>
+            </a:pPr>
+            <a:r>
+              <a:rPr b="1" lang="pt-BR" sz="1200" spc="-1" strike="noStrike">
+                <a:solidFill>
+                  <a:srgbClr val="ffffff"/>
+                </a:solidFill>
+                <a:latin typeface="Calibri"/>
+                <a:ea typeface="DejaVu Sans"/>
+              </a:rPr>
+              <a:t>Entregar máquina</a:t>
+            </a:r>
+            <a:endParaRPr b="0" lang="pt-BR" sz="1200" spc="-1" strike="noStrike">
+              <a:latin typeface="Arial"/>
+            </a:endParaRPr>
+          </a:p>
+        </p:txBody>
+      </p:sp>
+      <p:sp>
+        <p:nvSpPr>
+          <p:cNvPr id="59" name="CustomShape 12"/>
+          <p:cNvSpPr/>
+          <p:nvPr/>
+        </p:nvSpPr>
+        <p:spPr>
+          <a:xfrm>
+            <a:off x="5760000" y="2542680"/>
+            <a:ext cx="1343880" cy="553320"/>
+          </a:xfrm>
+          <a:prstGeom prst="cube">
+            <a:avLst>
+              <a:gd name="adj" fmla="val 25000"/>
+            </a:avLst>
+          </a:prstGeom>
+          <a:solidFill>
+            <a:srgbClr val="ffc000"/>
+          </a:solidFill>
+          <a:ln w="12600">
+            <a:solidFill>
+              <a:srgbClr val="4472c4"/>
+            </a:solidFill>
+            <a:miter/>
+          </a:ln>
+        </p:spPr>
+        <p:style>
+          <a:lnRef idx="0"/>
+          <a:fillRef idx="0"/>
+          <a:effectRef idx="0"/>
+          <a:fontRef idx="minor"/>
+        </p:style>
+        <p:txBody>
+          <a:bodyPr lIns="90000" rIns="90000" tIns="45000" bIns="45000">
+            <a:noAutofit/>
+          </a:bodyPr>
+          <a:p>
+            <a:pPr algn="ctr">
+              <a:lnSpc>
+                <a:spcPct val="100000"/>
+              </a:lnSpc>
+            </a:pPr>
+            <a:r>
+              <a:rPr b="0" lang="pt-BR" sz="1000" spc="-1" strike="noStrike">
+                <a:solidFill>
+                  <a:srgbClr val="000000"/>
+                </a:solidFill>
+                <a:latin typeface="Calibri"/>
+                <a:ea typeface="DejaVu Sans"/>
+              </a:rPr>
+              <a:t>Controle de Quailidade</a:t>
+            </a:r>
+            <a:endParaRPr b="0" lang="pt-BR" sz="1000" spc="-1" strike="noStrike">
+              <a:latin typeface="Arial"/>
+            </a:endParaRPr>
+          </a:p>
+          <a:p>
+            <a:pPr algn="ctr">
+              <a:lnSpc>
+                <a:spcPct val="100000"/>
+              </a:lnSpc>
+            </a:pPr>
+            <a:r>
+              <a:rPr b="1" lang="pt-BR" sz="1000" spc="-1" strike="noStrike">
+                <a:solidFill>
+                  <a:srgbClr val="000000"/>
+                </a:solidFill>
+                <a:latin typeface="Calibri"/>
+                <a:ea typeface="DejaVu Sans"/>
+              </a:rPr>
+              <a:t>(Nó Operacional)</a:t>
+            </a:r>
+            <a:endParaRPr b="0" lang="pt-BR" sz="1000" spc="-1" strike="noStrike">
+              <a:latin typeface="Arial"/>
+            </a:endParaRPr>
+          </a:p>
+          <a:p>
+            <a:pPr>
+              <a:lnSpc>
+                <a:spcPct val="100000"/>
+              </a:lnSpc>
+            </a:pPr>
+            <a:endParaRPr b="0" lang="pt-BR" sz="1000" spc="-1" strike="noStrike">
+              <a:latin typeface="Arial"/>
+            </a:endParaRPr>
+          </a:p>
+        </p:txBody>
+      </p:sp>
+      <p:sp>
+        <p:nvSpPr>
+          <p:cNvPr id="60" name="CustomShape 13"/>
+          <p:cNvSpPr/>
+          <p:nvPr/>
+        </p:nvSpPr>
+        <p:spPr>
+          <a:xfrm>
+            <a:off x="6031440" y="3672000"/>
+            <a:ext cx="1096560" cy="864000"/>
+          </a:xfrm>
+          <a:prstGeom prst="roundRect">
+            <a:avLst>
+              <a:gd name="adj" fmla="val 16667"/>
+            </a:avLst>
+          </a:prstGeom>
+          <a:solidFill>
+            <a:srgbClr val="70ad47"/>
+          </a:solidFill>
+          <a:ln>
+            <a:noFill/>
+          </a:ln>
+        </p:spPr>
+        <p:style>
+          <a:lnRef idx="0"/>
+          <a:fillRef idx="0"/>
+          <a:effectRef idx="0"/>
+          <a:fontRef idx="minor"/>
+        </p:style>
+        <p:txBody>
+          <a:bodyPr lIns="90000" rIns="90000" tIns="45000" bIns="45000" anchor="ctr">
+            <a:noAutofit/>
+          </a:bodyPr>
+          <a:p>
+            <a:pPr algn="ctr">
+              <a:lnSpc>
+                <a:spcPct val="100000"/>
+              </a:lnSpc>
+            </a:pPr>
+            <a:r>
+              <a:rPr b="1" lang="pt-BR" sz="1200" spc="-1" strike="noStrike">
+                <a:solidFill>
+                  <a:srgbClr val="ffffff"/>
+                </a:solidFill>
+                <a:latin typeface="Calibri"/>
+                <a:ea typeface="DejaVu Sans"/>
+              </a:rPr>
+              <a:t>Testar sub componente</a:t>
+            </a:r>
+            <a:endParaRPr b="0" lang="pt-BR" sz="1200" spc="-1" strike="noStrike">
+              <a:latin typeface="Arial"/>
+            </a:endParaRPr>
+          </a:p>
+        </p:txBody>
+      </p:sp>
+      <p:sp>
+        <p:nvSpPr>
+          <p:cNvPr id="61" name="Line 14"/>
+          <p:cNvSpPr/>
+          <p:nvPr/>
+        </p:nvSpPr>
+        <p:spPr>
+          <a:xfrm>
+            <a:off x="6408000" y="3145320"/>
+            <a:ext cx="0" cy="479520"/>
+          </a:xfrm>
+          <a:prstGeom prst="line">
+            <a:avLst/>
+          </a:prstGeom>
+          <a:ln w="6480">
+            <a:solidFill>
+              <a:srgbClr val="4472c4"/>
+            </a:solidFill>
+            <a:miter/>
+          </a:ln>
+        </p:spPr>
+        <p:style>
+          <a:lnRef idx="0"/>
+          <a:fillRef idx="0"/>
+          <a:effectRef idx="0"/>
+          <a:fontRef idx="minor"/>
+        </p:style>
+      </p:sp>
+      <p:sp>
+        <p:nvSpPr>
+          <p:cNvPr id="62" name="Line 15"/>
+          <p:cNvSpPr/>
+          <p:nvPr/>
+        </p:nvSpPr>
+        <p:spPr>
+          <a:xfrm>
+            <a:off x="4968000" y="3073320"/>
+            <a:ext cx="288000" cy="623880"/>
+          </a:xfrm>
+          <a:prstGeom prst="line">
+            <a:avLst/>
+          </a:prstGeom>
+          <a:ln w="6480">
+            <a:solidFill>
+              <a:srgbClr val="4472c4"/>
+            </a:solidFill>
+            <a:miter/>
+          </a:ln>
+        </p:spPr>
+        <p:style>
+          <a:lnRef idx="0"/>
+          <a:fillRef idx="0"/>
+          <a:effectRef idx="0"/>
+          <a:fontRef idx="minor"/>
+        </p:style>
+      </p:sp>
+      <p:sp>
+        <p:nvSpPr>
+          <p:cNvPr id="63" name="CustomShape 16"/>
+          <p:cNvSpPr/>
+          <p:nvPr/>
+        </p:nvSpPr>
+        <p:spPr>
+          <a:xfrm>
+            <a:off x="7200000" y="3744000"/>
+            <a:ext cx="808560" cy="648000"/>
+          </a:xfrm>
+          <a:prstGeom prst="roundRect">
+            <a:avLst>
+              <a:gd name="adj" fmla="val 16667"/>
+            </a:avLst>
+          </a:prstGeom>
+          <a:solidFill>
+            <a:srgbClr val="70ad47"/>
+          </a:solidFill>
+          <a:ln>
+            <a:noFill/>
+          </a:ln>
+        </p:spPr>
+        <p:style>
+          <a:lnRef idx="0"/>
+          <a:fillRef idx="0"/>
+          <a:effectRef idx="0"/>
+          <a:fontRef idx="minor"/>
+        </p:style>
+        <p:txBody>
+          <a:bodyPr lIns="90000" rIns="90000" tIns="45000" bIns="45000" anchor="ctr">
+            <a:noAutofit/>
+          </a:bodyPr>
+          <a:p>
+            <a:pPr algn="ctr">
+              <a:lnSpc>
+                <a:spcPct val="100000"/>
+              </a:lnSpc>
+            </a:pPr>
+            <a:r>
+              <a:rPr b="1" lang="pt-BR" sz="1200" spc="-1" strike="noStrike">
+                <a:solidFill>
+                  <a:srgbClr val="ffffff"/>
+                </a:solidFill>
+                <a:latin typeface="Calibri"/>
+                <a:ea typeface="DejaVu Sans"/>
+              </a:rPr>
+              <a:t>Montar Maquina</a:t>
+            </a:r>
+            <a:endParaRPr b="0" lang="pt-BR" sz="1200" spc="-1" strike="noStrike">
+              <a:latin typeface="Arial"/>
+            </a:endParaRPr>
+          </a:p>
+        </p:txBody>
+      </p:sp>
+      <p:sp>
+        <p:nvSpPr>
+          <p:cNvPr id="64" name="Line 17"/>
+          <p:cNvSpPr/>
+          <p:nvPr/>
+        </p:nvSpPr>
+        <p:spPr>
+          <a:xfrm>
+            <a:off x="6912000" y="3096000"/>
+            <a:ext cx="648000" cy="695520"/>
+          </a:xfrm>
+          <a:prstGeom prst="line">
+            <a:avLst/>
+          </a:prstGeom>
+          <a:ln w="6480">
+            <a:solidFill>
+              <a:srgbClr val="4472c4"/>
+            </a:solidFill>
+            <a:miter/>
+          </a:ln>
+        </p:spPr>
+        <p:style>
+          <a:lnRef idx="0"/>
+          <a:fillRef idx="0"/>
+          <a:effectRef idx="0"/>
+          <a:fontRef idx="minor"/>
+        </p:style>
+      </p:sp>
     </p:spTree>
-    <p:extLst>
-      <p:ext uri="{BB962C8B-B14F-4D97-AF65-F5344CB8AC3E}">
-        <p14:creationId xmlns:p14="http://schemas.microsoft.com/office/powerpoint/2010/main" val="2309475354"/>
-      </p:ext>
-    </p:extLst>
   </p:cSld>
-  <p:clrMapOvr>
-    <a:masterClrMapping/>
-  </p:clrMapOvr>
+  <mc:AlternateContent>
+    <mc:Choice Requires="p14">
+      <p:transition spd="slow" p14:dur="2000"/>
+    </mc:Choice>
+    <mc:Fallback>
+      <p:transition spd="slow"/>
+    </mc:Fallback>
+  </mc:AlternateContent>
 </p:sld>
 </file>
 
 <file path=ppt/slides/slide3.xml><?xml version="1.0" encoding="utf-8"?>
-<p:sld xmlns:a="http://schemas.openxmlformats.org/drawingml/2006/main" xmlns:r="http://schemas.openxmlformats.org/officeDocument/2006/relationships" xmlns:p="http://schemas.openxmlformats.org/presentationml/2006/main">
+<p:sld xmlns:a="http://schemas.openxmlformats.org/drawingml/2006/main" xmlns:p="http://schemas.openxmlformats.org/presentationml/2006/main" xmlns:r="http://schemas.openxmlformats.org/officeDocument/2006/relationships" xmlns:p14="http://schemas.microsoft.com/office/powerpoint/2010/main" xmlns:p15="http://schemas.microsoft.com/office/powerpoint/2012/main" xmlns:mc="http://schemas.openxmlformats.org/markup-compatibility/2006">
   <p:cSld>
     <p:spTree>
       <p:nvGrpSpPr>
@@ -2857,14 +3144,14 @@
       </p:grpSpPr>
       <p:sp>
         <p:nvSpPr>
-          <p:cNvPr id="43" name="CustomShape 1"/>
+          <p:cNvPr id="65" name="CustomShape 1"/>
           <p:cNvSpPr/>
           <p:nvPr/>
         </p:nvSpPr>
         <p:spPr>
           <a:xfrm>
             <a:off x="692640" y="301680"/>
-            <a:ext cx="8692920" cy="1094760"/>
+            <a:ext cx="8692200" cy="1094040"/>
           </a:xfrm>
           <a:prstGeom prst="rect">
             <a:avLst/>
@@ -2875,22 +3162,15 @@
           </a:ln>
         </p:spPr>
         <p:style>
-          <a:lnRef idx="0">
-            <a:scrgbClr r="0" g="0" b="0"/>
-          </a:lnRef>
-          <a:fillRef idx="0">
-            <a:scrgbClr r="0" g="0" b="0"/>
-          </a:fillRef>
-          <a:effectRef idx="0">
-            <a:scrgbClr r="0" g="0" b="0"/>
-          </a:effectRef>
-          <a:fontRef idx="minor"/>
-        </p:style>
-        <p:txBody>
-          <a:bodyPr lIns="90000" tIns="45000" rIns="90000" bIns="45000" anchor="ctr">
+          <a:lnRef idx="0"/>
+          <a:fillRef idx="0"/>
+          <a:effectRef idx="0"/>
+          <a:fontRef idx="minor"/>
+        </p:style>
+        <p:txBody>
+          <a:bodyPr lIns="90000" rIns="90000" tIns="45000" bIns="45000" anchor="ctr">
             <a:noAutofit/>
           </a:bodyPr>
-          <a:lstStyle/>
           <a:p>
             <a:pPr>
               <a:lnSpc>
@@ -2898,7 +3178,7 @@
               </a:lnSpc>
             </a:pPr>
             <a:r>
-              <a:rPr lang="pt-BR" sz="4400" b="0" strike="noStrike" spc="-1" dirty="0">
+              <a:rPr b="0" lang="pt-BR" sz="4400" spc="-1" strike="noStrike">
                 <a:solidFill>
                   <a:srgbClr val="000000"/>
                 </a:solidFill>
@@ -2908,31 +3188,31 @@
               <a:t>Cenário: </a:t>
             </a:r>
             <a:r>
-              <a:rPr lang="pt-BR" sz="3200" b="0" strike="noStrike" spc="-1" dirty="0">
+              <a:rPr b="0" lang="pt-BR" sz="3200" spc="-1" strike="noStrike">
                 <a:solidFill>
                   <a:srgbClr val="000000"/>
                 </a:solidFill>
                 <a:latin typeface="Calibri"/>
                 <a:ea typeface="Microsoft YaHei"/>
               </a:rPr>
-              <a:t>Solicitar Produção de Máquina</a:t>
-            </a:r>
-            <a:endParaRPr lang="pt-BR" sz="2800" b="0" strike="noStrike" spc="-1" dirty="0">
-              <a:latin typeface="Arial"/>
-            </a:endParaRPr>
-          </a:p>
-        </p:txBody>
-      </p:sp>
-      <p:sp>
-        <p:nvSpPr>
-          <p:cNvPr id="44" name="CustomShape 2"/>
+              <a:t>Priorizar Pedido</a:t>
+            </a:r>
+            <a:endParaRPr b="0" lang="pt-BR" sz="3200" spc="-1" strike="noStrike">
+              <a:latin typeface="Arial"/>
+            </a:endParaRPr>
+          </a:p>
+        </p:txBody>
+      </p:sp>
+      <p:sp>
+        <p:nvSpPr>
+          <p:cNvPr id="66" name="CustomShape 2"/>
           <p:cNvSpPr/>
           <p:nvPr/>
         </p:nvSpPr>
         <p:spPr>
           <a:xfrm>
             <a:off x="6231600" y="2637000"/>
-            <a:ext cx="1344600" cy="482040"/>
+            <a:ext cx="1343880" cy="481320"/>
           </a:xfrm>
           <a:prstGeom prst="cube">
             <a:avLst>
@@ -2940,32 +3220,25 @@
             </a:avLst>
           </a:prstGeom>
           <a:solidFill>
-            <a:srgbClr val="FFC000"/>
+            <a:srgbClr val="ffc000"/>
           </a:solidFill>
           <a:ln w="12600">
             <a:solidFill>
-              <a:srgbClr val="4472C4"/>
+              <a:srgbClr val="4472c4"/>
             </a:solidFill>
             <a:miter/>
           </a:ln>
         </p:spPr>
         <p:style>
-          <a:lnRef idx="0">
-            <a:scrgbClr r="0" g="0" b="0"/>
-          </a:lnRef>
-          <a:fillRef idx="0">
-            <a:scrgbClr r="0" g="0" b="0"/>
-          </a:fillRef>
-          <a:effectRef idx="0">
-            <a:scrgbClr r="0" g="0" b="0"/>
-          </a:effectRef>
-          <a:fontRef idx="minor"/>
-        </p:style>
-        <p:txBody>
-          <a:bodyPr lIns="90000" tIns="45000" rIns="90000" bIns="45000">
+          <a:lnRef idx="0"/>
+          <a:fillRef idx="0"/>
+          <a:effectRef idx="0"/>
+          <a:fontRef idx="minor"/>
+        </p:style>
+        <p:txBody>
+          <a:bodyPr lIns="90000" rIns="90000" tIns="45000" bIns="45000">
             <a:noAutofit/>
           </a:bodyPr>
-          <a:lstStyle/>
           <a:p>
             <a:pPr algn="ctr">
               <a:lnSpc>
@@ -2973,16 +3246,16 @@
               </a:lnSpc>
             </a:pPr>
             <a:r>
-              <a:rPr lang="pt-BR" sz="1000" b="0" strike="noStrike" spc="-1">
+              <a:rPr b="0" lang="pt-BR" sz="1000" spc="-1" strike="noStrike">
                 <a:solidFill>
                   <a:srgbClr val="000000"/>
                 </a:solidFill>
                 <a:latin typeface="Calibri"/>
                 <a:ea typeface="DejaVu Sans"/>
               </a:rPr>
-              <a:t>Comercial</a:t>
-            </a:r>
-            <a:endParaRPr lang="pt-BR" sz="1000" b="0" strike="noStrike" spc="-1">
+              <a:t>Gerencia</a:t>
+            </a:r>
+            <a:endParaRPr b="0" lang="pt-BR" sz="1000" spc="-1" strike="noStrike">
               <a:latin typeface="Arial"/>
             </a:endParaRPr>
           </a:p>
@@ -2993,7 +3266,7 @@
               </a:lnSpc>
             </a:pPr>
             <a:r>
-              <a:rPr lang="pt-BR" sz="1000" b="1" strike="noStrike" spc="-1">
+              <a:rPr b="1" lang="pt-BR" sz="1000" spc="-1" strike="noStrike">
                 <a:solidFill>
                   <a:srgbClr val="000000"/>
                 </a:solidFill>
@@ -3002,7 +3275,7 @@
               </a:rPr>
               <a:t>(Nó Operacional)</a:t>
             </a:r>
-            <a:endParaRPr lang="pt-BR" sz="1000" b="0" strike="noStrike" spc="-1">
+            <a:endParaRPr b="0" lang="pt-BR" sz="1000" spc="-1" strike="noStrike">
               <a:latin typeface="Arial"/>
             </a:endParaRPr>
           </a:p>
@@ -3012,22 +3285,22 @@
                 <a:spcPct val="100000"/>
               </a:lnSpc>
             </a:pPr>
-            <a:endParaRPr lang="pt-BR" sz="1000" b="0" strike="noStrike" spc="-1">
-              <a:latin typeface="Arial"/>
-            </a:endParaRPr>
-          </a:p>
-        </p:txBody>
-      </p:sp>
-      <p:sp>
-        <p:nvSpPr>
-          <p:cNvPr id="45" name="CustomShape 3"/>
+            <a:endParaRPr b="0" lang="pt-BR" sz="1000" spc="-1" strike="noStrike">
+              <a:latin typeface="Arial"/>
+            </a:endParaRPr>
+          </a:p>
+        </p:txBody>
+      </p:sp>
+      <p:sp>
+        <p:nvSpPr>
+          <p:cNvPr id="67" name="CustomShape 3"/>
           <p:cNvSpPr/>
           <p:nvPr/>
         </p:nvSpPr>
         <p:spPr>
           <a:xfrm>
             <a:off x="6318000" y="3551760"/>
-            <a:ext cx="1097280" cy="839520"/>
+            <a:ext cx="1096560" cy="838800"/>
           </a:xfrm>
           <a:prstGeom prst="roundRect">
             <a:avLst>
@@ -3035,29 +3308,22 @@
             </a:avLst>
           </a:prstGeom>
           <a:solidFill>
-            <a:srgbClr val="70AD47"/>
+            <a:srgbClr val="70ad47"/>
           </a:solidFill>
           <a:ln>
             <a:noFill/>
           </a:ln>
         </p:spPr>
         <p:style>
-          <a:lnRef idx="0">
-            <a:scrgbClr r="0" g="0" b="0"/>
-          </a:lnRef>
-          <a:fillRef idx="0">
-            <a:scrgbClr r="0" g="0" b="0"/>
-          </a:fillRef>
-          <a:effectRef idx="0">
-            <a:scrgbClr r="0" g="0" b="0"/>
-          </a:effectRef>
-          <a:fontRef idx="minor"/>
-        </p:style>
-        <p:txBody>
-          <a:bodyPr lIns="90000" tIns="45000" rIns="90000" bIns="45000" anchor="ctr">
+          <a:lnRef idx="0"/>
+          <a:fillRef idx="0"/>
+          <a:effectRef idx="0"/>
+          <a:fontRef idx="minor"/>
+        </p:style>
+        <p:txBody>
+          <a:bodyPr lIns="90000" rIns="90000" tIns="45000" bIns="45000" anchor="ctr">
             <a:noAutofit/>
           </a:bodyPr>
-          <a:lstStyle/>
           <a:p>
             <a:pPr algn="ctr">
               <a:lnSpc>
@@ -3065,37 +3331,37 @@
               </a:lnSpc>
             </a:pPr>
             <a:r>
-              <a:rPr lang="pt-BR" sz="1200" b="1" spc="-1" dirty="0">
+              <a:rPr b="1" lang="pt-BR" sz="1200" spc="-1" strike="noStrike">
                 <a:solidFill>
-                  <a:srgbClr val="FFFFFF"/>
+                  <a:srgbClr val="ffffff"/>
                 </a:solidFill>
                 <a:latin typeface="Calibri"/>
                 <a:ea typeface="DejaVu Sans"/>
               </a:rPr>
-              <a:t>Realizar Produção de Máquina </a:t>
-            </a:r>
-            <a:endParaRPr lang="pt-BR" sz="1200" b="0" strike="noStrike" spc="-1" dirty="0">
-              <a:latin typeface="Arial"/>
-            </a:endParaRPr>
-          </a:p>
-        </p:txBody>
-      </p:sp>
-      <p:sp>
-        <p:nvSpPr>
-          <p:cNvPr id="46" name="CustomShape 4"/>
+              <a:t>Receber máquina para reparo</a:t>
+            </a:r>
+            <a:endParaRPr b="0" lang="pt-BR" sz="1200" spc="-1" strike="noStrike">
+              <a:latin typeface="Arial"/>
+            </a:endParaRPr>
+          </a:p>
+        </p:txBody>
+      </p:sp>
+      <p:sp>
+        <p:nvSpPr>
+          <p:cNvPr id="68" name="CustomShape 4"/>
           <p:cNvSpPr/>
           <p:nvPr/>
         </p:nvSpPr>
         <p:spPr>
           <a:xfrm>
             <a:off x="1682280" y="2561040"/>
-            <a:ext cx="1103760" cy="754920"/>
+            <a:ext cx="1103040" cy="754200"/>
           </a:xfrm>
           <a:prstGeom prst="rect">
             <a:avLst/>
           </a:prstGeom>
           <a:solidFill>
-            <a:srgbClr val="4472C4"/>
+            <a:srgbClr val="4472c4"/>
           </a:solidFill>
           <a:ln w="12600">
             <a:solidFill>
@@ -3105,22 +3371,15 @@
           </a:ln>
         </p:spPr>
         <p:style>
-          <a:lnRef idx="0">
-            <a:scrgbClr r="0" g="0" b="0"/>
-          </a:lnRef>
-          <a:fillRef idx="0">
-            <a:scrgbClr r="0" g="0" b="0"/>
-          </a:fillRef>
-          <a:effectRef idx="0">
-            <a:scrgbClr r="0" g="0" b="0"/>
-          </a:effectRef>
-          <a:fontRef idx="minor"/>
-        </p:style>
-        <p:txBody>
-          <a:bodyPr lIns="90000" tIns="45000" rIns="90000" bIns="45000" anchor="ctr">
+          <a:lnRef idx="0"/>
+          <a:fillRef idx="0"/>
+          <a:effectRef idx="0"/>
+          <a:fontRef idx="minor"/>
+        </p:style>
+        <p:txBody>
+          <a:bodyPr lIns="90000" rIns="90000" tIns="45000" bIns="45000" anchor="ctr">
             <a:noAutofit/>
           </a:bodyPr>
-          <a:lstStyle/>
           <a:p>
             <a:pPr algn="ctr">
               <a:lnSpc>
@@ -3128,31 +3387,31 @@
               </a:lnSpc>
             </a:pPr>
             <a:r>
-              <a:rPr lang="pt-BR" sz="1800" b="0" strike="noStrike" spc="-1">
+              <a:rPr b="0" lang="pt-BR" sz="1800" spc="-1" strike="noStrike">
                 <a:solidFill>
-                  <a:srgbClr val="FFFFFF"/>
+                  <a:srgbClr val="ffffff"/>
                 </a:solidFill>
                 <a:latin typeface="Calibri"/>
                 <a:ea typeface="DejaVu Sans"/>
               </a:rPr>
-              <a:t>Cliente</a:t>
-            </a:r>
-            <a:endParaRPr lang="pt-BR" sz="1800" b="0" strike="noStrike" spc="-1">
-              <a:latin typeface="Arial"/>
-            </a:endParaRPr>
-          </a:p>
-        </p:txBody>
-      </p:sp>
-      <p:sp>
-        <p:nvSpPr>
-          <p:cNvPr id="48" name="CustomShape 6"/>
+              <a:t>Negocio</a:t>
+            </a:r>
+            <a:endParaRPr b="0" lang="pt-BR" sz="1800" spc="-1" strike="noStrike">
+              <a:latin typeface="Arial"/>
+            </a:endParaRPr>
+          </a:p>
+        </p:txBody>
+      </p:sp>
+      <p:sp>
+        <p:nvSpPr>
+          <p:cNvPr id="69" name="CustomShape 5"/>
           <p:cNvSpPr/>
           <p:nvPr/>
         </p:nvSpPr>
         <p:spPr>
           <a:xfrm>
             <a:off x="5412240" y="1584000"/>
-            <a:ext cx="3011040" cy="3095280"/>
+            <a:ext cx="3010320" cy="3094560"/>
           </a:xfrm>
           <a:prstGeom prst="roundRect">
             <a:avLst>
@@ -3168,43 +3427,40 @@
           </a:ln>
         </p:spPr>
         <p:style>
-          <a:lnRef idx="0">
-            <a:scrgbClr r="0" g="0" b="0"/>
-          </a:lnRef>
-          <a:fillRef idx="0">
-            <a:scrgbClr r="0" g="0" b="0"/>
-          </a:fillRef>
-          <a:effectRef idx="0">
-            <a:scrgbClr r="0" g="0" b="0"/>
-          </a:effectRef>
-          <a:fontRef idx="minor"/>
-        </p:style>
-        <p:txBody>
-          <a:bodyPr lIns="90000" tIns="45000" rIns="90000" bIns="45000">
+          <a:lnRef idx="0"/>
+          <a:fillRef idx="0"/>
+          <a:effectRef idx="0"/>
+          <a:fontRef idx="minor"/>
+        </p:style>
+        <p:txBody>
+          <a:bodyPr lIns="90000" rIns="90000" tIns="45000" bIns="45000">
             <a:noAutofit/>
           </a:bodyPr>
-          <a:lstStyle/>
-          <a:p>
-            <a:pPr algn="ctr"/>
-            <a:r>
-              <a:rPr lang="pt-BR" sz="1800" b="0" strike="noStrike" spc="-1" dirty="0">
+          <a:p>
+            <a:pPr algn="ctr">
+              <a:lnSpc>
+                <a:spcPct val="100000"/>
+              </a:lnSpc>
+            </a:pPr>
+            <a:r>
+              <a:rPr b="0" lang="pt-BR" sz="1800" spc="-1" strike="noStrike">
                 <a:solidFill>
                   <a:srgbClr val="000000"/>
                 </a:solidFill>
                 <a:latin typeface="Calibri"/>
                 <a:ea typeface="DejaVu Sans"/>
               </a:rPr>
-              <a:t>G.A Tecnologia</a:t>
-            </a:r>
-            <a:endParaRPr lang="pt-BR" sz="1800" b="0" strike="noStrike" spc="-1" dirty="0">
-              <a:latin typeface="Arial"/>
-            </a:endParaRPr>
-          </a:p>
-        </p:txBody>
-      </p:sp>
-      <p:sp>
-        <p:nvSpPr>
-          <p:cNvPr id="49" name="Line 7"/>
+              <a:t>Produção</a:t>
+            </a:r>
+            <a:endParaRPr b="0" lang="pt-BR" sz="1800" spc="-1" strike="noStrike">
+              <a:latin typeface="Arial"/>
+            </a:endParaRPr>
+          </a:p>
+        </p:txBody>
+      </p:sp>
+      <p:sp>
+        <p:nvSpPr>
+          <p:cNvPr id="70" name="Line 6"/>
           <p:cNvSpPr/>
           <p:nvPr/>
         </p:nvSpPr>
@@ -3218,46 +3474,37 @@
           </a:prstGeom>
           <a:ln w="6480">
             <a:solidFill>
-              <a:srgbClr val="4472C4"/>
+              <a:srgbClr val="4472c4"/>
             </a:solidFill>
             <a:miter/>
           </a:ln>
         </p:spPr>
         <p:style>
-          <a:lnRef idx="0">
-            <a:scrgbClr r="0" g="0" b="0"/>
-          </a:lnRef>
-          <a:fillRef idx="0">
-            <a:scrgbClr r="0" g="0" b="0"/>
-          </a:fillRef>
-          <a:effectRef idx="0">
-            <a:scrgbClr r="0" g="0" b="0"/>
-          </a:effectRef>
-          <a:fontRef idx="minor"/>
-        </p:style>
-      </p:sp>
-      <p:cxnSp>
-        <p:nvCxnSpPr>
-          <p:cNvPr id="3" name="Conector reto 2">
-            <a:extLst>
-              <a:ext uri="{FF2B5EF4-FFF2-40B4-BE49-F238E27FC236}">
-                <a16:creationId xmlns:a16="http://schemas.microsoft.com/office/drawing/2014/main" id="{9F0E8533-1A7F-4ED0-BF9C-66C645F925DF}"/>
-              </a:ext>
-            </a:extLst>
-          </p:cNvPr>
-          <p:cNvCxnSpPr>
-            <a:stCxn id="46" idx="3"/>
-          </p:cNvCxnSpPr>
-          <p:nvPr/>
-        </p:nvCxnSpPr>
-        <p:spPr>
-          <a:xfrm>
-            <a:off x="2786040" y="2938500"/>
-            <a:ext cx="2626200" cy="11177"/>
+          <a:lnRef idx="0"/>
+          <a:fillRef idx="0"/>
+          <a:effectRef idx="0"/>
+          <a:fontRef idx="minor"/>
+        </p:style>
+      </p:sp>
+      <p:sp>
+        <p:nvSpPr>
+          <p:cNvPr id="71" name="Line 7"/>
+          <p:cNvSpPr/>
+          <p:nvPr/>
+        </p:nvSpPr>
+        <p:spPr>
+          <a:xfrm>
+            <a:off x="2786040" y="2938320"/>
+            <a:ext cx="2626200" cy="11160"/>
           </a:xfrm>
           <a:prstGeom prst="line">
             <a:avLst/>
           </a:prstGeom>
+          <a:ln>
+            <a:solidFill>
+              <a:srgbClr val="4a7ebb"/>
+            </a:solidFill>
+          </a:ln>
         </p:spPr>
         <p:style>
           <a:lnRef idx="1">
@@ -3269,16 +3516,833 @@
           <a:effectRef idx="0">
             <a:schemeClr val="accent1"/>
           </a:effectRef>
-          <a:fontRef idx="minor">
-            <a:schemeClr val="tx1"/>
-          </a:fontRef>
-        </p:style>
-      </p:cxnSp>
+          <a:fontRef idx="minor"/>
+        </p:style>
+      </p:sp>
     </p:spTree>
   </p:cSld>
-  <p:clrMapOvr>
-    <a:masterClrMapping/>
-  </p:clrMapOvr>
+  <mc:AlternateContent>
+    <mc:Choice Requires="p14">
+      <p:transition spd="slow" p14:dur="2000"/>
+    </mc:Choice>
+    <mc:Fallback>
+      <p:transition spd="slow"/>
+    </mc:Fallback>
+  </mc:AlternateContent>
+</p:sld>
+</file>
+
+<file path=ppt/slides/slide4.xml><?xml version="1.0" encoding="utf-8"?>
+<p:sld xmlns:a="http://schemas.openxmlformats.org/drawingml/2006/main" xmlns:p="http://schemas.openxmlformats.org/presentationml/2006/main" xmlns:r="http://schemas.openxmlformats.org/officeDocument/2006/relationships" xmlns:p14="http://schemas.microsoft.com/office/powerpoint/2010/main" xmlns:p15="http://schemas.microsoft.com/office/powerpoint/2012/main" xmlns:mc="http://schemas.openxmlformats.org/markup-compatibility/2006">
+  <p:cSld>
+    <p:spTree>
+      <p:nvGrpSpPr>
+        <p:cNvPr id="1" name=""/>
+        <p:cNvGrpSpPr/>
+        <p:nvPr/>
+      </p:nvGrpSpPr>
+      <p:grpSpPr>
+        <a:xfrm>
+          <a:off x="0" y="0"/>
+          <a:ext cx="0" cy="0"/>
+          <a:chOff x="0" y="0"/>
+          <a:chExt cx="0" cy="0"/>
+        </a:xfrm>
+      </p:grpSpPr>
+      <p:sp>
+        <p:nvSpPr>
+          <p:cNvPr id="72" name="CustomShape 1"/>
+          <p:cNvSpPr/>
+          <p:nvPr/>
+        </p:nvSpPr>
+        <p:spPr>
+          <a:xfrm>
+            <a:off x="692640" y="301680"/>
+            <a:ext cx="8692200" cy="1094040"/>
+          </a:xfrm>
+          <a:prstGeom prst="rect">
+            <a:avLst/>
+          </a:prstGeom>
+          <a:noFill/>
+          <a:ln>
+            <a:noFill/>
+          </a:ln>
+        </p:spPr>
+        <p:style>
+          <a:lnRef idx="0"/>
+          <a:fillRef idx="0"/>
+          <a:effectRef idx="0"/>
+          <a:fontRef idx="minor"/>
+        </p:style>
+        <p:txBody>
+          <a:bodyPr lIns="90000" rIns="90000" tIns="45000" bIns="45000" anchor="ctr">
+            <a:noAutofit/>
+          </a:bodyPr>
+          <a:p>
+            <a:pPr>
+              <a:lnSpc>
+                <a:spcPct val="90000"/>
+              </a:lnSpc>
+            </a:pPr>
+            <a:r>
+              <a:rPr b="0" lang="pt-BR" sz="4400" spc="-1" strike="noStrike">
+                <a:solidFill>
+                  <a:srgbClr val="000000"/>
+                </a:solidFill>
+                <a:latin typeface="Calibri Light"/>
+                <a:ea typeface="Microsoft YaHei"/>
+              </a:rPr>
+              <a:t>Cenário: </a:t>
+            </a:r>
+            <a:r>
+              <a:rPr b="0" lang="pt-BR" sz="3200" spc="-1" strike="noStrike">
+                <a:solidFill>
+                  <a:srgbClr val="000000"/>
+                </a:solidFill>
+                <a:latin typeface="Calibri"/>
+                <a:ea typeface="Microsoft YaHei"/>
+              </a:rPr>
+              <a:t>Solicitar Reparo</a:t>
+            </a:r>
+            <a:endParaRPr b="0" lang="pt-BR" sz="3200" spc="-1" strike="noStrike">
+              <a:latin typeface="Arial"/>
+            </a:endParaRPr>
+          </a:p>
+        </p:txBody>
+      </p:sp>
+      <p:sp>
+        <p:nvSpPr>
+          <p:cNvPr id="73" name="CustomShape 2"/>
+          <p:cNvSpPr/>
+          <p:nvPr/>
+        </p:nvSpPr>
+        <p:spPr>
+          <a:xfrm>
+            <a:off x="6231600" y="2637000"/>
+            <a:ext cx="1343880" cy="481320"/>
+          </a:xfrm>
+          <a:prstGeom prst="cube">
+            <a:avLst>
+              <a:gd name="adj" fmla="val 25000"/>
+            </a:avLst>
+          </a:prstGeom>
+          <a:solidFill>
+            <a:srgbClr val="ffc000"/>
+          </a:solidFill>
+          <a:ln w="12600">
+            <a:solidFill>
+              <a:srgbClr val="4472c4"/>
+            </a:solidFill>
+            <a:miter/>
+          </a:ln>
+        </p:spPr>
+        <p:style>
+          <a:lnRef idx="0"/>
+          <a:fillRef idx="0"/>
+          <a:effectRef idx="0"/>
+          <a:fontRef idx="minor"/>
+        </p:style>
+        <p:txBody>
+          <a:bodyPr lIns="90000" rIns="90000" tIns="45000" bIns="45000">
+            <a:noAutofit/>
+          </a:bodyPr>
+          <a:p>
+            <a:pPr algn="ctr">
+              <a:lnSpc>
+                <a:spcPct val="100000"/>
+              </a:lnSpc>
+            </a:pPr>
+            <a:r>
+              <a:rPr b="0" lang="pt-BR" sz="1000" spc="-1" strike="noStrike">
+                <a:solidFill>
+                  <a:srgbClr val="000000"/>
+                </a:solidFill>
+                <a:latin typeface="Calibri"/>
+                <a:ea typeface="DejaVu Sans"/>
+              </a:rPr>
+              <a:t>Gerencia</a:t>
+            </a:r>
+            <a:endParaRPr b="0" lang="pt-BR" sz="1000" spc="-1" strike="noStrike">
+              <a:latin typeface="Arial"/>
+            </a:endParaRPr>
+          </a:p>
+          <a:p>
+            <a:pPr algn="ctr">
+              <a:lnSpc>
+                <a:spcPct val="100000"/>
+              </a:lnSpc>
+            </a:pPr>
+            <a:r>
+              <a:rPr b="1" lang="pt-BR" sz="1000" spc="-1" strike="noStrike">
+                <a:solidFill>
+                  <a:srgbClr val="000000"/>
+                </a:solidFill>
+                <a:latin typeface="Calibri"/>
+                <a:ea typeface="DejaVu Sans"/>
+              </a:rPr>
+              <a:t>(Nó Operacional)</a:t>
+            </a:r>
+            <a:endParaRPr b="0" lang="pt-BR" sz="1000" spc="-1" strike="noStrike">
+              <a:latin typeface="Arial"/>
+            </a:endParaRPr>
+          </a:p>
+          <a:p>
+            <a:pPr>
+              <a:lnSpc>
+                <a:spcPct val="100000"/>
+              </a:lnSpc>
+            </a:pPr>
+            <a:endParaRPr b="0" lang="pt-BR" sz="1000" spc="-1" strike="noStrike">
+              <a:latin typeface="Arial"/>
+            </a:endParaRPr>
+          </a:p>
+        </p:txBody>
+      </p:sp>
+      <p:sp>
+        <p:nvSpPr>
+          <p:cNvPr id="74" name="CustomShape 3"/>
+          <p:cNvSpPr/>
+          <p:nvPr/>
+        </p:nvSpPr>
+        <p:spPr>
+          <a:xfrm>
+            <a:off x="6318000" y="3551760"/>
+            <a:ext cx="1096560" cy="838800"/>
+          </a:xfrm>
+          <a:prstGeom prst="roundRect">
+            <a:avLst>
+              <a:gd name="adj" fmla="val 16667"/>
+            </a:avLst>
+          </a:prstGeom>
+          <a:solidFill>
+            <a:srgbClr val="70ad47"/>
+          </a:solidFill>
+          <a:ln>
+            <a:noFill/>
+          </a:ln>
+        </p:spPr>
+        <p:style>
+          <a:lnRef idx="0"/>
+          <a:fillRef idx="0"/>
+          <a:effectRef idx="0"/>
+          <a:fontRef idx="minor"/>
+        </p:style>
+        <p:txBody>
+          <a:bodyPr lIns="90000" rIns="90000" tIns="45000" bIns="45000" anchor="ctr">
+            <a:noAutofit/>
+          </a:bodyPr>
+          <a:p>
+            <a:pPr algn="ctr">
+              <a:lnSpc>
+                <a:spcPct val="100000"/>
+              </a:lnSpc>
+            </a:pPr>
+            <a:r>
+              <a:rPr b="1" lang="pt-BR" sz="1200" spc="-1" strike="noStrike">
+                <a:solidFill>
+                  <a:srgbClr val="ffffff"/>
+                </a:solidFill>
+                <a:latin typeface="Calibri"/>
+                <a:ea typeface="DejaVu Sans"/>
+              </a:rPr>
+              <a:t>Receber solicitação de reparo</a:t>
+            </a:r>
+            <a:endParaRPr b="0" lang="pt-BR" sz="1200" spc="-1" strike="noStrike">
+              <a:latin typeface="Arial"/>
+            </a:endParaRPr>
+          </a:p>
+        </p:txBody>
+      </p:sp>
+      <p:sp>
+        <p:nvSpPr>
+          <p:cNvPr id="75" name="CustomShape 4"/>
+          <p:cNvSpPr/>
+          <p:nvPr/>
+        </p:nvSpPr>
+        <p:spPr>
+          <a:xfrm>
+            <a:off x="1682280" y="2561040"/>
+            <a:ext cx="1103040" cy="754200"/>
+          </a:xfrm>
+          <a:prstGeom prst="rect">
+            <a:avLst/>
+          </a:prstGeom>
+          <a:solidFill>
+            <a:srgbClr val="4472c4"/>
+          </a:solidFill>
+          <a:ln w="12600">
+            <a:solidFill>
+              <a:srgbClr val="325490"/>
+            </a:solidFill>
+            <a:miter/>
+          </a:ln>
+        </p:spPr>
+        <p:style>
+          <a:lnRef idx="0"/>
+          <a:fillRef idx="0"/>
+          <a:effectRef idx="0"/>
+          <a:fontRef idx="minor"/>
+        </p:style>
+        <p:txBody>
+          <a:bodyPr lIns="90000" rIns="90000" tIns="45000" bIns="45000" anchor="ctr">
+            <a:noAutofit/>
+          </a:bodyPr>
+          <a:p>
+            <a:pPr algn="ctr">
+              <a:lnSpc>
+                <a:spcPct val="100000"/>
+              </a:lnSpc>
+            </a:pPr>
+            <a:r>
+              <a:rPr b="0" lang="pt-BR" sz="1800" spc="-1" strike="noStrike">
+                <a:solidFill>
+                  <a:srgbClr val="ffffff"/>
+                </a:solidFill>
+                <a:latin typeface="Calibri"/>
+                <a:ea typeface="DejaVu Sans"/>
+              </a:rPr>
+              <a:t>Comercial</a:t>
+            </a:r>
+            <a:endParaRPr b="0" lang="pt-BR" sz="1800" spc="-1" strike="noStrike">
+              <a:latin typeface="Arial"/>
+            </a:endParaRPr>
+          </a:p>
+        </p:txBody>
+      </p:sp>
+      <p:sp>
+        <p:nvSpPr>
+          <p:cNvPr id="76" name="CustomShape 5"/>
+          <p:cNvSpPr/>
+          <p:nvPr/>
+        </p:nvSpPr>
+        <p:spPr>
+          <a:xfrm>
+            <a:off x="5412240" y="1584000"/>
+            <a:ext cx="3010320" cy="3094560"/>
+          </a:xfrm>
+          <a:prstGeom prst="roundRect">
+            <a:avLst>
+              <a:gd name="adj" fmla="val 16667"/>
+            </a:avLst>
+          </a:prstGeom>
+          <a:noFill/>
+          <a:ln w="12600">
+            <a:solidFill>
+              <a:srgbClr val="325490"/>
+            </a:solidFill>
+            <a:miter/>
+          </a:ln>
+        </p:spPr>
+        <p:style>
+          <a:lnRef idx="0"/>
+          <a:fillRef idx="0"/>
+          <a:effectRef idx="0"/>
+          <a:fontRef idx="minor"/>
+        </p:style>
+        <p:txBody>
+          <a:bodyPr lIns="90000" rIns="90000" tIns="45000" bIns="45000">
+            <a:noAutofit/>
+          </a:bodyPr>
+          <a:p>
+            <a:pPr algn="ctr">
+              <a:lnSpc>
+                <a:spcPct val="100000"/>
+              </a:lnSpc>
+            </a:pPr>
+            <a:r>
+              <a:rPr b="0" lang="pt-BR" sz="1800" spc="-1" strike="noStrike">
+                <a:solidFill>
+                  <a:srgbClr val="000000"/>
+                </a:solidFill>
+                <a:latin typeface="Calibri"/>
+                <a:ea typeface="DejaVu Sans"/>
+              </a:rPr>
+              <a:t>Produção</a:t>
+            </a:r>
+            <a:endParaRPr b="0" lang="pt-BR" sz="1800" spc="-1" strike="noStrike">
+              <a:latin typeface="Arial"/>
+            </a:endParaRPr>
+          </a:p>
+        </p:txBody>
+      </p:sp>
+      <p:sp>
+        <p:nvSpPr>
+          <p:cNvPr id="77" name="Line 6"/>
+          <p:cNvSpPr/>
+          <p:nvPr/>
+        </p:nvSpPr>
+        <p:spPr>
+          <a:xfrm>
+            <a:off x="6843600" y="3120120"/>
+            <a:ext cx="2520" cy="432000"/>
+          </a:xfrm>
+          <a:prstGeom prst="line">
+            <a:avLst/>
+          </a:prstGeom>
+          <a:ln w="6480">
+            <a:solidFill>
+              <a:srgbClr val="4472c4"/>
+            </a:solidFill>
+            <a:miter/>
+          </a:ln>
+        </p:spPr>
+        <p:style>
+          <a:lnRef idx="0"/>
+          <a:fillRef idx="0"/>
+          <a:effectRef idx="0"/>
+          <a:fontRef idx="minor"/>
+        </p:style>
+      </p:sp>
+      <p:sp>
+        <p:nvSpPr>
+          <p:cNvPr id="78" name="Line 7"/>
+          <p:cNvSpPr/>
+          <p:nvPr/>
+        </p:nvSpPr>
+        <p:spPr>
+          <a:xfrm>
+            <a:off x="2786040" y="2938320"/>
+            <a:ext cx="2626200" cy="11160"/>
+          </a:xfrm>
+          <a:prstGeom prst="line">
+            <a:avLst/>
+          </a:prstGeom>
+          <a:ln>
+            <a:solidFill>
+              <a:srgbClr val="4a7ebb"/>
+            </a:solidFill>
+          </a:ln>
+        </p:spPr>
+        <p:style>
+          <a:lnRef idx="1">
+            <a:schemeClr val="accent1"/>
+          </a:lnRef>
+          <a:fillRef idx="0">
+            <a:schemeClr val="accent1"/>
+          </a:fillRef>
+          <a:effectRef idx="0">
+            <a:schemeClr val="accent1"/>
+          </a:effectRef>
+          <a:fontRef idx="minor"/>
+        </p:style>
+      </p:sp>
+    </p:spTree>
+  </p:cSld>
+  <mc:AlternateContent>
+    <mc:Choice Requires="p14">
+      <p:transition spd="slow" p14:dur="2000"/>
+    </mc:Choice>
+    <mc:Fallback>
+      <p:transition spd="slow"/>
+    </mc:Fallback>
+  </mc:AlternateContent>
+</p:sld>
+</file>
+
+<file path=ppt/slides/slide5.xml><?xml version="1.0" encoding="utf-8"?>
+<p:sld xmlns:a="http://schemas.openxmlformats.org/drawingml/2006/main" xmlns:p="http://schemas.openxmlformats.org/presentationml/2006/main" xmlns:r="http://schemas.openxmlformats.org/officeDocument/2006/relationships" xmlns:p14="http://schemas.microsoft.com/office/powerpoint/2010/main" xmlns:p15="http://schemas.microsoft.com/office/powerpoint/2012/main" xmlns:mc="http://schemas.openxmlformats.org/markup-compatibility/2006">
+  <p:cSld>
+    <p:spTree>
+      <p:nvGrpSpPr>
+        <p:cNvPr id="1" name=""/>
+        <p:cNvGrpSpPr/>
+        <p:nvPr/>
+      </p:nvGrpSpPr>
+      <p:grpSpPr>
+        <a:xfrm>
+          <a:off x="0" y="0"/>
+          <a:ext cx="0" cy="0"/>
+          <a:chOff x="0" y="0"/>
+          <a:chExt cx="0" cy="0"/>
+        </a:xfrm>
+      </p:grpSpPr>
+      <p:sp>
+        <p:nvSpPr>
+          <p:cNvPr id="79" name="CustomShape 1"/>
+          <p:cNvSpPr/>
+          <p:nvPr/>
+        </p:nvSpPr>
+        <p:spPr>
+          <a:xfrm>
+            <a:off x="692640" y="301680"/>
+            <a:ext cx="8692200" cy="1094040"/>
+          </a:xfrm>
+          <a:prstGeom prst="rect">
+            <a:avLst/>
+          </a:prstGeom>
+          <a:noFill/>
+          <a:ln>
+            <a:noFill/>
+          </a:ln>
+        </p:spPr>
+        <p:style>
+          <a:lnRef idx="0"/>
+          <a:fillRef idx="0"/>
+          <a:effectRef idx="0"/>
+          <a:fontRef idx="minor"/>
+        </p:style>
+        <p:txBody>
+          <a:bodyPr lIns="90000" rIns="90000" tIns="45000" bIns="45000" anchor="ctr">
+            <a:noAutofit/>
+          </a:bodyPr>
+          <a:p>
+            <a:pPr>
+              <a:lnSpc>
+                <a:spcPct val="90000"/>
+              </a:lnSpc>
+            </a:pPr>
+            <a:r>
+              <a:rPr b="0" lang="pt-BR" sz="4400" spc="-1" strike="noStrike">
+                <a:solidFill>
+                  <a:srgbClr val="000000"/>
+                </a:solidFill>
+                <a:latin typeface="Calibri Light"/>
+                <a:ea typeface="Microsoft YaHei"/>
+              </a:rPr>
+              <a:t>Cenário: </a:t>
+            </a:r>
+            <a:r>
+              <a:rPr b="0" lang="pt-BR" sz="3200" spc="-1" strike="noStrike">
+                <a:solidFill>
+                  <a:srgbClr val="000000"/>
+                </a:solidFill>
+                <a:latin typeface="Calibri"/>
+                <a:ea typeface="Microsoft YaHei"/>
+              </a:rPr>
+              <a:t>Enviar Máquina para reparo</a:t>
+            </a:r>
+            <a:endParaRPr b="0" lang="pt-BR" sz="3200" spc="-1" strike="noStrike">
+              <a:latin typeface="Arial"/>
+            </a:endParaRPr>
+          </a:p>
+        </p:txBody>
+      </p:sp>
+      <p:sp>
+        <p:nvSpPr>
+          <p:cNvPr id="80" name="CustomShape 2"/>
+          <p:cNvSpPr/>
+          <p:nvPr/>
+        </p:nvSpPr>
+        <p:spPr>
+          <a:xfrm>
+            <a:off x="5496120" y="2664000"/>
+            <a:ext cx="1343880" cy="481320"/>
+          </a:xfrm>
+          <a:prstGeom prst="cube">
+            <a:avLst>
+              <a:gd name="adj" fmla="val 25000"/>
+            </a:avLst>
+          </a:prstGeom>
+          <a:solidFill>
+            <a:srgbClr val="ffc000"/>
+          </a:solidFill>
+          <a:ln w="12600">
+            <a:solidFill>
+              <a:srgbClr val="4472c4"/>
+            </a:solidFill>
+            <a:miter/>
+          </a:ln>
+        </p:spPr>
+        <p:style>
+          <a:lnRef idx="0"/>
+          <a:fillRef idx="0"/>
+          <a:effectRef idx="0"/>
+          <a:fontRef idx="minor"/>
+        </p:style>
+        <p:txBody>
+          <a:bodyPr lIns="90000" rIns="90000" tIns="45000" bIns="45000">
+            <a:noAutofit/>
+          </a:bodyPr>
+          <a:p>
+            <a:pPr algn="ctr">
+              <a:lnSpc>
+                <a:spcPct val="100000"/>
+              </a:lnSpc>
+            </a:pPr>
+            <a:r>
+              <a:rPr b="0" lang="pt-BR" sz="1000" spc="-1" strike="noStrike">
+                <a:solidFill>
+                  <a:srgbClr val="000000"/>
+                </a:solidFill>
+                <a:latin typeface="Calibri"/>
+                <a:ea typeface="DejaVu Sans"/>
+              </a:rPr>
+              <a:t>Gerencia</a:t>
+            </a:r>
+            <a:endParaRPr b="0" lang="pt-BR" sz="1000" spc="-1" strike="noStrike">
+              <a:latin typeface="Arial"/>
+            </a:endParaRPr>
+          </a:p>
+          <a:p>
+            <a:pPr algn="ctr">
+              <a:lnSpc>
+                <a:spcPct val="100000"/>
+              </a:lnSpc>
+            </a:pPr>
+            <a:r>
+              <a:rPr b="1" lang="pt-BR" sz="1000" spc="-1" strike="noStrike">
+                <a:solidFill>
+                  <a:srgbClr val="000000"/>
+                </a:solidFill>
+                <a:latin typeface="Calibri"/>
+                <a:ea typeface="DejaVu Sans"/>
+              </a:rPr>
+              <a:t>(Nó Operacional)</a:t>
+            </a:r>
+            <a:endParaRPr b="0" lang="pt-BR" sz="1000" spc="-1" strike="noStrike">
+              <a:latin typeface="Arial"/>
+            </a:endParaRPr>
+          </a:p>
+          <a:p>
+            <a:pPr>
+              <a:lnSpc>
+                <a:spcPct val="100000"/>
+              </a:lnSpc>
+            </a:pPr>
+            <a:endParaRPr b="0" lang="pt-BR" sz="1000" spc="-1" strike="noStrike">
+              <a:latin typeface="Arial"/>
+            </a:endParaRPr>
+          </a:p>
+        </p:txBody>
+      </p:sp>
+      <p:sp>
+        <p:nvSpPr>
+          <p:cNvPr id="81" name="CustomShape 3"/>
+          <p:cNvSpPr/>
+          <p:nvPr/>
+        </p:nvSpPr>
+        <p:spPr>
+          <a:xfrm>
+            <a:off x="5599440" y="3697200"/>
+            <a:ext cx="1096560" cy="838800"/>
+          </a:xfrm>
+          <a:prstGeom prst="roundRect">
+            <a:avLst>
+              <a:gd name="adj" fmla="val 16667"/>
+            </a:avLst>
+          </a:prstGeom>
+          <a:solidFill>
+            <a:srgbClr val="70ad47"/>
+          </a:solidFill>
+          <a:ln>
+            <a:noFill/>
+          </a:ln>
+        </p:spPr>
+        <p:style>
+          <a:lnRef idx="0"/>
+          <a:fillRef idx="0"/>
+          <a:effectRef idx="0"/>
+          <a:fontRef idx="minor"/>
+        </p:style>
+        <p:txBody>
+          <a:bodyPr lIns="90000" rIns="90000" tIns="45000" bIns="45000" anchor="ctr">
+            <a:noAutofit/>
+          </a:bodyPr>
+          <a:p>
+            <a:pPr algn="ctr">
+              <a:lnSpc>
+                <a:spcPct val="100000"/>
+              </a:lnSpc>
+            </a:pPr>
+            <a:r>
+              <a:rPr b="1" lang="pt-BR" sz="1200" spc="-1" strike="noStrike">
+                <a:solidFill>
+                  <a:srgbClr val="ffffff"/>
+                </a:solidFill>
+                <a:latin typeface="Calibri"/>
+                <a:ea typeface="DejaVu Sans"/>
+              </a:rPr>
+              <a:t>Receber máquina para reparo</a:t>
+            </a:r>
+            <a:endParaRPr b="0" lang="pt-BR" sz="1200" spc="-1" strike="noStrike">
+              <a:latin typeface="Arial"/>
+            </a:endParaRPr>
+          </a:p>
+        </p:txBody>
+      </p:sp>
+      <p:sp>
+        <p:nvSpPr>
+          <p:cNvPr id="82" name="CustomShape 4"/>
+          <p:cNvSpPr/>
+          <p:nvPr/>
+        </p:nvSpPr>
+        <p:spPr>
+          <a:xfrm>
+            <a:off x="1682280" y="2561040"/>
+            <a:ext cx="1103040" cy="754200"/>
+          </a:xfrm>
+          <a:prstGeom prst="rect">
+            <a:avLst/>
+          </a:prstGeom>
+          <a:solidFill>
+            <a:srgbClr val="4472c4"/>
+          </a:solidFill>
+          <a:ln w="12600">
+            <a:solidFill>
+              <a:srgbClr val="325490"/>
+            </a:solidFill>
+            <a:miter/>
+          </a:ln>
+        </p:spPr>
+        <p:style>
+          <a:lnRef idx="0"/>
+          <a:fillRef idx="0"/>
+          <a:effectRef idx="0"/>
+          <a:fontRef idx="minor"/>
+        </p:style>
+        <p:txBody>
+          <a:bodyPr lIns="90000" rIns="90000" tIns="45000" bIns="45000" anchor="ctr">
+            <a:noAutofit/>
+          </a:bodyPr>
+          <a:p>
+            <a:pPr algn="ctr">
+              <a:lnSpc>
+                <a:spcPct val="100000"/>
+              </a:lnSpc>
+            </a:pPr>
+            <a:r>
+              <a:rPr b="0" lang="pt-BR" sz="1800" spc="-1" strike="noStrike">
+                <a:solidFill>
+                  <a:srgbClr val="ffffff"/>
+                </a:solidFill>
+                <a:latin typeface="Calibri"/>
+                <a:ea typeface="DejaVu Sans"/>
+              </a:rPr>
+              <a:t>Cliente</a:t>
+            </a:r>
+            <a:endParaRPr b="0" lang="pt-BR" sz="1800" spc="-1" strike="noStrike">
+              <a:latin typeface="Arial"/>
+            </a:endParaRPr>
+          </a:p>
+        </p:txBody>
+      </p:sp>
+      <p:sp>
+        <p:nvSpPr>
+          <p:cNvPr id="83" name="CustomShape 5"/>
+          <p:cNvSpPr/>
+          <p:nvPr/>
+        </p:nvSpPr>
+        <p:spPr>
+          <a:xfrm>
+            <a:off x="5412240" y="1395720"/>
+            <a:ext cx="3299760" cy="3282840"/>
+          </a:xfrm>
+          <a:prstGeom prst="roundRect">
+            <a:avLst>
+              <a:gd name="adj" fmla="val 16667"/>
+            </a:avLst>
+          </a:prstGeom>
+          <a:noFill/>
+          <a:ln w="12600">
+            <a:solidFill>
+              <a:srgbClr val="325490"/>
+            </a:solidFill>
+            <a:miter/>
+          </a:ln>
+        </p:spPr>
+        <p:style>
+          <a:lnRef idx="0"/>
+          <a:fillRef idx="0"/>
+          <a:effectRef idx="0"/>
+          <a:fontRef idx="minor"/>
+        </p:style>
+        <p:txBody>
+          <a:bodyPr lIns="90000" rIns="90000" tIns="45000" bIns="45000">
+            <a:noAutofit/>
+          </a:bodyPr>
+          <a:p>
+            <a:pPr algn="ctr">
+              <a:lnSpc>
+                <a:spcPct val="100000"/>
+              </a:lnSpc>
+            </a:pPr>
+            <a:r>
+              <a:rPr b="0" lang="pt-BR" sz="1800" spc="-1" strike="noStrike">
+                <a:solidFill>
+                  <a:srgbClr val="000000"/>
+                </a:solidFill>
+                <a:latin typeface="Calibri"/>
+                <a:ea typeface="DejaVu Sans"/>
+              </a:rPr>
+              <a:t>Produção</a:t>
+            </a:r>
+            <a:endParaRPr b="0" lang="pt-BR" sz="1800" spc="-1" strike="noStrike">
+              <a:latin typeface="Arial"/>
+            </a:endParaRPr>
+          </a:p>
+        </p:txBody>
+      </p:sp>
+      <p:sp>
+        <p:nvSpPr>
+          <p:cNvPr id="84" name="Line 6"/>
+          <p:cNvSpPr/>
+          <p:nvPr/>
+        </p:nvSpPr>
+        <p:spPr>
+          <a:xfrm>
+            <a:off x="6120000" y="3240000"/>
+            <a:ext cx="2520" cy="432000"/>
+          </a:xfrm>
+          <a:prstGeom prst="line">
+            <a:avLst/>
+          </a:prstGeom>
+          <a:ln w="6480">
+            <a:solidFill>
+              <a:srgbClr val="4472c4"/>
+            </a:solidFill>
+            <a:miter/>
+          </a:ln>
+        </p:spPr>
+        <p:style>
+          <a:lnRef idx="0"/>
+          <a:fillRef idx="0"/>
+          <a:effectRef idx="0"/>
+          <a:fontRef idx="minor"/>
+        </p:style>
+      </p:sp>
+      <p:sp>
+        <p:nvSpPr>
+          <p:cNvPr id="85" name="Line 7"/>
+          <p:cNvSpPr/>
+          <p:nvPr/>
+        </p:nvSpPr>
+        <p:spPr>
+          <a:xfrm>
+            <a:off x="2786040" y="2938320"/>
+            <a:ext cx="2626200" cy="11160"/>
+          </a:xfrm>
+          <a:prstGeom prst="line">
+            <a:avLst/>
+          </a:prstGeom>
+          <a:ln>
+            <a:solidFill>
+              <a:srgbClr val="4a7ebb"/>
+            </a:solidFill>
+          </a:ln>
+        </p:spPr>
+        <p:style>
+          <a:lnRef idx="1">
+            <a:schemeClr val="accent1"/>
+          </a:lnRef>
+          <a:fillRef idx="0">
+            <a:schemeClr val="accent1"/>
+          </a:fillRef>
+          <a:effectRef idx="0">
+            <a:schemeClr val="accent1"/>
+          </a:effectRef>
+          <a:fontRef idx="minor"/>
+        </p:style>
+      </p:sp>
+    </p:spTree>
+  </p:cSld>
+  <mc:AlternateContent>
+    <mc:Choice Requires="p14">
+      <p:transition spd="slow" p14:dur="2000"/>
+    </mc:Choice>
+    <mc:Fallback>
+      <p:transition spd="slow"/>
+    </mc:Fallback>
+  </mc:AlternateContent>
 </p:sld>
 </file>
 
@@ -3293,31 +4357,31 @@
         <a:sysClr val="window" lastClr="FFFFFF"/>
       </a:lt1>
       <a:dk2>
-        <a:srgbClr val="1F497D"/>
+        <a:srgbClr val="1f497d"/>
       </a:dk2>
       <a:lt2>
-        <a:srgbClr val="EEECE1"/>
+        <a:srgbClr val="eeece1"/>
       </a:lt2>
       <a:accent1>
-        <a:srgbClr val="4F81BD"/>
+        <a:srgbClr val="4f81bd"/>
       </a:accent1>
       <a:accent2>
-        <a:srgbClr val="C0504D"/>
+        <a:srgbClr val="c0504d"/>
       </a:accent2>
       <a:accent3>
-        <a:srgbClr val="9BBB59"/>
+        <a:srgbClr val="9bbb59"/>
       </a:accent3>
       <a:accent4>
-        <a:srgbClr val="8064A2"/>
+        <a:srgbClr val="8064a2"/>
       </a:accent4>
       <a:accent5>
-        <a:srgbClr val="4BACC6"/>
+        <a:srgbClr val="4bacc6"/>
       </a:accent5>
       <a:accent6>
-        <a:srgbClr val="F79646"/>
+        <a:srgbClr val="f79646"/>
       </a:accent6>
       <a:hlink>
-        <a:srgbClr val="0000FF"/>
+        <a:srgbClr val="0000ff"/>
       </a:hlink>
       <a:folHlink>
         <a:srgbClr val="800080"/>
@@ -3505,7 +4569,5 @@
       </a:bgFillStyleLst>
     </a:fmtScheme>
   </a:themeElements>
-  <a:objectDefaults/>
-  <a:extraClrSchemeLst/>
 </a:theme>
 </file>
</xml_diff>

<commit_message>
Artefato 17 finalizado correcoes no 16 e 15
</commit_message>
<xml_diff>
--- a/Artefatos/15-ArquiteturaDeNegocioParaCadaCenario.pptx
+++ b/Artefatos/15-ArquiteturaDeNegocioParaCadaCenario.pptx
@@ -68,7 +68,7 @@
         <p:spPr>
           <a:xfrm>
             <a:off x="692640" y="375480"/>
-            <a:ext cx="8692200" cy="946800"/>
+            <a:ext cx="8691840" cy="946800"/>
           </a:xfrm>
           <a:prstGeom prst="rect">
             <a:avLst/>
@@ -181,7 +181,7 @@
         <p:spPr>
           <a:xfrm>
             <a:off x="692640" y="375480"/>
-            <a:ext cx="8692200" cy="946800"/>
+            <a:ext cx="8691840" cy="946800"/>
           </a:xfrm>
           <a:prstGeom prst="rect">
             <a:avLst/>
@@ -354,7 +354,7 @@
         <p:spPr>
           <a:xfrm>
             <a:off x="692640" y="375480"/>
-            <a:ext cx="8692200" cy="946800"/>
+            <a:ext cx="8691840" cy="946800"/>
           </a:xfrm>
           <a:prstGeom prst="rect">
             <a:avLst/>
@@ -587,7 +587,7 @@
         <p:spPr>
           <a:xfrm>
             <a:off x="692640" y="375480"/>
-            <a:ext cx="8692200" cy="946800"/>
+            <a:ext cx="8691840" cy="946800"/>
           </a:xfrm>
           <a:prstGeom prst="rect">
             <a:avLst/>
@@ -671,7 +671,7 @@
         <p:spPr>
           <a:xfrm>
             <a:off x="692640" y="375480"/>
-            <a:ext cx="8692200" cy="946800"/>
+            <a:ext cx="8691840" cy="946800"/>
           </a:xfrm>
           <a:prstGeom prst="rect">
             <a:avLst/>
@@ -754,7 +754,7 @@
         <p:spPr>
           <a:xfrm>
             <a:off x="692640" y="375480"/>
-            <a:ext cx="8692200" cy="946800"/>
+            <a:ext cx="8691840" cy="946800"/>
           </a:xfrm>
           <a:prstGeom prst="rect">
             <a:avLst/>
@@ -867,7 +867,7 @@
         <p:spPr>
           <a:xfrm>
             <a:off x="692640" y="375480"/>
-            <a:ext cx="8692200" cy="946800"/>
+            <a:ext cx="8691840" cy="946800"/>
           </a:xfrm>
           <a:prstGeom prst="rect">
             <a:avLst/>
@@ -920,7 +920,7 @@
         <p:spPr>
           <a:xfrm>
             <a:off x="692640" y="375480"/>
-            <a:ext cx="8692200" cy="4390200"/>
+            <a:ext cx="8691840" cy="4390200"/>
           </a:xfrm>
           <a:prstGeom prst="rect">
             <a:avLst/>
@@ -973,7 +973,7 @@
         <p:spPr>
           <a:xfrm>
             <a:off x="692640" y="375480"/>
-            <a:ext cx="8692200" cy="946800"/>
+            <a:ext cx="8691840" cy="946800"/>
           </a:xfrm>
           <a:prstGeom prst="rect">
             <a:avLst/>
@@ -1116,7 +1116,7 @@
         <p:spPr>
           <a:xfrm>
             <a:off x="692640" y="375480"/>
-            <a:ext cx="8692200" cy="946800"/>
+            <a:ext cx="8691840" cy="946800"/>
           </a:xfrm>
           <a:prstGeom prst="rect">
             <a:avLst/>
@@ -1259,7 +1259,7 @@
         <p:spPr>
           <a:xfrm>
             <a:off x="692640" y="375480"/>
-            <a:ext cx="8692200" cy="946800"/>
+            <a:ext cx="8691840" cy="946800"/>
           </a:xfrm>
           <a:prstGeom prst="rect">
             <a:avLst/>
@@ -1409,7 +1409,7 @@
         <p:spPr>
           <a:xfrm>
             <a:off x="692640" y="375480"/>
-            <a:ext cx="8692200" cy="946800"/>
+            <a:ext cx="8691840" cy="946800"/>
           </a:xfrm>
           <a:prstGeom prst="rect">
             <a:avLst/>
@@ -1657,7 +1657,7 @@
         <p:spPr>
           <a:xfrm>
             <a:off x="692640" y="367560"/>
-            <a:ext cx="8692200" cy="1094040"/>
+            <a:ext cx="8691840" cy="1093680"/>
           </a:xfrm>
           <a:prstGeom prst="rect">
             <a:avLst/>
@@ -1708,7 +1708,7 @@
         <p:spPr>
           <a:xfrm>
             <a:off x="192240" y="2736000"/>
-            <a:ext cx="1175400" cy="754200"/>
+            <a:ext cx="1175040" cy="753840"/>
           </a:xfrm>
           <a:prstGeom prst="rect">
             <a:avLst/>
@@ -1764,7 +1764,7 @@
         <p:spPr>
           <a:xfrm>
             <a:off x="2658240" y="1584000"/>
-            <a:ext cx="2733480" cy="729000"/>
+            <a:ext cx="2733120" cy="729000"/>
           </a:xfrm>
           <a:prstGeom prst="rect">
             <a:avLst/>
@@ -1785,7 +1785,7 @@
             <a:spAutoFit/>
           </a:bodyPr>
           <a:p>
-            <a:pPr marL="343080" indent="-341280">
+            <a:pPr marL="343080" indent="-340920">
               <a:lnSpc>
                 <a:spcPct val="100000"/>
               </a:lnSpc>
@@ -1810,7 +1810,7 @@
             </a:endParaRPr>
           </a:p>
           <a:p>
-            <a:pPr marL="343080" indent="-341280">
+            <a:pPr marL="343080" indent="-340920">
               <a:lnSpc>
                 <a:spcPct val="100000"/>
               </a:lnSpc>
@@ -1855,7 +1855,7 @@
         <p:spPr>
           <a:xfrm>
             <a:off x="6048000" y="2016000"/>
-            <a:ext cx="2983320" cy="2375640"/>
+            <a:ext cx="2982960" cy="2375280"/>
           </a:xfrm>
           <a:prstGeom prst="roundRect">
             <a:avLst>
@@ -1944,7 +1944,7 @@
         <p:spPr>
           <a:xfrm>
             <a:off x="72000" y="4141440"/>
-            <a:ext cx="1175400" cy="754200"/>
+            <a:ext cx="1175040" cy="753840"/>
           </a:xfrm>
           <a:prstGeom prst="rect">
             <a:avLst/>
@@ -1993,21 +1993,23 @@
       </p:sp>
       <p:sp>
         <p:nvSpPr>
-          <p:cNvPr id="44" name="CustomShape 7"/>
+          <p:cNvPr id="44" name="Line 7"/>
           <p:cNvSpPr/>
           <p:nvPr/>
         </p:nvSpPr>
         <p:spPr>
-          <a:xfrm>
-            <a:off x="2709000" y="3512520"/>
-            <a:ext cx="1851480" cy="303120"/>
-          </a:xfrm>
-          <a:prstGeom prst="rect">
-            <a:avLst/>
-          </a:prstGeom>
-          <a:noFill/>
+          <a:xfrm flipV="1">
+            <a:off x="1391760" y="4104000"/>
+            <a:ext cx="4656240" cy="288000"/>
+          </a:xfrm>
+          <a:prstGeom prst="line">
+            <a:avLst/>
+          </a:prstGeom>
           <a:ln>
-            <a:noFill/>
+            <a:solidFill>
+              <a:srgbClr val="3465a4"/>
+            </a:solidFill>
+            <a:tailEnd len="med" type="triangle" w="med"/>
           </a:ln>
         </p:spPr>
         <p:style>
@@ -2016,75 +2018,17 @@
           <a:effectRef idx="0"/>
           <a:fontRef idx="minor"/>
         </p:style>
-        <p:txBody>
-          <a:bodyPr wrap="none" lIns="90000" rIns="90000" tIns="45000" bIns="45000">
-            <a:spAutoFit/>
-          </a:bodyPr>
-          <a:p>
-            <a:pPr marL="343080" indent="-341280">
-              <a:lnSpc>
-                <a:spcPct val="100000"/>
-              </a:lnSpc>
-              <a:buClr>
-                <a:srgbClr val="000000"/>
-              </a:buClr>
-              <a:buFont typeface="StarSymbol"/>
-              <a:buAutoNum type="arabicPeriod"/>
-            </a:pPr>
-            <a:r>
-              <a:rPr b="0" lang="pt-BR" sz="1400" spc="-1" strike="noStrike">
-                <a:solidFill>
-                  <a:srgbClr val="000000"/>
-                </a:solidFill>
-                <a:latin typeface="Calibri"/>
-                <a:ea typeface="DejaVu Sans"/>
-              </a:rPr>
-              <a:t>(3)Enviar Máquina</a:t>
-            </a:r>
-            <a:endParaRPr b="0" lang="pt-BR" sz="1400" spc="-1" strike="noStrike">
-              <a:latin typeface="Arial"/>
-            </a:endParaRPr>
-          </a:p>
-        </p:txBody>
-      </p:sp>
-      <p:sp>
-        <p:nvSpPr>
-          <p:cNvPr id="45" name="Line 8"/>
+      </p:sp>
+      <p:sp>
+        <p:nvSpPr>
+          <p:cNvPr id="45" name="CustomShape 8"/>
           <p:cNvSpPr/>
           <p:nvPr/>
         </p:nvSpPr>
         <p:spPr>
-          <a:xfrm flipV="1">
-            <a:off x="1391760" y="4104000"/>
-            <a:ext cx="4656240" cy="288000"/>
-          </a:xfrm>
-          <a:prstGeom prst="line">
-            <a:avLst/>
-          </a:prstGeom>
-          <a:ln>
-            <a:solidFill>
-              <a:srgbClr val="3465a4"/>
-            </a:solidFill>
-            <a:tailEnd len="med" type="triangle" w="med"/>
-          </a:ln>
-        </p:spPr>
-        <p:style>
-          <a:lnRef idx="0"/>
-          <a:fillRef idx="0"/>
-          <a:effectRef idx="0"/>
-          <a:fontRef idx="minor"/>
-        </p:style>
-      </p:sp>
-      <p:sp>
-        <p:nvSpPr>
-          <p:cNvPr id="46" name="CustomShape 9"/>
-          <p:cNvSpPr/>
-          <p:nvPr/>
-        </p:nvSpPr>
-        <p:spPr>
           <a:xfrm>
             <a:off x="1800000" y="4717440"/>
-            <a:ext cx="1175400" cy="754200"/>
+            <a:ext cx="1175040" cy="753840"/>
           </a:xfrm>
           <a:prstGeom prst="rect">
             <a:avLst/>
@@ -2133,14 +2077,14 @@
       </p:sp>
       <p:sp>
         <p:nvSpPr>
-          <p:cNvPr id="47" name="CustomShape 10"/>
-          <p:cNvSpPr/>
-          <p:nvPr/>
-        </p:nvSpPr>
-        <p:spPr>
-          <a:xfrm>
-            <a:off x="3229560" y="4379400"/>
-            <a:ext cx="2052720" cy="516240"/>
+          <p:cNvPr id="46" name="TextShape 9"/>
+          <p:cNvSpPr txBox="1"/>
+          <p:nvPr/>
+        </p:nvSpPr>
+        <p:spPr>
+          <a:xfrm>
+            <a:off x="2808000" y="3528000"/>
+            <a:ext cx="2160000" cy="602280"/>
           </a:xfrm>
           <a:prstGeom prst="rect">
             <a:avLst/>
@@ -2150,48 +2094,54 @@
             <a:noFill/>
           </a:ln>
         </p:spPr>
-        <p:style>
-          <a:lnRef idx="0"/>
-          <a:fillRef idx="0"/>
-          <a:effectRef idx="0"/>
-          <a:fontRef idx="minor"/>
-        </p:style>
-        <p:txBody>
-          <a:bodyPr wrap="none" lIns="90000" rIns="90000" tIns="45000" bIns="45000">
+        <p:txBody>
+          <a:bodyPr lIns="90000" rIns="90000" tIns="45000" bIns="45000">
             <a:spAutoFit/>
           </a:bodyPr>
           <a:p>
-            <a:pPr marL="343080" indent="-341280">
-              <a:lnSpc>
-                <a:spcPct val="100000"/>
-              </a:lnSpc>
-              <a:buClr>
-                <a:srgbClr val="000000"/>
-              </a:buClr>
-              <a:buFont typeface="StarSymbol"/>
-              <a:buAutoNum type="arabicPeriod"/>
-            </a:pPr>
-            <a:r>
-              <a:rPr b="0" lang="pt-BR" sz="1400" spc="-1" strike="noStrike">
-                <a:solidFill>
-                  <a:srgbClr val="000000"/>
-                </a:solidFill>
-                <a:latin typeface="Calibri"/>
-                <a:ea typeface="DejaVu Sans"/>
-              </a:rPr>
-              <a:t>(4)Priorizar Produção</a:t>
-            </a:r>
-            <a:endParaRPr b="0" lang="pt-BR" sz="1400" spc="-1" strike="noStrike">
-              <a:latin typeface="Arial"/>
-            </a:endParaRPr>
-          </a:p>
-          <a:p>
-            <a:pPr>
-              <a:lnSpc>
-                <a:spcPct val="100000"/>
-              </a:lnSpc>
-            </a:pPr>
-            <a:endParaRPr b="0" lang="pt-BR" sz="1400" spc="-1" strike="noStrike">
+            <a:r>
+              <a:rPr b="0" lang="pt-BR" sz="1800" spc="-1" strike="noStrike">
+                <a:latin typeface="Arial"/>
+              </a:rPr>
+              <a:t>3. Enviar máquina para reparo</a:t>
+            </a:r>
+            <a:endParaRPr b="0" lang="pt-BR" sz="1800" spc="-1" strike="noStrike">
+              <a:latin typeface="Arial"/>
+            </a:endParaRPr>
+          </a:p>
+        </p:txBody>
+      </p:sp>
+      <p:sp>
+        <p:nvSpPr>
+          <p:cNvPr id="47" name="TextShape 10"/>
+          <p:cNvSpPr txBox="1"/>
+          <p:nvPr/>
+        </p:nvSpPr>
+        <p:spPr>
+          <a:xfrm>
+            <a:off x="3456000" y="4680000"/>
+            <a:ext cx="1584000" cy="858240"/>
+          </a:xfrm>
+          <a:prstGeom prst="rect">
+            <a:avLst/>
+          </a:prstGeom>
+          <a:noFill/>
+          <a:ln>
+            <a:noFill/>
+          </a:ln>
+        </p:spPr>
+        <p:txBody>
+          <a:bodyPr lIns="90000" rIns="90000" tIns="45000" bIns="45000">
+            <a:spAutoFit/>
+          </a:bodyPr>
+          <a:p>
+            <a:r>
+              <a:rPr b="0" lang="pt-BR" sz="1800" spc="-1" strike="noStrike">
+                <a:latin typeface="Arial"/>
+              </a:rPr>
+              <a:t>4.Solicitar Priorização de pedido</a:t>
+            </a:r>
+            <a:endParaRPr b="0" lang="pt-BR" sz="1800" spc="-1" strike="noStrike">
               <a:latin typeface="Arial"/>
             </a:endParaRPr>
           </a:p>
@@ -2236,7 +2186,7 @@
         <p:spPr>
           <a:xfrm>
             <a:off x="692640" y="301680"/>
-            <a:ext cx="8692200" cy="1094040"/>
+            <a:ext cx="8691840" cy="1093680"/>
           </a:xfrm>
           <a:prstGeom prst="rect">
             <a:avLst/>
@@ -2297,7 +2247,7 @@
         <p:spPr>
           <a:xfrm>
             <a:off x="3696120" y="2592000"/>
-            <a:ext cx="1343880" cy="481320"/>
+            <a:ext cx="1343520" cy="480960"/>
           </a:xfrm>
           <a:prstGeom prst="cube">
             <a:avLst>
@@ -2385,7 +2335,7 @@
         <p:spPr>
           <a:xfrm>
             <a:off x="3727440" y="3625200"/>
-            <a:ext cx="1096560" cy="838800"/>
+            <a:ext cx="1096200" cy="838440"/>
           </a:xfrm>
           <a:prstGeom prst="roundRect">
             <a:avLst>
@@ -2440,7 +2390,7 @@
         <p:spPr>
           <a:xfrm>
             <a:off x="120960" y="2520000"/>
-            <a:ext cx="1103040" cy="754200"/>
+            <a:ext cx="1102680" cy="753840"/>
           </a:xfrm>
           <a:prstGeom prst="rect">
             <a:avLst/>
@@ -2496,7 +2446,7 @@
         <p:spPr>
           <a:xfrm>
             <a:off x="3672000" y="1395720"/>
-            <a:ext cx="5975640" cy="3571920"/>
+            <a:ext cx="5975280" cy="3571560"/>
           </a:xfrm>
           <a:prstGeom prst="roundRect">
             <a:avLst>
@@ -2613,7 +2563,7 @@
         <p:spPr>
           <a:xfrm>
             <a:off x="8208000" y="2470680"/>
-            <a:ext cx="1343880" cy="481320"/>
+            <a:ext cx="1343520" cy="480960"/>
           </a:xfrm>
           <a:prstGeom prst="cube">
             <a:avLst>
@@ -2701,7 +2651,7 @@
         <p:spPr>
           <a:xfrm>
             <a:off x="8119080" y="3552840"/>
-            <a:ext cx="1096560" cy="838800"/>
+            <a:ext cx="1096200" cy="838440"/>
           </a:xfrm>
           <a:prstGeom prst="roundRect">
             <a:avLst>
@@ -2784,7 +2734,7 @@
         <p:spPr>
           <a:xfrm>
             <a:off x="4824000" y="3697200"/>
-            <a:ext cx="1096560" cy="838800"/>
+            <a:ext cx="1096200" cy="838440"/>
           </a:xfrm>
           <a:prstGeom prst="roundRect">
             <a:avLst>
@@ -2839,7 +2789,7 @@
         <p:spPr>
           <a:xfrm>
             <a:off x="5760000" y="2542680"/>
-            <a:ext cx="1343880" cy="553320"/>
+            <a:ext cx="1343520" cy="552960"/>
           </a:xfrm>
           <a:prstGeom prst="cube">
             <a:avLst>
@@ -2927,7 +2877,7 @@
         <p:spPr>
           <a:xfrm>
             <a:off x="6031440" y="3672000"/>
-            <a:ext cx="1096560" cy="864000"/>
+            <a:ext cx="1096200" cy="863640"/>
           </a:xfrm>
           <a:prstGeom prst="roundRect">
             <a:avLst>
@@ -3038,7 +2988,7 @@
         <p:spPr>
           <a:xfrm>
             <a:off x="7200000" y="3744000"/>
-            <a:ext cx="808560" cy="648000"/>
+            <a:ext cx="808200" cy="647640"/>
           </a:xfrm>
           <a:prstGeom prst="roundRect">
             <a:avLst>
@@ -3151,7 +3101,7 @@
         <p:spPr>
           <a:xfrm>
             <a:off x="692640" y="301680"/>
-            <a:ext cx="8692200" cy="1094040"/>
+            <a:ext cx="8691840" cy="1093680"/>
           </a:xfrm>
           <a:prstGeom prst="rect">
             <a:avLst/>
@@ -3195,7 +3145,7 @@
                 <a:latin typeface="Calibri"/>
                 <a:ea typeface="Microsoft YaHei"/>
               </a:rPr>
-              <a:t>Priorizar Pedido</a:t>
+              <a:t>Solicitar prioridade de pedido </a:t>
             </a:r>
             <a:endParaRPr b="0" lang="pt-BR" sz="3200" spc="-1" strike="noStrike">
               <a:latin typeface="Arial"/>
@@ -3212,7 +3162,7 @@
         <p:spPr>
           <a:xfrm>
             <a:off x="6231600" y="2637000"/>
-            <a:ext cx="1343880" cy="481320"/>
+            <a:ext cx="1343520" cy="480960"/>
           </a:xfrm>
           <a:prstGeom prst="cube">
             <a:avLst>
@@ -3300,7 +3250,7 @@
         <p:spPr>
           <a:xfrm>
             <a:off x="6318000" y="3551760"/>
-            <a:ext cx="1096560" cy="838800"/>
+            <a:ext cx="1096200" cy="838440"/>
           </a:xfrm>
           <a:prstGeom prst="roundRect">
             <a:avLst>
@@ -3338,7 +3288,7 @@
                 <a:latin typeface="Calibri"/>
                 <a:ea typeface="DejaVu Sans"/>
               </a:rPr>
-              <a:t>Receber máquina para reparo</a:t>
+              <a:t>Priorizar pedido</a:t>
             </a:r>
             <a:endParaRPr b="0" lang="pt-BR" sz="1200" spc="-1" strike="noStrike">
               <a:latin typeface="Arial"/>
@@ -3355,7 +3305,7 @@
         <p:spPr>
           <a:xfrm>
             <a:off x="1682280" y="2561040"/>
-            <a:ext cx="1103040" cy="754200"/>
+            <a:ext cx="1102680" cy="753840"/>
           </a:xfrm>
           <a:prstGeom prst="rect">
             <a:avLst/>
@@ -3411,7 +3361,7 @@
         <p:spPr>
           <a:xfrm>
             <a:off x="5412240" y="1584000"/>
-            <a:ext cx="3010320" cy="3094560"/>
+            <a:ext cx="3009960" cy="3094200"/>
           </a:xfrm>
           <a:prstGeom prst="roundRect">
             <a:avLst>
@@ -3558,7 +3508,7 @@
         <p:spPr>
           <a:xfrm>
             <a:off x="692640" y="301680"/>
-            <a:ext cx="8692200" cy="1094040"/>
+            <a:ext cx="8691840" cy="1093680"/>
           </a:xfrm>
           <a:prstGeom prst="rect">
             <a:avLst/>
@@ -3619,7 +3569,7 @@
         <p:spPr>
           <a:xfrm>
             <a:off x="6231600" y="2637000"/>
-            <a:ext cx="1343880" cy="481320"/>
+            <a:ext cx="1343520" cy="480960"/>
           </a:xfrm>
           <a:prstGeom prst="cube">
             <a:avLst>
@@ -3707,7 +3657,7 @@
         <p:spPr>
           <a:xfrm>
             <a:off x="6318000" y="3551760"/>
-            <a:ext cx="1096560" cy="838800"/>
+            <a:ext cx="1096200" cy="838440"/>
           </a:xfrm>
           <a:prstGeom prst="roundRect">
             <a:avLst>
@@ -3762,7 +3712,7 @@
         <p:spPr>
           <a:xfrm>
             <a:off x="1682280" y="2561040"/>
-            <a:ext cx="1103040" cy="754200"/>
+            <a:ext cx="1102680" cy="753840"/>
           </a:xfrm>
           <a:prstGeom prst="rect">
             <a:avLst/>
@@ -3818,7 +3768,7 @@
         <p:spPr>
           <a:xfrm>
             <a:off x="5412240" y="1584000"/>
-            <a:ext cx="3010320" cy="3094560"/>
+            <a:ext cx="3009960" cy="3094200"/>
           </a:xfrm>
           <a:prstGeom prst="roundRect">
             <a:avLst>
@@ -3965,7 +3915,7 @@
         <p:spPr>
           <a:xfrm>
             <a:off x="692640" y="301680"/>
-            <a:ext cx="8692200" cy="1094040"/>
+            <a:ext cx="8691840" cy="1093680"/>
           </a:xfrm>
           <a:prstGeom prst="rect">
             <a:avLst/>
@@ -4026,7 +3976,7 @@
         <p:spPr>
           <a:xfrm>
             <a:off x="5496120" y="2664000"/>
-            <a:ext cx="1343880" cy="481320"/>
+            <a:ext cx="1343520" cy="480960"/>
           </a:xfrm>
           <a:prstGeom prst="cube">
             <a:avLst>
@@ -4114,7 +4064,7 @@
         <p:spPr>
           <a:xfrm>
             <a:off x="5599440" y="3697200"/>
-            <a:ext cx="1096560" cy="838800"/>
+            <a:ext cx="1096200" cy="838440"/>
           </a:xfrm>
           <a:prstGeom prst="roundRect">
             <a:avLst>
@@ -4169,7 +4119,7 @@
         <p:spPr>
           <a:xfrm>
             <a:off x="1682280" y="2561040"/>
-            <a:ext cx="1103040" cy="754200"/>
+            <a:ext cx="1102680" cy="753840"/>
           </a:xfrm>
           <a:prstGeom prst="rect">
             <a:avLst/>
@@ -4225,7 +4175,7 @@
         <p:spPr>
           <a:xfrm>
             <a:off x="5412240" y="1395720"/>
-            <a:ext cx="3299760" cy="3282840"/>
+            <a:ext cx="3299400" cy="3282480"/>
           </a:xfrm>
           <a:prstGeom prst="roundRect">
             <a:avLst>

</xml_diff>

<commit_message>
Correcoes nos artefatos 15,16,17 e comeco do 18
</commit_message>
<xml_diff>
--- a/Artefatos/15-ArquiteturaDeNegocioParaCadaCenario.pptx
+++ b/Artefatos/15-ArquiteturaDeNegocioParaCadaCenario.pptx
@@ -68,7 +68,7 @@
         <p:spPr>
           <a:xfrm>
             <a:off x="692640" y="375480"/>
-            <a:ext cx="8691840" cy="946800"/>
+            <a:ext cx="8691480" cy="946800"/>
           </a:xfrm>
           <a:prstGeom prst="rect">
             <a:avLst/>
@@ -181,7 +181,7 @@
         <p:spPr>
           <a:xfrm>
             <a:off x="692640" y="375480"/>
-            <a:ext cx="8691840" cy="946800"/>
+            <a:ext cx="8691480" cy="946800"/>
           </a:xfrm>
           <a:prstGeom prst="rect">
             <a:avLst/>
@@ -354,7 +354,7 @@
         <p:spPr>
           <a:xfrm>
             <a:off x="692640" y="375480"/>
-            <a:ext cx="8691840" cy="946800"/>
+            <a:ext cx="8691480" cy="946800"/>
           </a:xfrm>
           <a:prstGeom prst="rect">
             <a:avLst/>
@@ -587,7 +587,7 @@
         <p:spPr>
           <a:xfrm>
             <a:off x="692640" y="375480"/>
-            <a:ext cx="8691840" cy="946800"/>
+            <a:ext cx="8691480" cy="946800"/>
           </a:xfrm>
           <a:prstGeom prst="rect">
             <a:avLst/>
@@ -671,7 +671,7 @@
         <p:spPr>
           <a:xfrm>
             <a:off x="692640" y="375480"/>
-            <a:ext cx="8691840" cy="946800"/>
+            <a:ext cx="8691480" cy="946800"/>
           </a:xfrm>
           <a:prstGeom prst="rect">
             <a:avLst/>
@@ -754,7 +754,7 @@
         <p:spPr>
           <a:xfrm>
             <a:off x="692640" y="375480"/>
-            <a:ext cx="8691840" cy="946800"/>
+            <a:ext cx="8691480" cy="946800"/>
           </a:xfrm>
           <a:prstGeom prst="rect">
             <a:avLst/>
@@ -867,7 +867,7 @@
         <p:spPr>
           <a:xfrm>
             <a:off x="692640" y="375480"/>
-            <a:ext cx="8691840" cy="946800"/>
+            <a:ext cx="8691480" cy="946800"/>
           </a:xfrm>
           <a:prstGeom prst="rect">
             <a:avLst/>
@@ -920,7 +920,7 @@
         <p:spPr>
           <a:xfrm>
             <a:off x="692640" y="375480"/>
-            <a:ext cx="8691840" cy="4390200"/>
+            <a:ext cx="8691480" cy="4390200"/>
           </a:xfrm>
           <a:prstGeom prst="rect">
             <a:avLst/>
@@ -973,7 +973,7 @@
         <p:spPr>
           <a:xfrm>
             <a:off x="692640" y="375480"/>
-            <a:ext cx="8691840" cy="946800"/>
+            <a:ext cx="8691480" cy="946800"/>
           </a:xfrm>
           <a:prstGeom prst="rect">
             <a:avLst/>
@@ -1116,7 +1116,7 @@
         <p:spPr>
           <a:xfrm>
             <a:off x="692640" y="375480"/>
-            <a:ext cx="8691840" cy="946800"/>
+            <a:ext cx="8691480" cy="946800"/>
           </a:xfrm>
           <a:prstGeom prst="rect">
             <a:avLst/>
@@ -1259,7 +1259,7 @@
         <p:spPr>
           <a:xfrm>
             <a:off x="692640" y="375480"/>
-            <a:ext cx="8691840" cy="946800"/>
+            <a:ext cx="8691480" cy="946800"/>
           </a:xfrm>
           <a:prstGeom prst="rect">
             <a:avLst/>
@@ -1409,7 +1409,7 @@
         <p:spPr>
           <a:xfrm>
             <a:off x="692640" y="375480"/>
-            <a:ext cx="8691840" cy="946800"/>
+            <a:ext cx="8691480" cy="946800"/>
           </a:xfrm>
           <a:prstGeom prst="rect">
             <a:avLst/>
@@ -1657,7 +1657,7 @@
         <p:spPr>
           <a:xfrm>
             <a:off x="692640" y="367560"/>
-            <a:ext cx="8691840" cy="1093680"/>
+            <a:ext cx="8691480" cy="1093320"/>
           </a:xfrm>
           <a:prstGeom prst="rect">
             <a:avLst/>
@@ -1708,7 +1708,7 @@
         <p:spPr>
           <a:xfrm>
             <a:off x="192240" y="2736000"/>
-            <a:ext cx="1175040" cy="753840"/>
+            <a:ext cx="1174680" cy="753480"/>
           </a:xfrm>
           <a:prstGeom prst="rect">
             <a:avLst/>
@@ -1764,7 +1764,7 @@
         <p:spPr>
           <a:xfrm>
             <a:off x="2658240" y="1584000"/>
-            <a:ext cx="2733120" cy="729000"/>
+            <a:ext cx="2732760" cy="729000"/>
           </a:xfrm>
           <a:prstGeom prst="rect">
             <a:avLst/>
@@ -1785,7 +1785,7 @@
             <a:spAutoFit/>
           </a:bodyPr>
           <a:p>
-            <a:pPr marL="343080" indent="-340920">
+            <a:pPr marL="343080" indent="-340560">
               <a:lnSpc>
                 <a:spcPct val="100000"/>
               </a:lnSpc>
@@ -1810,7 +1810,7 @@
             </a:endParaRPr>
           </a:p>
           <a:p>
-            <a:pPr marL="343080" indent="-340920">
+            <a:pPr marL="343080" indent="-340560">
               <a:lnSpc>
                 <a:spcPct val="100000"/>
               </a:lnSpc>
@@ -1855,7 +1855,7 @@
         <p:spPr>
           <a:xfrm>
             <a:off x="6048000" y="2016000"/>
-            <a:ext cx="2982960" cy="2375280"/>
+            <a:ext cx="2982600" cy="2374920"/>
           </a:xfrm>
           <a:prstGeom prst="roundRect">
             <a:avLst>
@@ -1944,7 +1944,7 @@
         <p:spPr>
           <a:xfrm>
             <a:off x="72000" y="4141440"/>
-            <a:ext cx="1175040" cy="753840"/>
+            <a:ext cx="1174680" cy="753480"/>
           </a:xfrm>
           <a:prstGeom prst="rect">
             <a:avLst/>
@@ -2028,7 +2028,7 @@
         <p:spPr>
           <a:xfrm>
             <a:off x="1800000" y="4717440"/>
-            <a:ext cx="1175040" cy="753840"/>
+            <a:ext cx="1174680" cy="753480"/>
           </a:xfrm>
           <a:prstGeom prst="rect">
             <a:avLst/>
@@ -2077,14 +2077,14 @@
       </p:sp>
       <p:sp>
         <p:nvSpPr>
-          <p:cNvPr id="46" name="TextShape 9"/>
-          <p:cNvSpPr txBox="1"/>
+          <p:cNvPr id="46" name="CustomShape 9"/>
+          <p:cNvSpPr/>
           <p:nvPr/>
         </p:nvSpPr>
         <p:spPr>
           <a:xfrm>
             <a:off x="2808000" y="3528000"/>
-            <a:ext cx="2160000" cy="602280"/>
+            <a:ext cx="2159640" cy="638280"/>
           </a:xfrm>
           <a:prstGeom prst="rect">
             <a:avLst/>
@@ -2094,11 +2094,22 @@
             <a:noFill/>
           </a:ln>
         </p:spPr>
+        <p:style>
+          <a:lnRef idx="0"/>
+          <a:fillRef idx="0"/>
+          <a:effectRef idx="0"/>
+          <a:fontRef idx="minor"/>
+        </p:style>
         <p:txBody>
           <a:bodyPr lIns="90000" rIns="90000" tIns="45000" bIns="45000">
             <a:spAutoFit/>
           </a:bodyPr>
           <a:p>
+            <a:pPr>
+              <a:lnSpc>
+                <a:spcPct val="100000"/>
+              </a:lnSpc>
+            </a:pPr>
             <a:r>
               <a:rPr b="0" lang="pt-BR" sz="1800" spc="-1" strike="noStrike">
                 <a:latin typeface="Arial"/>
@@ -2113,14 +2124,14 @@
       </p:sp>
       <p:sp>
         <p:nvSpPr>
-          <p:cNvPr id="47" name="TextShape 10"/>
-          <p:cNvSpPr txBox="1"/>
+          <p:cNvPr id="47" name="CustomShape 10"/>
+          <p:cNvSpPr/>
           <p:nvPr/>
         </p:nvSpPr>
         <p:spPr>
           <a:xfrm>
             <a:off x="3456000" y="4680000"/>
-            <a:ext cx="1584000" cy="858240"/>
+            <a:ext cx="1583640" cy="912600"/>
           </a:xfrm>
           <a:prstGeom prst="rect">
             <a:avLst/>
@@ -2130,11 +2141,22 @@
             <a:noFill/>
           </a:ln>
         </p:spPr>
+        <p:style>
+          <a:lnRef idx="0"/>
+          <a:fillRef idx="0"/>
+          <a:effectRef idx="0"/>
+          <a:fontRef idx="minor"/>
+        </p:style>
         <p:txBody>
           <a:bodyPr lIns="90000" rIns="90000" tIns="45000" bIns="45000">
             <a:spAutoFit/>
           </a:bodyPr>
           <a:p>
+            <a:pPr>
+              <a:lnSpc>
+                <a:spcPct val="100000"/>
+              </a:lnSpc>
+            </a:pPr>
             <a:r>
               <a:rPr b="0" lang="pt-BR" sz="1800" spc="-1" strike="noStrike">
                 <a:latin typeface="Arial"/>
@@ -2186,7 +2208,7 @@
         <p:spPr>
           <a:xfrm>
             <a:off x="692640" y="301680"/>
-            <a:ext cx="8691840" cy="1093680"/>
+            <a:ext cx="8691480" cy="1093320"/>
           </a:xfrm>
           <a:prstGeom prst="rect">
             <a:avLst/>
@@ -2247,7 +2269,7 @@
         <p:spPr>
           <a:xfrm>
             <a:off x="3696120" y="2592000"/>
-            <a:ext cx="1343520" cy="480960"/>
+            <a:ext cx="1343160" cy="480600"/>
           </a:xfrm>
           <a:prstGeom prst="cube">
             <a:avLst>
@@ -2335,7 +2357,7 @@
         <p:spPr>
           <a:xfrm>
             <a:off x="3727440" y="3625200"/>
-            <a:ext cx="1096200" cy="838440"/>
+            <a:ext cx="1095840" cy="838080"/>
           </a:xfrm>
           <a:prstGeom prst="roundRect">
             <a:avLst>
@@ -2390,7 +2412,7 @@
         <p:spPr>
           <a:xfrm>
             <a:off x="120960" y="2520000"/>
-            <a:ext cx="1102680" cy="753840"/>
+            <a:ext cx="1102320" cy="753480"/>
           </a:xfrm>
           <a:prstGeom prst="rect">
             <a:avLst/>
@@ -2446,7 +2468,7 @@
         <p:spPr>
           <a:xfrm>
             <a:off x="3672000" y="1395720"/>
-            <a:ext cx="5975280" cy="3571560"/>
+            <a:ext cx="5974920" cy="3571200"/>
           </a:xfrm>
           <a:prstGeom prst="roundRect">
             <a:avLst>
@@ -2563,7 +2585,7 @@
         <p:spPr>
           <a:xfrm>
             <a:off x="8208000" y="2470680"/>
-            <a:ext cx="1343520" cy="480960"/>
+            <a:ext cx="1343160" cy="480600"/>
           </a:xfrm>
           <a:prstGeom prst="cube">
             <a:avLst>
@@ -2651,7 +2673,7 @@
         <p:spPr>
           <a:xfrm>
             <a:off x="8119080" y="3552840"/>
-            <a:ext cx="1096200" cy="838440"/>
+            <a:ext cx="1095840" cy="838080"/>
           </a:xfrm>
           <a:prstGeom prst="roundRect">
             <a:avLst>
@@ -2734,7 +2756,7 @@
         <p:spPr>
           <a:xfrm>
             <a:off x="4824000" y="3697200"/>
-            <a:ext cx="1096200" cy="838440"/>
+            <a:ext cx="1095840" cy="838080"/>
           </a:xfrm>
           <a:prstGeom prst="roundRect">
             <a:avLst>
@@ -2789,7 +2811,7 @@
         <p:spPr>
           <a:xfrm>
             <a:off x="5760000" y="2542680"/>
-            <a:ext cx="1343520" cy="552960"/>
+            <a:ext cx="1343160" cy="552600"/>
           </a:xfrm>
           <a:prstGeom prst="cube">
             <a:avLst>
@@ -2877,7 +2899,7 @@
         <p:spPr>
           <a:xfrm>
             <a:off x="6031440" y="3672000"/>
-            <a:ext cx="1096200" cy="863640"/>
+            <a:ext cx="1095840" cy="863280"/>
           </a:xfrm>
           <a:prstGeom prst="roundRect">
             <a:avLst>
@@ -2988,7 +3010,7 @@
         <p:spPr>
           <a:xfrm>
             <a:off x="7200000" y="3744000"/>
-            <a:ext cx="808200" cy="647640"/>
+            <a:ext cx="807840" cy="647280"/>
           </a:xfrm>
           <a:prstGeom prst="roundRect">
             <a:avLst>
@@ -3101,7 +3123,7 @@
         <p:spPr>
           <a:xfrm>
             <a:off x="692640" y="301680"/>
-            <a:ext cx="8691840" cy="1093680"/>
+            <a:ext cx="8691480" cy="1093320"/>
           </a:xfrm>
           <a:prstGeom prst="rect">
             <a:avLst/>
@@ -3162,7 +3184,7 @@
         <p:spPr>
           <a:xfrm>
             <a:off x="6231600" y="2637000"/>
-            <a:ext cx="1343520" cy="480960"/>
+            <a:ext cx="1343160" cy="480600"/>
           </a:xfrm>
           <a:prstGeom prst="cube">
             <a:avLst>
@@ -3250,7 +3272,7 @@
         <p:spPr>
           <a:xfrm>
             <a:off x="6318000" y="3551760"/>
-            <a:ext cx="1096200" cy="838440"/>
+            <a:ext cx="1095840" cy="838080"/>
           </a:xfrm>
           <a:prstGeom prst="roundRect">
             <a:avLst>
@@ -3305,7 +3327,7 @@
         <p:spPr>
           <a:xfrm>
             <a:off x="1682280" y="2561040"/>
-            <a:ext cx="1102680" cy="753840"/>
+            <a:ext cx="1102320" cy="753480"/>
           </a:xfrm>
           <a:prstGeom prst="rect">
             <a:avLst/>
@@ -3361,7 +3383,7 @@
         <p:spPr>
           <a:xfrm>
             <a:off x="5412240" y="1584000"/>
-            <a:ext cx="3009960" cy="3094200"/>
+            <a:ext cx="3009600" cy="3093840"/>
           </a:xfrm>
           <a:prstGeom prst="roundRect">
             <a:avLst>
@@ -3508,7 +3530,7 @@
         <p:spPr>
           <a:xfrm>
             <a:off x="692640" y="301680"/>
-            <a:ext cx="8691840" cy="1093680"/>
+            <a:ext cx="8691480" cy="1093320"/>
           </a:xfrm>
           <a:prstGeom prst="rect">
             <a:avLst/>
@@ -3569,7 +3591,7 @@
         <p:spPr>
           <a:xfrm>
             <a:off x="6231600" y="2637000"/>
-            <a:ext cx="1343520" cy="480960"/>
+            <a:ext cx="1343160" cy="480600"/>
           </a:xfrm>
           <a:prstGeom prst="cube">
             <a:avLst>
@@ -3657,7 +3679,7 @@
         <p:spPr>
           <a:xfrm>
             <a:off x="6318000" y="3551760"/>
-            <a:ext cx="1096200" cy="838440"/>
+            <a:ext cx="1095840" cy="838080"/>
           </a:xfrm>
           <a:prstGeom prst="roundRect">
             <a:avLst>
@@ -3712,7 +3734,7 @@
         <p:spPr>
           <a:xfrm>
             <a:off x="1682280" y="2561040"/>
-            <a:ext cx="1102680" cy="753840"/>
+            <a:ext cx="1102320" cy="753480"/>
           </a:xfrm>
           <a:prstGeom prst="rect">
             <a:avLst/>
@@ -3768,7 +3790,7 @@
         <p:spPr>
           <a:xfrm>
             <a:off x="5412240" y="1584000"/>
-            <a:ext cx="3009960" cy="3094200"/>
+            <a:ext cx="3009600" cy="3093840"/>
           </a:xfrm>
           <a:prstGeom prst="roundRect">
             <a:avLst>
@@ -3915,7 +3937,7 @@
         <p:spPr>
           <a:xfrm>
             <a:off x="692640" y="301680"/>
-            <a:ext cx="8691840" cy="1093680"/>
+            <a:ext cx="8691480" cy="1093320"/>
           </a:xfrm>
           <a:prstGeom prst="rect">
             <a:avLst/>
@@ -3976,7 +3998,7 @@
         <p:spPr>
           <a:xfrm>
             <a:off x="5496120" y="2664000"/>
-            <a:ext cx="1343520" cy="480960"/>
+            <a:ext cx="1343160" cy="480600"/>
           </a:xfrm>
           <a:prstGeom prst="cube">
             <a:avLst>
@@ -4064,7 +4086,7 @@
         <p:spPr>
           <a:xfrm>
             <a:off x="5599440" y="3697200"/>
-            <a:ext cx="1096200" cy="838440"/>
+            <a:ext cx="1095840" cy="838080"/>
           </a:xfrm>
           <a:prstGeom prst="roundRect">
             <a:avLst>
@@ -4119,7 +4141,7 @@
         <p:spPr>
           <a:xfrm>
             <a:off x="1682280" y="2561040"/>
-            <a:ext cx="1102680" cy="753840"/>
+            <a:ext cx="1102320" cy="753480"/>
           </a:xfrm>
           <a:prstGeom prst="rect">
             <a:avLst/>
@@ -4175,7 +4197,7 @@
         <p:spPr>
           <a:xfrm>
             <a:off x="5412240" y="1395720"/>
-            <a:ext cx="3299400" cy="3282480"/>
+            <a:ext cx="3299040" cy="3282120"/>
           </a:xfrm>
           <a:prstGeom prst="roundRect">
             <a:avLst>

</xml_diff>

<commit_message>
aretfatos 18 e 19 para pdf
</commit_message>
<xml_diff>
--- a/Artefatos/15-ArquiteturaDeNegocioParaCadaCenario.pptx
+++ b/Artefatos/15-ArquiteturaDeNegocioParaCadaCenario.pptx
@@ -8,8 +8,6 @@
     <p:sldId id="256" r:id="rId3"/>
     <p:sldId id="257" r:id="rId4"/>
     <p:sldId id="258" r:id="rId5"/>
-    <p:sldId id="259" r:id="rId6"/>
-    <p:sldId id="260" r:id="rId7"/>
   </p:sldIdLst>
   <p:sldSz cx="10080625" cy="5670550"/>
   <p:notesSz cx="7559675" cy="10691812"/>
@@ -68,7 +66,7 @@
         <p:spPr>
           <a:xfrm>
             <a:off x="692640" y="375480"/>
-            <a:ext cx="8691480" cy="946800"/>
+            <a:ext cx="8691120" cy="946800"/>
           </a:xfrm>
           <a:prstGeom prst="rect">
             <a:avLst/>
@@ -181,7 +179,7 @@
         <p:spPr>
           <a:xfrm>
             <a:off x="692640" y="375480"/>
-            <a:ext cx="8691480" cy="946800"/>
+            <a:ext cx="8691120" cy="946800"/>
           </a:xfrm>
           <a:prstGeom prst="rect">
             <a:avLst/>
@@ -354,7 +352,7 @@
         <p:spPr>
           <a:xfrm>
             <a:off x="692640" y="375480"/>
-            <a:ext cx="8691480" cy="946800"/>
+            <a:ext cx="8691120" cy="946800"/>
           </a:xfrm>
           <a:prstGeom prst="rect">
             <a:avLst/>
@@ -587,7 +585,7 @@
         <p:spPr>
           <a:xfrm>
             <a:off x="692640" y="375480"/>
-            <a:ext cx="8691480" cy="946800"/>
+            <a:ext cx="8691120" cy="946800"/>
           </a:xfrm>
           <a:prstGeom prst="rect">
             <a:avLst/>
@@ -671,7 +669,7 @@
         <p:spPr>
           <a:xfrm>
             <a:off x="692640" y="375480"/>
-            <a:ext cx="8691480" cy="946800"/>
+            <a:ext cx="8691120" cy="946800"/>
           </a:xfrm>
           <a:prstGeom prst="rect">
             <a:avLst/>
@@ -754,7 +752,7 @@
         <p:spPr>
           <a:xfrm>
             <a:off x="692640" y="375480"/>
-            <a:ext cx="8691480" cy="946800"/>
+            <a:ext cx="8691120" cy="946800"/>
           </a:xfrm>
           <a:prstGeom prst="rect">
             <a:avLst/>
@@ -867,7 +865,7 @@
         <p:spPr>
           <a:xfrm>
             <a:off x="692640" y="375480"/>
-            <a:ext cx="8691480" cy="946800"/>
+            <a:ext cx="8691120" cy="946800"/>
           </a:xfrm>
           <a:prstGeom prst="rect">
             <a:avLst/>
@@ -920,7 +918,7 @@
         <p:spPr>
           <a:xfrm>
             <a:off x="692640" y="375480"/>
-            <a:ext cx="8691480" cy="4390200"/>
+            <a:ext cx="8691120" cy="4390200"/>
           </a:xfrm>
           <a:prstGeom prst="rect">
             <a:avLst/>
@@ -973,7 +971,7 @@
         <p:spPr>
           <a:xfrm>
             <a:off x="692640" y="375480"/>
-            <a:ext cx="8691480" cy="946800"/>
+            <a:ext cx="8691120" cy="946800"/>
           </a:xfrm>
           <a:prstGeom prst="rect">
             <a:avLst/>
@@ -1116,7 +1114,7 @@
         <p:spPr>
           <a:xfrm>
             <a:off x="692640" y="375480"/>
-            <a:ext cx="8691480" cy="946800"/>
+            <a:ext cx="8691120" cy="946800"/>
           </a:xfrm>
           <a:prstGeom prst="rect">
             <a:avLst/>
@@ -1259,7 +1257,7 @@
         <p:spPr>
           <a:xfrm>
             <a:off x="692640" y="375480"/>
-            <a:ext cx="8691480" cy="946800"/>
+            <a:ext cx="8691120" cy="946800"/>
           </a:xfrm>
           <a:prstGeom prst="rect">
             <a:avLst/>
@@ -1409,7 +1407,7 @@
         <p:spPr>
           <a:xfrm>
             <a:off x="692640" y="375480"/>
-            <a:ext cx="8691480" cy="946800"/>
+            <a:ext cx="8691120" cy="946800"/>
           </a:xfrm>
           <a:prstGeom prst="rect">
             <a:avLst/>
@@ -1657,7 +1655,7 @@
         <p:spPr>
           <a:xfrm>
             <a:off x="692640" y="367560"/>
-            <a:ext cx="8691480" cy="1093320"/>
+            <a:ext cx="8691120" cy="1092960"/>
           </a:xfrm>
           <a:prstGeom prst="rect">
             <a:avLst/>
@@ -1708,7 +1706,7 @@
         <p:spPr>
           <a:xfrm>
             <a:off x="192240" y="2736000"/>
-            <a:ext cx="1174680" cy="753480"/>
+            <a:ext cx="1174320" cy="753120"/>
           </a:xfrm>
           <a:prstGeom prst="rect">
             <a:avLst/>
@@ -1763,8 +1761,8 @@
         </p:nvSpPr>
         <p:spPr>
           <a:xfrm>
-            <a:off x="2658240" y="1584000"/>
-            <a:ext cx="2732760" cy="729000"/>
+            <a:off x="2739600" y="2079000"/>
+            <a:ext cx="2732400" cy="729000"/>
           </a:xfrm>
           <a:prstGeom prst="rect">
             <a:avLst/>
@@ -1785,7 +1783,7 @@
             <a:spAutoFit/>
           </a:bodyPr>
           <a:p>
-            <a:pPr marL="343080" indent="-340560">
+            <a:pPr marL="343080" indent="-340200">
               <a:lnSpc>
                 <a:spcPct val="100000"/>
               </a:lnSpc>
@@ -1795,22 +1793,12 @@
               <a:buFont typeface="StarSymbol"/>
               <a:buAutoNum type="arabicPeriod"/>
             </a:pPr>
-            <a:r>
-              <a:rPr b="0" lang="pt-BR" sz="1400" spc="-1" strike="noStrike">
-                <a:solidFill>
-                  <a:srgbClr val="000000"/>
-                </a:solidFill>
-                <a:latin typeface="Calibri"/>
-                <a:ea typeface="DejaVu Sans"/>
-              </a:rPr>
-              <a:t>Solicitar Reparo</a:t>
-            </a:r>
-            <a:endParaRPr b="0" lang="pt-BR" sz="1400" spc="-1" strike="noStrike">
-              <a:latin typeface="Arial"/>
-            </a:endParaRPr>
-          </a:p>
-          <a:p>
-            <a:pPr marL="343080" indent="-340560">
+            <a:endParaRPr b="0" lang="pt-BR" sz="1800" spc="-1" strike="noStrike">
+              <a:latin typeface="Arial"/>
+            </a:endParaRPr>
+          </a:p>
+          <a:p>
+            <a:pPr marL="343080" indent="-340200">
               <a:lnSpc>
                 <a:spcPct val="100000"/>
               </a:lnSpc>
@@ -1855,7 +1843,7 @@
         <p:spPr>
           <a:xfrm>
             <a:off x="6048000" y="2016000"/>
-            <a:ext cx="2982600" cy="2374920"/>
+            <a:ext cx="2982240" cy="2374560"/>
           </a:xfrm>
           <a:prstGeom prst="roundRect">
             <a:avLst>
@@ -1944,7 +1932,7 @@
         <p:spPr>
           <a:xfrm>
             <a:off x="72000" y="4141440"/>
-            <a:ext cx="1174680" cy="753480"/>
+            <a:ext cx="1174320" cy="753120"/>
           </a:xfrm>
           <a:prstGeom prst="rect">
             <a:avLst/>
@@ -1983,7 +1971,7 @@
                 <a:latin typeface="Calibri"/>
                 <a:ea typeface="DejaVu Sans"/>
               </a:rPr>
-              <a:t>Cliente</a:t>
+              <a:t>Negócios</a:t>
             </a:r>
             <a:endParaRPr b="0" lang="pt-BR" sz="1800" spc="-1" strike="noStrike">
               <a:latin typeface="Arial"/>
@@ -2027,20 +2015,15 @@
         </p:nvSpPr>
         <p:spPr>
           <a:xfrm>
-            <a:off x="1800000" y="4717440"/>
-            <a:ext cx="1174680" cy="753480"/>
-          </a:xfrm>
-          <a:prstGeom prst="rect">
-            <a:avLst/>
-          </a:prstGeom>
-          <a:solidFill>
-            <a:srgbClr val="4472c4"/>
-          </a:solidFill>
-          <a:ln w="12600">
-            <a:solidFill>
-              <a:srgbClr val="325490"/>
-            </a:solidFill>
-            <a:miter/>
+            <a:off x="2808000" y="3528000"/>
+            <a:ext cx="2159280" cy="577080"/>
+          </a:xfrm>
+          <a:prstGeom prst="rect">
+            <a:avLst/>
+          </a:prstGeom>
+          <a:noFill/>
+          <a:ln>
+            <a:noFill/>
           </a:ln>
         </p:spPr>
         <p:style>
@@ -2050,57 +2033,6 @@
           <a:fontRef idx="minor"/>
         </p:style>
         <p:txBody>
-          <a:bodyPr lIns="90000" rIns="90000" tIns="45000" bIns="45000" anchor="ctr">
-            <a:noAutofit/>
-          </a:bodyPr>
-          <a:p>
-            <a:pPr algn="ctr">
-              <a:lnSpc>
-                <a:spcPct val="100000"/>
-              </a:lnSpc>
-            </a:pPr>
-            <a:r>
-              <a:rPr b="0" lang="pt-BR" sz="1800" spc="-1" strike="noStrike">
-                <a:solidFill>
-                  <a:srgbClr val="ffffff"/>
-                </a:solidFill>
-                <a:latin typeface="Calibri"/>
-                <a:ea typeface="DejaVu Sans"/>
-              </a:rPr>
-              <a:t>Negocios</a:t>
-            </a:r>
-            <a:endParaRPr b="0" lang="pt-BR" sz="1800" spc="-1" strike="noStrike">
-              <a:latin typeface="Arial"/>
-            </a:endParaRPr>
-          </a:p>
-        </p:txBody>
-      </p:sp>
-      <p:sp>
-        <p:nvSpPr>
-          <p:cNvPr id="46" name="CustomShape 9"/>
-          <p:cNvSpPr/>
-          <p:nvPr/>
-        </p:nvSpPr>
-        <p:spPr>
-          <a:xfrm>
-            <a:off x="2808000" y="3528000"/>
-            <a:ext cx="2159640" cy="638280"/>
-          </a:xfrm>
-          <a:prstGeom prst="rect">
-            <a:avLst/>
-          </a:prstGeom>
-          <a:noFill/>
-          <a:ln>
-            <a:noFill/>
-          </a:ln>
-        </p:spPr>
-        <p:style>
-          <a:lnRef idx="0"/>
-          <a:fillRef idx="0"/>
-          <a:effectRef idx="0"/>
-          <a:fontRef idx="minor"/>
-        </p:style>
-        <p:txBody>
           <a:bodyPr lIns="90000" rIns="90000" tIns="45000" bIns="45000">
             <a:spAutoFit/>
           </a:bodyPr>
@@ -2111,59 +2043,26 @@
               </a:lnSpc>
             </a:pPr>
             <a:r>
-              <a:rPr b="0" lang="pt-BR" sz="1800" spc="-1" strike="noStrike">
+              <a:rPr b="0" lang="pt-BR" sz="1600" spc="-1" strike="noStrike">
+                <a:solidFill>
+                  <a:srgbClr val="000000"/>
+                </a:solidFill>
                 <a:latin typeface="Arial"/>
+                <a:ea typeface="DejaVu Sans"/>
               </a:rPr>
-              <a:t>3. Enviar máquina para reparo</a:t>
+              <a:t>2. </a:t>
             </a:r>
-            <a:endParaRPr b="0" lang="pt-BR" sz="1800" spc="-1" strike="noStrike">
-              <a:latin typeface="Arial"/>
-            </a:endParaRPr>
-          </a:p>
-        </p:txBody>
-      </p:sp>
-      <p:sp>
-        <p:nvSpPr>
-          <p:cNvPr id="47" name="CustomShape 10"/>
-          <p:cNvSpPr/>
-          <p:nvPr/>
-        </p:nvSpPr>
-        <p:spPr>
-          <a:xfrm>
-            <a:off x="3456000" y="4680000"/>
-            <a:ext cx="1583640" cy="912600"/>
-          </a:xfrm>
-          <a:prstGeom prst="rect">
-            <a:avLst/>
-          </a:prstGeom>
-          <a:noFill/>
-          <a:ln>
-            <a:noFill/>
-          </a:ln>
-        </p:spPr>
-        <p:style>
-          <a:lnRef idx="0"/>
-          <a:fillRef idx="0"/>
-          <a:effectRef idx="0"/>
-          <a:fontRef idx="minor"/>
-        </p:style>
-        <p:txBody>
-          <a:bodyPr lIns="90000" rIns="90000" tIns="45000" bIns="45000">
-            <a:spAutoFit/>
-          </a:bodyPr>
-          <a:p>
-            <a:pPr>
-              <a:lnSpc>
-                <a:spcPct val="100000"/>
-              </a:lnSpc>
-            </a:pPr>
             <a:r>
-              <a:rPr b="0" lang="pt-BR" sz="1800" spc="-1" strike="noStrike">
-                <a:latin typeface="Arial"/>
+              <a:rPr b="0" lang="pt-BR" sz="1600" spc="-1" strike="noStrike">
+                <a:solidFill>
+                  <a:srgbClr val="000000"/>
+                </a:solidFill>
+                <a:latin typeface="Calibri"/>
+                <a:ea typeface="Microsoft YaHei"/>
               </a:rPr>
-              <a:t>4.Solicitar Priorização de pedido</a:t>
+              <a:t>Solicitar prioridade de pedido</a:t>
             </a:r>
-            <a:endParaRPr b="0" lang="pt-BR" sz="1800" spc="-1" strike="noStrike">
+            <a:endParaRPr b="0" lang="pt-BR" sz="1600" spc="-1" strike="noStrike">
               <a:latin typeface="Arial"/>
             </a:endParaRPr>
           </a:p>
@@ -2201,14 +2100,14 @@
       </p:grpSpPr>
       <p:sp>
         <p:nvSpPr>
-          <p:cNvPr id="48" name="CustomShape 1"/>
+          <p:cNvPr id="46" name="CustomShape 1"/>
           <p:cNvSpPr/>
           <p:nvPr/>
         </p:nvSpPr>
         <p:spPr>
           <a:xfrm>
             <a:off x="692640" y="301680"/>
-            <a:ext cx="8691480" cy="1093320"/>
+            <a:ext cx="8691120" cy="1092960"/>
           </a:xfrm>
           <a:prstGeom prst="rect">
             <a:avLst/>
@@ -2262,14 +2161,14 @@
       </p:sp>
       <p:sp>
         <p:nvSpPr>
-          <p:cNvPr id="49" name="CustomShape 2"/>
+          <p:cNvPr id="47" name="CustomShape 2"/>
           <p:cNvSpPr/>
           <p:nvPr/>
         </p:nvSpPr>
         <p:spPr>
           <a:xfrm>
-            <a:off x="3696120" y="2592000"/>
-            <a:ext cx="1343160" cy="480600"/>
+            <a:off x="3049200" y="2592000"/>
+            <a:ext cx="1342800" cy="480240"/>
           </a:xfrm>
           <a:prstGeom prst="cube">
             <a:avLst>
@@ -2350,14 +2249,14 @@
       </p:sp>
       <p:sp>
         <p:nvSpPr>
-          <p:cNvPr id="50" name="CustomShape 3"/>
+          <p:cNvPr id="48" name="CustomShape 3"/>
           <p:cNvSpPr/>
           <p:nvPr/>
         </p:nvSpPr>
         <p:spPr>
           <a:xfrm>
-            <a:off x="3727440" y="3625200"/>
-            <a:ext cx="1095840" cy="838080"/>
+            <a:off x="3096000" y="3554280"/>
+            <a:ext cx="1095480" cy="837720"/>
           </a:xfrm>
           <a:prstGeom prst="roundRect">
             <a:avLst>
@@ -2405,14 +2304,14 @@
       </p:sp>
       <p:sp>
         <p:nvSpPr>
-          <p:cNvPr id="51" name="CustomShape 4"/>
+          <p:cNvPr id="49" name="CustomShape 4"/>
           <p:cNvSpPr/>
           <p:nvPr/>
         </p:nvSpPr>
         <p:spPr>
           <a:xfrm>
             <a:off x="120960" y="2520000"/>
-            <a:ext cx="1102320" cy="753480"/>
+            <a:ext cx="1101960" cy="753120"/>
           </a:xfrm>
           <a:prstGeom prst="rect">
             <a:avLst/>
@@ -2461,14 +2360,14 @@
       </p:sp>
       <p:sp>
         <p:nvSpPr>
-          <p:cNvPr id="52" name="CustomShape 5"/>
+          <p:cNvPr id="50" name="CustomShape 5"/>
           <p:cNvSpPr/>
           <p:nvPr/>
         </p:nvSpPr>
         <p:spPr>
           <a:xfrm>
-            <a:off x="3672000" y="1395720"/>
-            <a:ext cx="5974920" cy="3571200"/>
+            <a:off x="3024000" y="1440000"/>
+            <a:ext cx="6622560" cy="3526560"/>
           </a:xfrm>
           <a:prstGeom prst="roundRect">
             <a:avLst>
@@ -2517,14 +2416,14 @@
       </p:sp>
       <p:sp>
         <p:nvSpPr>
-          <p:cNvPr id="53" name="Line 6"/>
+          <p:cNvPr id="51" name="Line 6"/>
           <p:cNvSpPr/>
           <p:nvPr/>
         </p:nvSpPr>
         <p:spPr>
           <a:xfrm>
-            <a:off x="4248000" y="3143160"/>
-            <a:ext cx="72000" cy="456840"/>
+            <a:off x="3600000" y="3072240"/>
+            <a:ext cx="0" cy="552600"/>
           </a:xfrm>
           <a:prstGeom prst="line">
             <a:avLst/>
@@ -2545,14 +2444,14 @@
       </p:sp>
       <p:sp>
         <p:nvSpPr>
-          <p:cNvPr id="54" name="Line 7"/>
+          <p:cNvPr id="52" name="Line 7"/>
           <p:cNvSpPr/>
           <p:nvPr/>
         </p:nvSpPr>
         <p:spPr>
           <a:xfrm>
             <a:off x="1045800" y="2927160"/>
-            <a:ext cx="2626200" cy="11160"/>
+            <a:ext cx="1978200" cy="11160"/>
           </a:xfrm>
           <a:prstGeom prst="line">
             <a:avLst/>
@@ -2578,14 +2477,14 @@
       </p:sp>
       <p:sp>
         <p:nvSpPr>
-          <p:cNvPr id="55" name="CustomShape 8"/>
+          <p:cNvPr id="53" name="CustomShape 8"/>
           <p:cNvSpPr/>
           <p:nvPr/>
         </p:nvSpPr>
         <p:spPr>
           <a:xfrm>
-            <a:off x="8208000" y="2470680"/>
-            <a:ext cx="1343160" cy="480600"/>
+            <a:off x="7992000" y="2592000"/>
+            <a:ext cx="1342800" cy="480240"/>
           </a:xfrm>
           <a:prstGeom prst="cube">
             <a:avLst>
@@ -2666,14 +2565,14 @@
       </p:sp>
       <p:sp>
         <p:nvSpPr>
-          <p:cNvPr id="56" name="CustomShape 9"/>
+          <p:cNvPr id="54" name="CustomShape 9"/>
           <p:cNvSpPr/>
           <p:nvPr/>
         </p:nvSpPr>
         <p:spPr>
           <a:xfrm>
-            <a:off x="8119080" y="3552840"/>
-            <a:ext cx="1095840" cy="838080"/>
+            <a:off x="7904520" y="3626280"/>
+            <a:ext cx="1095480" cy="837720"/>
           </a:xfrm>
           <a:prstGeom prst="roundRect">
             <a:avLst>
@@ -2721,14 +2620,14 @@
       </p:sp>
       <p:sp>
         <p:nvSpPr>
-          <p:cNvPr id="57" name="Line 10"/>
+          <p:cNvPr id="55" name="Line 10"/>
           <p:cNvSpPr/>
           <p:nvPr/>
         </p:nvSpPr>
         <p:spPr>
-          <a:xfrm>
-            <a:off x="8640000" y="3021480"/>
-            <a:ext cx="0" cy="506520"/>
+          <a:xfrm flipH="1">
+            <a:off x="8352000" y="3139200"/>
+            <a:ext cx="216000" cy="604800"/>
           </a:xfrm>
           <a:prstGeom prst="line">
             <a:avLst/>
@@ -2749,14 +2648,14 @@
       </p:sp>
       <p:sp>
         <p:nvSpPr>
-          <p:cNvPr id="58" name="CustomShape 11"/>
+          <p:cNvPr id="56" name="CustomShape 11"/>
           <p:cNvSpPr/>
           <p:nvPr/>
         </p:nvSpPr>
         <p:spPr>
           <a:xfrm>
-            <a:off x="4824000" y="3697200"/>
-            <a:ext cx="1095840" cy="838080"/>
+            <a:off x="4248000" y="3554280"/>
+            <a:ext cx="1095480" cy="837720"/>
           </a:xfrm>
           <a:prstGeom prst="roundRect">
             <a:avLst>
@@ -2804,14 +2703,14 @@
       </p:sp>
       <p:sp>
         <p:nvSpPr>
-          <p:cNvPr id="59" name="CustomShape 12"/>
+          <p:cNvPr id="57" name="CustomShape 12"/>
           <p:cNvSpPr/>
           <p:nvPr/>
         </p:nvSpPr>
         <p:spPr>
           <a:xfrm>
-            <a:off x="5760000" y="2542680"/>
-            <a:ext cx="1343160" cy="552600"/>
+            <a:off x="5400000" y="2398680"/>
+            <a:ext cx="1368000" cy="697320"/>
           </a:xfrm>
           <a:prstGeom prst="cube">
             <a:avLst>
@@ -2892,14 +2791,14 @@
       </p:sp>
       <p:sp>
         <p:nvSpPr>
-          <p:cNvPr id="60" name="CustomShape 13"/>
+          <p:cNvPr id="58" name="CustomShape 13"/>
           <p:cNvSpPr/>
           <p:nvPr/>
         </p:nvSpPr>
         <p:spPr>
           <a:xfrm>
-            <a:off x="6031440" y="3672000"/>
-            <a:ext cx="1095840" cy="863280"/>
+            <a:off x="5456520" y="3600000"/>
+            <a:ext cx="1095480" cy="862920"/>
           </a:xfrm>
           <a:prstGeom prst="roundRect">
             <a:avLst>
@@ -2947,13 +2846,13 @@
       </p:sp>
       <p:sp>
         <p:nvSpPr>
-          <p:cNvPr id="61" name="Line 14"/>
+          <p:cNvPr id="59" name="Line 14"/>
           <p:cNvSpPr/>
           <p:nvPr/>
         </p:nvSpPr>
         <p:spPr>
           <a:xfrm>
-            <a:off x="6408000" y="3145320"/>
+            <a:off x="6048000" y="3121560"/>
             <a:ext cx="0" cy="479520"/>
           </a:xfrm>
           <a:prstGeom prst="line">
@@ -2975,14 +2874,14 @@
       </p:sp>
       <p:sp>
         <p:nvSpPr>
-          <p:cNvPr id="62" name="Line 15"/>
+          <p:cNvPr id="60" name="Line 15"/>
           <p:cNvSpPr/>
           <p:nvPr/>
         </p:nvSpPr>
         <p:spPr>
           <a:xfrm>
-            <a:off x="4968000" y="3073320"/>
-            <a:ext cx="288000" cy="623880"/>
+            <a:off x="4176000" y="3072240"/>
+            <a:ext cx="432000" cy="482040"/>
           </a:xfrm>
           <a:prstGeom prst="line">
             <a:avLst/>
@@ -3003,14 +2902,14 @@
       </p:sp>
       <p:sp>
         <p:nvSpPr>
-          <p:cNvPr id="63" name="CustomShape 16"/>
+          <p:cNvPr id="61" name="CustomShape 16"/>
           <p:cNvSpPr/>
           <p:nvPr/>
         </p:nvSpPr>
         <p:spPr>
           <a:xfrm>
-            <a:off x="7200000" y="3744000"/>
-            <a:ext cx="807840" cy="647280"/>
+            <a:off x="6640920" y="3600000"/>
+            <a:ext cx="1135080" cy="792000"/>
           </a:xfrm>
           <a:prstGeom prst="roundRect">
             <a:avLst>
@@ -3058,14 +2957,14 @@
       </p:sp>
       <p:sp>
         <p:nvSpPr>
-          <p:cNvPr id="64" name="Line 17"/>
+          <p:cNvPr id="62" name="Line 17"/>
           <p:cNvSpPr/>
           <p:nvPr/>
         </p:nvSpPr>
         <p:spPr>
           <a:xfrm>
-            <a:off x="6912000" y="3096000"/>
-            <a:ext cx="648000" cy="695520"/>
+            <a:off x="6624000" y="3096000"/>
+            <a:ext cx="360000" cy="504000"/>
           </a:xfrm>
           <a:prstGeom prst="line">
             <a:avLst/>
@@ -3116,14 +3015,14 @@
       </p:grpSpPr>
       <p:sp>
         <p:nvSpPr>
-          <p:cNvPr id="65" name="CustomShape 1"/>
+          <p:cNvPr id="63" name="CustomShape 1"/>
           <p:cNvSpPr/>
           <p:nvPr/>
         </p:nvSpPr>
         <p:spPr>
           <a:xfrm>
             <a:off x="692640" y="301680"/>
-            <a:ext cx="8691480" cy="1093320"/>
+            <a:ext cx="8691120" cy="1092960"/>
           </a:xfrm>
           <a:prstGeom prst="rect">
             <a:avLst/>
@@ -3167,7 +3066,7 @@
                 <a:latin typeface="Calibri"/>
                 <a:ea typeface="Microsoft YaHei"/>
               </a:rPr>
-              <a:t>Solicitar prioridade de pedido </a:t>
+              <a:t>Solicitar prioridade de pedido</a:t>
             </a:r>
             <a:endParaRPr b="0" lang="pt-BR" sz="3200" spc="-1" strike="noStrike">
               <a:latin typeface="Arial"/>
@@ -3177,14 +3076,14 @@
       </p:sp>
       <p:sp>
         <p:nvSpPr>
-          <p:cNvPr id="66" name="CustomShape 2"/>
+          <p:cNvPr id="64" name="CustomShape 2"/>
           <p:cNvSpPr/>
           <p:nvPr/>
         </p:nvSpPr>
         <p:spPr>
           <a:xfrm>
             <a:off x="6231600" y="2637000"/>
-            <a:ext cx="1343160" cy="480600"/>
+            <a:ext cx="1342800" cy="480240"/>
           </a:xfrm>
           <a:prstGeom prst="cube">
             <a:avLst>
@@ -3265,14 +3164,14 @@
       </p:sp>
       <p:sp>
         <p:nvSpPr>
-          <p:cNvPr id="67" name="CustomShape 3"/>
+          <p:cNvPr id="65" name="CustomShape 3"/>
           <p:cNvSpPr/>
           <p:nvPr/>
         </p:nvSpPr>
         <p:spPr>
           <a:xfrm>
             <a:off x="6318000" y="3551760"/>
-            <a:ext cx="1095840" cy="838080"/>
+            <a:ext cx="1095480" cy="837720"/>
           </a:xfrm>
           <a:prstGeom prst="roundRect">
             <a:avLst>
@@ -3320,14 +3219,14 @@
       </p:sp>
       <p:sp>
         <p:nvSpPr>
-          <p:cNvPr id="68" name="CustomShape 4"/>
+          <p:cNvPr id="66" name="CustomShape 4"/>
           <p:cNvSpPr/>
           <p:nvPr/>
         </p:nvSpPr>
         <p:spPr>
           <a:xfrm>
             <a:off x="1682280" y="2561040"/>
-            <a:ext cx="1102320" cy="753480"/>
+            <a:ext cx="1101960" cy="753120"/>
           </a:xfrm>
           <a:prstGeom prst="rect">
             <a:avLst/>
@@ -3376,14 +3275,14 @@
       </p:sp>
       <p:sp>
         <p:nvSpPr>
-          <p:cNvPr id="69" name="CustomShape 5"/>
+          <p:cNvPr id="67" name="CustomShape 5"/>
           <p:cNvSpPr/>
           <p:nvPr/>
         </p:nvSpPr>
         <p:spPr>
           <a:xfrm>
             <a:off x="5412240" y="1584000"/>
-            <a:ext cx="3009600" cy="3093840"/>
+            <a:ext cx="3009240" cy="3093480"/>
           </a:xfrm>
           <a:prstGeom prst="roundRect">
             <a:avLst>
@@ -3432,7 +3331,7 @@
       </p:sp>
       <p:sp>
         <p:nvSpPr>
-          <p:cNvPr id="70" name="Line 6"/>
+          <p:cNvPr id="68" name="Line 6"/>
           <p:cNvSpPr/>
           <p:nvPr/>
         </p:nvSpPr>
@@ -3460,821 +3359,7 @@
       </p:sp>
       <p:sp>
         <p:nvSpPr>
-          <p:cNvPr id="71" name="Line 7"/>
-          <p:cNvSpPr/>
-          <p:nvPr/>
-        </p:nvSpPr>
-        <p:spPr>
-          <a:xfrm>
-            <a:off x="2786040" y="2938320"/>
-            <a:ext cx="2626200" cy="11160"/>
-          </a:xfrm>
-          <a:prstGeom prst="line">
-            <a:avLst/>
-          </a:prstGeom>
-          <a:ln>
-            <a:solidFill>
-              <a:srgbClr val="4a7ebb"/>
-            </a:solidFill>
-          </a:ln>
-        </p:spPr>
-        <p:style>
-          <a:lnRef idx="1">
-            <a:schemeClr val="accent1"/>
-          </a:lnRef>
-          <a:fillRef idx="0">
-            <a:schemeClr val="accent1"/>
-          </a:fillRef>
-          <a:effectRef idx="0">
-            <a:schemeClr val="accent1"/>
-          </a:effectRef>
-          <a:fontRef idx="minor"/>
-        </p:style>
-      </p:sp>
-    </p:spTree>
-  </p:cSld>
-  <mc:AlternateContent>
-    <mc:Choice Requires="p14">
-      <p:transition spd="slow" p14:dur="2000"/>
-    </mc:Choice>
-    <mc:Fallback>
-      <p:transition spd="slow"/>
-    </mc:Fallback>
-  </mc:AlternateContent>
-</p:sld>
-</file>
-
-<file path=ppt/slides/slide4.xml><?xml version="1.0" encoding="utf-8"?>
-<p:sld xmlns:a="http://schemas.openxmlformats.org/drawingml/2006/main" xmlns:p="http://schemas.openxmlformats.org/presentationml/2006/main" xmlns:r="http://schemas.openxmlformats.org/officeDocument/2006/relationships" xmlns:p14="http://schemas.microsoft.com/office/powerpoint/2010/main" xmlns:p15="http://schemas.microsoft.com/office/powerpoint/2012/main" xmlns:mc="http://schemas.openxmlformats.org/markup-compatibility/2006">
-  <p:cSld>
-    <p:spTree>
-      <p:nvGrpSpPr>
-        <p:cNvPr id="1" name=""/>
-        <p:cNvGrpSpPr/>
-        <p:nvPr/>
-      </p:nvGrpSpPr>
-      <p:grpSpPr>
-        <a:xfrm>
-          <a:off x="0" y="0"/>
-          <a:ext cx="0" cy="0"/>
-          <a:chOff x="0" y="0"/>
-          <a:chExt cx="0" cy="0"/>
-        </a:xfrm>
-      </p:grpSpPr>
-      <p:sp>
-        <p:nvSpPr>
-          <p:cNvPr id="72" name="CustomShape 1"/>
-          <p:cNvSpPr/>
-          <p:nvPr/>
-        </p:nvSpPr>
-        <p:spPr>
-          <a:xfrm>
-            <a:off x="692640" y="301680"/>
-            <a:ext cx="8691480" cy="1093320"/>
-          </a:xfrm>
-          <a:prstGeom prst="rect">
-            <a:avLst/>
-          </a:prstGeom>
-          <a:noFill/>
-          <a:ln>
-            <a:noFill/>
-          </a:ln>
-        </p:spPr>
-        <p:style>
-          <a:lnRef idx="0"/>
-          <a:fillRef idx="0"/>
-          <a:effectRef idx="0"/>
-          <a:fontRef idx="minor"/>
-        </p:style>
-        <p:txBody>
-          <a:bodyPr lIns="90000" rIns="90000" tIns="45000" bIns="45000" anchor="ctr">
-            <a:noAutofit/>
-          </a:bodyPr>
-          <a:p>
-            <a:pPr>
-              <a:lnSpc>
-                <a:spcPct val="90000"/>
-              </a:lnSpc>
-            </a:pPr>
-            <a:r>
-              <a:rPr b="0" lang="pt-BR" sz="4400" spc="-1" strike="noStrike">
-                <a:solidFill>
-                  <a:srgbClr val="000000"/>
-                </a:solidFill>
-                <a:latin typeface="Calibri Light"/>
-                <a:ea typeface="Microsoft YaHei"/>
-              </a:rPr>
-              <a:t>Cenário: </a:t>
-            </a:r>
-            <a:r>
-              <a:rPr b="0" lang="pt-BR" sz="3200" spc="-1" strike="noStrike">
-                <a:solidFill>
-                  <a:srgbClr val="000000"/>
-                </a:solidFill>
-                <a:latin typeface="Calibri"/>
-                <a:ea typeface="Microsoft YaHei"/>
-              </a:rPr>
-              <a:t>Solicitar Reparo</a:t>
-            </a:r>
-            <a:endParaRPr b="0" lang="pt-BR" sz="3200" spc="-1" strike="noStrike">
-              <a:latin typeface="Arial"/>
-            </a:endParaRPr>
-          </a:p>
-        </p:txBody>
-      </p:sp>
-      <p:sp>
-        <p:nvSpPr>
-          <p:cNvPr id="73" name="CustomShape 2"/>
-          <p:cNvSpPr/>
-          <p:nvPr/>
-        </p:nvSpPr>
-        <p:spPr>
-          <a:xfrm>
-            <a:off x="6231600" y="2637000"/>
-            <a:ext cx="1343160" cy="480600"/>
-          </a:xfrm>
-          <a:prstGeom prst="cube">
-            <a:avLst>
-              <a:gd name="adj" fmla="val 25000"/>
-            </a:avLst>
-          </a:prstGeom>
-          <a:solidFill>
-            <a:srgbClr val="ffc000"/>
-          </a:solidFill>
-          <a:ln w="12600">
-            <a:solidFill>
-              <a:srgbClr val="4472c4"/>
-            </a:solidFill>
-            <a:miter/>
-          </a:ln>
-        </p:spPr>
-        <p:style>
-          <a:lnRef idx="0"/>
-          <a:fillRef idx="0"/>
-          <a:effectRef idx="0"/>
-          <a:fontRef idx="minor"/>
-        </p:style>
-        <p:txBody>
-          <a:bodyPr lIns="90000" rIns="90000" tIns="45000" bIns="45000">
-            <a:noAutofit/>
-          </a:bodyPr>
-          <a:p>
-            <a:pPr algn="ctr">
-              <a:lnSpc>
-                <a:spcPct val="100000"/>
-              </a:lnSpc>
-            </a:pPr>
-            <a:r>
-              <a:rPr b="0" lang="pt-BR" sz="1000" spc="-1" strike="noStrike">
-                <a:solidFill>
-                  <a:srgbClr val="000000"/>
-                </a:solidFill>
-                <a:latin typeface="Calibri"/>
-                <a:ea typeface="DejaVu Sans"/>
-              </a:rPr>
-              <a:t>Gerencia</a:t>
-            </a:r>
-            <a:endParaRPr b="0" lang="pt-BR" sz="1000" spc="-1" strike="noStrike">
-              <a:latin typeface="Arial"/>
-            </a:endParaRPr>
-          </a:p>
-          <a:p>
-            <a:pPr algn="ctr">
-              <a:lnSpc>
-                <a:spcPct val="100000"/>
-              </a:lnSpc>
-            </a:pPr>
-            <a:r>
-              <a:rPr b="1" lang="pt-BR" sz="1000" spc="-1" strike="noStrike">
-                <a:solidFill>
-                  <a:srgbClr val="000000"/>
-                </a:solidFill>
-                <a:latin typeface="Calibri"/>
-                <a:ea typeface="DejaVu Sans"/>
-              </a:rPr>
-              <a:t>(Nó Operacional)</a:t>
-            </a:r>
-            <a:endParaRPr b="0" lang="pt-BR" sz="1000" spc="-1" strike="noStrike">
-              <a:latin typeface="Arial"/>
-            </a:endParaRPr>
-          </a:p>
-          <a:p>
-            <a:pPr>
-              <a:lnSpc>
-                <a:spcPct val="100000"/>
-              </a:lnSpc>
-            </a:pPr>
-            <a:endParaRPr b="0" lang="pt-BR" sz="1000" spc="-1" strike="noStrike">
-              <a:latin typeface="Arial"/>
-            </a:endParaRPr>
-          </a:p>
-        </p:txBody>
-      </p:sp>
-      <p:sp>
-        <p:nvSpPr>
-          <p:cNvPr id="74" name="CustomShape 3"/>
-          <p:cNvSpPr/>
-          <p:nvPr/>
-        </p:nvSpPr>
-        <p:spPr>
-          <a:xfrm>
-            <a:off x="6318000" y="3551760"/>
-            <a:ext cx="1095840" cy="838080"/>
-          </a:xfrm>
-          <a:prstGeom prst="roundRect">
-            <a:avLst>
-              <a:gd name="adj" fmla="val 16667"/>
-            </a:avLst>
-          </a:prstGeom>
-          <a:solidFill>
-            <a:srgbClr val="70ad47"/>
-          </a:solidFill>
-          <a:ln>
-            <a:noFill/>
-          </a:ln>
-        </p:spPr>
-        <p:style>
-          <a:lnRef idx="0"/>
-          <a:fillRef idx="0"/>
-          <a:effectRef idx="0"/>
-          <a:fontRef idx="minor"/>
-        </p:style>
-        <p:txBody>
-          <a:bodyPr lIns="90000" rIns="90000" tIns="45000" bIns="45000" anchor="ctr">
-            <a:noAutofit/>
-          </a:bodyPr>
-          <a:p>
-            <a:pPr algn="ctr">
-              <a:lnSpc>
-                <a:spcPct val="100000"/>
-              </a:lnSpc>
-            </a:pPr>
-            <a:r>
-              <a:rPr b="1" lang="pt-BR" sz="1200" spc="-1" strike="noStrike">
-                <a:solidFill>
-                  <a:srgbClr val="ffffff"/>
-                </a:solidFill>
-                <a:latin typeface="Calibri"/>
-                <a:ea typeface="DejaVu Sans"/>
-              </a:rPr>
-              <a:t>Receber solicitação de reparo</a:t>
-            </a:r>
-            <a:endParaRPr b="0" lang="pt-BR" sz="1200" spc="-1" strike="noStrike">
-              <a:latin typeface="Arial"/>
-            </a:endParaRPr>
-          </a:p>
-        </p:txBody>
-      </p:sp>
-      <p:sp>
-        <p:nvSpPr>
-          <p:cNvPr id="75" name="CustomShape 4"/>
-          <p:cNvSpPr/>
-          <p:nvPr/>
-        </p:nvSpPr>
-        <p:spPr>
-          <a:xfrm>
-            <a:off x="1682280" y="2561040"/>
-            <a:ext cx="1102320" cy="753480"/>
-          </a:xfrm>
-          <a:prstGeom prst="rect">
-            <a:avLst/>
-          </a:prstGeom>
-          <a:solidFill>
-            <a:srgbClr val="4472c4"/>
-          </a:solidFill>
-          <a:ln w="12600">
-            <a:solidFill>
-              <a:srgbClr val="325490"/>
-            </a:solidFill>
-            <a:miter/>
-          </a:ln>
-        </p:spPr>
-        <p:style>
-          <a:lnRef idx="0"/>
-          <a:fillRef idx="0"/>
-          <a:effectRef idx="0"/>
-          <a:fontRef idx="minor"/>
-        </p:style>
-        <p:txBody>
-          <a:bodyPr lIns="90000" rIns="90000" tIns="45000" bIns="45000" anchor="ctr">
-            <a:noAutofit/>
-          </a:bodyPr>
-          <a:p>
-            <a:pPr algn="ctr">
-              <a:lnSpc>
-                <a:spcPct val="100000"/>
-              </a:lnSpc>
-            </a:pPr>
-            <a:r>
-              <a:rPr b="0" lang="pt-BR" sz="1800" spc="-1" strike="noStrike">
-                <a:solidFill>
-                  <a:srgbClr val="ffffff"/>
-                </a:solidFill>
-                <a:latin typeface="Calibri"/>
-                <a:ea typeface="DejaVu Sans"/>
-              </a:rPr>
-              <a:t>Comercial</a:t>
-            </a:r>
-            <a:endParaRPr b="0" lang="pt-BR" sz="1800" spc="-1" strike="noStrike">
-              <a:latin typeface="Arial"/>
-            </a:endParaRPr>
-          </a:p>
-        </p:txBody>
-      </p:sp>
-      <p:sp>
-        <p:nvSpPr>
-          <p:cNvPr id="76" name="CustomShape 5"/>
-          <p:cNvSpPr/>
-          <p:nvPr/>
-        </p:nvSpPr>
-        <p:spPr>
-          <a:xfrm>
-            <a:off x="5412240" y="1584000"/>
-            <a:ext cx="3009600" cy="3093840"/>
-          </a:xfrm>
-          <a:prstGeom prst="roundRect">
-            <a:avLst>
-              <a:gd name="adj" fmla="val 16667"/>
-            </a:avLst>
-          </a:prstGeom>
-          <a:noFill/>
-          <a:ln w="12600">
-            <a:solidFill>
-              <a:srgbClr val="325490"/>
-            </a:solidFill>
-            <a:miter/>
-          </a:ln>
-        </p:spPr>
-        <p:style>
-          <a:lnRef idx="0"/>
-          <a:fillRef idx="0"/>
-          <a:effectRef idx="0"/>
-          <a:fontRef idx="minor"/>
-        </p:style>
-        <p:txBody>
-          <a:bodyPr lIns="90000" rIns="90000" tIns="45000" bIns="45000">
-            <a:noAutofit/>
-          </a:bodyPr>
-          <a:p>
-            <a:pPr algn="ctr">
-              <a:lnSpc>
-                <a:spcPct val="100000"/>
-              </a:lnSpc>
-            </a:pPr>
-            <a:r>
-              <a:rPr b="0" lang="pt-BR" sz="1800" spc="-1" strike="noStrike">
-                <a:solidFill>
-                  <a:srgbClr val="000000"/>
-                </a:solidFill>
-                <a:latin typeface="Calibri"/>
-                <a:ea typeface="DejaVu Sans"/>
-              </a:rPr>
-              <a:t>Produção</a:t>
-            </a:r>
-            <a:endParaRPr b="0" lang="pt-BR" sz="1800" spc="-1" strike="noStrike">
-              <a:latin typeface="Arial"/>
-            </a:endParaRPr>
-          </a:p>
-        </p:txBody>
-      </p:sp>
-      <p:sp>
-        <p:nvSpPr>
-          <p:cNvPr id="77" name="Line 6"/>
-          <p:cNvSpPr/>
-          <p:nvPr/>
-        </p:nvSpPr>
-        <p:spPr>
-          <a:xfrm>
-            <a:off x="6843600" y="3120120"/>
-            <a:ext cx="2520" cy="432000"/>
-          </a:xfrm>
-          <a:prstGeom prst="line">
-            <a:avLst/>
-          </a:prstGeom>
-          <a:ln w="6480">
-            <a:solidFill>
-              <a:srgbClr val="4472c4"/>
-            </a:solidFill>
-            <a:miter/>
-          </a:ln>
-        </p:spPr>
-        <p:style>
-          <a:lnRef idx="0"/>
-          <a:fillRef idx="0"/>
-          <a:effectRef idx="0"/>
-          <a:fontRef idx="minor"/>
-        </p:style>
-      </p:sp>
-      <p:sp>
-        <p:nvSpPr>
-          <p:cNvPr id="78" name="Line 7"/>
-          <p:cNvSpPr/>
-          <p:nvPr/>
-        </p:nvSpPr>
-        <p:spPr>
-          <a:xfrm>
-            <a:off x="2786040" y="2938320"/>
-            <a:ext cx="2626200" cy="11160"/>
-          </a:xfrm>
-          <a:prstGeom prst="line">
-            <a:avLst/>
-          </a:prstGeom>
-          <a:ln>
-            <a:solidFill>
-              <a:srgbClr val="4a7ebb"/>
-            </a:solidFill>
-          </a:ln>
-        </p:spPr>
-        <p:style>
-          <a:lnRef idx="1">
-            <a:schemeClr val="accent1"/>
-          </a:lnRef>
-          <a:fillRef idx="0">
-            <a:schemeClr val="accent1"/>
-          </a:fillRef>
-          <a:effectRef idx="0">
-            <a:schemeClr val="accent1"/>
-          </a:effectRef>
-          <a:fontRef idx="minor"/>
-        </p:style>
-      </p:sp>
-    </p:spTree>
-  </p:cSld>
-  <mc:AlternateContent>
-    <mc:Choice Requires="p14">
-      <p:transition spd="slow" p14:dur="2000"/>
-    </mc:Choice>
-    <mc:Fallback>
-      <p:transition spd="slow"/>
-    </mc:Fallback>
-  </mc:AlternateContent>
-</p:sld>
-</file>
-
-<file path=ppt/slides/slide5.xml><?xml version="1.0" encoding="utf-8"?>
-<p:sld xmlns:a="http://schemas.openxmlformats.org/drawingml/2006/main" xmlns:p="http://schemas.openxmlformats.org/presentationml/2006/main" xmlns:r="http://schemas.openxmlformats.org/officeDocument/2006/relationships" xmlns:p14="http://schemas.microsoft.com/office/powerpoint/2010/main" xmlns:p15="http://schemas.microsoft.com/office/powerpoint/2012/main" xmlns:mc="http://schemas.openxmlformats.org/markup-compatibility/2006">
-  <p:cSld>
-    <p:spTree>
-      <p:nvGrpSpPr>
-        <p:cNvPr id="1" name=""/>
-        <p:cNvGrpSpPr/>
-        <p:nvPr/>
-      </p:nvGrpSpPr>
-      <p:grpSpPr>
-        <a:xfrm>
-          <a:off x="0" y="0"/>
-          <a:ext cx="0" cy="0"/>
-          <a:chOff x="0" y="0"/>
-          <a:chExt cx="0" cy="0"/>
-        </a:xfrm>
-      </p:grpSpPr>
-      <p:sp>
-        <p:nvSpPr>
-          <p:cNvPr id="79" name="CustomShape 1"/>
-          <p:cNvSpPr/>
-          <p:nvPr/>
-        </p:nvSpPr>
-        <p:spPr>
-          <a:xfrm>
-            <a:off x="692640" y="301680"/>
-            <a:ext cx="8691480" cy="1093320"/>
-          </a:xfrm>
-          <a:prstGeom prst="rect">
-            <a:avLst/>
-          </a:prstGeom>
-          <a:noFill/>
-          <a:ln>
-            <a:noFill/>
-          </a:ln>
-        </p:spPr>
-        <p:style>
-          <a:lnRef idx="0"/>
-          <a:fillRef idx="0"/>
-          <a:effectRef idx="0"/>
-          <a:fontRef idx="minor"/>
-        </p:style>
-        <p:txBody>
-          <a:bodyPr lIns="90000" rIns="90000" tIns="45000" bIns="45000" anchor="ctr">
-            <a:noAutofit/>
-          </a:bodyPr>
-          <a:p>
-            <a:pPr>
-              <a:lnSpc>
-                <a:spcPct val="90000"/>
-              </a:lnSpc>
-            </a:pPr>
-            <a:r>
-              <a:rPr b="0" lang="pt-BR" sz="4400" spc="-1" strike="noStrike">
-                <a:solidFill>
-                  <a:srgbClr val="000000"/>
-                </a:solidFill>
-                <a:latin typeface="Calibri Light"/>
-                <a:ea typeface="Microsoft YaHei"/>
-              </a:rPr>
-              <a:t>Cenário: </a:t>
-            </a:r>
-            <a:r>
-              <a:rPr b="0" lang="pt-BR" sz="3200" spc="-1" strike="noStrike">
-                <a:solidFill>
-                  <a:srgbClr val="000000"/>
-                </a:solidFill>
-                <a:latin typeface="Calibri"/>
-                <a:ea typeface="Microsoft YaHei"/>
-              </a:rPr>
-              <a:t>Enviar Máquina para reparo</a:t>
-            </a:r>
-            <a:endParaRPr b="0" lang="pt-BR" sz="3200" spc="-1" strike="noStrike">
-              <a:latin typeface="Arial"/>
-            </a:endParaRPr>
-          </a:p>
-        </p:txBody>
-      </p:sp>
-      <p:sp>
-        <p:nvSpPr>
-          <p:cNvPr id="80" name="CustomShape 2"/>
-          <p:cNvSpPr/>
-          <p:nvPr/>
-        </p:nvSpPr>
-        <p:spPr>
-          <a:xfrm>
-            <a:off x="5496120" y="2664000"/>
-            <a:ext cx="1343160" cy="480600"/>
-          </a:xfrm>
-          <a:prstGeom prst="cube">
-            <a:avLst>
-              <a:gd name="adj" fmla="val 25000"/>
-            </a:avLst>
-          </a:prstGeom>
-          <a:solidFill>
-            <a:srgbClr val="ffc000"/>
-          </a:solidFill>
-          <a:ln w="12600">
-            <a:solidFill>
-              <a:srgbClr val="4472c4"/>
-            </a:solidFill>
-            <a:miter/>
-          </a:ln>
-        </p:spPr>
-        <p:style>
-          <a:lnRef idx="0"/>
-          <a:fillRef idx="0"/>
-          <a:effectRef idx="0"/>
-          <a:fontRef idx="minor"/>
-        </p:style>
-        <p:txBody>
-          <a:bodyPr lIns="90000" rIns="90000" tIns="45000" bIns="45000">
-            <a:noAutofit/>
-          </a:bodyPr>
-          <a:p>
-            <a:pPr algn="ctr">
-              <a:lnSpc>
-                <a:spcPct val="100000"/>
-              </a:lnSpc>
-            </a:pPr>
-            <a:r>
-              <a:rPr b="0" lang="pt-BR" sz="1000" spc="-1" strike="noStrike">
-                <a:solidFill>
-                  <a:srgbClr val="000000"/>
-                </a:solidFill>
-                <a:latin typeface="Calibri"/>
-                <a:ea typeface="DejaVu Sans"/>
-              </a:rPr>
-              <a:t>Gerencia</a:t>
-            </a:r>
-            <a:endParaRPr b="0" lang="pt-BR" sz="1000" spc="-1" strike="noStrike">
-              <a:latin typeface="Arial"/>
-            </a:endParaRPr>
-          </a:p>
-          <a:p>
-            <a:pPr algn="ctr">
-              <a:lnSpc>
-                <a:spcPct val="100000"/>
-              </a:lnSpc>
-            </a:pPr>
-            <a:r>
-              <a:rPr b="1" lang="pt-BR" sz="1000" spc="-1" strike="noStrike">
-                <a:solidFill>
-                  <a:srgbClr val="000000"/>
-                </a:solidFill>
-                <a:latin typeface="Calibri"/>
-                <a:ea typeface="DejaVu Sans"/>
-              </a:rPr>
-              <a:t>(Nó Operacional)</a:t>
-            </a:r>
-            <a:endParaRPr b="0" lang="pt-BR" sz="1000" spc="-1" strike="noStrike">
-              <a:latin typeface="Arial"/>
-            </a:endParaRPr>
-          </a:p>
-          <a:p>
-            <a:pPr>
-              <a:lnSpc>
-                <a:spcPct val="100000"/>
-              </a:lnSpc>
-            </a:pPr>
-            <a:endParaRPr b="0" lang="pt-BR" sz="1000" spc="-1" strike="noStrike">
-              <a:latin typeface="Arial"/>
-            </a:endParaRPr>
-          </a:p>
-        </p:txBody>
-      </p:sp>
-      <p:sp>
-        <p:nvSpPr>
-          <p:cNvPr id="81" name="CustomShape 3"/>
-          <p:cNvSpPr/>
-          <p:nvPr/>
-        </p:nvSpPr>
-        <p:spPr>
-          <a:xfrm>
-            <a:off x="5599440" y="3697200"/>
-            <a:ext cx="1095840" cy="838080"/>
-          </a:xfrm>
-          <a:prstGeom prst="roundRect">
-            <a:avLst>
-              <a:gd name="adj" fmla="val 16667"/>
-            </a:avLst>
-          </a:prstGeom>
-          <a:solidFill>
-            <a:srgbClr val="70ad47"/>
-          </a:solidFill>
-          <a:ln>
-            <a:noFill/>
-          </a:ln>
-        </p:spPr>
-        <p:style>
-          <a:lnRef idx="0"/>
-          <a:fillRef idx="0"/>
-          <a:effectRef idx="0"/>
-          <a:fontRef idx="minor"/>
-        </p:style>
-        <p:txBody>
-          <a:bodyPr lIns="90000" rIns="90000" tIns="45000" bIns="45000" anchor="ctr">
-            <a:noAutofit/>
-          </a:bodyPr>
-          <a:p>
-            <a:pPr algn="ctr">
-              <a:lnSpc>
-                <a:spcPct val="100000"/>
-              </a:lnSpc>
-            </a:pPr>
-            <a:r>
-              <a:rPr b="1" lang="pt-BR" sz="1200" spc="-1" strike="noStrike">
-                <a:solidFill>
-                  <a:srgbClr val="ffffff"/>
-                </a:solidFill>
-                <a:latin typeface="Calibri"/>
-                <a:ea typeface="DejaVu Sans"/>
-              </a:rPr>
-              <a:t>Receber máquina para reparo</a:t>
-            </a:r>
-            <a:endParaRPr b="0" lang="pt-BR" sz="1200" spc="-1" strike="noStrike">
-              <a:latin typeface="Arial"/>
-            </a:endParaRPr>
-          </a:p>
-        </p:txBody>
-      </p:sp>
-      <p:sp>
-        <p:nvSpPr>
-          <p:cNvPr id="82" name="CustomShape 4"/>
-          <p:cNvSpPr/>
-          <p:nvPr/>
-        </p:nvSpPr>
-        <p:spPr>
-          <a:xfrm>
-            <a:off x="1682280" y="2561040"/>
-            <a:ext cx="1102320" cy="753480"/>
-          </a:xfrm>
-          <a:prstGeom prst="rect">
-            <a:avLst/>
-          </a:prstGeom>
-          <a:solidFill>
-            <a:srgbClr val="4472c4"/>
-          </a:solidFill>
-          <a:ln w="12600">
-            <a:solidFill>
-              <a:srgbClr val="325490"/>
-            </a:solidFill>
-            <a:miter/>
-          </a:ln>
-        </p:spPr>
-        <p:style>
-          <a:lnRef idx="0"/>
-          <a:fillRef idx="0"/>
-          <a:effectRef idx="0"/>
-          <a:fontRef idx="minor"/>
-        </p:style>
-        <p:txBody>
-          <a:bodyPr lIns="90000" rIns="90000" tIns="45000" bIns="45000" anchor="ctr">
-            <a:noAutofit/>
-          </a:bodyPr>
-          <a:p>
-            <a:pPr algn="ctr">
-              <a:lnSpc>
-                <a:spcPct val="100000"/>
-              </a:lnSpc>
-            </a:pPr>
-            <a:r>
-              <a:rPr b="0" lang="pt-BR" sz="1800" spc="-1" strike="noStrike">
-                <a:solidFill>
-                  <a:srgbClr val="ffffff"/>
-                </a:solidFill>
-                <a:latin typeface="Calibri"/>
-                <a:ea typeface="DejaVu Sans"/>
-              </a:rPr>
-              <a:t>Cliente</a:t>
-            </a:r>
-            <a:endParaRPr b="0" lang="pt-BR" sz="1800" spc="-1" strike="noStrike">
-              <a:latin typeface="Arial"/>
-            </a:endParaRPr>
-          </a:p>
-        </p:txBody>
-      </p:sp>
-      <p:sp>
-        <p:nvSpPr>
-          <p:cNvPr id="83" name="CustomShape 5"/>
-          <p:cNvSpPr/>
-          <p:nvPr/>
-        </p:nvSpPr>
-        <p:spPr>
-          <a:xfrm>
-            <a:off x="5412240" y="1395720"/>
-            <a:ext cx="3299040" cy="3282120"/>
-          </a:xfrm>
-          <a:prstGeom prst="roundRect">
-            <a:avLst>
-              <a:gd name="adj" fmla="val 16667"/>
-            </a:avLst>
-          </a:prstGeom>
-          <a:noFill/>
-          <a:ln w="12600">
-            <a:solidFill>
-              <a:srgbClr val="325490"/>
-            </a:solidFill>
-            <a:miter/>
-          </a:ln>
-        </p:spPr>
-        <p:style>
-          <a:lnRef idx="0"/>
-          <a:fillRef idx="0"/>
-          <a:effectRef idx="0"/>
-          <a:fontRef idx="minor"/>
-        </p:style>
-        <p:txBody>
-          <a:bodyPr lIns="90000" rIns="90000" tIns="45000" bIns="45000">
-            <a:noAutofit/>
-          </a:bodyPr>
-          <a:p>
-            <a:pPr algn="ctr">
-              <a:lnSpc>
-                <a:spcPct val="100000"/>
-              </a:lnSpc>
-            </a:pPr>
-            <a:r>
-              <a:rPr b="0" lang="pt-BR" sz="1800" spc="-1" strike="noStrike">
-                <a:solidFill>
-                  <a:srgbClr val="000000"/>
-                </a:solidFill>
-                <a:latin typeface="Calibri"/>
-                <a:ea typeface="DejaVu Sans"/>
-              </a:rPr>
-              <a:t>Produção</a:t>
-            </a:r>
-            <a:endParaRPr b="0" lang="pt-BR" sz="1800" spc="-1" strike="noStrike">
-              <a:latin typeface="Arial"/>
-            </a:endParaRPr>
-          </a:p>
-        </p:txBody>
-      </p:sp>
-      <p:sp>
-        <p:nvSpPr>
-          <p:cNvPr id="84" name="Line 6"/>
-          <p:cNvSpPr/>
-          <p:nvPr/>
-        </p:nvSpPr>
-        <p:spPr>
-          <a:xfrm>
-            <a:off x="6120000" y="3240000"/>
-            <a:ext cx="2520" cy="432000"/>
-          </a:xfrm>
-          <a:prstGeom prst="line">
-            <a:avLst/>
-          </a:prstGeom>
-          <a:ln w="6480">
-            <a:solidFill>
-              <a:srgbClr val="4472c4"/>
-            </a:solidFill>
-            <a:miter/>
-          </a:ln>
-        </p:spPr>
-        <p:style>
-          <a:lnRef idx="0"/>
-          <a:fillRef idx="0"/>
-          <a:effectRef idx="0"/>
-          <a:fontRef idx="minor"/>
-        </p:style>
-      </p:sp>
-      <p:sp>
-        <p:nvSpPr>
-          <p:cNvPr id="85" name="Line 7"/>
+          <p:cNvPr id="69" name="Line 7"/>
           <p:cNvSpPr/>
           <p:nvPr/>
         </p:nvSpPr>

</xml_diff>

<commit_message>
15 , 16 17
</commit_message>
<xml_diff>
--- a/Artefatos/15-ArquiteturaDeNegocioParaCadaCenario.pptx
+++ b/Artefatos/15-ArquiteturaDeNegocioParaCadaCenario.pptx
@@ -66,7 +66,7 @@
         <p:spPr>
           <a:xfrm>
             <a:off x="692640" y="375480"/>
-            <a:ext cx="8691120" cy="946800"/>
+            <a:ext cx="8690760" cy="946800"/>
           </a:xfrm>
           <a:prstGeom prst="rect">
             <a:avLst/>
@@ -179,7 +179,7 @@
         <p:spPr>
           <a:xfrm>
             <a:off x="692640" y="375480"/>
-            <a:ext cx="8691120" cy="946800"/>
+            <a:ext cx="8690760" cy="946800"/>
           </a:xfrm>
           <a:prstGeom prst="rect">
             <a:avLst/>
@@ -352,7 +352,7 @@
         <p:spPr>
           <a:xfrm>
             <a:off x="692640" y="375480"/>
-            <a:ext cx="8691120" cy="946800"/>
+            <a:ext cx="8690760" cy="946800"/>
           </a:xfrm>
           <a:prstGeom prst="rect">
             <a:avLst/>
@@ -585,7 +585,7 @@
         <p:spPr>
           <a:xfrm>
             <a:off x="692640" y="375480"/>
-            <a:ext cx="8691120" cy="946800"/>
+            <a:ext cx="8690760" cy="946800"/>
           </a:xfrm>
           <a:prstGeom prst="rect">
             <a:avLst/>
@@ -669,7 +669,7 @@
         <p:spPr>
           <a:xfrm>
             <a:off x="692640" y="375480"/>
-            <a:ext cx="8691120" cy="946800"/>
+            <a:ext cx="8690760" cy="946800"/>
           </a:xfrm>
           <a:prstGeom prst="rect">
             <a:avLst/>
@@ -752,7 +752,7 @@
         <p:spPr>
           <a:xfrm>
             <a:off x="692640" y="375480"/>
-            <a:ext cx="8691120" cy="946800"/>
+            <a:ext cx="8690760" cy="946800"/>
           </a:xfrm>
           <a:prstGeom prst="rect">
             <a:avLst/>
@@ -865,7 +865,7 @@
         <p:spPr>
           <a:xfrm>
             <a:off x="692640" y="375480"/>
-            <a:ext cx="8691120" cy="946800"/>
+            <a:ext cx="8690760" cy="946800"/>
           </a:xfrm>
           <a:prstGeom prst="rect">
             <a:avLst/>
@@ -918,7 +918,7 @@
         <p:spPr>
           <a:xfrm>
             <a:off x="692640" y="375480"/>
-            <a:ext cx="8691120" cy="4390200"/>
+            <a:ext cx="8690760" cy="4390200"/>
           </a:xfrm>
           <a:prstGeom prst="rect">
             <a:avLst/>
@@ -971,7 +971,7 @@
         <p:spPr>
           <a:xfrm>
             <a:off x="692640" y="375480"/>
-            <a:ext cx="8691120" cy="946800"/>
+            <a:ext cx="8690760" cy="946800"/>
           </a:xfrm>
           <a:prstGeom prst="rect">
             <a:avLst/>
@@ -1114,7 +1114,7 @@
         <p:spPr>
           <a:xfrm>
             <a:off x="692640" y="375480"/>
-            <a:ext cx="8691120" cy="946800"/>
+            <a:ext cx="8690760" cy="946800"/>
           </a:xfrm>
           <a:prstGeom prst="rect">
             <a:avLst/>
@@ -1257,7 +1257,7 @@
         <p:spPr>
           <a:xfrm>
             <a:off x="692640" y="375480"/>
-            <a:ext cx="8691120" cy="946800"/>
+            <a:ext cx="8690760" cy="946800"/>
           </a:xfrm>
           <a:prstGeom prst="rect">
             <a:avLst/>
@@ -1407,7 +1407,7 @@
         <p:spPr>
           <a:xfrm>
             <a:off x="692640" y="375480"/>
-            <a:ext cx="8691120" cy="946800"/>
+            <a:ext cx="8690760" cy="946800"/>
           </a:xfrm>
           <a:prstGeom prst="rect">
             <a:avLst/>
@@ -1655,7 +1655,7 @@
         <p:spPr>
           <a:xfrm>
             <a:off x="692640" y="367560"/>
-            <a:ext cx="8691120" cy="1092960"/>
+            <a:ext cx="8690760" cy="1092600"/>
           </a:xfrm>
           <a:prstGeom prst="rect">
             <a:avLst/>
@@ -1706,7 +1706,7 @@
         <p:spPr>
           <a:xfrm>
             <a:off x="192240" y="2736000"/>
-            <a:ext cx="1174320" cy="753120"/>
+            <a:ext cx="1173960" cy="752760"/>
           </a:xfrm>
           <a:prstGeom prst="rect">
             <a:avLst/>
@@ -1762,7 +1762,7 @@
         <p:spPr>
           <a:xfrm>
             <a:off x="2739600" y="2079000"/>
-            <a:ext cx="2732400" cy="729000"/>
+            <a:ext cx="2732400" cy="790200"/>
           </a:xfrm>
           <a:prstGeom prst="rect">
             <a:avLst/>
@@ -1783,22 +1783,17 @@
             <a:spAutoFit/>
           </a:bodyPr>
           <a:p>
-            <a:pPr marL="343080" indent="-340200">
+            <a:pPr>
               <a:lnSpc>
                 <a:spcPct val="100000"/>
               </a:lnSpc>
-              <a:buClr>
-                <a:srgbClr val="000000"/>
-              </a:buClr>
-              <a:buFont typeface="StarSymbol"/>
-              <a:buAutoNum type="arabicPeriod"/>
             </a:pPr>
             <a:endParaRPr b="0" lang="pt-BR" sz="1800" spc="-1" strike="noStrike">
               <a:latin typeface="Arial"/>
             </a:endParaRPr>
           </a:p>
           <a:p>
-            <a:pPr marL="343080" indent="-340200">
+            <a:pPr marL="343080" indent="-339840">
               <a:lnSpc>
                 <a:spcPct val="100000"/>
               </a:lnSpc>
@@ -1843,7 +1838,7 @@
         <p:spPr>
           <a:xfrm>
             <a:off x="6048000" y="2016000"/>
-            <a:ext cx="2982240" cy="2374560"/>
+            <a:ext cx="2981880" cy="2374200"/>
           </a:xfrm>
           <a:prstGeom prst="roundRect">
             <a:avLst>
@@ -1932,7 +1927,7 @@
         <p:spPr>
           <a:xfrm>
             <a:off x="72000" y="4141440"/>
-            <a:ext cx="1174320" cy="753120"/>
+            <a:ext cx="1173960" cy="752760"/>
           </a:xfrm>
           <a:prstGeom prst="rect">
             <a:avLst/>
@@ -2016,7 +2011,7 @@
         <p:spPr>
           <a:xfrm>
             <a:off x="2808000" y="3528000"/>
-            <a:ext cx="2159280" cy="577080"/>
+            <a:ext cx="2158920" cy="576720"/>
           </a:xfrm>
           <a:prstGeom prst="rect">
             <a:avLst/>
@@ -2107,7 +2102,7 @@
         <p:spPr>
           <a:xfrm>
             <a:off x="692640" y="301680"/>
-            <a:ext cx="8691120" cy="1092960"/>
+            <a:ext cx="8690760" cy="1092600"/>
           </a:xfrm>
           <a:prstGeom prst="rect">
             <a:avLst/>
@@ -2168,7 +2163,7 @@
         <p:spPr>
           <a:xfrm>
             <a:off x="3049200" y="2592000"/>
-            <a:ext cx="1342800" cy="480240"/>
+            <a:ext cx="1342440" cy="479880"/>
           </a:xfrm>
           <a:prstGeom prst="cube">
             <a:avLst>
@@ -2256,7 +2251,7 @@
         <p:spPr>
           <a:xfrm>
             <a:off x="3096000" y="3554280"/>
-            <a:ext cx="1095480" cy="837720"/>
+            <a:ext cx="1095120" cy="837360"/>
           </a:xfrm>
           <a:prstGeom prst="roundRect">
             <a:avLst>
@@ -2311,7 +2306,7 @@
         <p:spPr>
           <a:xfrm>
             <a:off x="120960" y="2520000"/>
-            <a:ext cx="1101960" cy="753120"/>
+            <a:ext cx="1101600" cy="752760"/>
           </a:xfrm>
           <a:prstGeom prst="rect">
             <a:avLst/>
@@ -2367,7 +2362,7 @@
         <p:spPr>
           <a:xfrm>
             <a:off x="3024000" y="1440000"/>
-            <a:ext cx="6622560" cy="3526560"/>
+            <a:ext cx="6622200" cy="3526200"/>
           </a:xfrm>
           <a:prstGeom prst="roundRect">
             <a:avLst>
@@ -2484,7 +2479,7 @@
         <p:spPr>
           <a:xfrm>
             <a:off x="7992000" y="2592000"/>
-            <a:ext cx="1342800" cy="480240"/>
+            <a:ext cx="1342440" cy="479880"/>
           </a:xfrm>
           <a:prstGeom prst="cube">
             <a:avLst>
@@ -2572,7 +2567,7 @@
         <p:spPr>
           <a:xfrm>
             <a:off x="7904520" y="3626280"/>
-            <a:ext cx="1095480" cy="837720"/>
+            <a:ext cx="1095120" cy="837360"/>
           </a:xfrm>
           <a:prstGeom prst="roundRect">
             <a:avLst>
@@ -2655,7 +2650,7 @@
         <p:spPr>
           <a:xfrm>
             <a:off x="4248000" y="3554280"/>
-            <a:ext cx="1095480" cy="837720"/>
+            <a:ext cx="1095120" cy="837360"/>
           </a:xfrm>
           <a:prstGeom prst="roundRect">
             <a:avLst>
@@ -2710,7 +2705,7 @@
         <p:spPr>
           <a:xfrm>
             <a:off x="5400000" y="2398680"/>
-            <a:ext cx="1368000" cy="697320"/>
+            <a:ext cx="1367640" cy="696960"/>
           </a:xfrm>
           <a:prstGeom prst="cube">
             <a:avLst>
@@ -2791,25 +2786,23 @@
       </p:sp>
       <p:sp>
         <p:nvSpPr>
-          <p:cNvPr id="58" name="CustomShape 13"/>
+          <p:cNvPr id="58" name="Line 13"/>
           <p:cNvSpPr/>
           <p:nvPr/>
         </p:nvSpPr>
         <p:spPr>
           <a:xfrm>
-            <a:off x="5456520" y="3600000"/>
-            <a:ext cx="1095480" cy="862920"/>
-          </a:xfrm>
-          <a:prstGeom prst="roundRect">
-            <a:avLst>
-              <a:gd name="adj" fmla="val 16667"/>
-            </a:avLst>
-          </a:prstGeom>
-          <a:solidFill>
-            <a:srgbClr val="70ad47"/>
-          </a:solidFill>
-          <a:ln>
-            <a:noFill/>
+            <a:off x="4176000" y="3072240"/>
+            <a:ext cx="432000" cy="482040"/>
+          </a:xfrm>
+          <a:prstGeom prst="line">
+            <a:avLst/>
+          </a:prstGeom>
+          <a:ln w="6480">
+            <a:solidFill>
+              <a:srgbClr val="4472c4"/>
+            </a:solidFill>
+            <a:miter/>
           </a:ln>
         </p:spPr>
         <p:style>
@@ -2818,98 +2811,17 @@
           <a:effectRef idx="0"/>
           <a:fontRef idx="minor"/>
         </p:style>
-        <p:txBody>
-          <a:bodyPr lIns="90000" rIns="90000" tIns="45000" bIns="45000" anchor="ctr">
-            <a:noAutofit/>
-          </a:bodyPr>
-          <a:p>
-            <a:pPr algn="ctr">
-              <a:lnSpc>
-                <a:spcPct val="100000"/>
-              </a:lnSpc>
-            </a:pPr>
-            <a:r>
-              <a:rPr b="1" lang="pt-BR" sz="1200" spc="-1" strike="noStrike">
-                <a:solidFill>
-                  <a:srgbClr val="ffffff"/>
-                </a:solidFill>
-                <a:latin typeface="Calibri"/>
-                <a:ea typeface="DejaVu Sans"/>
-              </a:rPr>
-              <a:t>Testar sub componente</a:t>
-            </a:r>
-            <a:endParaRPr b="0" lang="pt-BR" sz="1200" spc="-1" strike="noStrike">
-              <a:latin typeface="Arial"/>
-            </a:endParaRPr>
-          </a:p>
-        </p:txBody>
-      </p:sp>
-      <p:sp>
-        <p:nvSpPr>
-          <p:cNvPr id="59" name="Line 14"/>
+      </p:sp>
+      <p:sp>
+        <p:nvSpPr>
+          <p:cNvPr id="59" name="CustomShape 14"/>
           <p:cNvSpPr/>
           <p:nvPr/>
         </p:nvSpPr>
         <p:spPr>
           <a:xfrm>
-            <a:off x="6048000" y="3121560"/>
-            <a:ext cx="0" cy="479520"/>
-          </a:xfrm>
-          <a:prstGeom prst="line">
-            <a:avLst/>
-          </a:prstGeom>
-          <a:ln w="6480">
-            <a:solidFill>
-              <a:srgbClr val="4472c4"/>
-            </a:solidFill>
-            <a:miter/>
-          </a:ln>
-        </p:spPr>
-        <p:style>
-          <a:lnRef idx="0"/>
-          <a:fillRef idx="0"/>
-          <a:effectRef idx="0"/>
-          <a:fontRef idx="minor"/>
-        </p:style>
-      </p:sp>
-      <p:sp>
-        <p:nvSpPr>
-          <p:cNvPr id="60" name="Line 15"/>
-          <p:cNvSpPr/>
-          <p:nvPr/>
-        </p:nvSpPr>
-        <p:spPr>
-          <a:xfrm>
-            <a:off x="4176000" y="3072240"/>
-            <a:ext cx="432000" cy="482040"/>
-          </a:xfrm>
-          <a:prstGeom prst="line">
-            <a:avLst/>
-          </a:prstGeom>
-          <a:ln w="6480">
-            <a:solidFill>
-              <a:srgbClr val="4472c4"/>
-            </a:solidFill>
-            <a:miter/>
-          </a:ln>
-        </p:spPr>
-        <p:style>
-          <a:lnRef idx="0"/>
-          <a:fillRef idx="0"/>
-          <a:effectRef idx="0"/>
-          <a:fontRef idx="minor"/>
-        </p:style>
-      </p:sp>
-      <p:sp>
-        <p:nvSpPr>
-          <p:cNvPr id="61" name="CustomShape 16"/>
-          <p:cNvSpPr/>
-          <p:nvPr/>
-        </p:nvSpPr>
-        <p:spPr>
-          <a:xfrm>
             <a:off x="6640920" y="3600000"/>
-            <a:ext cx="1135080" cy="792000"/>
+            <a:ext cx="1134720" cy="791640"/>
           </a:xfrm>
           <a:prstGeom prst="roundRect">
             <a:avLst>
@@ -2957,7 +2869,7 @@
       </p:sp>
       <p:sp>
         <p:nvSpPr>
-          <p:cNvPr id="62" name="Line 17"/>
+          <p:cNvPr id="60" name="Line 15"/>
           <p:cNvSpPr/>
           <p:nvPr/>
         </p:nvSpPr>
@@ -3015,14 +2927,14 @@
       </p:grpSpPr>
       <p:sp>
         <p:nvSpPr>
-          <p:cNvPr id="63" name="CustomShape 1"/>
+          <p:cNvPr id="61" name="CustomShape 1"/>
           <p:cNvSpPr/>
           <p:nvPr/>
         </p:nvSpPr>
         <p:spPr>
           <a:xfrm>
             <a:off x="692640" y="301680"/>
-            <a:ext cx="8691120" cy="1092960"/>
+            <a:ext cx="8690760" cy="1092600"/>
           </a:xfrm>
           <a:prstGeom prst="rect">
             <a:avLst/>
@@ -3076,14 +2988,14 @@
       </p:sp>
       <p:sp>
         <p:nvSpPr>
-          <p:cNvPr id="64" name="CustomShape 2"/>
+          <p:cNvPr id="62" name="CustomShape 2"/>
           <p:cNvSpPr/>
           <p:nvPr/>
         </p:nvSpPr>
         <p:spPr>
           <a:xfrm>
             <a:off x="6231600" y="2637000"/>
-            <a:ext cx="1342800" cy="480240"/>
+            <a:ext cx="1342440" cy="479880"/>
           </a:xfrm>
           <a:prstGeom prst="cube">
             <a:avLst>
@@ -3164,14 +3076,14 @@
       </p:sp>
       <p:sp>
         <p:nvSpPr>
-          <p:cNvPr id="65" name="CustomShape 3"/>
+          <p:cNvPr id="63" name="CustomShape 3"/>
           <p:cNvSpPr/>
           <p:nvPr/>
         </p:nvSpPr>
         <p:spPr>
           <a:xfrm>
             <a:off x="6318000" y="3551760"/>
-            <a:ext cx="1095480" cy="837720"/>
+            <a:ext cx="1095120" cy="837360"/>
           </a:xfrm>
           <a:prstGeom prst="roundRect">
             <a:avLst>
@@ -3219,14 +3131,14 @@
       </p:sp>
       <p:sp>
         <p:nvSpPr>
-          <p:cNvPr id="66" name="CustomShape 4"/>
+          <p:cNvPr id="64" name="CustomShape 4"/>
           <p:cNvSpPr/>
           <p:nvPr/>
         </p:nvSpPr>
         <p:spPr>
           <a:xfrm>
             <a:off x="1682280" y="2561040"/>
-            <a:ext cx="1101960" cy="753120"/>
+            <a:ext cx="1101600" cy="752760"/>
           </a:xfrm>
           <a:prstGeom prst="rect">
             <a:avLst/>
@@ -3275,14 +3187,14 @@
       </p:sp>
       <p:sp>
         <p:nvSpPr>
-          <p:cNvPr id="67" name="CustomShape 5"/>
+          <p:cNvPr id="65" name="CustomShape 5"/>
           <p:cNvSpPr/>
           <p:nvPr/>
         </p:nvSpPr>
         <p:spPr>
           <a:xfrm>
             <a:off x="5412240" y="1584000"/>
-            <a:ext cx="3009240" cy="3093480"/>
+            <a:ext cx="3008880" cy="3093120"/>
           </a:xfrm>
           <a:prstGeom prst="roundRect">
             <a:avLst>
@@ -3331,7 +3243,7 @@
       </p:sp>
       <p:sp>
         <p:nvSpPr>
-          <p:cNvPr id="68" name="Line 6"/>
+          <p:cNvPr id="66" name="Line 6"/>
           <p:cNvSpPr/>
           <p:nvPr/>
         </p:nvSpPr>
@@ -3359,7 +3271,7 @@
       </p:sp>
       <p:sp>
         <p:nvSpPr>
-          <p:cNvPr id="69" name="Line 7"/>
+          <p:cNvPr id="67" name="Line 7"/>
           <p:cNvSpPr/>
           <p:nvPr/>
         </p:nvSpPr>

</xml_diff>